<commit_message>
[documentação] adiciona o status report da semana 03/11 à 10/11
</commit_message>
<xml_diff>
--- a/documentacao/status-report/Status_Report_-_Grupo_09.pptx
+++ b/documentacao/status-report/Status_Report_-_Grupo_09.pptx
@@ -7,10 +7,10 @@
     <p:sldMasterId id="2147483665" r:id="rId6"/>
   </p:sldMasterIdLst>
   <p:notesMasterIdLst>
-    <p:notesMasterId r:id="rId17"/>
+    <p:notesMasterId r:id="rId18"/>
   </p:notesMasterIdLst>
   <p:handoutMasterIdLst>
-    <p:handoutMasterId r:id="rId18"/>
+    <p:handoutMasterId r:id="rId19"/>
   </p:handoutMasterIdLst>
   <p:sldIdLst>
     <p:sldId id="344" r:id="rId7"/>
@@ -23,6 +23,7 @@
     <p:sldId id="477" r:id="rId14"/>
     <p:sldId id="478" r:id="rId15"/>
     <p:sldId id="479" r:id="rId16"/>
+    <p:sldId id="480" r:id="rId17"/>
   </p:sldIdLst>
   <p:sldSz cx="13442950" cy="7561263"/>
   <p:notesSz cx="7104063" cy="10234613"/>
@@ -139,6 +140,7 @@
             <p14:sldId id="477"/>
             <p14:sldId id="478"/>
             <p14:sldId id="479"/>
+            <p14:sldId id="480"/>
           </p14:sldIdLst>
         </p14:section>
       </p14:sectionLst>
@@ -437,7 +439,7 @@
             <a:fld id="{C3CD65D1-5C11-455D-9F9A-0E035F00A0DA}" type="datetimeFigureOut">
               <a:rPr lang="pt-BR" smtClean="0"/>
               <a:pPr/>
-              <a:t>03/11/2021</a:t>
+              <a:t>10/11/2021</a:t>
             </a:fld>
             <a:endParaRPr lang="pt-BR"/>
           </a:p>
@@ -605,7 +607,7 @@
             <a:fld id="{A05DA3EF-18EA-43DE-B1BB-402A3C558822}" type="datetimeFigureOut">
               <a:rPr lang="pt-BR" smtClean="0"/>
               <a:pPr/>
-              <a:t>03/11/2021</a:t>
+              <a:t>10/11/2021</a:t>
             </a:fld>
             <a:endParaRPr lang="pt-BR"/>
           </a:p>
@@ -1045,6 +1047,99 @@
     <p:extLst>
       <p:ext uri="{BB962C8B-B14F-4D97-AF65-F5344CB8AC3E}">
         <p14:creationId xmlns:p14="http://schemas.microsoft.com/office/powerpoint/2010/main" val="2926183806"/>
+      </p:ext>
+    </p:extLst>
+  </p:cSld>
+  <p:clrMapOvr>
+    <a:masterClrMapping/>
+  </p:clrMapOvr>
+</p:notes>
+</file>
+
+<file path=ppt/notesSlides/notesSlide11.xml><?xml version="1.0" encoding="utf-8"?>
+<p:notes xmlns:a="http://schemas.openxmlformats.org/drawingml/2006/main" xmlns:r="http://schemas.openxmlformats.org/officeDocument/2006/relationships" xmlns:p="http://schemas.openxmlformats.org/presentationml/2006/main">
+  <p:cSld>
+    <p:spTree>
+      <p:nvGrpSpPr>
+        <p:cNvPr id="1" name=""/>
+        <p:cNvGrpSpPr/>
+        <p:nvPr/>
+      </p:nvGrpSpPr>
+      <p:grpSpPr>
+        <a:xfrm>
+          <a:off x="0" y="0"/>
+          <a:ext cx="0" cy="0"/>
+          <a:chOff x="0" y="0"/>
+          <a:chExt cx="0" cy="0"/>
+        </a:xfrm>
+      </p:grpSpPr>
+      <p:sp>
+        <p:nvSpPr>
+          <p:cNvPr id="2" name="Slide Image Placeholder 1"/>
+          <p:cNvSpPr>
+            <a:spLocks noGrp="1" noRot="1" noChangeAspect="1"/>
+          </p:cNvSpPr>
+          <p:nvPr>
+            <p:ph type="sldImg"/>
+          </p:nvPr>
+        </p:nvSpPr>
+        <p:spPr/>
+      </p:sp>
+      <p:sp>
+        <p:nvSpPr>
+          <p:cNvPr id="3" name="Notes Placeholder 2"/>
+          <p:cNvSpPr>
+            <a:spLocks noGrp="1"/>
+          </p:cNvSpPr>
+          <p:nvPr>
+            <p:ph type="body" idx="1"/>
+          </p:nvPr>
+        </p:nvSpPr>
+        <p:spPr/>
+        <p:txBody>
+          <a:bodyPr/>
+          <a:lstStyle/>
+          <a:p>
+            <a:endParaRPr lang="en-US"/>
+          </a:p>
+        </p:txBody>
+      </p:sp>
+      <p:sp>
+        <p:nvSpPr>
+          <p:cNvPr id="4" name="Slide Number Placeholder 3"/>
+          <p:cNvSpPr>
+            <a:spLocks noGrp="1"/>
+          </p:cNvSpPr>
+          <p:nvPr>
+            <p:ph type="sldNum" sz="quarter" idx="10"/>
+          </p:nvPr>
+        </p:nvSpPr>
+        <p:spPr/>
+        <p:txBody>
+          <a:bodyPr/>
+          <a:lstStyle/>
+          <a:p>
+            <a:fld id="{B39AF3DB-B6A1-2444-9DD8-53D016F8E638}" type="slidenum">
+              <a:rPr lang="pt-BR" smtClean="0">
+                <a:solidFill>
+                  <a:prstClr val="black"/>
+                </a:solidFill>
+              </a:rPr>
+              <a:pPr/>
+              <a:t>11</a:t>
+            </a:fld>
+            <a:endParaRPr lang="pt-BR">
+              <a:solidFill>
+                <a:prstClr val="black"/>
+              </a:solidFill>
+            </a:endParaRPr>
+          </a:p>
+        </p:txBody>
+      </p:sp>
+    </p:spTree>
+    <p:extLst>
+      <p:ext uri="{BB962C8B-B14F-4D97-AF65-F5344CB8AC3E}">
+        <p14:creationId xmlns:p14="http://schemas.microsoft.com/office/powerpoint/2010/main" val="409348578"/>
       </p:ext>
     </p:extLst>
   </p:cSld>
@@ -23543,6 +23638,1969 @@
     <p:extLst>
       <p:ext uri="{BB962C8B-B14F-4D97-AF65-F5344CB8AC3E}">
         <p14:creationId xmlns:p14="http://schemas.microsoft.com/office/powerpoint/2010/main" val="84309309"/>
+      </p:ext>
+    </p:extLst>
+  </p:cSld>
+  <p:clrMapOvr>
+    <a:masterClrMapping/>
+  </p:clrMapOvr>
+</p:sld>
+</file>
+
+<file path=ppt/slides/slide11.xml><?xml version="1.0" encoding="utf-8"?>
+<p:sld xmlns:a="http://schemas.openxmlformats.org/drawingml/2006/main" xmlns:r="http://schemas.openxmlformats.org/officeDocument/2006/relationships" xmlns:p="http://schemas.openxmlformats.org/presentationml/2006/main">
+  <p:cSld>
+    <p:spTree>
+      <p:nvGrpSpPr>
+        <p:cNvPr id="1" name=""/>
+        <p:cNvGrpSpPr/>
+        <p:nvPr/>
+      </p:nvGrpSpPr>
+      <p:grpSpPr>
+        <a:xfrm>
+          <a:off x="0" y="0"/>
+          <a:ext cx="0" cy="0"/>
+          <a:chOff x="0" y="0"/>
+          <a:chExt cx="0" cy="0"/>
+        </a:xfrm>
+      </p:grpSpPr>
+      <p:sp>
+        <p:nvSpPr>
+          <p:cNvPr id="43" name="Rectangle 42"/>
+          <p:cNvSpPr/>
+          <p:nvPr/>
+        </p:nvSpPr>
+        <p:spPr>
+          <a:xfrm>
+            <a:off x="6804884" y="1106495"/>
+            <a:ext cx="6254624" cy="2191469"/>
+          </a:xfrm>
+          <a:prstGeom prst="rect">
+            <a:avLst/>
+          </a:prstGeom>
+          <a:noFill/>
+          <a:ln w="12700">
+            <a:solidFill>
+              <a:schemeClr val="bg1">
+                <a:lumMod val="50000"/>
+              </a:schemeClr>
+            </a:solidFill>
+          </a:ln>
+        </p:spPr>
+        <p:style>
+          <a:lnRef idx="2">
+            <a:schemeClr val="accent4"/>
+          </a:lnRef>
+          <a:fillRef idx="1">
+            <a:schemeClr val="lt1"/>
+          </a:fillRef>
+          <a:effectRef idx="0">
+            <a:schemeClr val="accent4"/>
+          </a:effectRef>
+          <a:fontRef idx="minor">
+            <a:schemeClr val="dk1"/>
+          </a:fontRef>
+        </p:style>
+        <p:txBody>
+          <a:bodyPr tIns="105844" rtlCol="0" anchor="t"/>
+          <a:lstStyle/>
+          <a:p>
+            <a:pPr defTabSz="672130">
+              <a:spcAft>
+                <a:spcPts val="882"/>
+              </a:spcAft>
+            </a:pPr>
+            <a:endParaRPr lang="pt-BR" sz="1470" dirty="0">
+              <a:solidFill>
+                <a:schemeClr val="tx1"/>
+              </a:solidFill>
+              <a:latin typeface="Exo 2 Medium" panose="00000600000000000000" pitchFamily="50" charset="0"/>
+              <a:cs typeface="Simplon BP Regular"/>
+            </a:endParaRPr>
+          </a:p>
+        </p:txBody>
+      </p:sp>
+      <p:sp>
+        <p:nvSpPr>
+          <p:cNvPr id="3" name="Title 2"/>
+          <p:cNvSpPr>
+            <a:spLocks noGrp="1"/>
+          </p:cNvSpPr>
+          <p:nvPr>
+            <p:ph type="title"/>
+          </p:nvPr>
+        </p:nvSpPr>
+        <p:spPr>
+          <a:xfrm>
+            <a:off x="469692" y="185232"/>
+            <a:ext cx="12098020" cy="800352"/>
+          </a:xfrm>
+        </p:spPr>
+        <p:txBody>
+          <a:bodyPr vert="horz" wrap="square" lIns="105844" tIns="0" rIns="105844" bIns="0" numCol="1" anchor="t" anchorCtr="0" compatLnSpc="1">
+            <a:prstTxWarp prst="textNoShape">
+              <a:avLst/>
+            </a:prstTxWarp>
+            <a:noAutofit/>
+          </a:bodyPr>
+          <a:lstStyle/>
+          <a:p>
+            <a:pPr algn="l">
+              <a:spcAft>
+                <a:spcPts val="882"/>
+              </a:spcAft>
+            </a:pPr>
+            <a:r>
+              <a:rPr lang="en-US" sz="2646" dirty="0">
+                <a:solidFill>
+                  <a:prstClr val="black"/>
+                </a:solidFill>
+                <a:latin typeface="Exo 2 Medium" panose="00000600000000000000" pitchFamily="50" charset="0"/>
+                <a:cs typeface="Simplon Oi Headline"/>
+              </a:rPr>
+              <a:t>SEMANA 13 - 10/11/2021</a:t>
+            </a:r>
+          </a:p>
+        </p:txBody>
+      </p:sp>
+      <p:sp>
+        <p:nvSpPr>
+          <p:cNvPr id="78" name="TextBox 118"/>
+          <p:cNvSpPr txBox="1"/>
+          <p:nvPr/>
+        </p:nvSpPr>
+        <p:spPr>
+          <a:xfrm>
+            <a:off x="11822773" y="576471"/>
+            <a:ext cx="899678" cy="179824"/>
+          </a:xfrm>
+          <a:prstGeom prst="rect">
+            <a:avLst/>
+          </a:prstGeom>
+          <a:noFill/>
+          <a:ln w="12700">
+            <a:noFill/>
+          </a:ln>
+        </p:spPr>
+        <p:style>
+          <a:lnRef idx="2">
+            <a:schemeClr val="accent4"/>
+          </a:lnRef>
+          <a:fillRef idx="1">
+            <a:schemeClr val="lt1"/>
+          </a:fillRef>
+          <a:effectRef idx="0">
+            <a:schemeClr val="accent4"/>
+          </a:effectRef>
+          <a:fontRef idx="minor">
+            <a:schemeClr val="dk1"/>
+          </a:fontRef>
+        </p:style>
+        <p:txBody>
+          <a:bodyPr wrap="none" lIns="52922" tIns="52922" rIns="52922" bIns="0" rtlCol="0" anchor="b"/>
+          <a:lstStyle>
+            <a:defPPr>
+              <a:defRPr lang="en-US"/>
+            </a:defPPr>
+            <a:lvl1pPr algn="ctr">
+              <a:defRPr sz="1000" b="1">
+                <a:latin typeface="Simplon BP Regular"/>
+                <a:cs typeface="Simplon BP Regular"/>
+              </a:defRPr>
+            </a:lvl1pPr>
+            <a:lvl2pPr>
+              <a:defRPr>
+                <a:solidFill>
+                  <a:schemeClr val="dk1"/>
+                </a:solidFill>
+              </a:defRPr>
+            </a:lvl2pPr>
+            <a:lvl3pPr>
+              <a:defRPr>
+                <a:solidFill>
+                  <a:schemeClr val="dk1"/>
+                </a:solidFill>
+              </a:defRPr>
+            </a:lvl3pPr>
+            <a:lvl4pPr>
+              <a:defRPr>
+                <a:solidFill>
+                  <a:schemeClr val="dk1"/>
+                </a:solidFill>
+              </a:defRPr>
+            </a:lvl4pPr>
+            <a:lvl5pPr>
+              <a:defRPr>
+                <a:solidFill>
+                  <a:schemeClr val="dk1"/>
+                </a:solidFill>
+              </a:defRPr>
+            </a:lvl5pPr>
+            <a:lvl6pPr>
+              <a:defRPr>
+                <a:solidFill>
+                  <a:schemeClr val="dk1"/>
+                </a:solidFill>
+              </a:defRPr>
+            </a:lvl6pPr>
+            <a:lvl7pPr>
+              <a:defRPr>
+                <a:solidFill>
+                  <a:schemeClr val="dk1"/>
+                </a:solidFill>
+              </a:defRPr>
+            </a:lvl7pPr>
+            <a:lvl8pPr>
+              <a:defRPr>
+                <a:solidFill>
+                  <a:schemeClr val="dk1"/>
+                </a:solidFill>
+              </a:defRPr>
+            </a:lvl8pPr>
+            <a:lvl9pPr>
+              <a:defRPr>
+                <a:solidFill>
+                  <a:schemeClr val="dk1"/>
+                </a:solidFill>
+              </a:defRPr>
+            </a:lvl9pPr>
+          </a:lstStyle>
+          <a:p>
+            <a:pPr defTabSz="672130"/>
+            <a:r>
+              <a:rPr lang="pt-BR" sz="1176" b="0" dirty="0">
+                <a:solidFill>
+                  <a:prstClr val="black"/>
+                </a:solidFill>
+                <a:latin typeface="Exo 2 Medium" panose="00000600000000000000" pitchFamily="50" charset="0"/>
+              </a:rPr>
+              <a:t>Negócios</a:t>
+            </a:r>
+          </a:p>
+        </p:txBody>
+      </p:sp>
+      <p:sp>
+        <p:nvSpPr>
+          <p:cNvPr id="109" name="Oval 120"/>
+          <p:cNvSpPr>
+            <a:spLocks noChangeAspect="1"/>
+          </p:cNvSpPr>
+          <p:nvPr/>
+        </p:nvSpPr>
+        <p:spPr>
+          <a:xfrm>
+            <a:off x="11193898" y="297930"/>
+            <a:ext cx="211404" cy="211689"/>
+          </a:xfrm>
+          <a:prstGeom prst="ellipse">
+            <a:avLst/>
+          </a:prstGeom>
+          <a:solidFill>
+            <a:srgbClr val="1BCF13"/>
+          </a:solidFill>
+          <a:ln w="12700">
+            <a:solidFill>
+              <a:schemeClr val="accent3"/>
+            </a:solidFill>
+          </a:ln>
+        </p:spPr>
+        <p:style>
+          <a:lnRef idx="2">
+            <a:schemeClr val="accent1">
+              <a:shade val="50000"/>
+            </a:schemeClr>
+          </a:lnRef>
+          <a:fillRef idx="1">
+            <a:schemeClr val="accent1"/>
+          </a:fillRef>
+          <a:effectRef idx="0">
+            <a:schemeClr val="accent1"/>
+          </a:effectRef>
+          <a:fontRef idx="minor">
+            <a:schemeClr val="lt1"/>
+          </a:fontRef>
+        </p:style>
+        <p:txBody>
+          <a:bodyPr wrap="none" lIns="52922" tIns="52922" rIns="52922" rtlCol="0" anchor="ctr"/>
+          <a:lstStyle/>
+          <a:p>
+            <a:pPr algn="ctr" defTabSz="672130"/>
+            <a:endParaRPr lang="en-US" sz="1176" dirty="0">
+              <a:solidFill>
+                <a:prstClr val="black"/>
+              </a:solidFill>
+              <a:latin typeface="Exo 2 Medium" panose="00000600000000000000" pitchFamily="50" charset="0"/>
+              <a:cs typeface="Simplon BP Regular"/>
+            </a:endParaRPr>
+          </a:p>
+        </p:txBody>
+      </p:sp>
+      <p:sp>
+        <p:nvSpPr>
+          <p:cNvPr id="80" name="TextBox 123"/>
+          <p:cNvSpPr txBox="1"/>
+          <p:nvPr/>
+        </p:nvSpPr>
+        <p:spPr>
+          <a:xfrm>
+            <a:off x="10852497" y="576471"/>
+            <a:ext cx="899678" cy="179824"/>
+          </a:xfrm>
+          <a:prstGeom prst="rect">
+            <a:avLst/>
+          </a:prstGeom>
+          <a:noFill/>
+          <a:ln w="12700">
+            <a:noFill/>
+          </a:ln>
+        </p:spPr>
+        <p:style>
+          <a:lnRef idx="2">
+            <a:schemeClr val="accent4"/>
+          </a:lnRef>
+          <a:fillRef idx="1">
+            <a:schemeClr val="lt1"/>
+          </a:fillRef>
+          <a:effectRef idx="0">
+            <a:schemeClr val="accent4"/>
+          </a:effectRef>
+          <a:fontRef idx="minor">
+            <a:schemeClr val="dk1"/>
+          </a:fontRef>
+        </p:style>
+        <p:txBody>
+          <a:bodyPr wrap="none" lIns="52922" tIns="52922" rIns="52922" bIns="0" rtlCol="0" anchor="b"/>
+          <a:lstStyle>
+            <a:defPPr>
+              <a:defRPr lang="en-US"/>
+            </a:defPPr>
+            <a:lvl1pPr algn="ctr">
+              <a:defRPr sz="1000" b="1">
+                <a:latin typeface="Simplon BP Regular"/>
+                <a:cs typeface="Simplon BP Regular"/>
+              </a:defRPr>
+            </a:lvl1pPr>
+            <a:lvl2pPr>
+              <a:defRPr>
+                <a:solidFill>
+                  <a:schemeClr val="dk1"/>
+                </a:solidFill>
+              </a:defRPr>
+            </a:lvl2pPr>
+            <a:lvl3pPr>
+              <a:defRPr>
+                <a:solidFill>
+                  <a:schemeClr val="dk1"/>
+                </a:solidFill>
+              </a:defRPr>
+            </a:lvl3pPr>
+            <a:lvl4pPr>
+              <a:defRPr>
+                <a:solidFill>
+                  <a:schemeClr val="dk1"/>
+                </a:solidFill>
+              </a:defRPr>
+            </a:lvl4pPr>
+            <a:lvl5pPr>
+              <a:defRPr>
+                <a:solidFill>
+                  <a:schemeClr val="dk1"/>
+                </a:solidFill>
+              </a:defRPr>
+            </a:lvl5pPr>
+            <a:lvl6pPr>
+              <a:defRPr>
+                <a:solidFill>
+                  <a:schemeClr val="dk1"/>
+                </a:solidFill>
+              </a:defRPr>
+            </a:lvl6pPr>
+            <a:lvl7pPr>
+              <a:defRPr>
+                <a:solidFill>
+                  <a:schemeClr val="dk1"/>
+                </a:solidFill>
+              </a:defRPr>
+            </a:lvl7pPr>
+            <a:lvl8pPr>
+              <a:defRPr>
+                <a:solidFill>
+                  <a:schemeClr val="dk1"/>
+                </a:solidFill>
+              </a:defRPr>
+            </a:lvl8pPr>
+            <a:lvl9pPr>
+              <a:defRPr>
+                <a:solidFill>
+                  <a:schemeClr val="dk1"/>
+                </a:solidFill>
+              </a:defRPr>
+            </a:lvl9pPr>
+          </a:lstStyle>
+          <a:p>
+            <a:pPr defTabSz="672130"/>
+            <a:r>
+              <a:rPr lang="pt-BR" sz="1176" b="0" dirty="0">
+                <a:solidFill>
+                  <a:prstClr val="black"/>
+                </a:solidFill>
+                <a:latin typeface="Exo 2 Medium" panose="00000600000000000000" pitchFamily="50" charset="0"/>
+              </a:rPr>
+              <a:t>Plataforma</a:t>
+            </a:r>
+          </a:p>
+        </p:txBody>
+      </p:sp>
+      <p:sp>
+        <p:nvSpPr>
+          <p:cNvPr id="82" name="TextBox 128"/>
+          <p:cNvSpPr txBox="1"/>
+          <p:nvPr/>
+        </p:nvSpPr>
+        <p:spPr>
+          <a:xfrm>
+            <a:off x="9854245" y="576471"/>
+            <a:ext cx="899678" cy="179824"/>
+          </a:xfrm>
+          <a:prstGeom prst="rect">
+            <a:avLst/>
+          </a:prstGeom>
+          <a:noFill/>
+          <a:ln w="12700">
+            <a:noFill/>
+          </a:ln>
+        </p:spPr>
+        <p:style>
+          <a:lnRef idx="2">
+            <a:schemeClr val="accent4"/>
+          </a:lnRef>
+          <a:fillRef idx="1">
+            <a:schemeClr val="lt1"/>
+          </a:fillRef>
+          <a:effectRef idx="0">
+            <a:schemeClr val="accent4"/>
+          </a:effectRef>
+          <a:fontRef idx="minor">
+            <a:schemeClr val="dk1"/>
+          </a:fontRef>
+        </p:style>
+        <p:txBody>
+          <a:bodyPr wrap="none" lIns="52922" tIns="52922" rIns="52922" bIns="0" rtlCol="0" anchor="b"/>
+          <a:lstStyle>
+            <a:defPPr>
+              <a:defRPr lang="en-US"/>
+            </a:defPPr>
+            <a:lvl1pPr algn="ctr">
+              <a:defRPr sz="1000" b="1">
+                <a:latin typeface="Simplon BP Regular"/>
+                <a:cs typeface="Simplon BP Regular"/>
+              </a:defRPr>
+            </a:lvl1pPr>
+            <a:lvl2pPr>
+              <a:defRPr>
+                <a:solidFill>
+                  <a:schemeClr val="dk1"/>
+                </a:solidFill>
+              </a:defRPr>
+            </a:lvl2pPr>
+            <a:lvl3pPr>
+              <a:defRPr>
+                <a:solidFill>
+                  <a:schemeClr val="dk1"/>
+                </a:solidFill>
+              </a:defRPr>
+            </a:lvl3pPr>
+            <a:lvl4pPr>
+              <a:defRPr>
+                <a:solidFill>
+                  <a:schemeClr val="dk1"/>
+                </a:solidFill>
+              </a:defRPr>
+            </a:lvl4pPr>
+            <a:lvl5pPr>
+              <a:defRPr>
+                <a:solidFill>
+                  <a:schemeClr val="dk1"/>
+                </a:solidFill>
+              </a:defRPr>
+            </a:lvl5pPr>
+            <a:lvl6pPr>
+              <a:defRPr>
+                <a:solidFill>
+                  <a:schemeClr val="dk1"/>
+                </a:solidFill>
+              </a:defRPr>
+            </a:lvl6pPr>
+            <a:lvl7pPr>
+              <a:defRPr>
+                <a:solidFill>
+                  <a:schemeClr val="dk1"/>
+                </a:solidFill>
+              </a:defRPr>
+            </a:lvl7pPr>
+            <a:lvl8pPr>
+              <a:defRPr>
+                <a:solidFill>
+                  <a:schemeClr val="dk1"/>
+                </a:solidFill>
+              </a:defRPr>
+            </a:lvl8pPr>
+            <a:lvl9pPr>
+              <a:defRPr>
+                <a:solidFill>
+                  <a:schemeClr val="dk1"/>
+                </a:solidFill>
+              </a:defRPr>
+            </a:lvl9pPr>
+          </a:lstStyle>
+          <a:p>
+            <a:pPr defTabSz="672130"/>
+            <a:r>
+              <a:rPr lang="pt-BR" sz="1176" b="0" dirty="0">
+                <a:solidFill>
+                  <a:prstClr val="black"/>
+                </a:solidFill>
+                <a:latin typeface="Exo 2 Medium" panose="00000600000000000000" pitchFamily="50" charset="0"/>
+              </a:rPr>
+              <a:t>Back</a:t>
+            </a:r>
+          </a:p>
+        </p:txBody>
+      </p:sp>
+      <p:sp>
+        <p:nvSpPr>
+          <p:cNvPr id="84" name="TextBox 133"/>
+          <p:cNvSpPr txBox="1"/>
+          <p:nvPr/>
+        </p:nvSpPr>
+        <p:spPr>
+          <a:xfrm>
+            <a:off x="8986650" y="576471"/>
+            <a:ext cx="899678" cy="179824"/>
+          </a:xfrm>
+          <a:prstGeom prst="rect">
+            <a:avLst/>
+          </a:prstGeom>
+          <a:noFill/>
+          <a:ln w="12700">
+            <a:noFill/>
+          </a:ln>
+        </p:spPr>
+        <p:style>
+          <a:lnRef idx="2">
+            <a:schemeClr val="accent4"/>
+          </a:lnRef>
+          <a:fillRef idx="1">
+            <a:schemeClr val="lt1"/>
+          </a:fillRef>
+          <a:effectRef idx="0">
+            <a:schemeClr val="accent4"/>
+          </a:effectRef>
+          <a:fontRef idx="minor">
+            <a:schemeClr val="dk1"/>
+          </a:fontRef>
+        </p:style>
+        <p:txBody>
+          <a:bodyPr wrap="none" lIns="52922" tIns="52922" rIns="52922" bIns="0" rtlCol="0" anchor="b"/>
+          <a:lstStyle>
+            <a:defPPr>
+              <a:defRPr lang="en-US"/>
+            </a:defPPr>
+            <a:lvl1pPr algn="ctr">
+              <a:defRPr sz="1000" b="1">
+                <a:latin typeface="Simplon BP Regular"/>
+                <a:cs typeface="Simplon BP Regular"/>
+              </a:defRPr>
+            </a:lvl1pPr>
+            <a:lvl2pPr>
+              <a:defRPr>
+                <a:solidFill>
+                  <a:schemeClr val="dk1"/>
+                </a:solidFill>
+              </a:defRPr>
+            </a:lvl2pPr>
+            <a:lvl3pPr>
+              <a:defRPr>
+                <a:solidFill>
+                  <a:schemeClr val="dk1"/>
+                </a:solidFill>
+              </a:defRPr>
+            </a:lvl3pPr>
+            <a:lvl4pPr>
+              <a:defRPr>
+                <a:solidFill>
+                  <a:schemeClr val="dk1"/>
+                </a:solidFill>
+              </a:defRPr>
+            </a:lvl4pPr>
+            <a:lvl5pPr>
+              <a:defRPr>
+                <a:solidFill>
+                  <a:schemeClr val="dk1"/>
+                </a:solidFill>
+              </a:defRPr>
+            </a:lvl5pPr>
+            <a:lvl6pPr>
+              <a:defRPr>
+                <a:solidFill>
+                  <a:schemeClr val="dk1"/>
+                </a:solidFill>
+              </a:defRPr>
+            </a:lvl6pPr>
+            <a:lvl7pPr>
+              <a:defRPr>
+                <a:solidFill>
+                  <a:schemeClr val="dk1"/>
+                </a:solidFill>
+              </a:defRPr>
+            </a:lvl7pPr>
+            <a:lvl8pPr>
+              <a:defRPr>
+                <a:solidFill>
+                  <a:schemeClr val="dk1"/>
+                </a:solidFill>
+              </a:defRPr>
+            </a:lvl8pPr>
+            <a:lvl9pPr>
+              <a:defRPr>
+                <a:solidFill>
+                  <a:schemeClr val="dk1"/>
+                </a:solidFill>
+              </a:defRPr>
+            </a:lvl9pPr>
+          </a:lstStyle>
+          <a:p>
+            <a:pPr defTabSz="672130"/>
+            <a:r>
+              <a:rPr lang="pt-BR" sz="1176" b="0" dirty="0">
+                <a:solidFill>
+                  <a:prstClr val="black"/>
+                </a:solidFill>
+                <a:latin typeface="Exo 2 Medium" panose="00000600000000000000" pitchFamily="50" charset="0"/>
+              </a:rPr>
+              <a:t>Front</a:t>
+            </a:r>
+          </a:p>
+        </p:txBody>
+      </p:sp>
+      <p:sp>
+        <p:nvSpPr>
+          <p:cNvPr id="88" name="Oval 134"/>
+          <p:cNvSpPr>
+            <a:spLocks noChangeAspect="1"/>
+          </p:cNvSpPr>
+          <p:nvPr/>
+        </p:nvSpPr>
+        <p:spPr>
+          <a:xfrm>
+            <a:off x="8443555" y="297930"/>
+            <a:ext cx="211404" cy="211689"/>
+          </a:xfrm>
+          <a:prstGeom prst="ellipse">
+            <a:avLst/>
+          </a:prstGeom>
+          <a:solidFill>
+            <a:srgbClr val="1BCF13"/>
+          </a:solidFill>
+          <a:ln w="12700">
+            <a:solidFill>
+              <a:schemeClr val="accent3"/>
+            </a:solidFill>
+          </a:ln>
+        </p:spPr>
+        <p:style>
+          <a:lnRef idx="2">
+            <a:schemeClr val="accent1">
+              <a:shade val="50000"/>
+            </a:schemeClr>
+          </a:lnRef>
+          <a:fillRef idx="1">
+            <a:schemeClr val="accent1"/>
+          </a:fillRef>
+          <a:effectRef idx="0">
+            <a:schemeClr val="accent1"/>
+          </a:effectRef>
+          <a:fontRef idx="minor">
+            <a:schemeClr val="lt1"/>
+          </a:fontRef>
+        </p:style>
+        <p:txBody>
+          <a:bodyPr wrap="none" lIns="52922" tIns="52922" rIns="52922" rtlCol="0" anchor="ctr"/>
+          <a:lstStyle/>
+          <a:p>
+            <a:pPr algn="ctr" defTabSz="672130"/>
+            <a:endParaRPr lang="en-US" sz="1176" dirty="0">
+              <a:solidFill>
+                <a:prstClr val="black"/>
+              </a:solidFill>
+              <a:latin typeface="Exo 2 Medium" panose="00000600000000000000" pitchFamily="50" charset="0"/>
+              <a:cs typeface="Simplon BP Regular"/>
+            </a:endParaRPr>
+          </a:p>
+        </p:txBody>
+      </p:sp>
+      <p:sp>
+        <p:nvSpPr>
+          <p:cNvPr id="86" name="TextBox 138"/>
+          <p:cNvSpPr txBox="1"/>
+          <p:nvPr/>
+        </p:nvSpPr>
+        <p:spPr>
+          <a:xfrm>
+            <a:off x="8126053" y="576471"/>
+            <a:ext cx="899678" cy="179824"/>
+          </a:xfrm>
+          <a:prstGeom prst="rect">
+            <a:avLst/>
+          </a:prstGeom>
+          <a:noFill/>
+          <a:ln w="12700">
+            <a:noFill/>
+          </a:ln>
+        </p:spPr>
+        <p:style>
+          <a:lnRef idx="2">
+            <a:schemeClr val="accent4"/>
+          </a:lnRef>
+          <a:fillRef idx="1">
+            <a:schemeClr val="lt1"/>
+          </a:fillRef>
+          <a:effectRef idx="0">
+            <a:schemeClr val="accent4"/>
+          </a:effectRef>
+          <a:fontRef idx="minor">
+            <a:schemeClr val="dk1"/>
+          </a:fontRef>
+        </p:style>
+        <p:txBody>
+          <a:bodyPr wrap="none" lIns="52922" tIns="52922" rIns="52922" bIns="0" rtlCol="0" anchor="b"/>
+          <a:lstStyle>
+            <a:defPPr>
+              <a:defRPr lang="en-US"/>
+            </a:defPPr>
+            <a:lvl1pPr algn="ctr">
+              <a:defRPr sz="1000" b="1">
+                <a:latin typeface="Simplon BP Regular"/>
+                <a:cs typeface="Simplon BP Regular"/>
+              </a:defRPr>
+            </a:lvl1pPr>
+            <a:lvl2pPr>
+              <a:defRPr>
+                <a:solidFill>
+                  <a:schemeClr val="dk1"/>
+                </a:solidFill>
+              </a:defRPr>
+            </a:lvl2pPr>
+            <a:lvl3pPr>
+              <a:defRPr>
+                <a:solidFill>
+                  <a:schemeClr val="dk1"/>
+                </a:solidFill>
+              </a:defRPr>
+            </a:lvl3pPr>
+            <a:lvl4pPr>
+              <a:defRPr>
+                <a:solidFill>
+                  <a:schemeClr val="dk1"/>
+                </a:solidFill>
+              </a:defRPr>
+            </a:lvl4pPr>
+            <a:lvl5pPr>
+              <a:defRPr>
+                <a:solidFill>
+                  <a:schemeClr val="dk1"/>
+                </a:solidFill>
+              </a:defRPr>
+            </a:lvl5pPr>
+            <a:lvl6pPr>
+              <a:defRPr>
+                <a:solidFill>
+                  <a:schemeClr val="dk1"/>
+                </a:solidFill>
+              </a:defRPr>
+            </a:lvl6pPr>
+            <a:lvl7pPr>
+              <a:defRPr>
+                <a:solidFill>
+                  <a:schemeClr val="dk1"/>
+                </a:solidFill>
+              </a:defRPr>
+            </a:lvl7pPr>
+            <a:lvl8pPr>
+              <a:defRPr>
+                <a:solidFill>
+                  <a:schemeClr val="dk1"/>
+                </a:solidFill>
+              </a:defRPr>
+            </a:lvl8pPr>
+            <a:lvl9pPr>
+              <a:defRPr>
+                <a:solidFill>
+                  <a:schemeClr val="dk1"/>
+                </a:solidFill>
+              </a:defRPr>
+            </a:lvl9pPr>
+          </a:lstStyle>
+          <a:p>
+            <a:pPr defTabSz="672130"/>
+            <a:r>
+              <a:rPr lang="en-US" sz="1176" b="0" dirty="0">
+                <a:solidFill>
+                  <a:prstClr val="black"/>
+                </a:solidFill>
+                <a:latin typeface="Exo 2 Medium" panose="00000600000000000000" pitchFamily="50" charset="0"/>
+              </a:rPr>
+              <a:t>Equipe</a:t>
+            </a:r>
+          </a:p>
+        </p:txBody>
+      </p:sp>
+      <p:sp>
+        <p:nvSpPr>
+          <p:cNvPr id="64" name="Retângulo 63"/>
+          <p:cNvSpPr/>
+          <p:nvPr/>
+        </p:nvSpPr>
+        <p:spPr>
+          <a:xfrm>
+            <a:off x="512766" y="868345"/>
+            <a:ext cx="6186608" cy="238150"/>
+          </a:xfrm>
+          <a:prstGeom prst="rect">
+            <a:avLst/>
+          </a:prstGeom>
+          <a:solidFill>
+            <a:schemeClr val="bg1">
+              <a:lumMod val="85000"/>
+            </a:schemeClr>
+          </a:solidFill>
+        </p:spPr>
+        <p:txBody>
+          <a:bodyPr vert="horz" lIns="134422" tIns="67211" rIns="134422" bIns="67211" rtlCol="0" anchor="ctr"/>
+          <a:lstStyle/>
+          <a:p>
+            <a:pPr defTabSz="672130"/>
+            <a:r>
+              <a:rPr lang="en-US" sz="1544" dirty="0">
+                <a:latin typeface="Exo 2 Medium" panose="00000600000000000000" pitchFamily="50" charset="0"/>
+                <a:ea typeface="Simplon Oi Headline" charset="0"/>
+                <a:cs typeface="Simplon Oi Headline" charset="0"/>
+              </a:rPr>
+              <a:t>Progressos c/ responsáveis </a:t>
+            </a:r>
+          </a:p>
+        </p:txBody>
+      </p:sp>
+      <p:sp>
+        <p:nvSpPr>
+          <p:cNvPr id="65" name="Retângulo 64"/>
+          <p:cNvSpPr/>
+          <p:nvPr/>
+        </p:nvSpPr>
+        <p:spPr>
+          <a:xfrm>
+            <a:off x="6814576" y="868344"/>
+            <a:ext cx="6244932" cy="250902"/>
+          </a:xfrm>
+          <a:prstGeom prst="rect">
+            <a:avLst/>
+          </a:prstGeom>
+          <a:solidFill>
+            <a:schemeClr val="bg1">
+              <a:lumMod val="85000"/>
+            </a:schemeClr>
+          </a:solidFill>
+        </p:spPr>
+        <p:txBody>
+          <a:bodyPr vert="horz" lIns="134422" tIns="67211" rIns="134422" bIns="67211" rtlCol="0" anchor="ctr"/>
+          <a:lstStyle/>
+          <a:p>
+            <a:pPr defTabSz="672130"/>
+            <a:r>
+              <a:rPr lang="pt-BR" sz="1544" dirty="0">
+                <a:latin typeface="Exo 2 Medium" panose="00000600000000000000" pitchFamily="50" charset="0"/>
+                <a:ea typeface="Simplon Oi Headline" charset="0"/>
+                <a:cs typeface="Simplon Oi Headline" charset="0"/>
+              </a:rPr>
+              <a:t>Pontos atenção/ Principais Riscos</a:t>
+            </a:r>
+          </a:p>
+        </p:txBody>
+      </p:sp>
+      <p:sp>
+        <p:nvSpPr>
+          <p:cNvPr id="66" name="Retângulo 65"/>
+          <p:cNvSpPr/>
+          <p:nvPr/>
+        </p:nvSpPr>
+        <p:spPr>
+          <a:xfrm>
+            <a:off x="528898" y="3479441"/>
+            <a:ext cx="12551972" cy="238150"/>
+          </a:xfrm>
+          <a:prstGeom prst="rect">
+            <a:avLst/>
+          </a:prstGeom>
+          <a:solidFill>
+            <a:schemeClr val="bg1">
+              <a:lumMod val="85000"/>
+            </a:schemeClr>
+          </a:solidFill>
+        </p:spPr>
+        <p:txBody>
+          <a:bodyPr vert="horz" lIns="134422" tIns="67211" rIns="134422" bIns="67211" rtlCol="0" anchor="ctr"/>
+          <a:lstStyle/>
+          <a:p>
+            <a:pPr defTabSz="672130"/>
+            <a:r>
+              <a:rPr lang="pt-BR" sz="1544" dirty="0">
+                <a:latin typeface="Exo 2 Medium" panose="00000600000000000000" pitchFamily="50" charset="0"/>
+                <a:ea typeface="Simplon Oi Headline" charset="0"/>
+                <a:cs typeface="Simplon Oi Headline" charset="0"/>
+              </a:rPr>
+              <a:t>Próximos Passos c/ responsáveis </a:t>
+            </a:r>
+          </a:p>
+        </p:txBody>
+      </p:sp>
+      <p:sp>
+        <p:nvSpPr>
+          <p:cNvPr id="63" name="Rectangle 37"/>
+          <p:cNvSpPr/>
+          <p:nvPr/>
+        </p:nvSpPr>
+        <p:spPr>
+          <a:xfrm>
+            <a:off x="496765" y="1106495"/>
+            <a:ext cx="6207777" cy="2235805"/>
+          </a:xfrm>
+          <a:prstGeom prst="rect">
+            <a:avLst/>
+          </a:prstGeom>
+          <a:noFill/>
+          <a:ln w="12700">
+            <a:solidFill>
+              <a:schemeClr val="bg1">
+                <a:lumMod val="50000"/>
+              </a:schemeClr>
+            </a:solidFill>
+          </a:ln>
+        </p:spPr>
+        <p:style>
+          <a:lnRef idx="2">
+            <a:schemeClr val="accent4"/>
+          </a:lnRef>
+          <a:fillRef idx="1">
+            <a:schemeClr val="lt1"/>
+          </a:fillRef>
+          <a:effectRef idx="0">
+            <a:schemeClr val="accent4"/>
+          </a:effectRef>
+          <a:fontRef idx="minor">
+            <a:schemeClr val="dk1"/>
+          </a:fontRef>
+        </p:style>
+        <p:txBody>
+          <a:bodyPr tIns="105844" rtlCol="0" anchor="t"/>
+          <a:lstStyle/>
+          <a:p>
+            <a:pPr marL="252049" indent="-252049" fontAlgn="base">
+              <a:spcBef>
+                <a:spcPct val="0"/>
+              </a:spcBef>
+              <a:buFont typeface="Wingdings" panose="05000000000000000000" pitchFamily="2" charset="2"/>
+              <a:buChar char="ü"/>
+              <a:defRPr/>
+            </a:pPr>
+            <a:r>
+              <a:rPr lang="pt-BR" sz="1323" dirty="0">
+                <a:solidFill>
+                  <a:schemeClr val="tx1"/>
+                </a:solidFill>
+                <a:latin typeface="Exo 2 Medium" panose="00000600000000000000" pitchFamily="50" charset="0"/>
+                <a:cs typeface="Simplon BP Regular"/>
+              </a:rPr>
+              <a:t>Refatorar as telas Sobre e Equipe do Institucional </a:t>
+            </a:r>
+            <a:r>
+              <a:rPr lang="pt-BR" sz="1323" b="1" dirty="0">
+                <a:solidFill>
+                  <a:schemeClr val="tx1"/>
+                </a:solidFill>
+                <a:latin typeface="Exo 2 Medium" panose="00000600000000000000" pitchFamily="50" charset="0"/>
+                <a:cs typeface="Simplon BP Regular"/>
+              </a:rPr>
+              <a:t>#Ferraz</a:t>
+            </a:r>
+          </a:p>
+          <a:p>
+            <a:pPr marL="252049" indent="-252049" fontAlgn="base">
+              <a:spcBef>
+                <a:spcPct val="0"/>
+              </a:spcBef>
+              <a:buFont typeface="Wingdings" panose="05000000000000000000" pitchFamily="2" charset="2"/>
+              <a:buChar char="ü"/>
+              <a:defRPr/>
+            </a:pPr>
+            <a:r>
+              <a:rPr lang="pt-BR" sz="1323" dirty="0">
+                <a:solidFill>
+                  <a:schemeClr val="tx1"/>
+                </a:solidFill>
+                <a:latin typeface="Exo 2 Medium" panose="00000600000000000000" pitchFamily="50" charset="0"/>
+                <a:cs typeface="Simplon BP Regular"/>
+              </a:rPr>
+              <a:t>Refatorar as telas de Cadastro e Login em React </a:t>
+            </a:r>
+            <a:r>
+              <a:rPr lang="pt-BR" sz="1323" b="1" dirty="0">
+                <a:solidFill>
+                  <a:schemeClr val="tx1"/>
+                </a:solidFill>
+                <a:latin typeface="Exo 2 Medium" panose="00000600000000000000" pitchFamily="50" charset="0"/>
+                <a:cs typeface="Simplon BP Regular"/>
+              </a:rPr>
+              <a:t>#Vinicius</a:t>
+            </a:r>
+          </a:p>
+          <a:p>
+            <a:pPr marL="252049" indent="-252049" fontAlgn="base">
+              <a:spcBef>
+                <a:spcPct val="0"/>
+              </a:spcBef>
+              <a:buFont typeface="Wingdings" panose="05000000000000000000" pitchFamily="2" charset="2"/>
+              <a:buChar char="ü"/>
+              <a:defRPr/>
+            </a:pPr>
+            <a:r>
+              <a:rPr lang="pt-BR" sz="1323" dirty="0">
+                <a:solidFill>
+                  <a:schemeClr val="tx1"/>
+                </a:solidFill>
+                <a:latin typeface="Exo 2 Medium" panose="00000600000000000000" pitchFamily="50" charset="0"/>
+                <a:cs typeface="Simplon BP Regular"/>
+              </a:rPr>
+              <a:t>Protótipo da Tela de Emissão de Boletos </a:t>
+            </a:r>
+            <a:r>
+              <a:rPr lang="pt-BR" sz="1323" b="1" dirty="0">
+                <a:solidFill>
+                  <a:schemeClr val="tx1"/>
+                </a:solidFill>
+                <a:latin typeface="Exo 2 Medium" panose="00000600000000000000" pitchFamily="50" charset="0"/>
+                <a:cs typeface="Simplon BP Regular"/>
+              </a:rPr>
+              <a:t>#Ferraz </a:t>
+            </a:r>
+          </a:p>
+          <a:p>
+            <a:pPr marL="252049" indent="-252049" fontAlgn="base">
+              <a:spcBef>
+                <a:spcPct val="0"/>
+              </a:spcBef>
+              <a:buFont typeface="Wingdings" panose="05000000000000000000" pitchFamily="2" charset="2"/>
+              <a:buChar char="ü"/>
+              <a:defRPr/>
+            </a:pPr>
+            <a:r>
+              <a:rPr lang="pt-BR" sz="1323" dirty="0">
+                <a:solidFill>
+                  <a:schemeClr val="tx1"/>
+                </a:solidFill>
+                <a:latin typeface="Exo 2 Medium" panose="00000600000000000000" pitchFamily="50" charset="0"/>
+                <a:cs typeface="Simplon BP Regular"/>
+              </a:rPr>
+              <a:t>Integrar o projeto SpringBoot com Estrutura de Dados </a:t>
+            </a:r>
+            <a:r>
+              <a:rPr lang="pt-BR" sz="1323" b="1" dirty="0">
+                <a:solidFill>
+                  <a:schemeClr val="tx1"/>
+                </a:solidFill>
+                <a:latin typeface="Exo 2 Medium" panose="00000600000000000000" pitchFamily="50" charset="0"/>
+                <a:cs typeface="Simplon BP Regular"/>
+              </a:rPr>
+              <a:t>#Pedro e Wesley</a:t>
+            </a:r>
+          </a:p>
+          <a:p>
+            <a:pPr marL="252049" indent="-252049" fontAlgn="base">
+              <a:spcBef>
+                <a:spcPct val="0"/>
+              </a:spcBef>
+              <a:buFont typeface="Wingdings" panose="05000000000000000000" pitchFamily="2" charset="2"/>
+              <a:buChar char="ü"/>
+              <a:defRPr/>
+            </a:pPr>
+            <a:r>
+              <a:rPr lang="pt-BR" sz="1323" dirty="0">
+                <a:solidFill>
+                  <a:schemeClr val="tx1"/>
+                </a:solidFill>
+                <a:latin typeface="Exo 2 Medium" panose="00000600000000000000" pitchFamily="50" charset="0"/>
+                <a:cs typeface="Simplon BP Regular"/>
+              </a:rPr>
+              <a:t>Inicio ao desenvolvimento do Documento de Layout de Importação e Exportação de Dados</a:t>
+            </a:r>
+            <a:r>
+              <a:rPr lang="pt-BR" sz="1323" b="1" dirty="0">
+                <a:solidFill>
+                  <a:schemeClr val="tx1"/>
+                </a:solidFill>
+                <a:latin typeface="Exo 2 Medium" panose="00000600000000000000" pitchFamily="50" charset="0"/>
+                <a:cs typeface="Simplon BP Regular"/>
+              </a:rPr>
+              <a:t> #Pedro</a:t>
+            </a:r>
+          </a:p>
+          <a:p>
+            <a:pPr marL="252049" indent="-252049" fontAlgn="base">
+              <a:spcBef>
+                <a:spcPct val="0"/>
+              </a:spcBef>
+              <a:buFont typeface="Wingdings" panose="05000000000000000000" pitchFamily="2" charset="2"/>
+              <a:buChar char="ü"/>
+              <a:defRPr/>
+            </a:pPr>
+            <a:r>
+              <a:rPr lang="pt-BR" sz="1323" dirty="0">
+                <a:solidFill>
+                  <a:schemeClr val="tx1"/>
+                </a:solidFill>
+                <a:latin typeface="Exo 2 Medium" panose="00000600000000000000" pitchFamily="50" charset="0"/>
+                <a:cs typeface="Simplon BP Regular"/>
+              </a:rPr>
+              <a:t>Componentizar o Institucional </a:t>
+            </a:r>
+            <a:r>
+              <a:rPr lang="pt-BR" sz="1323" b="1" dirty="0">
+                <a:solidFill>
+                  <a:schemeClr val="tx1"/>
+                </a:solidFill>
+                <a:latin typeface="Exo 2 Medium" panose="00000600000000000000" pitchFamily="50" charset="0"/>
+                <a:cs typeface="Simplon BP Regular"/>
+              </a:rPr>
+              <a:t>#Wesley</a:t>
+            </a:r>
+          </a:p>
+        </p:txBody>
+      </p:sp>
+      <p:sp>
+        <p:nvSpPr>
+          <p:cNvPr id="2" name="Rectangle 43">
+            <a:extLst>
+              <a:ext uri="{FF2B5EF4-FFF2-40B4-BE49-F238E27FC236}">
+                <a16:creationId xmlns:a16="http://schemas.microsoft.com/office/drawing/2014/main" id="{B15BA19F-C787-4E6A-ADAB-C0DFF09C66A8}"/>
+              </a:ext>
+            </a:extLst>
+          </p:cNvPr>
+          <p:cNvSpPr>
+            <a:spLocks/>
+          </p:cNvSpPr>
+          <p:nvPr/>
+        </p:nvSpPr>
+        <p:spPr>
+          <a:xfrm>
+            <a:off x="493440" y="3717591"/>
+            <a:ext cx="12587430" cy="3634138"/>
+          </a:xfrm>
+          <a:prstGeom prst="rect">
+            <a:avLst/>
+          </a:prstGeom>
+          <a:noFill/>
+          <a:ln w="12700">
+            <a:solidFill>
+              <a:schemeClr val="bg1">
+                <a:lumMod val="50000"/>
+              </a:schemeClr>
+            </a:solidFill>
+          </a:ln>
+        </p:spPr>
+        <p:style>
+          <a:lnRef idx="2">
+            <a:schemeClr val="accent4"/>
+          </a:lnRef>
+          <a:fillRef idx="1">
+            <a:schemeClr val="lt1"/>
+          </a:fillRef>
+          <a:effectRef idx="0">
+            <a:schemeClr val="accent4"/>
+          </a:effectRef>
+          <a:fontRef idx="minor">
+            <a:schemeClr val="dk1"/>
+          </a:fontRef>
+        </p:style>
+        <p:txBody>
+          <a:bodyPr wrap="square" tIns="105844" numCol="3" rtlCol="0" anchor="t"/>
+          <a:lstStyle/>
+          <a:p>
+            <a:pPr marL="0" lvl="1" defTabSz="672130"/>
+            <a:r>
+              <a:rPr lang="pt-BR" sz="1323" b="1" dirty="0">
+                <a:solidFill>
+                  <a:schemeClr val="tx1"/>
+                </a:solidFill>
+                <a:latin typeface="Exo 2 Medium" panose="00000600000000000000" pitchFamily="50" charset="0"/>
+                <a:cs typeface="Simplon BP Regular"/>
+              </a:rPr>
+              <a:t>Frente Plataforma</a:t>
+            </a:r>
+          </a:p>
+          <a:p>
+            <a:pPr marL="285750" lvl="1" indent="-285750" defTabSz="672130">
+              <a:buFont typeface="Wingdings" panose="05000000000000000000" pitchFamily="2" charset="2"/>
+              <a:buChar char="§"/>
+            </a:pPr>
+            <a:r>
+              <a:rPr lang="pt-BR" sz="1323" dirty="0">
+                <a:solidFill>
+                  <a:schemeClr val="tx1"/>
+                </a:solidFill>
+                <a:latin typeface="Exo 2 Medium" panose="00000600000000000000" pitchFamily="50" charset="0"/>
+                <a:cs typeface="Simplon BP Regular"/>
+              </a:rPr>
+              <a:t>Hospedar nossa aplicação no provisionamento da</a:t>
+            </a:r>
+            <a:br>
+              <a:rPr lang="pt-BR" sz="1323" dirty="0">
+                <a:solidFill>
+                  <a:schemeClr val="tx1"/>
+                </a:solidFill>
+                <a:latin typeface="Exo 2 Medium" panose="00000600000000000000" pitchFamily="50" charset="0"/>
+                <a:cs typeface="Simplon BP Regular"/>
+              </a:rPr>
+            </a:br>
+            <a:r>
+              <a:rPr lang="pt-BR" sz="1323" dirty="0">
+                <a:solidFill>
+                  <a:schemeClr val="tx1"/>
+                </a:solidFill>
+                <a:latin typeface="Exo 2 Medium" panose="00000600000000000000" pitchFamily="50" charset="0"/>
+                <a:cs typeface="Simplon BP Regular"/>
+              </a:rPr>
+              <a:t>Azure </a:t>
+            </a:r>
+            <a:r>
+              <a:rPr lang="pt-BR" sz="1323" b="1" dirty="0">
+                <a:solidFill>
+                  <a:schemeClr val="tx1"/>
+                </a:solidFill>
+                <a:latin typeface="Exo 2 Medium" panose="00000600000000000000" pitchFamily="50" charset="0"/>
+                <a:cs typeface="Simplon BP Regular"/>
+              </a:rPr>
+              <a:t>#Wesley</a:t>
+            </a:r>
+          </a:p>
+          <a:p>
+            <a:pPr marL="0" lvl="1" defTabSz="672130"/>
+            <a:endParaRPr lang="pt-BR" sz="1323" b="1" dirty="0">
+              <a:solidFill>
+                <a:schemeClr val="tx1"/>
+              </a:solidFill>
+              <a:latin typeface="Exo 2 Medium" panose="00000600000000000000" pitchFamily="50" charset="0"/>
+              <a:cs typeface="Simplon BP Regular"/>
+            </a:endParaRPr>
+          </a:p>
+          <a:p>
+            <a:pPr marL="0" lvl="1" defTabSz="672130"/>
+            <a:r>
+              <a:rPr lang="pt-BR" sz="1323" b="1" dirty="0">
+                <a:solidFill>
+                  <a:schemeClr val="tx1"/>
+                </a:solidFill>
+                <a:latin typeface="Exo 2 Medium" panose="00000600000000000000" pitchFamily="50" charset="0"/>
+                <a:cs typeface="Simplon BP Regular"/>
+              </a:rPr>
+              <a:t>Frente Back-End</a:t>
+            </a:r>
+          </a:p>
+          <a:p>
+            <a:pPr marL="0" lvl="1" indent="-252049">
+              <a:buFont typeface="Wingdings" panose="05000000000000000000" pitchFamily="2" charset="2"/>
+              <a:buChar char="§"/>
+            </a:pPr>
+            <a:r>
+              <a:rPr lang="pt-BR" sz="1323" dirty="0">
+                <a:solidFill>
+                  <a:schemeClr val="tx1"/>
+                </a:solidFill>
+                <a:latin typeface="Exo 2 Medium" panose="00000600000000000000" pitchFamily="50" charset="0"/>
+                <a:cs typeface="Simplon BP Regular"/>
+              </a:rPr>
+              <a:t>Implementar a conexão do Back-end com nosso Banco de Dados na Azure </a:t>
+            </a:r>
+            <a:r>
+              <a:rPr lang="pt-BR" sz="1323" b="1" dirty="0">
+                <a:solidFill>
+                  <a:schemeClr val="tx1"/>
+                </a:solidFill>
+                <a:latin typeface="Exo 2 Medium" panose="00000600000000000000" pitchFamily="50" charset="0"/>
+                <a:cs typeface="Simplon BP Regular"/>
+              </a:rPr>
+              <a:t>#Equipe</a:t>
+            </a:r>
+            <a:br>
+              <a:rPr lang="pt-BR" sz="1323" b="1" dirty="0">
+                <a:solidFill>
+                  <a:schemeClr val="tx1"/>
+                </a:solidFill>
+                <a:latin typeface="Exo 2 Medium" panose="00000600000000000000" pitchFamily="50" charset="0"/>
+                <a:cs typeface="Simplon BP Regular"/>
+              </a:rPr>
+            </a:br>
+            <a:endParaRPr lang="pt-BR" sz="1323" b="1" dirty="0">
+              <a:solidFill>
+                <a:schemeClr val="tx1"/>
+              </a:solidFill>
+              <a:latin typeface="Exo 2 Medium" panose="00000600000000000000" pitchFamily="50" charset="0"/>
+              <a:cs typeface="Simplon BP Regular"/>
+            </a:endParaRPr>
+          </a:p>
+          <a:p>
+            <a:pPr marL="0" lvl="1" defTabSz="672130"/>
+            <a:r>
+              <a:rPr lang="pt-BR" sz="1323" b="1" dirty="0">
+                <a:solidFill>
+                  <a:schemeClr val="tx1"/>
+                </a:solidFill>
+                <a:latin typeface="Exo 2 Medium" panose="00000600000000000000" pitchFamily="50" charset="0"/>
+                <a:cs typeface="Simplon BP Regular"/>
+              </a:rPr>
+              <a:t>Frente Front-End</a:t>
+            </a:r>
+          </a:p>
+          <a:p>
+            <a:pPr marL="285750" lvl="1" indent="-285750" defTabSz="672130">
+              <a:buFont typeface="Wingdings" panose="05000000000000000000" pitchFamily="2" charset="2"/>
+              <a:buChar char="§"/>
+            </a:pPr>
+            <a:r>
+              <a:rPr lang="pt-BR" sz="1323" dirty="0">
+                <a:solidFill>
+                  <a:schemeClr val="tx1"/>
+                </a:solidFill>
+                <a:latin typeface="Exo 2 Medium" panose="00000600000000000000" pitchFamily="50" charset="0"/>
+                <a:cs typeface="Simplon BP Regular"/>
+              </a:rPr>
+              <a:t>Desenvolver as rotas de navegação do Institucional </a:t>
+            </a:r>
+            <a:br>
+              <a:rPr lang="pt-BR" sz="1323" dirty="0">
+                <a:solidFill>
+                  <a:schemeClr val="tx1"/>
+                </a:solidFill>
+                <a:latin typeface="Exo 2 Medium" panose="00000600000000000000" pitchFamily="50" charset="0"/>
+                <a:cs typeface="Simplon BP Regular"/>
+              </a:rPr>
+            </a:br>
+            <a:r>
+              <a:rPr lang="pt-BR" sz="1323" dirty="0">
+                <a:solidFill>
+                  <a:schemeClr val="tx1"/>
+                </a:solidFill>
+                <a:latin typeface="Exo 2 Medium" panose="00000600000000000000" pitchFamily="50" charset="0"/>
+                <a:cs typeface="Simplon BP Regular"/>
+              </a:rPr>
+              <a:t>com Login e Cadastro </a:t>
+            </a:r>
+            <a:r>
+              <a:rPr lang="pt-BR" sz="1323" b="1" dirty="0">
+                <a:solidFill>
+                  <a:schemeClr val="tx1"/>
+                </a:solidFill>
+                <a:latin typeface="Exo 2 Medium" panose="00000600000000000000" pitchFamily="50" charset="0"/>
+                <a:cs typeface="Simplon BP Regular"/>
+              </a:rPr>
+              <a:t>#Vinicius</a:t>
+            </a:r>
+          </a:p>
+          <a:p>
+            <a:pPr marL="0" lvl="1" indent="-252049">
+              <a:buFont typeface="Wingdings" panose="05000000000000000000" pitchFamily="2" charset="2"/>
+              <a:buChar char="§"/>
+            </a:pPr>
+            <a:r>
+              <a:rPr lang="pt-BR" sz="1323" dirty="0">
+                <a:solidFill>
+                  <a:schemeClr val="tx1"/>
+                </a:solidFill>
+                <a:latin typeface="Exo 2 Medium" panose="00000600000000000000" pitchFamily="50" charset="0"/>
+                <a:cs typeface="Simplon BP Regular"/>
+              </a:rPr>
+              <a:t>Desenvolver o Menu Lateral da Aplicação de Agendamentos </a:t>
+            </a:r>
+            <a:r>
+              <a:rPr lang="pt-BR" sz="1323" b="1" dirty="0">
+                <a:solidFill>
+                  <a:schemeClr val="tx1"/>
+                </a:solidFill>
+                <a:latin typeface="Exo 2 Medium" panose="00000600000000000000" pitchFamily="50" charset="0"/>
+                <a:cs typeface="Simplon BP Regular"/>
+              </a:rPr>
+              <a:t>#Vinicius e Ferraz</a:t>
+            </a:r>
+          </a:p>
+          <a:p>
+            <a:pPr marL="0" lvl="1" indent="-252049">
+              <a:buFont typeface="Wingdings" panose="05000000000000000000" pitchFamily="2" charset="2"/>
+              <a:buChar char="§"/>
+            </a:pPr>
+            <a:r>
+              <a:rPr lang="pt-BR" sz="1323" dirty="0">
+                <a:solidFill>
+                  <a:schemeClr val="tx1"/>
+                </a:solidFill>
+                <a:latin typeface="Exo 2 Medium" panose="00000600000000000000" pitchFamily="50" charset="0"/>
+                <a:cs typeface="Simplon BP Regular"/>
+              </a:rPr>
+              <a:t>Desenvolver a Tela Inicial da Aplicação de Agendamentos </a:t>
+            </a:r>
+            <a:r>
+              <a:rPr lang="pt-BR" sz="1323" b="1">
+                <a:solidFill>
+                  <a:schemeClr val="tx1"/>
+                </a:solidFill>
+                <a:latin typeface="Exo 2 Medium" panose="00000600000000000000" pitchFamily="50" charset="0"/>
+                <a:cs typeface="Simplon BP Regular"/>
+              </a:rPr>
+              <a:t>#Vinicius e Ferraz</a:t>
+            </a:r>
+            <a:br>
+              <a:rPr lang="pt-BR" sz="1200" b="1" dirty="0">
+                <a:solidFill>
+                  <a:schemeClr val="tx1"/>
+                </a:solidFill>
+                <a:latin typeface="Exo 2 Medium" panose="00000600000000000000" pitchFamily="50" charset="0"/>
+                <a:cs typeface="Simplon BP Regular"/>
+              </a:rPr>
+            </a:br>
+            <a:br>
+              <a:rPr lang="pt-BR" sz="1200" b="1" dirty="0">
+                <a:solidFill>
+                  <a:schemeClr val="tx1"/>
+                </a:solidFill>
+                <a:latin typeface="Exo 2 Medium" panose="00000600000000000000" pitchFamily="50" charset="0"/>
+                <a:cs typeface="Simplon BP Regular"/>
+              </a:rPr>
+            </a:br>
+            <a:endParaRPr lang="pt-BR" sz="1200" b="1" dirty="0">
+              <a:solidFill>
+                <a:schemeClr val="tx1"/>
+              </a:solidFill>
+              <a:latin typeface="Exo 2 Medium" panose="00000600000000000000" pitchFamily="50" charset="0"/>
+              <a:cs typeface="Simplon BP Regular"/>
+            </a:endParaRPr>
+          </a:p>
+          <a:p>
+            <a:pPr marL="0" lvl="1" defTabSz="672130"/>
+            <a:r>
+              <a:rPr lang="pt-BR" sz="1320" b="1" dirty="0">
+                <a:solidFill>
+                  <a:schemeClr val="tx1"/>
+                </a:solidFill>
+                <a:latin typeface="Exo 2 Medium" panose="00000600000000000000" pitchFamily="50" charset="0"/>
+                <a:cs typeface="Simplon BP Regular"/>
+              </a:rPr>
+              <a:t>Frente Negócios</a:t>
+            </a:r>
+            <a:endParaRPr lang="pt-BR" sz="1320" dirty="0">
+              <a:solidFill>
+                <a:schemeClr val="tx1"/>
+              </a:solidFill>
+              <a:latin typeface="Exo 2 Medium" panose="00000600000000000000" pitchFamily="50" charset="0"/>
+              <a:cs typeface="Simplon BP Regular"/>
+            </a:endParaRPr>
+          </a:p>
+          <a:p>
+            <a:pPr marL="0" lvl="1"/>
+            <a:r>
+              <a:rPr lang="pt-BR" sz="1300" dirty="0">
+                <a:solidFill>
+                  <a:schemeClr val="tx1"/>
+                </a:solidFill>
+                <a:latin typeface="Exo 2 Medium" panose="00000600000000000000" pitchFamily="50" charset="0"/>
+                <a:cs typeface="Simplon BP Regular"/>
+              </a:rPr>
+              <a:t>Sem atividades no momento</a:t>
+            </a:r>
+            <a:endParaRPr lang="pt-BR" sz="1320" b="1" dirty="0">
+              <a:solidFill>
+                <a:schemeClr val="tx1"/>
+              </a:solidFill>
+              <a:latin typeface="Exo 2 Medium" panose="00000600000000000000" pitchFamily="50" charset="0"/>
+              <a:cs typeface="Simplon BP Regular"/>
+            </a:endParaRPr>
+          </a:p>
+        </p:txBody>
+      </p:sp>
+      <p:sp>
+        <p:nvSpPr>
+          <p:cNvPr id="6" name="Oval 134">
+            <a:extLst>
+              <a:ext uri="{FF2B5EF4-FFF2-40B4-BE49-F238E27FC236}">
+                <a16:creationId xmlns:a16="http://schemas.microsoft.com/office/drawing/2014/main" id="{70825C6F-9257-4CF5-8C62-1CA1EB2F8815}"/>
+              </a:ext>
+            </a:extLst>
+          </p:cNvPr>
+          <p:cNvSpPr>
+            <a:spLocks noChangeAspect="1"/>
+          </p:cNvSpPr>
+          <p:nvPr/>
+        </p:nvSpPr>
+        <p:spPr>
+          <a:xfrm>
+            <a:off x="9323960" y="269355"/>
+            <a:ext cx="211404" cy="211689"/>
+          </a:xfrm>
+          <a:prstGeom prst="ellipse">
+            <a:avLst/>
+          </a:prstGeom>
+          <a:solidFill>
+            <a:srgbClr val="1BCF13"/>
+          </a:solidFill>
+          <a:ln w="12700">
+            <a:solidFill>
+              <a:schemeClr val="accent3"/>
+            </a:solidFill>
+          </a:ln>
+        </p:spPr>
+        <p:style>
+          <a:lnRef idx="2">
+            <a:schemeClr val="accent1">
+              <a:shade val="50000"/>
+            </a:schemeClr>
+          </a:lnRef>
+          <a:fillRef idx="1">
+            <a:schemeClr val="accent1"/>
+          </a:fillRef>
+          <a:effectRef idx="0">
+            <a:schemeClr val="accent1"/>
+          </a:effectRef>
+          <a:fontRef idx="minor">
+            <a:schemeClr val="lt1"/>
+          </a:fontRef>
+        </p:style>
+        <p:txBody>
+          <a:bodyPr wrap="none" lIns="52922" tIns="52922" rIns="52922" rtlCol="0" anchor="ctr"/>
+          <a:lstStyle/>
+          <a:p>
+            <a:pPr algn="ctr" defTabSz="672130"/>
+            <a:endParaRPr lang="en-US" sz="1176" dirty="0">
+              <a:ln>
+                <a:solidFill>
+                  <a:srgbClr val="00B050"/>
+                </a:solidFill>
+              </a:ln>
+              <a:solidFill>
+                <a:srgbClr val="1BCF13"/>
+              </a:solidFill>
+              <a:highlight>
+                <a:srgbClr val="FFFF00"/>
+              </a:highlight>
+              <a:latin typeface="Exo 2 Medium" panose="00000600000000000000" pitchFamily="50" charset="0"/>
+              <a:cs typeface="Simplon BP Regular"/>
+            </a:endParaRPr>
+          </a:p>
+        </p:txBody>
+      </p:sp>
+      <p:sp>
+        <p:nvSpPr>
+          <p:cNvPr id="9" name="Oval 134">
+            <a:extLst>
+              <a:ext uri="{FF2B5EF4-FFF2-40B4-BE49-F238E27FC236}">
+                <a16:creationId xmlns:a16="http://schemas.microsoft.com/office/drawing/2014/main" id="{B60B13C9-0C70-4C0F-82B2-D0CD4FDFC1F0}"/>
+              </a:ext>
+            </a:extLst>
+          </p:cNvPr>
+          <p:cNvSpPr>
+            <a:spLocks noChangeAspect="1"/>
+          </p:cNvSpPr>
+          <p:nvPr/>
+        </p:nvSpPr>
+        <p:spPr>
+          <a:xfrm>
+            <a:off x="12155999" y="297930"/>
+            <a:ext cx="211404" cy="211689"/>
+          </a:xfrm>
+          <a:prstGeom prst="ellipse">
+            <a:avLst/>
+          </a:prstGeom>
+          <a:solidFill>
+            <a:srgbClr val="1BCF13"/>
+          </a:solidFill>
+          <a:ln w="12700">
+            <a:solidFill>
+              <a:schemeClr val="accent3"/>
+            </a:solidFill>
+          </a:ln>
+        </p:spPr>
+        <p:style>
+          <a:lnRef idx="2">
+            <a:schemeClr val="accent1">
+              <a:shade val="50000"/>
+            </a:schemeClr>
+          </a:lnRef>
+          <a:fillRef idx="1">
+            <a:schemeClr val="accent1"/>
+          </a:fillRef>
+          <a:effectRef idx="0">
+            <a:schemeClr val="accent1"/>
+          </a:effectRef>
+          <a:fontRef idx="minor">
+            <a:schemeClr val="lt1"/>
+          </a:fontRef>
+        </p:style>
+        <p:txBody>
+          <a:bodyPr wrap="none" lIns="52922" tIns="52922" rIns="52922" rtlCol="0" anchor="ctr"/>
+          <a:lstStyle/>
+          <a:p>
+            <a:pPr algn="ctr" defTabSz="672130"/>
+            <a:endParaRPr lang="en-US" sz="1176" dirty="0">
+              <a:solidFill>
+                <a:prstClr val="black"/>
+              </a:solidFill>
+              <a:latin typeface="Exo 2 Medium" panose="00000600000000000000" pitchFamily="50" charset="0"/>
+              <a:cs typeface="Simplon BP Regular"/>
+            </a:endParaRPr>
+          </a:p>
+        </p:txBody>
+      </p:sp>
+      <p:sp>
+        <p:nvSpPr>
+          <p:cNvPr id="44" name="Oval 120">
+            <a:extLst>
+              <a:ext uri="{FF2B5EF4-FFF2-40B4-BE49-F238E27FC236}">
+                <a16:creationId xmlns:a16="http://schemas.microsoft.com/office/drawing/2014/main" id="{2688D066-DD5D-4246-B846-8AD1218C78EC}"/>
+              </a:ext>
+            </a:extLst>
+          </p:cNvPr>
+          <p:cNvSpPr>
+            <a:spLocks noChangeAspect="1"/>
+          </p:cNvSpPr>
+          <p:nvPr/>
+        </p:nvSpPr>
+        <p:spPr>
+          <a:xfrm>
+            <a:off x="10188056" y="297930"/>
+            <a:ext cx="211404" cy="211689"/>
+          </a:xfrm>
+          <a:prstGeom prst="ellipse">
+            <a:avLst/>
+          </a:prstGeom>
+          <a:solidFill>
+            <a:srgbClr val="FFFF00"/>
+          </a:solidFill>
+          <a:ln w="12700">
+            <a:solidFill>
+              <a:schemeClr val="accent3"/>
+            </a:solidFill>
+          </a:ln>
+        </p:spPr>
+        <p:style>
+          <a:lnRef idx="2">
+            <a:schemeClr val="accent1">
+              <a:shade val="50000"/>
+            </a:schemeClr>
+          </a:lnRef>
+          <a:fillRef idx="1">
+            <a:schemeClr val="accent1"/>
+          </a:fillRef>
+          <a:effectRef idx="0">
+            <a:schemeClr val="accent1"/>
+          </a:effectRef>
+          <a:fontRef idx="minor">
+            <a:schemeClr val="lt1"/>
+          </a:fontRef>
+        </p:style>
+        <p:txBody>
+          <a:bodyPr wrap="none" lIns="52922" tIns="52922" rIns="52922" rtlCol="0" anchor="ctr"/>
+          <a:lstStyle/>
+          <a:p>
+            <a:pPr algn="ctr" defTabSz="672130"/>
+            <a:endParaRPr lang="en-US" sz="1176" dirty="0">
+              <a:solidFill>
+                <a:prstClr val="black"/>
+              </a:solidFill>
+              <a:latin typeface="Exo 2 Medium" panose="00000600000000000000" pitchFamily="50" charset="0"/>
+              <a:cs typeface="Simplon BP Regular"/>
+            </a:endParaRPr>
+          </a:p>
+        </p:txBody>
+      </p:sp>
+      <p:sp>
+        <p:nvSpPr>
+          <p:cNvPr id="5" name="Retângulo 4">
+            <a:extLst>
+              <a:ext uri="{FF2B5EF4-FFF2-40B4-BE49-F238E27FC236}">
+                <a16:creationId xmlns:a16="http://schemas.microsoft.com/office/drawing/2014/main" id="{A1C14918-6027-46B3-96BF-C5F7FDEC3276}"/>
+              </a:ext>
+            </a:extLst>
+          </p:cNvPr>
+          <p:cNvSpPr/>
+          <p:nvPr/>
+        </p:nvSpPr>
+        <p:spPr>
+          <a:xfrm>
+            <a:off x="8017619" y="209534"/>
+            <a:ext cx="5041889" cy="618769"/>
+          </a:xfrm>
+          <a:prstGeom prst="rect">
+            <a:avLst/>
+          </a:prstGeom>
+          <a:noFill/>
+          <a:ln w="6350">
+            <a:solidFill>
+              <a:schemeClr val="bg1">
+                <a:lumMod val="75000"/>
+              </a:schemeClr>
+            </a:solidFill>
+          </a:ln>
+        </p:spPr>
+        <p:style>
+          <a:lnRef idx="2">
+            <a:schemeClr val="accent1">
+              <a:shade val="50000"/>
+            </a:schemeClr>
+          </a:lnRef>
+          <a:fillRef idx="1">
+            <a:schemeClr val="accent1"/>
+          </a:fillRef>
+          <a:effectRef idx="0">
+            <a:schemeClr val="accent1"/>
+          </a:effectRef>
+          <a:fontRef idx="minor">
+            <a:schemeClr val="lt1"/>
+          </a:fontRef>
+        </p:style>
+        <p:txBody>
+          <a:bodyPr rtlCol="0" anchor="ctr"/>
+          <a:lstStyle/>
+          <a:p>
+            <a:pPr algn="ctr"/>
+            <a:endParaRPr lang="pt-BR">
+              <a:latin typeface="Exo 2 Medium" panose="00000600000000000000" pitchFamily="50" charset="0"/>
+            </a:endParaRPr>
+          </a:p>
+        </p:txBody>
+      </p:sp>
+      <p:sp>
+        <p:nvSpPr>
+          <p:cNvPr id="8" name="TextBox 138">
+            <a:extLst>
+              <a:ext uri="{FF2B5EF4-FFF2-40B4-BE49-F238E27FC236}">
+                <a16:creationId xmlns:a16="http://schemas.microsoft.com/office/drawing/2014/main" id="{5CE7D08C-795B-4BF1-97F6-F9773F4E9F4C}"/>
+              </a:ext>
+            </a:extLst>
+          </p:cNvPr>
+          <p:cNvSpPr txBox="1"/>
+          <p:nvPr/>
+        </p:nvSpPr>
+        <p:spPr>
+          <a:xfrm>
+            <a:off x="9715810" y="51570"/>
+            <a:ext cx="1478088" cy="211688"/>
+          </a:xfrm>
+          <a:prstGeom prst="rect">
+            <a:avLst/>
+          </a:prstGeom>
+          <a:solidFill>
+            <a:schemeClr val="bg1"/>
+          </a:solidFill>
+          <a:ln w="12700">
+            <a:noFill/>
+          </a:ln>
+        </p:spPr>
+        <p:style>
+          <a:lnRef idx="2">
+            <a:schemeClr val="accent4"/>
+          </a:lnRef>
+          <a:fillRef idx="1">
+            <a:schemeClr val="lt1"/>
+          </a:fillRef>
+          <a:effectRef idx="0">
+            <a:schemeClr val="accent4"/>
+          </a:effectRef>
+          <a:fontRef idx="minor">
+            <a:schemeClr val="dk1"/>
+          </a:fontRef>
+        </p:style>
+        <p:txBody>
+          <a:bodyPr wrap="none" lIns="52922" tIns="52922" rIns="52922" bIns="0" rtlCol="0" anchor="b"/>
+          <a:lstStyle>
+            <a:defPPr>
+              <a:defRPr lang="en-US"/>
+            </a:defPPr>
+            <a:lvl1pPr algn="ctr">
+              <a:defRPr sz="1000" b="1">
+                <a:latin typeface="Simplon BP Regular"/>
+                <a:cs typeface="Simplon BP Regular"/>
+              </a:defRPr>
+            </a:lvl1pPr>
+            <a:lvl2pPr>
+              <a:defRPr>
+                <a:solidFill>
+                  <a:schemeClr val="dk1"/>
+                </a:solidFill>
+              </a:defRPr>
+            </a:lvl2pPr>
+            <a:lvl3pPr>
+              <a:defRPr>
+                <a:solidFill>
+                  <a:schemeClr val="dk1"/>
+                </a:solidFill>
+              </a:defRPr>
+            </a:lvl3pPr>
+            <a:lvl4pPr>
+              <a:defRPr>
+                <a:solidFill>
+                  <a:schemeClr val="dk1"/>
+                </a:solidFill>
+              </a:defRPr>
+            </a:lvl4pPr>
+            <a:lvl5pPr>
+              <a:defRPr>
+                <a:solidFill>
+                  <a:schemeClr val="dk1"/>
+                </a:solidFill>
+              </a:defRPr>
+            </a:lvl5pPr>
+            <a:lvl6pPr>
+              <a:defRPr>
+                <a:solidFill>
+                  <a:schemeClr val="dk1"/>
+                </a:solidFill>
+              </a:defRPr>
+            </a:lvl6pPr>
+            <a:lvl7pPr>
+              <a:defRPr>
+                <a:solidFill>
+                  <a:schemeClr val="dk1"/>
+                </a:solidFill>
+              </a:defRPr>
+            </a:lvl7pPr>
+            <a:lvl8pPr>
+              <a:defRPr>
+                <a:solidFill>
+                  <a:schemeClr val="dk1"/>
+                </a:solidFill>
+              </a:defRPr>
+            </a:lvl8pPr>
+            <a:lvl9pPr>
+              <a:defRPr>
+                <a:solidFill>
+                  <a:schemeClr val="dk1"/>
+                </a:solidFill>
+              </a:defRPr>
+            </a:lvl9pPr>
+          </a:lstStyle>
+          <a:p>
+            <a:pPr defTabSz="672130"/>
+            <a:r>
+              <a:rPr lang="en-US" sz="1176" b="0" dirty="0">
+                <a:solidFill>
+                  <a:prstClr val="black"/>
+                </a:solidFill>
+                <a:latin typeface="Exo 2 Medium" panose="00000600000000000000" pitchFamily="50" charset="0"/>
+              </a:rPr>
+              <a:t>    Farol do Projeto   </a:t>
+            </a:r>
+          </a:p>
+        </p:txBody>
+      </p:sp>
+      <p:sp>
+        <p:nvSpPr>
+          <p:cNvPr id="21" name="Retângulo 20">
+            <a:extLst>
+              <a:ext uri="{FF2B5EF4-FFF2-40B4-BE49-F238E27FC236}">
+                <a16:creationId xmlns:a16="http://schemas.microsoft.com/office/drawing/2014/main" id="{2045E605-DF27-495A-BAFB-81B6DAE989BF}"/>
+              </a:ext>
+            </a:extLst>
+          </p:cNvPr>
+          <p:cNvSpPr/>
+          <p:nvPr/>
+        </p:nvSpPr>
+        <p:spPr>
+          <a:xfrm>
+            <a:off x="6844996" y="1121895"/>
+            <a:ext cx="6164295" cy="1110240"/>
+          </a:xfrm>
+          <a:prstGeom prst="rect">
+            <a:avLst/>
+          </a:prstGeom>
+        </p:spPr>
+        <p:txBody>
+          <a:bodyPr wrap="square">
+            <a:spAutoFit/>
+          </a:bodyPr>
+          <a:lstStyle/>
+          <a:p>
+            <a:pPr marL="285750" indent="-285750" fontAlgn="base">
+              <a:spcBef>
+                <a:spcPct val="0"/>
+              </a:spcBef>
+              <a:buFont typeface="Wingdings" panose="05000000000000000000" pitchFamily="2" charset="2"/>
+              <a:buChar char="§"/>
+              <a:defRPr/>
+            </a:pPr>
+            <a:r>
+              <a:rPr lang="pt-BR" sz="1323" dirty="0">
+                <a:latin typeface="Exo 2 Medium" panose="00000600000000000000" pitchFamily="50" charset="0"/>
+                <a:cs typeface="Simplon BP Regular"/>
+              </a:rPr>
+              <a:t>Integrar a lógica de cadastro e login na aplicação do nosso back-end com nosso front-end</a:t>
+            </a:r>
+          </a:p>
+          <a:p>
+            <a:pPr marL="252049" indent="-252049" fontAlgn="base">
+              <a:spcBef>
+                <a:spcPct val="0"/>
+              </a:spcBef>
+              <a:buFont typeface="Wingdings" panose="05000000000000000000" pitchFamily="2" charset="2"/>
+              <a:buChar char="§"/>
+              <a:defRPr/>
+            </a:pPr>
+            <a:r>
+              <a:rPr lang="pt-BR" sz="1323" dirty="0">
+                <a:latin typeface="Exo 2 Medium" panose="00000600000000000000" pitchFamily="50" charset="0"/>
+                <a:cs typeface="Simplon BP Regular"/>
+              </a:rPr>
+              <a:t>Integrar banco de dados com nosso front-end</a:t>
+            </a:r>
+          </a:p>
+          <a:p>
+            <a:pPr marL="252049" indent="-252049" fontAlgn="base">
+              <a:spcBef>
+                <a:spcPct val="0"/>
+              </a:spcBef>
+              <a:buFont typeface="Wingdings" panose="05000000000000000000" pitchFamily="2" charset="2"/>
+              <a:buChar char="§"/>
+              <a:defRPr/>
+            </a:pPr>
+            <a:endParaRPr lang="pt-BR" sz="1323" dirty="0">
+              <a:latin typeface="Exo 2 Medium" panose="00000600000000000000" pitchFamily="50" charset="0"/>
+              <a:cs typeface="Simplon BP Regular"/>
+            </a:endParaRPr>
+          </a:p>
+          <a:p>
+            <a:pPr marL="252049" indent="-252049" fontAlgn="base">
+              <a:spcBef>
+                <a:spcPct val="0"/>
+              </a:spcBef>
+              <a:buFont typeface="Wingdings" panose="05000000000000000000" pitchFamily="2" charset="2"/>
+              <a:buChar char="§"/>
+              <a:defRPr/>
+            </a:pPr>
+            <a:endParaRPr lang="pt-BR" sz="1323" dirty="0">
+              <a:latin typeface="Exo 2 Medium" panose="00000600000000000000" pitchFamily="50" charset="0"/>
+              <a:cs typeface="Simplon BP Regular"/>
+            </a:endParaRPr>
+          </a:p>
+        </p:txBody>
+      </p:sp>
+    </p:spTree>
+    <p:extLst>
+      <p:ext uri="{BB962C8B-B14F-4D97-AF65-F5344CB8AC3E}">
+        <p14:creationId xmlns:p14="http://schemas.microsoft.com/office/powerpoint/2010/main" val="4193015970"/>
       </p:ext>
     </p:extLst>
   </p:cSld>
@@ -41747,21 +43805,6 @@
 </file>
 
 <file path=customXml/item1.xml><?xml version="1.0" encoding="utf-8"?>
-<?mso-contentType ?>
-<FormTemplates xmlns="http://schemas.microsoft.com/sharepoint/v3/contenttype/forms">
-  <Display>DocumentLibraryForm</Display>
-  <Edit>DocumentLibraryForm</Edit>
-  <New>DocumentLibraryForm</New>
-</FormTemplates>
-</file>
-
-<file path=customXml/item2.xml><?xml version="1.0" encoding="utf-8"?>
-<p:properties xmlns:p="http://schemas.microsoft.com/office/2006/metadata/properties" xmlns:xsi="http://www.w3.org/2001/XMLSchema-instance" xmlns:pc="http://schemas.microsoft.com/office/infopath/2007/PartnerControls">
-  <documentManagement/>
-</p:properties>
-</file>
-
-<file path=customXml/item3.xml><?xml version="1.0" encoding="utf-8"?>
 <ct:contentTypeSchema xmlns:ct="http://schemas.microsoft.com/office/2006/metadata/contentType" xmlns:ma="http://schemas.microsoft.com/office/2006/metadata/properties/metaAttributes" ct:_="" ma:_="" ma:contentTypeName="Document" ma:contentTypeID="0x0101007F8ECE7139958D46ABEDA89D12B90CBF" ma:contentTypeVersion="0" ma:contentTypeDescription="Create a new document." ma:contentTypeScope="" ma:versionID="e6d660081116f63565d30cc13099d5ec">
   <xsd:schema xmlns:xsd="http://www.w3.org/2001/XMLSchema" xmlns:xs="http://www.w3.org/2001/XMLSchema" xmlns:p="http://schemas.microsoft.com/office/2006/metadata/properties" targetNamespace="http://schemas.microsoft.com/office/2006/metadata/properties" ma:root="true" ma:fieldsID="d413257cd9829394d17656a545d5fa4e">
     <xsd:element name="properties">
@@ -41875,10 +43918,33 @@
 </ct:contentTypeSchema>
 </file>
 
+<file path=customXml/item2.xml><?xml version="1.0" encoding="utf-8"?>
+<p:properties xmlns:p="http://schemas.microsoft.com/office/2006/metadata/properties" xmlns:xsi="http://www.w3.org/2001/XMLSchema-instance" xmlns:pc="http://schemas.microsoft.com/office/infopath/2007/PartnerControls">
+  <documentManagement/>
+</p:properties>
+</file>
+
+<file path=customXml/item3.xml><?xml version="1.0" encoding="utf-8"?>
+<?mso-contentType ?>
+<FormTemplates xmlns="http://schemas.microsoft.com/sharepoint/v3/contenttype/forms">
+  <Display>DocumentLibraryForm</Display>
+  <Edit>DocumentLibraryForm</Edit>
+  <New>DocumentLibraryForm</New>
+</FormTemplates>
+</file>
+
 <file path=customXml/itemProps1.xml><?xml version="1.0" encoding="utf-8"?>
-<ds:datastoreItem xmlns:ds="http://schemas.openxmlformats.org/officeDocument/2006/customXml" ds:itemID="{E2481852-F24E-4532-AF30-C154D705D105}">
+<ds:datastoreItem xmlns:ds="http://schemas.openxmlformats.org/officeDocument/2006/customXml" ds:itemID="{EFDE92A4-5D2A-451A-A373-EB014CDC0D59}">
   <ds:schemaRefs>
-    <ds:schemaRef ds:uri="http://schemas.microsoft.com/sharepoint/v3/contenttype/forms"/>
+    <ds:schemaRef ds:uri="http://schemas.microsoft.com/office/2006/metadata/contentType"/>
+    <ds:schemaRef ds:uri="http://schemas.microsoft.com/office/2006/metadata/properties/metaAttributes"/>
+    <ds:schemaRef ds:uri="http://www.w3.org/2001/XMLSchema"/>
+    <ds:schemaRef ds:uri="http://schemas.microsoft.com/office/2006/metadata/properties"/>
+    <ds:schemaRef ds:uri="http://schemas.openxmlformats.org/package/2006/metadata/core-properties"/>
+    <ds:schemaRef ds:uri="http://purl.org/dc/elements/1.1/"/>
+    <ds:schemaRef ds:uri="http://purl.org/dc/terms/"/>
+    <ds:schemaRef ds:uri="http://schemas.microsoft.com/internal/obd"/>
+    <ds:schemaRef ds:uri="http://schemas.microsoft.com/office/infopath/2007/PartnerControls"/>
   </ds:schemaRefs>
 </ds:datastoreItem>
 </file>
@@ -41901,17 +43967,9 @@
 </file>
 
 <file path=customXml/itemProps3.xml><?xml version="1.0" encoding="utf-8"?>
-<ds:datastoreItem xmlns:ds="http://schemas.openxmlformats.org/officeDocument/2006/customXml" ds:itemID="{EFDE92A4-5D2A-451A-A373-EB014CDC0D59}">
+<ds:datastoreItem xmlns:ds="http://schemas.openxmlformats.org/officeDocument/2006/customXml" ds:itemID="{E2481852-F24E-4532-AF30-C154D705D105}">
   <ds:schemaRefs>
-    <ds:schemaRef ds:uri="http://schemas.microsoft.com/office/2006/metadata/contentType"/>
-    <ds:schemaRef ds:uri="http://schemas.microsoft.com/office/2006/metadata/properties/metaAttributes"/>
-    <ds:schemaRef ds:uri="http://www.w3.org/2001/XMLSchema"/>
-    <ds:schemaRef ds:uri="http://schemas.microsoft.com/office/2006/metadata/properties"/>
-    <ds:schemaRef ds:uri="http://schemas.openxmlformats.org/package/2006/metadata/core-properties"/>
-    <ds:schemaRef ds:uri="http://purl.org/dc/elements/1.1/"/>
-    <ds:schemaRef ds:uri="http://purl.org/dc/terms/"/>
-    <ds:schemaRef ds:uri="http://schemas.microsoft.com/internal/obd"/>
-    <ds:schemaRef ds:uri="http://schemas.microsoft.com/office/infopath/2007/PartnerControls"/>
+    <ds:schemaRef ds:uri="http://schemas.microsoft.com/sharepoint/v3/contenttype/forms"/>
   </ds:schemaRefs>
 </ds:datastoreItem>
 </file>
</xml_diff>

<commit_message>
[Documentação] Adiciona o Status Report da semana do dia 10 a 17/11
</commit_message>
<xml_diff>
--- a/documentacao/status-report/Status_Report_-_Grupo_09.pptx
+++ b/documentacao/status-report/Status_Report_-_Grupo_09.pptx
@@ -7,10 +7,10 @@
     <p:sldMasterId id="2147483665" r:id="rId6"/>
   </p:sldMasterIdLst>
   <p:notesMasterIdLst>
-    <p:notesMasterId r:id="rId18"/>
+    <p:notesMasterId r:id="rId19"/>
   </p:notesMasterIdLst>
   <p:handoutMasterIdLst>
-    <p:handoutMasterId r:id="rId19"/>
+    <p:handoutMasterId r:id="rId20"/>
   </p:handoutMasterIdLst>
   <p:sldIdLst>
     <p:sldId id="344" r:id="rId7"/>
@@ -24,6 +24,7 @@
     <p:sldId id="478" r:id="rId15"/>
     <p:sldId id="479" r:id="rId16"/>
     <p:sldId id="480" r:id="rId17"/>
+    <p:sldId id="481" r:id="rId18"/>
   </p:sldIdLst>
   <p:sldSz cx="13442950" cy="7561263"/>
   <p:notesSz cx="7104063" cy="10234613"/>
@@ -141,6 +142,7 @@
             <p14:sldId id="478"/>
             <p14:sldId id="479"/>
             <p14:sldId id="480"/>
+            <p14:sldId id="481"/>
           </p14:sldIdLst>
         </p14:section>
       </p14:sectionLst>
@@ -439,7 +441,7 @@
             <a:fld id="{C3CD65D1-5C11-455D-9F9A-0E035F00A0DA}" type="datetimeFigureOut">
               <a:rPr lang="pt-BR" smtClean="0"/>
               <a:pPr/>
-              <a:t>10/11/2021</a:t>
+              <a:t>17/11/2021</a:t>
             </a:fld>
             <a:endParaRPr lang="pt-BR"/>
           </a:p>
@@ -607,7 +609,7 @@
             <a:fld id="{A05DA3EF-18EA-43DE-B1BB-402A3C558822}" type="datetimeFigureOut">
               <a:rPr lang="pt-BR" smtClean="0"/>
               <a:pPr/>
-              <a:t>10/11/2021</a:t>
+              <a:t>17/11/2021</a:t>
             </a:fld>
             <a:endParaRPr lang="pt-BR"/>
           </a:p>
@@ -1140,6 +1142,99 @@
     <p:extLst>
       <p:ext uri="{BB962C8B-B14F-4D97-AF65-F5344CB8AC3E}">
         <p14:creationId xmlns:p14="http://schemas.microsoft.com/office/powerpoint/2010/main" val="409348578"/>
+      </p:ext>
+    </p:extLst>
+  </p:cSld>
+  <p:clrMapOvr>
+    <a:masterClrMapping/>
+  </p:clrMapOvr>
+</p:notes>
+</file>
+
+<file path=ppt/notesSlides/notesSlide12.xml><?xml version="1.0" encoding="utf-8"?>
+<p:notes xmlns:a="http://schemas.openxmlformats.org/drawingml/2006/main" xmlns:r="http://schemas.openxmlformats.org/officeDocument/2006/relationships" xmlns:p="http://schemas.openxmlformats.org/presentationml/2006/main">
+  <p:cSld>
+    <p:spTree>
+      <p:nvGrpSpPr>
+        <p:cNvPr id="1" name=""/>
+        <p:cNvGrpSpPr/>
+        <p:nvPr/>
+      </p:nvGrpSpPr>
+      <p:grpSpPr>
+        <a:xfrm>
+          <a:off x="0" y="0"/>
+          <a:ext cx="0" cy="0"/>
+          <a:chOff x="0" y="0"/>
+          <a:chExt cx="0" cy="0"/>
+        </a:xfrm>
+      </p:grpSpPr>
+      <p:sp>
+        <p:nvSpPr>
+          <p:cNvPr id="2" name="Slide Image Placeholder 1"/>
+          <p:cNvSpPr>
+            <a:spLocks noGrp="1" noRot="1" noChangeAspect="1"/>
+          </p:cNvSpPr>
+          <p:nvPr>
+            <p:ph type="sldImg"/>
+          </p:nvPr>
+        </p:nvSpPr>
+        <p:spPr/>
+      </p:sp>
+      <p:sp>
+        <p:nvSpPr>
+          <p:cNvPr id="3" name="Notes Placeholder 2"/>
+          <p:cNvSpPr>
+            <a:spLocks noGrp="1"/>
+          </p:cNvSpPr>
+          <p:nvPr>
+            <p:ph type="body" idx="1"/>
+          </p:nvPr>
+        </p:nvSpPr>
+        <p:spPr/>
+        <p:txBody>
+          <a:bodyPr/>
+          <a:lstStyle/>
+          <a:p>
+            <a:endParaRPr lang="en-US"/>
+          </a:p>
+        </p:txBody>
+      </p:sp>
+      <p:sp>
+        <p:nvSpPr>
+          <p:cNvPr id="4" name="Slide Number Placeholder 3"/>
+          <p:cNvSpPr>
+            <a:spLocks noGrp="1"/>
+          </p:cNvSpPr>
+          <p:nvPr>
+            <p:ph type="sldNum" sz="quarter" idx="10"/>
+          </p:nvPr>
+        </p:nvSpPr>
+        <p:spPr/>
+        <p:txBody>
+          <a:bodyPr/>
+          <a:lstStyle/>
+          <a:p>
+            <a:fld id="{B39AF3DB-B6A1-2444-9DD8-53D016F8E638}" type="slidenum">
+              <a:rPr lang="pt-BR" smtClean="0">
+                <a:solidFill>
+                  <a:prstClr val="black"/>
+                </a:solidFill>
+              </a:rPr>
+              <a:pPr/>
+              <a:t>12</a:t>
+            </a:fld>
+            <a:endParaRPr lang="pt-BR">
+              <a:solidFill>
+                <a:prstClr val="black"/>
+              </a:solidFill>
+            </a:endParaRPr>
+          </a:p>
+        </p:txBody>
+      </p:sp>
+    </p:spTree>
+    <p:extLst>
+      <p:ext uri="{BB962C8B-B14F-4D97-AF65-F5344CB8AC3E}">
+        <p14:creationId xmlns:p14="http://schemas.microsoft.com/office/powerpoint/2010/main" val="1170018892"/>
       </p:ext>
     </p:extLst>
   </p:cSld>
@@ -25601,6 +25696,2077 @@
     <p:extLst>
       <p:ext uri="{BB962C8B-B14F-4D97-AF65-F5344CB8AC3E}">
         <p14:creationId xmlns:p14="http://schemas.microsoft.com/office/powerpoint/2010/main" val="4193015970"/>
+      </p:ext>
+    </p:extLst>
+  </p:cSld>
+  <p:clrMapOvr>
+    <a:masterClrMapping/>
+  </p:clrMapOvr>
+</p:sld>
+</file>
+
+<file path=ppt/slides/slide12.xml><?xml version="1.0" encoding="utf-8"?>
+<p:sld xmlns:a="http://schemas.openxmlformats.org/drawingml/2006/main" xmlns:r="http://schemas.openxmlformats.org/officeDocument/2006/relationships" xmlns:p="http://schemas.openxmlformats.org/presentationml/2006/main">
+  <p:cSld>
+    <p:spTree>
+      <p:nvGrpSpPr>
+        <p:cNvPr id="1" name=""/>
+        <p:cNvGrpSpPr/>
+        <p:nvPr/>
+      </p:nvGrpSpPr>
+      <p:grpSpPr>
+        <a:xfrm>
+          <a:off x="0" y="0"/>
+          <a:ext cx="0" cy="0"/>
+          <a:chOff x="0" y="0"/>
+          <a:chExt cx="0" cy="0"/>
+        </a:xfrm>
+      </p:grpSpPr>
+      <p:sp>
+        <p:nvSpPr>
+          <p:cNvPr id="43" name="Rectangle 42"/>
+          <p:cNvSpPr/>
+          <p:nvPr/>
+        </p:nvSpPr>
+        <p:spPr>
+          <a:xfrm>
+            <a:off x="6804884" y="1106495"/>
+            <a:ext cx="6254624" cy="2191469"/>
+          </a:xfrm>
+          <a:prstGeom prst="rect">
+            <a:avLst/>
+          </a:prstGeom>
+          <a:noFill/>
+          <a:ln w="12700">
+            <a:solidFill>
+              <a:schemeClr val="bg1">
+                <a:lumMod val="50000"/>
+              </a:schemeClr>
+            </a:solidFill>
+          </a:ln>
+        </p:spPr>
+        <p:style>
+          <a:lnRef idx="2">
+            <a:schemeClr val="accent4"/>
+          </a:lnRef>
+          <a:fillRef idx="1">
+            <a:schemeClr val="lt1"/>
+          </a:fillRef>
+          <a:effectRef idx="0">
+            <a:schemeClr val="accent4"/>
+          </a:effectRef>
+          <a:fontRef idx="minor">
+            <a:schemeClr val="dk1"/>
+          </a:fontRef>
+        </p:style>
+        <p:txBody>
+          <a:bodyPr tIns="105844" rtlCol="0" anchor="t"/>
+          <a:lstStyle/>
+          <a:p>
+            <a:pPr defTabSz="672130">
+              <a:spcAft>
+                <a:spcPts val="882"/>
+              </a:spcAft>
+            </a:pPr>
+            <a:endParaRPr lang="pt-BR" sz="1470" dirty="0">
+              <a:solidFill>
+                <a:schemeClr val="tx1"/>
+              </a:solidFill>
+              <a:latin typeface="Exo 2 Medium" panose="00000600000000000000" pitchFamily="50" charset="0"/>
+              <a:cs typeface="Simplon BP Regular"/>
+            </a:endParaRPr>
+          </a:p>
+        </p:txBody>
+      </p:sp>
+      <p:sp>
+        <p:nvSpPr>
+          <p:cNvPr id="3" name="Title 2"/>
+          <p:cNvSpPr>
+            <a:spLocks noGrp="1"/>
+          </p:cNvSpPr>
+          <p:nvPr>
+            <p:ph type="title"/>
+          </p:nvPr>
+        </p:nvSpPr>
+        <p:spPr>
+          <a:xfrm>
+            <a:off x="469692" y="185232"/>
+            <a:ext cx="12098020" cy="800352"/>
+          </a:xfrm>
+        </p:spPr>
+        <p:txBody>
+          <a:bodyPr vert="horz" wrap="square" lIns="105844" tIns="0" rIns="105844" bIns="0" numCol="1" anchor="t" anchorCtr="0" compatLnSpc="1">
+            <a:prstTxWarp prst="textNoShape">
+              <a:avLst/>
+            </a:prstTxWarp>
+            <a:noAutofit/>
+          </a:bodyPr>
+          <a:lstStyle/>
+          <a:p>
+            <a:pPr algn="l">
+              <a:spcAft>
+                <a:spcPts val="882"/>
+              </a:spcAft>
+            </a:pPr>
+            <a:r>
+              <a:rPr lang="en-US" sz="2646" dirty="0">
+                <a:solidFill>
+                  <a:prstClr val="black"/>
+                </a:solidFill>
+                <a:latin typeface="Exo 2 Medium" panose="00000600000000000000" pitchFamily="50" charset="0"/>
+                <a:cs typeface="Simplon Oi Headline"/>
+              </a:rPr>
+              <a:t>SEMANA 14 - 17/11/2021</a:t>
+            </a:r>
+          </a:p>
+        </p:txBody>
+      </p:sp>
+      <p:sp>
+        <p:nvSpPr>
+          <p:cNvPr id="78" name="TextBox 118"/>
+          <p:cNvSpPr txBox="1"/>
+          <p:nvPr/>
+        </p:nvSpPr>
+        <p:spPr>
+          <a:xfrm>
+            <a:off x="11822773" y="576471"/>
+            <a:ext cx="899678" cy="179824"/>
+          </a:xfrm>
+          <a:prstGeom prst="rect">
+            <a:avLst/>
+          </a:prstGeom>
+          <a:noFill/>
+          <a:ln w="12700">
+            <a:noFill/>
+          </a:ln>
+        </p:spPr>
+        <p:style>
+          <a:lnRef idx="2">
+            <a:schemeClr val="accent4"/>
+          </a:lnRef>
+          <a:fillRef idx="1">
+            <a:schemeClr val="lt1"/>
+          </a:fillRef>
+          <a:effectRef idx="0">
+            <a:schemeClr val="accent4"/>
+          </a:effectRef>
+          <a:fontRef idx="minor">
+            <a:schemeClr val="dk1"/>
+          </a:fontRef>
+        </p:style>
+        <p:txBody>
+          <a:bodyPr wrap="none" lIns="52922" tIns="52922" rIns="52922" bIns="0" rtlCol="0" anchor="b"/>
+          <a:lstStyle>
+            <a:defPPr>
+              <a:defRPr lang="en-US"/>
+            </a:defPPr>
+            <a:lvl1pPr algn="ctr">
+              <a:defRPr sz="1000" b="1">
+                <a:latin typeface="Simplon BP Regular"/>
+                <a:cs typeface="Simplon BP Regular"/>
+              </a:defRPr>
+            </a:lvl1pPr>
+            <a:lvl2pPr>
+              <a:defRPr>
+                <a:solidFill>
+                  <a:schemeClr val="dk1"/>
+                </a:solidFill>
+              </a:defRPr>
+            </a:lvl2pPr>
+            <a:lvl3pPr>
+              <a:defRPr>
+                <a:solidFill>
+                  <a:schemeClr val="dk1"/>
+                </a:solidFill>
+              </a:defRPr>
+            </a:lvl3pPr>
+            <a:lvl4pPr>
+              <a:defRPr>
+                <a:solidFill>
+                  <a:schemeClr val="dk1"/>
+                </a:solidFill>
+              </a:defRPr>
+            </a:lvl4pPr>
+            <a:lvl5pPr>
+              <a:defRPr>
+                <a:solidFill>
+                  <a:schemeClr val="dk1"/>
+                </a:solidFill>
+              </a:defRPr>
+            </a:lvl5pPr>
+            <a:lvl6pPr>
+              <a:defRPr>
+                <a:solidFill>
+                  <a:schemeClr val="dk1"/>
+                </a:solidFill>
+              </a:defRPr>
+            </a:lvl6pPr>
+            <a:lvl7pPr>
+              <a:defRPr>
+                <a:solidFill>
+                  <a:schemeClr val="dk1"/>
+                </a:solidFill>
+              </a:defRPr>
+            </a:lvl7pPr>
+            <a:lvl8pPr>
+              <a:defRPr>
+                <a:solidFill>
+                  <a:schemeClr val="dk1"/>
+                </a:solidFill>
+              </a:defRPr>
+            </a:lvl8pPr>
+            <a:lvl9pPr>
+              <a:defRPr>
+                <a:solidFill>
+                  <a:schemeClr val="dk1"/>
+                </a:solidFill>
+              </a:defRPr>
+            </a:lvl9pPr>
+          </a:lstStyle>
+          <a:p>
+            <a:pPr defTabSz="672130"/>
+            <a:r>
+              <a:rPr lang="pt-BR" sz="1176" b="0" dirty="0">
+                <a:solidFill>
+                  <a:prstClr val="black"/>
+                </a:solidFill>
+                <a:latin typeface="Exo 2 Medium" panose="00000600000000000000" pitchFamily="50" charset="0"/>
+              </a:rPr>
+              <a:t>Negócios</a:t>
+            </a:r>
+          </a:p>
+        </p:txBody>
+      </p:sp>
+      <p:sp>
+        <p:nvSpPr>
+          <p:cNvPr id="109" name="Oval 120"/>
+          <p:cNvSpPr>
+            <a:spLocks noChangeAspect="1"/>
+          </p:cNvSpPr>
+          <p:nvPr/>
+        </p:nvSpPr>
+        <p:spPr>
+          <a:xfrm>
+            <a:off x="11193898" y="297930"/>
+            <a:ext cx="211404" cy="211689"/>
+          </a:xfrm>
+          <a:prstGeom prst="ellipse">
+            <a:avLst/>
+          </a:prstGeom>
+          <a:solidFill>
+            <a:srgbClr val="1BCF13"/>
+          </a:solidFill>
+          <a:ln w="12700">
+            <a:solidFill>
+              <a:schemeClr val="accent3"/>
+            </a:solidFill>
+          </a:ln>
+        </p:spPr>
+        <p:style>
+          <a:lnRef idx="2">
+            <a:schemeClr val="accent1">
+              <a:shade val="50000"/>
+            </a:schemeClr>
+          </a:lnRef>
+          <a:fillRef idx="1">
+            <a:schemeClr val="accent1"/>
+          </a:fillRef>
+          <a:effectRef idx="0">
+            <a:schemeClr val="accent1"/>
+          </a:effectRef>
+          <a:fontRef idx="minor">
+            <a:schemeClr val="lt1"/>
+          </a:fontRef>
+        </p:style>
+        <p:txBody>
+          <a:bodyPr wrap="none" lIns="52922" tIns="52922" rIns="52922" rtlCol="0" anchor="ctr"/>
+          <a:lstStyle/>
+          <a:p>
+            <a:pPr algn="ctr" defTabSz="672130"/>
+            <a:endParaRPr lang="en-US" sz="1176" dirty="0">
+              <a:solidFill>
+                <a:prstClr val="black"/>
+              </a:solidFill>
+              <a:latin typeface="Exo 2 Medium" panose="00000600000000000000" pitchFamily="50" charset="0"/>
+              <a:cs typeface="Simplon BP Regular"/>
+            </a:endParaRPr>
+          </a:p>
+        </p:txBody>
+      </p:sp>
+      <p:sp>
+        <p:nvSpPr>
+          <p:cNvPr id="80" name="TextBox 123"/>
+          <p:cNvSpPr txBox="1"/>
+          <p:nvPr/>
+        </p:nvSpPr>
+        <p:spPr>
+          <a:xfrm>
+            <a:off x="10852497" y="576471"/>
+            <a:ext cx="899678" cy="179824"/>
+          </a:xfrm>
+          <a:prstGeom prst="rect">
+            <a:avLst/>
+          </a:prstGeom>
+          <a:noFill/>
+          <a:ln w="12700">
+            <a:noFill/>
+          </a:ln>
+        </p:spPr>
+        <p:style>
+          <a:lnRef idx="2">
+            <a:schemeClr val="accent4"/>
+          </a:lnRef>
+          <a:fillRef idx="1">
+            <a:schemeClr val="lt1"/>
+          </a:fillRef>
+          <a:effectRef idx="0">
+            <a:schemeClr val="accent4"/>
+          </a:effectRef>
+          <a:fontRef idx="minor">
+            <a:schemeClr val="dk1"/>
+          </a:fontRef>
+        </p:style>
+        <p:txBody>
+          <a:bodyPr wrap="none" lIns="52922" tIns="52922" rIns="52922" bIns="0" rtlCol="0" anchor="b"/>
+          <a:lstStyle>
+            <a:defPPr>
+              <a:defRPr lang="en-US"/>
+            </a:defPPr>
+            <a:lvl1pPr algn="ctr">
+              <a:defRPr sz="1000" b="1">
+                <a:latin typeface="Simplon BP Regular"/>
+                <a:cs typeface="Simplon BP Regular"/>
+              </a:defRPr>
+            </a:lvl1pPr>
+            <a:lvl2pPr>
+              <a:defRPr>
+                <a:solidFill>
+                  <a:schemeClr val="dk1"/>
+                </a:solidFill>
+              </a:defRPr>
+            </a:lvl2pPr>
+            <a:lvl3pPr>
+              <a:defRPr>
+                <a:solidFill>
+                  <a:schemeClr val="dk1"/>
+                </a:solidFill>
+              </a:defRPr>
+            </a:lvl3pPr>
+            <a:lvl4pPr>
+              <a:defRPr>
+                <a:solidFill>
+                  <a:schemeClr val="dk1"/>
+                </a:solidFill>
+              </a:defRPr>
+            </a:lvl4pPr>
+            <a:lvl5pPr>
+              <a:defRPr>
+                <a:solidFill>
+                  <a:schemeClr val="dk1"/>
+                </a:solidFill>
+              </a:defRPr>
+            </a:lvl5pPr>
+            <a:lvl6pPr>
+              <a:defRPr>
+                <a:solidFill>
+                  <a:schemeClr val="dk1"/>
+                </a:solidFill>
+              </a:defRPr>
+            </a:lvl6pPr>
+            <a:lvl7pPr>
+              <a:defRPr>
+                <a:solidFill>
+                  <a:schemeClr val="dk1"/>
+                </a:solidFill>
+              </a:defRPr>
+            </a:lvl7pPr>
+            <a:lvl8pPr>
+              <a:defRPr>
+                <a:solidFill>
+                  <a:schemeClr val="dk1"/>
+                </a:solidFill>
+              </a:defRPr>
+            </a:lvl8pPr>
+            <a:lvl9pPr>
+              <a:defRPr>
+                <a:solidFill>
+                  <a:schemeClr val="dk1"/>
+                </a:solidFill>
+              </a:defRPr>
+            </a:lvl9pPr>
+          </a:lstStyle>
+          <a:p>
+            <a:pPr defTabSz="672130"/>
+            <a:r>
+              <a:rPr lang="pt-BR" sz="1176" b="0" dirty="0">
+                <a:solidFill>
+                  <a:prstClr val="black"/>
+                </a:solidFill>
+                <a:latin typeface="Exo 2 Medium" panose="00000600000000000000" pitchFamily="50" charset="0"/>
+              </a:rPr>
+              <a:t>Plataforma</a:t>
+            </a:r>
+          </a:p>
+        </p:txBody>
+      </p:sp>
+      <p:sp>
+        <p:nvSpPr>
+          <p:cNvPr id="82" name="TextBox 128"/>
+          <p:cNvSpPr txBox="1"/>
+          <p:nvPr/>
+        </p:nvSpPr>
+        <p:spPr>
+          <a:xfrm>
+            <a:off x="9854245" y="576471"/>
+            <a:ext cx="899678" cy="179824"/>
+          </a:xfrm>
+          <a:prstGeom prst="rect">
+            <a:avLst/>
+          </a:prstGeom>
+          <a:noFill/>
+          <a:ln w="12700">
+            <a:noFill/>
+          </a:ln>
+        </p:spPr>
+        <p:style>
+          <a:lnRef idx="2">
+            <a:schemeClr val="accent4"/>
+          </a:lnRef>
+          <a:fillRef idx="1">
+            <a:schemeClr val="lt1"/>
+          </a:fillRef>
+          <a:effectRef idx="0">
+            <a:schemeClr val="accent4"/>
+          </a:effectRef>
+          <a:fontRef idx="minor">
+            <a:schemeClr val="dk1"/>
+          </a:fontRef>
+        </p:style>
+        <p:txBody>
+          <a:bodyPr wrap="none" lIns="52922" tIns="52922" rIns="52922" bIns="0" rtlCol="0" anchor="b"/>
+          <a:lstStyle>
+            <a:defPPr>
+              <a:defRPr lang="en-US"/>
+            </a:defPPr>
+            <a:lvl1pPr algn="ctr">
+              <a:defRPr sz="1000" b="1">
+                <a:latin typeface="Simplon BP Regular"/>
+                <a:cs typeface="Simplon BP Regular"/>
+              </a:defRPr>
+            </a:lvl1pPr>
+            <a:lvl2pPr>
+              <a:defRPr>
+                <a:solidFill>
+                  <a:schemeClr val="dk1"/>
+                </a:solidFill>
+              </a:defRPr>
+            </a:lvl2pPr>
+            <a:lvl3pPr>
+              <a:defRPr>
+                <a:solidFill>
+                  <a:schemeClr val="dk1"/>
+                </a:solidFill>
+              </a:defRPr>
+            </a:lvl3pPr>
+            <a:lvl4pPr>
+              <a:defRPr>
+                <a:solidFill>
+                  <a:schemeClr val="dk1"/>
+                </a:solidFill>
+              </a:defRPr>
+            </a:lvl4pPr>
+            <a:lvl5pPr>
+              <a:defRPr>
+                <a:solidFill>
+                  <a:schemeClr val="dk1"/>
+                </a:solidFill>
+              </a:defRPr>
+            </a:lvl5pPr>
+            <a:lvl6pPr>
+              <a:defRPr>
+                <a:solidFill>
+                  <a:schemeClr val="dk1"/>
+                </a:solidFill>
+              </a:defRPr>
+            </a:lvl6pPr>
+            <a:lvl7pPr>
+              <a:defRPr>
+                <a:solidFill>
+                  <a:schemeClr val="dk1"/>
+                </a:solidFill>
+              </a:defRPr>
+            </a:lvl7pPr>
+            <a:lvl8pPr>
+              <a:defRPr>
+                <a:solidFill>
+                  <a:schemeClr val="dk1"/>
+                </a:solidFill>
+              </a:defRPr>
+            </a:lvl8pPr>
+            <a:lvl9pPr>
+              <a:defRPr>
+                <a:solidFill>
+                  <a:schemeClr val="dk1"/>
+                </a:solidFill>
+              </a:defRPr>
+            </a:lvl9pPr>
+          </a:lstStyle>
+          <a:p>
+            <a:pPr defTabSz="672130"/>
+            <a:r>
+              <a:rPr lang="pt-BR" sz="1176" b="0" dirty="0">
+                <a:solidFill>
+                  <a:prstClr val="black"/>
+                </a:solidFill>
+                <a:latin typeface="Exo 2 Medium" panose="00000600000000000000" pitchFamily="50" charset="0"/>
+              </a:rPr>
+              <a:t>Back</a:t>
+            </a:r>
+          </a:p>
+        </p:txBody>
+      </p:sp>
+      <p:sp>
+        <p:nvSpPr>
+          <p:cNvPr id="84" name="TextBox 133"/>
+          <p:cNvSpPr txBox="1"/>
+          <p:nvPr/>
+        </p:nvSpPr>
+        <p:spPr>
+          <a:xfrm>
+            <a:off x="8986650" y="576471"/>
+            <a:ext cx="899678" cy="179824"/>
+          </a:xfrm>
+          <a:prstGeom prst="rect">
+            <a:avLst/>
+          </a:prstGeom>
+          <a:noFill/>
+          <a:ln w="12700">
+            <a:noFill/>
+          </a:ln>
+        </p:spPr>
+        <p:style>
+          <a:lnRef idx="2">
+            <a:schemeClr val="accent4"/>
+          </a:lnRef>
+          <a:fillRef idx="1">
+            <a:schemeClr val="lt1"/>
+          </a:fillRef>
+          <a:effectRef idx="0">
+            <a:schemeClr val="accent4"/>
+          </a:effectRef>
+          <a:fontRef idx="minor">
+            <a:schemeClr val="dk1"/>
+          </a:fontRef>
+        </p:style>
+        <p:txBody>
+          <a:bodyPr wrap="none" lIns="52922" tIns="52922" rIns="52922" bIns="0" rtlCol="0" anchor="b"/>
+          <a:lstStyle>
+            <a:defPPr>
+              <a:defRPr lang="en-US"/>
+            </a:defPPr>
+            <a:lvl1pPr algn="ctr">
+              <a:defRPr sz="1000" b="1">
+                <a:latin typeface="Simplon BP Regular"/>
+                <a:cs typeface="Simplon BP Regular"/>
+              </a:defRPr>
+            </a:lvl1pPr>
+            <a:lvl2pPr>
+              <a:defRPr>
+                <a:solidFill>
+                  <a:schemeClr val="dk1"/>
+                </a:solidFill>
+              </a:defRPr>
+            </a:lvl2pPr>
+            <a:lvl3pPr>
+              <a:defRPr>
+                <a:solidFill>
+                  <a:schemeClr val="dk1"/>
+                </a:solidFill>
+              </a:defRPr>
+            </a:lvl3pPr>
+            <a:lvl4pPr>
+              <a:defRPr>
+                <a:solidFill>
+                  <a:schemeClr val="dk1"/>
+                </a:solidFill>
+              </a:defRPr>
+            </a:lvl4pPr>
+            <a:lvl5pPr>
+              <a:defRPr>
+                <a:solidFill>
+                  <a:schemeClr val="dk1"/>
+                </a:solidFill>
+              </a:defRPr>
+            </a:lvl5pPr>
+            <a:lvl6pPr>
+              <a:defRPr>
+                <a:solidFill>
+                  <a:schemeClr val="dk1"/>
+                </a:solidFill>
+              </a:defRPr>
+            </a:lvl6pPr>
+            <a:lvl7pPr>
+              <a:defRPr>
+                <a:solidFill>
+                  <a:schemeClr val="dk1"/>
+                </a:solidFill>
+              </a:defRPr>
+            </a:lvl7pPr>
+            <a:lvl8pPr>
+              <a:defRPr>
+                <a:solidFill>
+                  <a:schemeClr val="dk1"/>
+                </a:solidFill>
+              </a:defRPr>
+            </a:lvl8pPr>
+            <a:lvl9pPr>
+              <a:defRPr>
+                <a:solidFill>
+                  <a:schemeClr val="dk1"/>
+                </a:solidFill>
+              </a:defRPr>
+            </a:lvl9pPr>
+          </a:lstStyle>
+          <a:p>
+            <a:pPr defTabSz="672130"/>
+            <a:r>
+              <a:rPr lang="pt-BR" sz="1176" b="0" dirty="0">
+                <a:solidFill>
+                  <a:prstClr val="black"/>
+                </a:solidFill>
+                <a:latin typeface="Exo 2 Medium" panose="00000600000000000000" pitchFamily="50" charset="0"/>
+              </a:rPr>
+              <a:t>Front</a:t>
+            </a:r>
+          </a:p>
+        </p:txBody>
+      </p:sp>
+      <p:sp>
+        <p:nvSpPr>
+          <p:cNvPr id="88" name="Oval 134"/>
+          <p:cNvSpPr>
+            <a:spLocks noChangeAspect="1"/>
+          </p:cNvSpPr>
+          <p:nvPr/>
+        </p:nvSpPr>
+        <p:spPr>
+          <a:xfrm>
+            <a:off x="8443555" y="297930"/>
+            <a:ext cx="211404" cy="211689"/>
+          </a:xfrm>
+          <a:prstGeom prst="ellipse">
+            <a:avLst/>
+          </a:prstGeom>
+          <a:solidFill>
+            <a:srgbClr val="1BCF13"/>
+          </a:solidFill>
+          <a:ln w="12700">
+            <a:solidFill>
+              <a:schemeClr val="accent3"/>
+            </a:solidFill>
+          </a:ln>
+        </p:spPr>
+        <p:style>
+          <a:lnRef idx="2">
+            <a:schemeClr val="accent1">
+              <a:shade val="50000"/>
+            </a:schemeClr>
+          </a:lnRef>
+          <a:fillRef idx="1">
+            <a:schemeClr val="accent1"/>
+          </a:fillRef>
+          <a:effectRef idx="0">
+            <a:schemeClr val="accent1"/>
+          </a:effectRef>
+          <a:fontRef idx="minor">
+            <a:schemeClr val="lt1"/>
+          </a:fontRef>
+        </p:style>
+        <p:txBody>
+          <a:bodyPr wrap="none" lIns="52922" tIns="52922" rIns="52922" rtlCol="0" anchor="ctr"/>
+          <a:lstStyle/>
+          <a:p>
+            <a:pPr algn="ctr" defTabSz="672130"/>
+            <a:endParaRPr lang="en-US" sz="1176" dirty="0">
+              <a:solidFill>
+                <a:prstClr val="black"/>
+              </a:solidFill>
+              <a:latin typeface="Exo 2 Medium" panose="00000600000000000000" pitchFamily="50" charset="0"/>
+              <a:cs typeface="Simplon BP Regular"/>
+            </a:endParaRPr>
+          </a:p>
+        </p:txBody>
+      </p:sp>
+      <p:sp>
+        <p:nvSpPr>
+          <p:cNvPr id="86" name="TextBox 138"/>
+          <p:cNvSpPr txBox="1"/>
+          <p:nvPr/>
+        </p:nvSpPr>
+        <p:spPr>
+          <a:xfrm>
+            <a:off x="8126053" y="576471"/>
+            <a:ext cx="899678" cy="179824"/>
+          </a:xfrm>
+          <a:prstGeom prst="rect">
+            <a:avLst/>
+          </a:prstGeom>
+          <a:noFill/>
+          <a:ln w="12700">
+            <a:noFill/>
+          </a:ln>
+        </p:spPr>
+        <p:style>
+          <a:lnRef idx="2">
+            <a:schemeClr val="accent4"/>
+          </a:lnRef>
+          <a:fillRef idx="1">
+            <a:schemeClr val="lt1"/>
+          </a:fillRef>
+          <a:effectRef idx="0">
+            <a:schemeClr val="accent4"/>
+          </a:effectRef>
+          <a:fontRef idx="minor">
+            <a:schemeClr val="dk1"/>
+          </a:fontRef>
+        </p:style>
+        <p:txBody>
+          <a:bodyPr wrap="none" lIns="52922" tIns="52922" rIns="52922" bIns="0" rtlCol="0" anchor="b"/>
+          <a:lstStyle>
+            <a:defPPr>
+              <a:defRPr lang="en-US"/>
+            </a:defPPr>
+            <a:lvl1pPr algn="ctr">
+              <a:defRPr sz="1000" b="1">
+                <a:latin typeface="Simplon BP Regular"/>
+                <a:cs typeface="Simplon BP Regular"/>
+              </a:defRPr>
+            </a:lvl1pPr>
+            <a:lvl2pPr>
+              <a:defRPr>
+                <a:solidFill>
+                  <a:schemeClr val="dk1"/>
+                </a:solidFill>
+              </a:defRPr>
+            </a:lvl2pPr>
+            <a:lvl3pPr>
+              <a:defRPr>
+                <a:solidFill>
+                  <a:schemeClr val="dk1"/>
+                </a:solidFill>
+              </a:defRPr>
+            </a:lvl3pPr>
+            <a:lvl4pPr>
+              <a:defRPr>
+                <a:solidFill>
+                  <a:schemeClr val="dk1"/>
+                </a:solidFill>
+              </a:defRPr>
+            </a:lvl4pPr>
+            <a:lvl5pPr>
+              <a:defRPr>
+                <a:solidFill>
+                  <a:schemeClr val="dk1"/>
+                </a:solidFill>
+              </a:defRPr>
+            </a:lvl5pPr>
+            <a:lvl6pPr>
+              <a:defRPr>
+                <a:solidFill>
+                  <a:schemeClr val="dk1"/>
+                </a:solidFill>
+              </a:defRPr>
+            </a:lvl6pPr>
+            <a:lvl7pPr>
+              <a:defRPr>
+                <a:solidFill>
+                  <a:schemeClr val="dk1"/>
+                </a:solidFill>
+              </a:defRPr>
+            </a:lvl7pPr>
+            <a:lvl8pPr>
+              <a:defRPr>
+                <a:solidFill>
+                  <a:schemeClr val="dk1"/>
+                </a:solidFill>
+              </a:defRPr>
+            </a:lvl8pPr>
+            <a:lvl9pPr>
+              <a:defRPr>
+                <a:solidFill>
+                  <a:schemeClr val="dk1"/>
+                </a:solidFill>
+              </a:defRPr>
+            </a:lvl9pPr>
+          </a:lstStyle>
+          <a:p>
+            <a:pPr defTabSz="672130"/>
+            <a:r>
+              <a:rPr lang="en-US" sz="1176" b="0" dirty="0">
+                <a:solidFill>
+                  <a:prstClr val="black"/>
+                </a:solidFill>
+                <a:latin typeface="Exo 2 Medium" panose="00000600000000000000" pitchFamily="50" charset="0"/>
+              </a:rPr>
+              <a:t>Equipe</a:t>
+            </a:r>
+          </a:p>
+        </p:txBody>
+      </p:sp>
+      <p:sp>
+        <p:nvSpPr>
+          <p:cNvPr id="64" name="Retângulo 63"/>
+          <p:cNvSpPr/>
+          <p:nvPr/>
+        </p:nvSpPr>
+        <p:spPr>
+          <a:xfrm>
+            <a:off x="512766" y="868345"/>
+            <a:ext cx="6186608" cy="238150"/>
+          </a:xfrm>
+          <a:prstGeom prst="rect">
+            <a:avLst/>
+          </a:prstGeom>
+          <a:solidFill>
+            <a:schemeClr val="bg1">
+              <a:lumMod val="85000"/>
+            </a:schemeClr>
+          </a:solidFill>
+        </p:spPr>
+        <p:txBody>
+          <a:bodyPr vert="horz" lIns="134422" tIns="67211" rIns="134422" bIns="67211" rtlCol="0" anchor="ctr"/>
+          <a:lstStyle/>
+          <a:p>
+            <a:pPr defTabSz="672130"/>
+            <a:r>
+              <a:rPr lang="en-US" sz="1544" dirty="0">
+                <a:latin typeface="Exo 2 Medium" panose="00000600000000000000" pitchFamily="50" charset="0"/>
+                <a:ea typeface="Simplon Oi Headline" charset="0"/>
+                <a:cs typeface="Simplon Oi Headline" charset="0"/>
+              </a:rPr>
+              <a:t>Progressos c/ responsáveis </a:t>
+            </a:r>
+          </a:p>
+        </p:txBody>
+      </p:sp>
+      <p:sp>
+        <p:nvSpPr>
+          <p:cNvPr id="65" name="Retângulo 64"/>
+          <p:cNvSpPr/>
+          <p:nvPr/>
+        </p:nvSpPr>
+        <p:spPr>
+          <a:xfrm>
+            <a:off x="6814576" y="868344"/>
+            <a:ext cx="6244932" cy="250902"/>
+          </a:xfrm>
+          <a:prstGeom prst="rect">
+            <a:avLst/>
+          </a:prstGeom>
+          <a:solidFill>
+            <a:schemeClr val="bg1">
+              <a:lumMod val="85000"/>
+            </a:schemeClr>
+          </a:solidFill>
+        </p:spPr>
+        <p:txBody>
+          <a:bodyPr vert="horz" lIns="134422" tIns="67211" rIns="134422" bIns="67211" rtlCol="0" anchor="ctr"/>
+          <a:lstStyle/>
+          <a:p>
+            <a:pPr defTabSz="672130"/>
+            <a:r>
+              <a:rPr lang="pt-BR" sz="1544" dirty="0">
+                <a:latin typeface="Exo 2 Medium" panose="00000600000000000000" pitchFamily="50" charset="0"/>
+                <a:ea typeface="Simplon Oi Headline" charset="0"/>
+                <a:cs typeface="Simplon Oi Headline" charset="0"/>
+              </a:rPr>
+              <a:t>Pontos atenção/ Principais Riscos</a:t>
+            </a:r>
+          </a:p>
+        </p:txBody>
+      </p:sp>
+      <p:sp>
+        <p:nvSpPr>
+          <p:cNvPr id="66" name="Retângulo 65"/>
+          <p:cNvSpPr/>
+          <p:nvPr/>
+        </p:nvSpPr>
+        <p:spPr>
+          <a:xfrm>
+            <a:off x="528898" y="3479441"/>
+            <a:ext cx="12551972" cy="238150"/>
+          </a:xfrm>
+          <a:prstGeom prst="rect">
+            <a:avLst/>
+          </a:prstGeom>
+          <a:solidFill>
+            <a:schemeClr val="bg1">
+              <a:lumMod val="85000"/>
+            </a:schemeClr>
+          </a:solidFill>
+        </p:spPr>
+        <p:txBody>
+          <a:bodyPr vert="horz" lIns="134422" tIns="67211" rIns="134422" bIns="67211" rtlCol="0" anchor="ctr"/>
+          <a:lstStyle/>
+          <a:p>
+            <a:pPr defTabSz="672130"/>
+            <a:r>
+              <a:rPr lang="pt-BR" sz="1544" dirty="0">
+                <a:latin typeface="Exo 2 Medium" panose="00000600000000000000" pitchFamily="50" charset="0"/>
+                <a:ea typeface="Simplon Oi Headline" charset="0"/>
+                <a:cs typeface="Simplon Oi Headline" charset="0"/>
+              </a:rPr>
+              <a:t>Próximos Passos c/ responsáveis </a:t>
+            </a:r>
+          </a:p>
+        </p:txBody>
+      </p:sp>
+      <p:sp>
+        <p:nvSpPr>
+          <p:cNvPr id="63" name="Rectangle 37"/>
+          <p:cNvSpPr/>
+          <p:nvPr/>
+        </p:nvSpPr>
+        <p:spPr>
+          <a:xfrm>
+            <a:off x="496765" y="1106495"/>
+            <a:ext cx="6207777" cy="2235805"/>
+          </a:xfrm>
+          <a:prstGeom prst="rect">
+            <a:avLst/>
+          </a:prstGeom>
+          <a:noFill/>
+          <a:ln w="12700">
+            <a:solidFill>
+              <a:schemeClr val="bg1">
+                <a:lumMod val="50000"/>
+              </a:schemeClr>
+            </a:solidFill>
+          </a:ln>
+        </p:spPr>
+        <p:style>
+          <a:lnRef idx="2">
+            <a:schemeClr val="accent4"/>
+          </a:lnRef>
+          <a:fillRef idx="1">
+            <a:schemeClr val="lt1"/>
+          </a:fillRef>
+          <a:effectRef idx="0">
+            <a:schemeClr val="accent4"/>
+          </a:effectRef>
+          <a:fontRef idx="minor">
+            <a:schemeClr val="dk1"/>
+          </a:fontRef>
+        </p:style>
+        <p:txBody>
+          <a:bodyPr tIns="105844" rtlCol="0" anchor="t"/>
+          <a:lstStyle/>
+          <a:p>
+            <a:pPr marL="252049" indent="-252049" fontAlgn="base">
+              <a:spcBef>
+                <a:spcPct val="0"/>
+              </a:spcBef>
+              <a:buFont typeface="Wingdings" panose="05000000000000000000" pitchFamily="2" charset="2"/>
+              <a:buChar char="ü"/>
+              <a:defRPr/>
+            </a:pPr>
+            <a:r>
+              <a:rPr lang="pt-BR" sz="1323" dirty="0">
+                <a:solidFill>
+                  <a:schemeClr val="tx1"/>
+                </a:solidFill>
+                <a:latin typeface="Exo 2 Medium" panose="00000600000000000000" pitchFamily="50" charset="0"/>
+                <a:cs typeface="Simplon BP Regular"/>
+              </a:rPr>
+              <a:t>Implementar Conexão do Back-end com Banco de Dados na Azure </a:t>
+            </a:r>
+            <a:r>
+              <a:rPr lang="pt-BR" sz="1323" b="1" dirty="0">
+                <a:solidFill>
+                  <a:schemeClr val="tx1"/>
+                </a:solidFill>
+                <a:latin typeface="Exo 2 Medium" panose="00000600000000000000" pitchFamily="50" charset="0"/>
+                <a:cs typeface="Simplon BP Regular"/>
+              </a:rPr>
+              <a:t>#Vinicius</a:t>
+            </a:r>
+          </a:p>
+          <a:p>
+            <a:pPr marL="252049" indent="-252049" fontAlgn="base">
+              <a:spcBef>
+                <a:spcPct val="0"/>
+              </a:spcBef>
+              <a:buFont typeface="Wingdings" panose="05000000000000000000" pitchFamily="2" charset="2"/>
+              <a:buChar char="ü"/>
+              <a:defRPr/>
+            </a:pPr>
+            <a:r>
+              <a:rPr lang="pt-BR" sz="1323" dirty="0">
+                <a:solidFill>
+                  <a:schemeClr val="tx1"/>
+                </a:solidFill>
+                <a:latin typeface="Exo 2 Medium" panose="00000600000000000000" pitchFamily="50" charset="0"/>
+                <a:cs typeface="Simplon BP Regular"/>
+              </a:rPr>
+              <a:t>Desenvolver as rotas de navegação do Institucional com Login e Cadastro </a:t>
+            </a:r>
+            <a:r>
+              <a:rPr lang="pt-BR" sz="1323" b="1" dirty="0">
+                <a:solidFill>
+                  <a:schemeClr val="tx1"/>
+                </a:solidFill>
+                <a:latin typeface="Exo 2 Medium" panose="00000600000000000000" pitchFamily="50" charset="0"/>
+                <a:cs typeface="Simplon BP Regular"/>
+              </a:rPr>
+              <a:t>#Vinicius</a:t>
+            </a:r>
+          </a:p>
+          <a:p>
+            <a:pPr marL="252049" indent="-252049" fontAlgn="base">
+              <a:spcBef>
+                <a:spcPct val="0"/>
+              </a:spcBef>
+              <a:buFont typeface="Wingdings" panose="05000000000000000000" pitchFamily="2" charset="2"/>
+              <a:buChar char="ü"/>
+              <a:defRPr/>
+            </a:pPr>
+            <a:r>
+              <a:rPr lang="pt-BR" sz="1323" dirty="0">
+                <a:solidFill>
+                  <a:schemeClr val="tx1"/>
+                </a:solidFill>
+                <a:latin typeface="Exo 2 Medium" panose="00000600000000000000" pitchFamily="50" charset="0"/>
+                <a:cs typeface="Simplon BP Regular"/>
+              </a:rPr>
+              <a:t>Componentizar o Institucional </a:t>
+            </a:r>
+            <a:r>
+              <a:rPr lang="pt-BR" sz="1323" b="1" dirty="0">
+                <a:solidFill>
+                  <a:schemeClr val="tx1"/>
+                </a:solidFill>
+                <a:latin typeface="Exo 2 Medium" panose="00000600000000000000" pitchFamily="50" charset="0"/>
+                <a:cs typeface="Simplon BP Regular"/>
+              </a:rPr>
+              <a:t>#Wesley</a:t>
+            </a:r>
+          </a:p>
+          <a:p>
+            <a:pPr marL="252049" indent="-252049" fontAlgn="base">
+              <a:spcBef>
+                <a:spcPct val="0"/>
+              </a:spcBef>
+              <a:buFont typeface="Wingdings" panose="05000000000000000000" pitchFamily="2" charset="2"/>
+              <a:buChar char="ü"/>
+              <a:defRPr/>
+            </a:pPr>
+            <a:r>
+              <a:rPr lang="pt-BR" sz="1323" dirty="0">
+                <a:solidFill>
+                  <a:schemeClr val="tx1"/>
+                </a:solidFill>
+                <a:latin typeface="Exo 2 Medium" panose="00000600000000000000" pitchFamily="50" charset="0"/>
+                <a:cs typeface="Simplon BP Regular"/>
+              </a:rPr>
+              <a:t>Refatorar o Institucional </a:t>
+            </a:r>
+            <a:r>
+              <a:rPr lang="pt-BR" sz="1323" b="1" dirty="0">
+                <a:solidFill>
+                  <a:schemeClr val="tx1"/>
+                </a:solidFill>
+                <a:latin typeface="Exo 2 Medium" panose="00000600000000000000" pitchFamily="50" charset="0"/>
+                <a:cs typeface="Simplon BP Regular"/>
+              </a:rPr>
+              <a:t>#Equipe</a:t>
+            </a:r>
+          </a:p>
+          <a:p>
+            <a:pPr marL="252049" indent="-252049" fontAlgn="base">
+              <a:spcBef>
+                <a:spcPct val="0"/>
+              </a:spcBef>
+              <a:buFont typeface="Wingdings" panose="05000000000000000000" pitchFamily="2" charset="2"/>
+              <a:buChar char="ü"/>
+              <a:defRPr/>
+            </a:pPr>
+            <a:r>
+              <a:rPr lang="pt-BR" sz="1323" dirty="0">
+                <a:solidFill>
+                  <a:schemeClr val="tx1"/>
+                </a:solidFill>
+                <a:latin typeface="Exo 2 Medium" panose="00000600000000000000" pitchFamily="50" charset="0"/>
+                <a:cs typeface="Simplon BP Regular"/>
+              </a:rPr>
+              <a:t>Finalizar as Prototipações das Telas Finais </a:t>
+            </a:r>
+            <a:r>
+              <a:rPr lang="pt-BR" sz="1323" b="1" dirty="0">
+                <a:solidFill>
+                  <a:schemeClr val="tx1"/>
+                </a:solidFill>
+                <a:latin typeface="Exo 2 Medium" panose="00000600000000000000" pitchFamily="50" charset="0"/>
+                <a:cs typeface="Simplon BP Regular"/>
+              </a:rPr>
+              <a:t>#Ferraz e Vinicius</a:t>
+            </a:r>
+          </a:p>
+          <a:p>
+            <a:pPr marL="252049" indent="-252049" fontAlgn="base">
+              <a:spcBef>
+                <a:spcPct val="0"/>
+              </a:spcBef>
+              <a:buFont typeface="Wingdings" panose="05000000000000000000" pitchFamily="2" charset="2"/>
+              <a:buChar char="ü"/>
+              <a:defRPr/>
+            </a:pPr>
+            <a:r>
+              <a:rPr lang="pt-BR" sz="1323" dirty="0">
+                <a:solidFill>
+                  <a:schemeClr val="tx1"/>
+                </a:solidFill>
+                <a:latin typeface="Exo 2 Medium" panose="00000600000000000000" pitchFamily="50" charset="0"/>
+                <a:cs typeface="Simplon BP Regular"/>
+              </a:rPr>
+              <a:t>Desenvolver o Menu Lateral da Aplicação de Agendamentos </a:t>
+            </a:r>
+            <a:r>
+              <a:rPr lang="pt-BR" sz="1323" b="1" dirty="0">
+                <a:solidFill>
+                  <a:schemeClr val="tx1"/>
+                </a:solidFill>
+                <a:latin typeface="Exo 2 Medium" panose="00000600000000000000" pitchFamily="50" charset="0"/>
+                <a:cs typeface="Simplon BP Regular"/>
+              </a:rPr>
+              <a:t>#Ferraz e Vinicius</a:t>
+            </a:r>
+          </a:p>
+          <a:p>
+            <a:pPr marL="252049" indent="-252049" fontAlgn="base">
+              <a:spcBef>
+                <a:spcPct val="0"/>
+              </a:spcBef>
+              <a:buFont typeface="Wingdings" panose="05000000000000000000" pitchFamily="2" charset="2"/>
+              <a:buChar char="ü"/>
+              <a:defRPr/>
+            </a:pPr>
+            <a:r>
+              <a:rPr lang="pt-BR" sz="1323" dirty="0">
+                <a:solidFill>
+                  <a:schemeClr val="tx1"/>
+                </a:solidFill>
+                <a:latin typeface="Exo 2 Medium" panose="00000600000000000000" pitchFamily="50" charset="0"/>
+                <a:cs typeface="Simplon BP Regular"/>
+              </a:rPr>
+              <a:t>Inicio ao desenvolvimento da Tela Inicial de Agendamentos </a:t>
+            </a:r>
+            <a:r>
+              <a:rPr lang="pt-BR" sz="1323" b="1" dirty="0">
+                <a:solidFill>
+                  <a:schemeClr val="tx1"/>
+                </a:solidFill>
+                <a:latin typeface="Exo 2 Medium" panose="00000600000000000000" pitchFamily="50" charset="0"/>
+                <a:cs typeface="Simplon BP Regular"/>
+              </a:rPr>
+              <a:t>#Vinicius</a:t>
+            </a:r>
+          </a:p>
+          <a:p>
+            <a:pPr marL="252049" indent="-252049" fontAlgn="base">
+              <a:spcBef>
+                <a:spcPct val="0"/>
+              </a:spcBef>
+              <a:buFont typeface="Wingdings" panose="05000000000000000000" pitchFamily="2" charset="2"/>
+              <a:buChar char="ü"/>
+              <a:defRPr/>
+            </a:pPr>
+            <a:r>
+              <a:rPr lang="pt-BR" sz="1323" dirty="0">
+                <a:solidFill>
+                  <a:schemeClr val="tx1"/>
+                </a:solidFill>
+                <a:latin typeface="Exo 2 Medium" panose="00000600000000000000" pitchFamily="50" charset="0"/>
+                <a:cs typeface="Simplon BP Regular"/>
+              </a:rPr>
+              <a:t>Elaborar o Documento de Layout de Importação e Exportação de Arquivo </a:t>
+            </a:r>
+            <a:r>
+              <a:rPr lang="pt-BR" sz="1323" b="1" dirty="0">
+                <a:solidFill>
+                  <a:schemeClr val="tx1"/>
+                </a:solidFill>
+                <a:latin typeface="Exo 2 Medium" panose="00000600000000000000" pitchFamily="50" charset="0"/>
+                <a:cs typeface="Simplon BP Regular"/>
+              </a:rPr>
+              <a:t>#Pedro</a:t>
+            </a:r>
+          </a:p>
+        </p:txBody>
+      </p:sp>
+      <p:sp>
+        <p:nvSpPr>
+          <p:cNvPr id="2" name="Rectangle 43">
+            <a:extLst>
+              <a:ext uri="{FF2B5EF4-FFF2-40B4-BE49-F238E27FC236}">
+                <a16:creationId xmlns:a16="http://schemas.microsoft.com/office/drawing/2014/main" id="{B15BA19F-C787-4E6A-ADAB-C0DFF09C66A8}"/>
+              </a:ext>
+            </a:extLst>
+          </p:cNvPr>
+          <p:cNvSpPr>
+            <a:spLocks/>
+          </p:cNvSpPr>
+          <p:nvPr/>
+        </p:nvSpPr>
+        <p:spPr>
+          <a:xfrm>
+            <a:off x="493440" y="3717591"/>
+            <a:ext cx="12587430" cy="3634138"/>
+          </a:xfrm>
+          <a:prstGeom prst="rect">
+            <a:avLst/>
+          </a:prstGeom>
+          <a:noFill/>
+          <a:ln w="12700">
+            <a:solidFill>
+              <a:schemeClr val="bg1">
+                <a:lumMod val="50000"/>
+              </a:schemeClr>
+            </a:solidFill>
+          </a:ln>
+        </p:spPr>
+        <p:style>
+          <a:lnRef idx="2">
+            <a:schemeClr val="accent4"/>
+          </a:lnRef>
+          <a:fillRef idx="1">
+            <a:schemeClr val="lt1"/>
+          </a:fillRef>
+          <a:effectRef idx="0">
+            <a:schemeClr val="accent4"/>
+          </a:effectRef>
+          <a:fontRef idx="minor">
+            <a:schemeClr val="dk1"/>
+          </a:fontRef>
+        </p:style>
+        <p:txBody>
+          <a:bodyPr wrap="square" tIns="105844" numCol="3" rtlCol="0" anchor="t"/>
+          <a:lstStyle/>
+          <a:p>
+            <a:pPr marL="0" lvl="1" defTabSz="672130"/>
+            <a:r>
+              <a:rPr lang="pt-BR" sz="1323" b="1" dirty="0">
+                <a:solidFill>
+                  <a:schemeClr val="tx1"/>
+                </a:solidFill>
+                <a:latin typeface="Exo 2 Medium" panose="00000600000000000000" pitchFamily="50" charset="0"/>
+                <a:cs typeface="Simplon BP Regular"/>
+              </a:rPr>
+              <a:t>Frente Plataforma</a:t>
+            </a:r>
+          </a:p>
+          <a:p>
+            <a:pPr marL="285750" lvl="1" indent="-285750" defTabSz="672130">
+              <a:buFont typeface="Wingdings" panose="05000000000000000000" pitchFamily="2" charset="2"/>
+              <a:buChar char="§"/>
+            </a:pPr>
+            <a:r>
+              <a:rPr lang="pt-BR" sz="1323" dirty="0">
+                <a:solidFill>
+                  <a:schemeClr val="tx1"/>
+                </a:solidFill>
+                <a:latin typeface="Exo 2 Medium" panose="00000600000000000000" pitchFamily="50" charset="0"/>
+                <a:cs typeface="Simplon BP Regular"/>
+              </a:rPr>
+              <a:t>Hospedar nossa Aplicação em provisionamento na</a:t>
+            </a:r>
+            <a:br>
+              <a:rPr lang="pt-BR" sz="1323" dirty="0">
+                <a:solidFill>
+                  <a:schemeClr val="tx1"/>
+                </a:solidFill>
+                <a:latin typeface="Exo 2 Medium" panose="00000600000000000000" pitchFamily="50" charset="0"/>
+                <a:cs typeface="Simplon BP Regular"/>
+              </a:rPr>
+            </a:br>
+            <a:r>
+              <a:rPr lang="pt-BR" sz="1323" dirty="0">
+                <a:solidFill>
+                  <a:schemeClr val="tx1"/>
+                </a:solidFill>
+                <a:latin typeface="Exo 2 Medium" panose="00000600000000000000" pitchFamily="50" charset="0"/>
+                <a:cs typeface="Simplon BP Regular"/>
+              </a:rPr>
+              <a:t>Azure </a:t>
+            </a:r>
+            <a:r>
+              <a:rPr lang="pt-BR" sz="1323" b="1" dirty="0">
+                <a:solidFill>
+                  <a:schemeClr val="tx1"/>
+                </a:solidFill>
+                <a:latin typeface="Exo 2 Medium" panose="00000600000000000000" pitchFamily="50" charset="0"/>
+                <a:cs typeface="Simplon BP Regular"/>
+              </a:rPr>
+              <a:t>#Wesley</a:t>
+            </a:r>
+          </a:p>
+          <a:p>
+            <a:pPr marL="0" lvl="1" defTabSz="672130"/>
+            <a:endParaRPr lang="pt-BR" sz="1323" b="1" dirty="0">
+              <a:solidFill>
+                <a:schemeClr val="tx1"/>
+              </a:solidFill>
+              <a:latin typeface="Exo 2 Medium" panose="00000600000000000000" pitchFamily="50" charset="0"/>
+              <a:cs typeface="Simplon BP Regular"/>
+            </a:endParaRPr>
+          </a:p>
+          <a:p>
+            <a:pPr marL="0" lvl="1" defTabSz="672130"/>
+            <a:r>
+              <a:rPr lang="pt-BR" sz="1323" b="1" dirty="0">
+                <a:solidFill>
+                  <a:schemeClr val="tx1"/>
+                </a:solidFill>
+                <a:latin typeface="Exo 2 Medium" panose="00000600000000000000" pitchFamily="50" charset="0"/>
+                <a:cs typeface="Simplon BP Regular"/>
+              </a:rPr>
+              <a:t>Frente Back-End</a:t>
+            </a:r>
+          </a:p>
+          <a:p>
+            <a:pPr marL="0" lvl="1" indent="-252049">
+              <a:buFont typeface="Wingdings" panose="05000000000000000000" pitchFamily="2" charset="2"/>
+              <a:buChar char="§"/>
+            </a:pPr>
+            <a:r>
+              <a:rPr lang="pt-BR" sz="1323" dirty="0">
+                <a:solidFill>
+                  <a:schemeClr val="tx1"/>
+                </a:solidFill>
+                <a:latin typeface="Exo 2 Medium" panose="00000600000000000000" pitchFamily="50" charset="0"/>
+                <a:cs typeface="Simplon BP Regular"/>
+              </a:rPr>
+              <a:t>Integrar lógica de Login e Cadastro do Front-end com nosso Back-end </a:t>
+            </a:r>
+            <a:r>
+              <a:rPr lang="pt-BR" sz="1323" b="1" dirty="0">
+                <a:solidFill>
+                  <a:schemeClr val="tx1"/>
+                </a:solidFill>
+                <a:latin typeface="Exo 2 Medium" panose="00000600000000000000" pitchFamily="50" charset="0"/>
+                <a:cs typeface="Simplon BP Regular"/>
+              </a:rPr>
+              <a:t>#Equipe</a:t>
+            </a:r>
+          </a:p>
+          <a:p>
+            <a:pPr marL="0" lvl="1" indent="-252049">
+              <a:buFont typeface="Wingdings" panose="05000000000000000000" pitchFamily="2" charset="2"/>
+              <a:buChar char="§"/>
+            </a:pPr>
+            <a:r>
+              <a:rPr lang="pt-BR" sz="1323" dirty="0">
+                <a:solidFill>
+                  <a:schemeClr val="tx1"/>
+                </a:solidFill>
+                <a:latin typeface="Exo 2 Medium" panose="00000600000000000000" pitchFamily="50" charset="0"/>
+                <a:cs typeface="Simplon BP Regular"/>
+              </a:rPr>
+              <a:t>Implementar o uso de Pilhas e Filas na Aplicação</a:t>
+            </a:r>
+            <a:r>
+              <a:rPr lang="pt-BR" sz="1323" b="1" dirty="0">
+                <a:solidFill>
+                  <a:schemeClr val="tx1"/>
+                </a:solidFill>
+                <a:latin typeface="Exo 2 Medium" panose="00000600000000000000" pitchFamily="50" charset="0"/>
+                <a:cs typeface="Simplon BP Regular"/>
+              </a:rPr>
+              <a:t> #Pedro</a:t>
+            </a:r>
+            <a:br>
+              <a:rPr lang="pt-BR" sz="1323" b="1" dirty="0">
+                <a:solidFill>
+                  <a:schemeClr val="tx1"/>
+                </a:solidFill>
+                <a:latin typeface="Exo 2 Medium" panose="00000600000000000000" pitchFamily="50" charset="0"/>
+                <a:cs typeface="Simplon BP Regular"/>
+              </a:rPr>
+            </a:br>
+            <a:endParaRPr lang="pt-BR" sz="1323" b="1" dirty="0">
+              <a:solidFill>
+                <a:schemeClr val="tx1"/>
+              </a:solidFill>
+              <a:latin typeface="Exo 2 Medium" panose="00000600000000000000" pitchFamily="50" charset="0"/>
+              <a:cs typeface="Simplon BP Regular"/>
+            </a:endParaRPr>
+          </a:p>
+          <a:p>
+            <a:pPr marL="0" lvl="1" defTabSz="672130"/>
+            <a:r>
+              <a:rPr lang="pt-BR" sz="1323" b="1" dirty="0">
+                <a:solidFill>
+                  <a:schemeClr val="tx1"/>
+                </a:solidFill>
+                <a:latin typeface="Exo 2 Medium" panose="00000600000000000000" pitchFamily="50" charset="0"/>
+                <a:cs typeface="Simplon BP Regular"/>
+              </a:rPr>
+              <a:t>Frente Front-End</a:t>
+            </a:r>
+          </a:p>
+          <a:p>
+            <a:pPr marL="285750" lvl="1" indent="-285750" defTabSz="672130">
+              <a:buFont typeface="Wingdings" panose="05000000000000000000" pitchFamily="2" charset="2"/>
+              <a:buChar char="§"/>
+            </a:pPr>
+            <a:r>
+              <a:rPr lang="pt-BR" sz="1323" dirty="0">
+                <a:solidFill>
+                  <a:schemeClr val="tx1"/>
+                </a:solidFill>
+                <a:latin typeface="Exo 2 Medium" panose="00000600000000000000" pitchFamily="50" charset="0"/>
+                <a:cs typeface="Simplon BP Regular"/>
+              </a:rPr>
+              <a:t>Desenvolver a Tela de Agendamentos na Aplicação </a:t>
+            </a:r>
+            <a:r>
+              <a:rPr lang="pt-BR" sz="1323" b="1" dirty="0">
+                <a:solidFill>
+                  <a:schemeClr val="tx1"/>
+                </a:solidFill>
+                <a:latin typeface="Exo 2 Medium" panose="00000600000000000000" pitchFamily="50" charset="0"/>
+                <a:cs typeface="Simplon BP Regular"/>
+              </a:rPr>
+              <a:t>#Ferraz e Vinicius</a:t>
+            </a:r>
+          </a:p>
+          <a:p>
+            <a:pPr marL="285750" lvl="1" indent="-285750" defTabSz="672130">
+              <a:buFont typeface="Wingdings" panose="05000000000000000000" pitchFamily="2" charset="2"/>
+              <a:buChar char="§"/>
+            </a:pPr>
+            <a:r>
+              <a:rPr lang="pt-BR" sz="1323" dirty="0">
+                <a:solidFill>
+                  <a:schemeClr val="tx1"/>
+                </a:solidFill>
+                <a:latin typeface="Exo 2 Medium" panose="00000600000000000000" pitchFamily="50" charset="0"/>
+                <a:cs typeface="Simplon BP Regular"/>
+              </a:rPr>
+              <a:t>Desenvolver a Tela de Cadastro de Centros Esportivos na Aplicação </a:t>
+            </a:r>
+            <a:r>
+              <a:rPr lang="pt-BR" sz="1323" b="1" dirty="0">
+                <a:solidFill>
+                  <a:schemeClr val="tx1"/>
+                </a:solidFill>
+                <a:latin typeface="Exo 2 Medium" panose="00000600000000000000" pitchFamily="50" charset="0"/>
+                <a:cs typeface="Simplon BP Regular"/>
+              </a:rPr>
+              <a:t>#Ferraz e Vinicius</a:t>
+            </a:r>
+          </a:p>
+          <a:p>
+            <a:pPr marL="285750" lvl="1" indent="-285750" defTabSz="672130">
+              <a:buFont typeface="Wingdings" panose="05000000000000000000" pitchFamily="2" charset="2"/>
+              <a:buChar char="§"/>
+            </a:pPr>
+            <a:r>
+              <a:rPr lang="pt-BR" sz="1323" dirty="0">
+                <a:solidFill>
+                  <a:schemeClr val="tx1"/>
+                </a:solidFill>
+                <a:latin typeface="Exo 2 Medium" panose="00000600000000000000" pitchFamily="50" charset="0"/>
+                <a:cs typeface="Simplon BP Regular"/>
+              </a:rPr>
+              <a:t>Desenvolver a Tela de Cadastro de Quadras na Aplicação </a:t>
+            </a:r>
+            <a:r>
+              <a:rPr lang="pt-BR" sz="1323" b="1" dirty="0">
+                <a:solidFill>
+                  <a:schemeClr val="tx1"/>
+                </a:solidFill>
+                <a:latin typeface="Exo 2 Medium" panose="00000600000000000000" pitchFamily="50" charset="0"/>
+                <a:cs typeface="Simplon BP Regular"/>
+              </a:rPr>
+              <a:t>#Ferras e Vinicius </a:t>
+            </a:r>
+            <a:br>
+              <a:rPr lang="pt-BR" sz="1200" b="1" dirty="0">
+                <a:solidFill>
+                  <a:schemeClr val="tx1"/>
+                </a:solidFill>
+                <a:latin typeface="Exo 2 Medium" panose="00000600000000000000" pitchFamily="50" charset="0"/>
+                <a:cs typeface="Simplon BP Regular"/>
+              </a:rPr>
+            </a:br>
+            <a:br>
+              <a:rPr lang="pt-BR" sz="1200" b="1" dirty="0">
+                <a:solidFill>
+                  <a:schemeClr val="tx1"/>
+                </a:solidFill>
+                <a:latin typeface="Exo 2 Medium" panose="00000600000000000000" pitchFamily="50" charset="0"/>
+                <a:cs typeface="Simplon BP Regular"/>
+              </a:rPr>
+            </a:br>
+            <a:endParaRPr lang="pt-BR" sz="1200" b="1" dirty="0">
+              <a:solidFill>
+                <a:schemeClr val="tx1"/>
+              </a:solidFill>
+              <a:latin typeface="Exo 2 Medium" panose="00000600000000000000" pitchFamily="50" charset="0"/>
+              <a:cs typeface="Simplon BP Regular"/>
+            </a:endParaRPr>
+          </a:p>
+          <a:p>
+            <a:pPr marL="0" lvl="1" defTabSz="672130"/>
+            <a:r>
+              <a:rPr lang="pt-BR" sz="1320" b="1" dirty="0">
+                <a:solidFill>
+                  <a:schemeClr val="tx1"/>
+                </a:solidFill>
+                <a:latin typeface="Exo 2 Medium" panose="00000600000000000000" pitchFamily="50" charset="0"/>
+                <a:cs typeface="Simplon BP Regular"/>
+              </a:rPr>
+              <a:t>Frente Negócios</a:t>
+            </a:r>
+          </a:p>
+          <a:p>
+            <a:pPr marL="285750" lvl="1" indent="-285750" defTabSz="672130">
+              <a:buFont typeface="Wingdings" panose="05000000000000000000" pitchFamily="2" charset="2"/>
+              <a:buChar char="§"/>
+            </a:pPr>
+            <a:r>
+              <a:rPr lang="pt-BR" sz="1320" dirty="0">
+                <a:solidFill>
+                  <a:schemeClr val="tx1"/>
+                </a:solidFill>
+                <a:latin typeface="Exo 2 Medium" panose="00000600000000000000" pitchFamily="50" charset="0"/>
+                <a:cs typeface="Simplon BP Regular"/>
+              </a:rPr>
+              <a:t>Construir a Planilha UAT da Aplicação </a:t>
+            </a:r>
+            <a:r>
+              <a:rPr lang="pt-BR" sz="1320" b="1" dirty="0">
+                <a:solidFill>
+                  <a:schemeClr val="tx1"/>
+                </a:solidFill>
+                <a:latin typeface="Exo 2 Medium" panose="00000600000000000000" pitchFamily="50" charset="0"/>
+                <a:cs typeface="Simplon BP Regular"/>
+              </a:rPr>
+              <a:t>#Equipe</a:t>
+            </a:r>
+          </a:p>
+          <a:p>
+            <a:pPr marL="285750" lvl="1" indent="-285750" defTabSz="672130">
+              <a:buFont typeface="Wingdings" panose="05000000000000000000" pitchFamily="2" charset="2"/>
+              <a:buChar char="§"/>
+            </a:pPr>
+            <a:r>
+              <a:rPr lang="pt-BR" sz="1320" dirty="0">
+                <a:solidFill>
+                  <a:schemeClr val="tx1"/>
+                </a:solidFill>
+                <a:latin typeface="Exo 2 Medium" panose="00000600000000000000" pitchFamily="50" charset="0"/>
+                <a:cs typeface="Simplon BP Regular"/>
+              </a:rPr>
+              <a:t>Elaborar o WhitePaper do Projeto </a:t>
+            </a:r>
+            <a:r>
+              <a:rPr lang="pt-BR" sz="1320" b="1" dirty="0">
+                <a:solidFill>
+                  <a:schemeClr val="tx1"/>
+                </a:solidFill>
+                <a:latin typeface="Exo 2 Medium" panose="00000600000000000000" pitchFamily="50" charset="0"/>
+                <a:cs typeface="Simplon BP Regular"/>
+              </a:rPr>
+              <a:t>#Wesley</a:t>
+            </a:r>
+            <a:endParaRPr lang="pt-BR" sz="1320" dirty="0">
+              <a:solidFill>
+                <a:schemeClr val="tx1"/>
+              </a:solidFill>
+              <a:latin typeface="Exo 2 Medium" panose="00000600000000000000" pitchFamily="50" charset="0"/>
+              <a:cs typeface="Simplon BP Regular"/>
+            </a:endParaRPr>
+          </a:p>
+          <a:p>
+            <a:pPr marL="0" lvl="1"/>
+            <a:r>
+              <a:rPr lang="pt-BR" sz="1300" dirty="0">
+                <a:solidFill>
+                  <a:schemeClr val="tx1"/>
+                </a:solidFill>
+                <a:latin typeface="Exo 2 Medium" panose="00000600000000000000" pitchFamily="50" charset="0"/>
+                <a:cs typeface="Simplon BP Regular"/>
+              </a:rPr>
+              <a:t>Conversar com professor sobre escopo de pagamentos</a:t>
+            </a:r>
+          </a:p>
+          <a:p>
+            <a:pPr marL="0" lvl="1"/>
+            <a:endParaRPr lang="pt-BR" sz="1320" b="1" dirty="0">
+              <a:solidFill>
+                <a:schemeClr val="tx1"/>
+              </a:solidFill>
+              <a:latin typeface="Exo 2 Medium" panose="00000600000000000000" pitchFamily="50" charset="0"/>
+              <a:cs typeface="Simplon BP Regular"/>
+            </a:endParaRPr>
+          </a:p>
+        </p:txBody>
+      </p:sp>
+      <p:sp>
+        <p:nvSpPr>
+          <p:cNvPr id="6" name="Oval 134">
+            <a:extLst>
+              <a:ext uri="{FF2B5EF4-FFF2-40B4-BE49-F238E27FC236}">
+                <a16:creationId xmlns:a16="http://schemas.microsoft.com/office/drawing/2014/main" id="{70825C6F-9257-4CF5-8C62-1CA1EB2F8815}"/>
+              </a:ext>
+            </a:extLst>
+          </p:cNvPr>
+          <p:cNvSpPr>
+            <a:spLocks noChangeAspect="1"/>
+          </p:cNvSpPr>
+          <p:nvPr/>
+        </p:nvSpPr>
+        <p:spPr>
+          <a:xfrm>
+            <a:off x="9323960" y="269355"/>
+            <a:ext cx="211404" cy="211689"/>
+          </a:xfrm>
+          <a:prstGeom prst="ellipse">
+            <a:avLst/>
+          </a:prstGeom>
+          <a:solidFill>
+            <a:srgbClr val="FFFF00"/>
+          </a:solidFill>
+          <a:ln w="12700">
+            <a:solidFill>
+              <a:schemeClr val="accent3"/>
+            </a:solidFill>
+          </a:ln>
+        </p:spPr>
+        <p:style>
+          <a:lnRef idx="2">
+            <a:schemeClr val="accent1">
+              <a:shade val="50000"/>
+            </a:schemeClr>
+          </a:lnRef>
+          <a:fillRef idx="1">
+            <a:schemeClr val="accent1"/>
+          </a:fillRef>
+          <a:effectRef idx="0">
+            <a:schemeClr val="accent1"/>
+          </a:effectRef>
+          <a:fontRef idx="minor">
+            <a:schemeClr val="lt1"/>
+          </a:fontRef>
+        </p:style>
+        <p:txBody>
+          <a:bodyPr wrap="none" lIns="52922" tIns="52922" rIns="52922" rtlCol="0" anchor="ctr"/>
+          <a:lstStyle/>
+          <a:p>
+            <a:pPr algn="ctr" defTabSz="672130"/>
+            <a:endParaRPr lang="en-US" sz="1176" dirty="0">
+              <a:ln>
+                <a:solidFill>
+                  <a:srgbClr val="00B050"/>
+                </a:solidFill>
+              </a:ln>
+              <a:solidFill>
+                <a:srgbClr val="1BCF13"/>
+              </a:solidFill>
+              <a:highlight>
+                <a:srgbClr val="FFFF00"/>
+              </a:highlight>
+              <a:latin typeface="Exo 2 Medium" panose="00000600000000000000" pitchFamily="50" charset="0"/>
+              <a:cs typeface="Simplon BP Regular"/>
+            </a:endParaRPr>
+          </a:p>
+        </p:txBody>
+      </p:sp>
+      <p:sp>
+        <p:nvSpPr>
+          <p:cNvPr id="9" name="Oval 134">
+            <a:extLst>
+              <a:ext uri="{FF2B5EF4-FFF2-40B4-BE49-F238E27FC236}">
+                <a16:creationId xmlns:a16="http://schemas.microsoft.com/office/drawing/2014/main" id="{B60B13C9-0C70-4C0F-82B2-D0CD4FDFC1F0}"/>
+              </a:ext>
+            </a:extLst>
+          </p:cNvPr>
+          <p:cNvSpPr>
+            <a:spLocks noChangeAspect="1"/>
+          </p:cNvSpPr>
+          <p:nvPr/>
+        </p:nvSpPr>
+        <p:spPr>
+          <a:xfrm>
+            <a:off x="12155999" y="297930"/>
+            <a:ext cx="211404" cy="211689"/>
+          </a:xfrm>
+          <a:prstGeom prst="ellipse">
+            <a:avLst/>
+          </a:prstGeom>
+          <a:solidFill>
+            <a:srgbClr val="1BCF13"/>
+          </a:solidFill>
+          <a:ln w="12700">
+            <a:solidFill>
+              <a:schemeClr val="accent3"/>
+            </a:solidFill>
+          </a:ln>
+        </p:spPr>
+        <p:style>
+          <a:lnRef idx="2">
+            <a:schemeClr val="accent1">
+              <a:shade val="50000"/>
+            </a:schemeClr>
+          </a:lnRef>
+          <a:fillRef idx="1">
+            <a:schemeClr val="accent1"/>
+          </a:fillRef>
+          <a:effectRef idx="0">
+            <a:schemeClr val="accent1"/>
+          </a:effectRef>
+          <a:fontRef idx="minor">
+            <a:schemeClr val="lt1"/>
+          </a:fontRef>
+        </p:style>
+        <p:txBody>
+          <a:bodyPr wrap="none" lIns="52922" tIns="52922" rIns="52922" rtlCol="0" anchor="ctr"/>
+          <a:lstStyle/>
+          <a:p>
+            <a:pPr algn="ctr" defTabSz="672130"/>
+            <a:endParaRPr lang="en-US" sz="1176" dirty="0">
+              <a:solidFill>
+                <a:prstClr val="black"/>
+              </a:solidFill>
+              <a:latin typeface="Exo 2 Medium" panose="00000600000000000000" pitchFamily="50" charset="0"/>
+              <a:cs typeface="Simplon BP Regular"/>
+            </a:endParaRPr>
+          </a:p>
+        </p:txBody>
+      </p:sp>
+      <p:sp>
+        <p:nvSpPr>
+          <p:cNvPr id="44" name="Oval 120">
+            <a:extLst>
+              <a:ext uri="{FF2B5EF4-FFF2-40B4-BE49-F238E27FC236}">
+                <a16:creationId xmlns:a16="http://schemas.microsoft.com/office/drawing/2014/main" id="{2688D066-DD5D-4246-B846-8AD1218C78EC}"/>
+              </a:ext>
+            </a:extLst>
+          </p:cNvPr>
+          <p:cNvSpPr>
+            <a:spLocks noChangeAspect="1"/>
+          </p:cNvSpPr>
+          <p:nvPr/>
+        </p:nvSpPr>
+        <p:spPr>
+          <a:xfrm>
+            <a:off x="10188056" y="297930"/>
+            <a:ext cx="211404" cy="211689"/>
+          </a:xfrm>
+          <a:prstGeom prst="ellipse">
+            <a:avLst/>
+          </a:prstGeom>
+          <a:solidFill>
+            <a:srgbClr val="FFFF00"/>
+          </a:solidFill>
+          <a:ln w="12700">
+            <a:solidFill>
+              <a:schemeClr val="accent3"/>
+            </a:solidFill>
+          </a:ln>
+        </p:spPr>
+        <p:style>
+          <a:lnRef idx="2">
+            <a:schemeClr val="accent1">
+              <a:shade val="50000"/>
+            </a:schemeClr>
+          </a:lnRef>
+          <a:fillRef idx="1">
+            <a:schemeClr val="accent1"/>
+          </a:fillRef>
+          <a:effectRef idx="0">
+            <a:schemeClr val="accent1"/>
+          </a:effectRef>
+          <a:fontRef idx="minor">
+            <a:schemeClr val="lt1"/>
+          </a:fontRef>
+        </p:style>
+        <p:txBody>
+          <a:bodyPr wrap="none" lIns="52922" tIns="52922" rIns="52922" rtlCol="0" anchor="ctr"/>
+          <a:lstStyle/>
+          <a:p>
+            <a:pPr algn="ctr" defTabSz="672130"/>
+            <a:endParaRPr lang="en-US" sz="1176" dirty="0">
+              <a:solidFill>
+                <a:prstClr val="black"/>
+              </a:solidFill>
+              <a:latin typeface="Exo 2 Medium" panose="00000600000000000000" pitchFamily="50" charset="0"/>
+              <a:cs typeface="Simplon BP Regular"/>
+            </a:endParaRPr>
+          </a:p>
+        </p:txBody>
+      </p:sp>
+      <p:sp>
+        <p:nvSpPr>
+          <p:cNvPr id="5" name="Retângulo 4">
+            <a:extLst>
+              <a:ext uri="{FF2B5EF4-FFF2-40B4-BE49-F238E27FC236}">
+                <a16:creationId xmlns:a16="http://schemas.microsoft.com/office/drawing/2014/main" id="{A1C14918-6027-46B3-96BF-C5F7FDEC3276}"/>
+              </a:ext>
+            </a:extLst>
+          </p:cNvPr>
+          <p:cNvSpPr/>
+          <p:nvPr/>
+        </p:nvSpPr>
+        <p:spPr>
+          <a:xfrm>
+            <a:off x="8017619" y="209534"/>
+            <a:ext cx="5041889" cy="618769"/>
+          </a:xfrm>
+          <a:prstGeom prst="rect">
+            <a:avLst/>
+          </a:prstGeom>
+          <a:noFill/>
+          <a:ln w="6350">
+            <a:solidFill>
+              <a:schemeClr val="bg1">
+                <a:lumMod val="75000"/>
+              </a:schemeClr>
+            </a:solidFill>
+          </a:ln>
+        </p:spPr>
+        <p:style>
+          <a:lnRef idx="2">
+            <a:schemeClr val="accent1">
+              <a:shade val="50000"/>
+            </a:schemeClr>
+          </a:lnRef>
+          <a:fillRef idx="1">
+            <a:schemeClr val="accent1"/>
+          </a:fillRef>
+          <a:effectRef idx="0">
+            <a:schemeClr val="accent1"/>
+          </a:effectRef>
+          <a:fontRef idx="minor">
+            <a:schemeClr val="lt1"/>
+          </a:fontRef>
+        </p:style>
+        <p:txBody>
+          <a:bodyPr rtlCol="0" anchor="ctr"/>
+          <a:lstStyle/>
+          <a:p>
+            <a:pPr algn="ctr"/>
+            <a:endParaRPr lang="pt-BR">
+              <a:latin typeface="Exo 2 Medium" panose="00000600000000000000" pitchFamily="50" charset="0"/>
+            </a:endParaRPr>
+          </a:p>
+        </p:txBody>
+      </p:sp>
+      <p:sp>
+        <p:nvSpPr>
+          <p:cNvPr id="8" name="TextBox 138">
+            <a:extLst>
+              <a:ext uri="{FF2B5EF4-FFF2-40B4-BE49-F238E27FC236}">
+                <a16:creationId xmlns:a16="http://schemas.microsoft.com/office/drawing/2014/main" id="{5CE7D08C-795B-4BF1-97F6-F9773F4E9F4C}"/>
+              </a:ext>
+            </a:extLst>
+          </p:cNvPr>
+          <p:cNvSpPr txBox="1"/>
+          <p:nvPr/>
+        </p:nvSpPr>
+        <p:spPr>
+          <a:xfrm>
+            <a:off x="9715810" y="51570"/>
+            <a:ext cx="1478088" cy="211688"/>
+          </a:xfrm>
+          <a:prstGeom prst="rect">
+            <a:avLst/>
+          </a:prstGeom>
+          <a:solidFill>
+            <a:schemeClr val="bg1"/>
+          </a:solidFill>
+          <a:ln w="12700">
+            <a:noFill/>
+          </a:ln>
+        </p:spPr>
+        <p:style>
+          <a:lnRef idx="2">
+            <a:schemeClr val="accent4"/>
+          </a:lnRef>
+          <a:fillRef idx="1">
+            <a:schemeClr val="lt1"/>
+          </a:fillRef>
+          <a:effectRef idx="0">
+            <a:schemeClr val="accent4"/>
+          </a:effectRef>
+          <a:fontRef idx="minor">
+            <a:schemeClr val="dk1"/>
+          </a:fontRef>
+        </p:style>
+        <p:txBody>
+          <a:bodyPr wrap="none" lIns="52922" tIns="52922" rIns="52922" bIns="0" rtlCol="0" anchor="b"/>
+          <a:lstStyle>
+            <a:defPPr>
+              <a:defRPr lang="en-US"/>
+            </a:defPPr>
+            <a:lvl1pPr algn="ctr">
+              <a:defRPr sz="1000" b="1">
+                <a:latin typeface="Simplon BP Regular"/>
+                <a:cs typeface="Simplon BP Regular"/>
+              </a:defRPr>
+            </a:lvl1pPr>
+            <a:lvl2pPr>
+              <a:defRPr>
+                <a:solidFill>
+                  <a:schemeClr val="dk1"/>
+                </a:solidFill>
+              </a:defRPr>
+            </a:lvl2pPr>
+            <a:lvl3pPr>
+              <a:defRPr>
+                <a:solidFill>
+                  <a:schemeClr val="dk1"/>
+                </a:solidFill>
+              </a:defRPr>
+            </a:lvl3pPr>
+            <a:lvl4pPr>
+              <a:defRPr>
+                <a:solidFill>
+                  <a:schemeClr val="dk1"/>
+                </a:solidFill>
+              </a:defRPr>
+            </a:lvl4pPr>
+            <a:lvl5pPr>
+              <a:defRPr>
+                <a:solidFill>
+                  <a:schemeClr val="dk1"/>
+                </a:solidFill>
+              </a:defRPr>
+            </a:lvl5pPr>
+            <a:lvl6pPr>
+              <a:defRPr>
+                <a:solidFill>
+                  <a:schemeClr val="dk1"/>
+                </a:solidFill>
+              </a:defRPr>
+            </a:lvl6pPr>
+            <a:lvl7pPr>
+              <a:defRPr>
+                <a:solidFill>
+                  <a:schemeClr val="dk1"/>
+                </a:solidFill>
+              </a:defRPr>
+            </a:lvl7pPr>
+            <a:lvl8pPr>
+              <a:defRPr>
+                <a:solidFill>
+                  <a:schemeClr val="dk1"/>
+                </a:solidFill>
+              </a:defRPr>
+            </a:lvl8pPr>
+            <a:lvl9pPr>
+              <a:defRPr>
+                <a:solidFill>
+                  <a:schemeClr val="dk1"/>
+                </a:solidFill>
+              </a:defRPr>
+            </a:lvl9pPr>
+          </a:lstStyle>
+          <a:p>
+            <a:pPr defTabSz="672130"/>
+            <a:r>
+              <a:rPr lang="en-US" sz="1176" b="0" dirty="0">
+                <a:solidFill>
+                  <a:prstClr val="black"/>
+                </a:solidFill>
+                <a:latin typeface="Exo 2 Medium" panose="00000600000000000000" pitchFamily="50" charset="0"/>
+              </a:rPr>
+              <a:t>    Farol do Projeto   </a:t>
+            </a:r>
+          </a:p>
+        </p:txBody>
+      </p:sp>
+      <p:sp>
+        <p:nvSpPr>
+          <p:cNvPr id="21" name="Retângulo 20">
+            <a:extLst>
+              <a:ext uri="{FF2B5EF4-FFF2-40B4-BE49-F238E27FC236}">
+                <a16:creationId xmlns:a16="http://schemas.microsoft.com/office/drawing/2014/main" id="{2045E605-DF27-495A-BAFB-81B6DAE989BF}"/>
+              </a:ext>
+            </a:extLst>
+          </p:cNvPr>
+          <p:cNvSpPr/>
+          <p:nvPr/>
+        </p:nvSpPr>
+        <p:spPr>
+          <a:xfrm>
+            <a:off x="6844996" y="1121895"/>
+            <a:ext cx="6164295" cy="1110240"/>
+          </a:xfrm>
+          <a:prstGeom prst="rect">
+            <a:avLst/>
+          </a:prstGeom>
+        </p:spPr>
+        <p:txBody>
+          <a:bodyPr wrap="square">
+            <a:spAutoFit/>
+          </a:bodyPr>
+          <a:lstStyle/>
+          <a:p>
+            <a:pPr marL="285750" indent="-285750" fontAlgn="base">
+              <a:spcBef>
+                <a:spcPct val="0"/>
+              </a:spcBef>
+              <a:buFont typeface="Wingdings" panose="05000000000000000000" pitchFamily="2" charset="2"/>
+              <a:buChar char="§"/>
+              <a:defRPr/>
+            </a:pPr>
+            <a:r>
+              <a:rPr lang="pt-BR" sz="1323" dirty="0">
+                <a:latin typeface="Exo 2 Medium" panose="00000600000000000000" pitchFamily="50" charset="0"/>
+                <a:cs typeface="Simplon BP Regular"/>
+              </a:rPr>
+              <a:t>Ainda não integramos a lógica de cadastro e login na aplicação do nosso back-end com nosso front-end</a:t>
+            </a:r>
+          </a:p>
+          <a:p>
+            <a:pPr marL="285750" indent="-285750" fontAlgn="base">
+              <a:spcBef>
+                <a:spcPct val="0"/>
+              </a:spcBef>
+              <a:buFont typeface="Wingdings" panose="05000000000000000000" pitchFamily="2" charset="2"/>
+              <a:buChar char="§"/>
+              <a:defRPr/>
+            </a:pPr>
+            <a:r>
+              <a:rPr lang="pt-BR" sz="1323" dirty="0">
+                <a:latin typeface="Exo 2 Medium" panose="00000600000000000000" pitchFamily="50" charset="0"/>
+                <a:cs typeface="Simplon BP Regular"/>
+              </a:rPr>
+              <a:t>Ainda não iniciamos a integração toda da nossa massa de dados do Back-end com nosso Front-end</a:t>
+            </a:r>
+          </a:p>
+          <a:p>
+            <a:pPr marL="252049" indent="-252049" fontAlgn="base">
+              <a:spcBef>
+                <a:spcPct val="0"/>
+              </a:spcBef>
+              <a:buFont typeface="Wingdings" panose="05000000000000000000" pitchFamily="2" charset="2"/>
+              <a:buChar char="§"/>
+              <a:defRPr/>
+            </a:pPr>
+            <a:endParaRPr lang="pt-BR" sz="1323" dirty="0">
+              <a:latin typeface="Exo 2 Medium" panose="00000600000000000000" pitchFamily="50" charset="0"/>
+              <a:cs typeface="Simplon BP Regular"/>
+            </a:endParaRPr>
+          </a:p>
+        </p:txBody>
+      </p:sp>
+    </p:spTree>
+    <p:extLst>
+      <p:ext uri="{BB962C8B-B14F-4D97-AF65-F5344CB8AC3E}">
+        <p14:creationId xmlns:p14="http://schemas.microsoft.com/office/powerpoint/2010/main" val="420052351"/>
       </p:ext>
     </p:extLst>
   </p:cSld>
@@ -43805,6 +45971,21 @@
 </file>
 
 <file path=customXml/item1.xml><?xml version="1.0" encoding="utf-8"?>
+<?mso-contentType ?>
+<FormTemplates xmlns="http://schemas.microsoft.com/sharepoint/v3/contenttype/forms">
+  <Display>DocumentLibraryForm</Display>
+  <Edit>DocumentLibraryForm</Edit>
+  <New>DocumentLibraryForm</New>
+</FormTemplates>
+</file>
+
+<file path=customXml/item2.xml><?xml version="1.0" encoding="utf-8"?>
+<p:properties xmlns:p="http://schemas.microsoft.com/office/2006/metadata/properties" xmlns:xsi="http://www.w3.org/2001/XMLSchema-instance" xmlns:pc="http://schemas.microsoft.com/office/infopath/2007/PartnerControls">
+  <documentManagement/>
+</p:properties>
+</file>
+
+<file path=customXml/item3.xml><?xml version="1.0" encoding="utf-8"?>
 <ct:contentTypeSchema xmlns:ct="http://schemas.microsoft.com/office/2006/metadata/contentType" xmlns:ma="http://schemas.microsoft.com/office/2006/metadata/properties/metaAttributes" ct:_="" ma:_="" ma:contentTypeName="Document" ma:contentTypeID="0x0101007F8ECE7139958D46ABEDA89D12B90CBF" ma:contentTypeVersion="0" ma:contentTypeDescription="Create a new document." ma:contentTypeScope="" ma:versionID="e6d660081116f63565d30cc13099d5ec">
   <xsd:schema xmlns:xsd="http://www.w3.org/2001/XMLSchema" xmlns:xs="http://www.w3.org/2001/XMLSchema" xmlns:p="http://schemas.microsoft.com/office/2006/metadata/properties" targetNamespace="http://schemas.microsoft.com/office/2006/metadata/properties" ma:root="true" ma:fieldsID="d413257cd9829394d17656a545d5fa4e">
     <xsd:element name="properties">
@@ -43918,33 +46099,10 @@
 </ct:contentTypeSchema>
 </file>
 
-<file path=customXml/item2.xml><?xml version="1.0" encoding="utf-8"?>
-<p:properties xmlns:p="http://schemas.microsoft.com/office/2006/metadata/properties" xmlns:xsi="http://www.w3.org/2001/XMLSchema-instance" xmlns:pc="http://schemas.microsoft.com/office/infopath/2007/PartnerControls">
-  <documentManagement/>
-</p:properties>
-</file>
-
-<file path=customXml/item3.xml><?xml version="1.0" encoding="utf-8"?>
-<?mso-contentType ?>
-<FormTemplates xmlns="http://schemas.microsoft.com/sharepoint/v3/contenttype/forms">
-  <Display>DocumentLibraryForm</Display>
-  <Edit>DocumentLibraryForm</Edit>
-  <New>DocumentLibraryForm</New>
-</FormTemplates>
-</file>
-
 <file path=customXml/itemProps1.xml><?xml version="1.0" encoding="utf-8"?>
-<ds:datastoreItem xmlns:ds="http://schemas.openxmlformats.org/officeDocument/2006/customXml" ds:itemID="{EFDE92A4-5D2A-451A-A373-EB014CDC0D59}">
+<ds:datastoreItem xmlns:ds="http://schemas.openxmlformats.org/officeDocument/2006/customXml" ds:itemID="{E2481852-F24E-4532-AF30-C154D705D105}">
   <ds:schemaRefs>
-    <ds:schemaRef ds:uri="http://schemas.microsoft.com/office/2006/metadata/contentType"/>
-    <ds:schemaRef ds:uri="http://schemas.microsoft.com/office/2006/metadata/properties/metaAttributes"/>
-    <ds:schemaRef ds:uri="http://www.w3.org/2001/XMLSchema"/>
-    <ds:schemaRef ds:uri="http://schemas.microsoft.com/office/2006/metadata/properties"/>
-    <ds:schemaRef ds:uri="http://schemas.openxmlformats.org/package/2006/metadata/core-properties"/>
-    <ds:schemaRef ds:uri="http://purl.org/dc/elements/1.1/"/>
-    <ds:schemaRef ds:uri="http://purl.org/dc/terms/"/>
-    <ds:schemaRef ds:uri="http://schemas.microsoft.com/internal/obd"/>
-    <ds:schemaRef ds:uri="http://schemas.microsoft.com/office/infopath/2007/PartnerControls"/>
+    <ds:schemaRef ds:uri="http://schemas.microsoft.com/sharepoint/v3/contenttype/forms"/>
   </ds:schemaRefs>
 </ds:datastoreItem>
 </file>
@@ -43967,9 +46125,17 @@
 </file>
 
 <file path=customXml/itemProps3.xml><?xml version="1.0" encoding="utf-8"?>
-<ds:datastoreItem xmlns:ds="http://schemas.openxmlformats.org/officeDocument/2006/customXml" ds:itemID="{E2481852-F24E-4532-AF30-C154D705D105}">
+<ds:datastoreItem xmlns:ds="http://schemas.openxmlformats.org/officeDocument/2006/customXml" ds:itemID="{EFDE92A4-5D2A-451A-A373-EB014CDC0D59}">
   <ds:schemaRefs>
-    <ds:schemaRef ds:uri="http://schemas.microsoft.com/sharepoint/v3/contenttype/forms"/>
+    <ds:schemaRef ds:uri="http://schemas.microsoft.com/office/2006/metadata/contentType"/>
+    <ds:schemaRef ds:uri="http://schemas.microsoft.com/office/2006/metadata/properties/metaAttributes"/>
+    <ds:schemaRef ds:uri="http://www.w3.org/2001/XMLSchema"/>
+    <ds:schemaRef ds:uri="http://schemas.microsoft.com/office/2006/metadata/properties"/>
+    <ds:schemaRef ds:uri="http://schemas.openxmlformats.org/package/2006/metadata/core-properties"/>
+    <ds:schemaRef ds:uri="http://purl.org/dc/elements/1.1/"/>
+    <ds:schemaRef ds:uri="http://purl.org/dc/terms/"/>
+    <ds:schemaRef ds:uri="http://schemas.microsoft.com/internal/obd"/>
+    <ds:schemaRef ds:uri="http://schemas.microsoft.com/office/infopath/2007/PartnerControls"/>
   </ds:schemaRefs>
 </ds:datastoreItem>
 </file>
</xml_diff>

<commit_message>
[mobile]Status reporte e juncao das telas
</commit_message>
<xml_diff>
--- a/documentacao/status-report/Status_Report_-_Grupo_09.pptx
+++ b/documentacao/status-report/Status_Report_-_Grupo_09.pptx
@@ -7,10 +7,10 @@
     <p:sldMasterId id="2147483665" r:id="rId6"/>
   </p:sldMasterIdLst>
   <p:notesMasterIdLst>
-    <p:notesMasterId r:id="rId21"/>
+    <p:notesMasterId r:id="rId22"/>
   </p:notesMasterIdLst>
   <p:handoutMasterIdLst>
-    <p:handoutMasterId r:id="rId22"/>
+    <p:handoutMasterId r:id="rId23"/>
   </p:handoutMasterIdLst>
   <p:sldIdLst>
     <p:sldId id="344" r:id="rId7"/>
@@ -27,6 +27,7 @@
     <p:sldId id="481" r:id="rId18"/>
     <p:sldId id="482" r:id="rId19"/>
     <p:sldId id="483" r:id="rId20"/>
+    <p:sldId id="484" r:id="rId21"/>
   </p:sldIdLst>
   <p:sldSz cx="13442950" cy="7561263"/>
   <p:notesSz cx="7104063" cy="10234613"/>
@@ -147,6 +148,7 @@
             <p14:sldId id="481"/>
             <p14:sldId id="482"/>
             <p14:sldId id="483"/>
+            <p14:sldId id="484"/>
           </p14:sldIdLst>
         </p14:section>
       </p14:sectionLst>
@@ -445,7 +447,7 @@
             <a:fld id="{C3CD65D1-5C11-455D-9F9A-0E035F00A0DA}" type="datetimeFigureOut">
               <a:rPr lang="pt-BR" smtClean="0"/>
               <a:pPr/>
-              <a:t>08/03/2022</a:t>
+              <a:t>05/04/2022</a:t>
             </a:fld>
             <a:endParaRPr lang="pt-BR"/>
           </a:p>
@@ -613,7 +615,7 @@
             <a:fld id="{A05DA3EF-18EA-43DE-B1BB-402A3C558822}" type="datetimeFigureOut">
               <a:rPr lang="pt-BR" smtClean="0"/>
               <a:pPr/>
-              <a:t>08/03/2022</a:t>
+              <a:t>05/04/2022</a:t>
             </a:fld>
             <a:endParaRPr lang="pt-BR"/>
           </a:p>
@@ -1425,6 +1427,99 @@
     <p:extLst>
       <p:ext uri="{BB962C8B-B14F-4D97-AF65-F5344CB8AC3E}">
         <p14:creationId xmlns:p14="http://schemas.microsoft.com/office/powerpoint/2010/main" val="2552771170"/>
+      </p:ext>
+    </p:extLst>
+  </p:cSld>
+  <p:clrMapOvr>
+    <a:masterClrMapping/>
+  </p:clrMapOvr>
+</p:notes>
+</file>
+
+<file path=ppt/notesSlides/notesSlide15.xml><?xml version="1.0" encoding="utf-8"?>
+<p:notes xmlns:a="http://schemas.openxmlformats.org/drawingml/2006/main" xmlns:r="http://schemas.openxmlformats.org/officeDocument/2006/relationships" xmlns:p="http://schemas.openxmlformats.org/presentationml/2006/main">
+  <p:cSld>
+    <p:spTree>
+      <p:nvGrpSpPr>
+        <p:cNvPr id="1" name=""/>
+        <p:cNvGrpSpPr/>
+        <p:nvPr/>
+      </p:nvGrpSpPr>
+      <p:grpSpPr>
+        <a:xfrm>
+          <a:off x="0" y="0"/>
+          <a:ext cx="0" cy="0"/>
+          <a:chOff x="0" y="0"/>
+          <a:chExt cx="0" cy="0"/>
+        </a:xfrm>
+      </p:grpSpPr>
+      <p:sp>
+        <p:nvSpPr>
+          <p:cNvPr id="2" name="Slide Image Placeholder 1"/>
+          <p:cNvSpPr>
+            <a:spLocks noGrp="1" noRot="1" noChangeAspect="1"/>
+          </p:cNvSpPr>
+          <p:nvPr>
+            <p:ph type="sldImg"/>
+          </p:nvPr>
+        </p:nvSpPr>
+        <p:spPr/>
+      </p:sp>
+      <p:sp>
+        <p:nvSpPr>
+          <p:cNvPr id="3" name="Notes Placeholder 2"/>
+          <p:cNvSpPr>
+            <a:spLocks noGrp="1"/>
+          </p:cNvSpPr>
+          <p:nvPr>
+            <p:ph type="body" idx="1"/>
+          </p:nvPr>
+        </p:nvSpPr>
+        <p:spPr/>
+        <p:txBody>
+          <a:bodyPr/>
+          <a:lstStyle/>
+          <a:p>
+            <a:endParaRPr lang="en-US"/>
+          </a:p>
+        </p:txBody>
+      </p:sp>
+      <p:sp>
+        <p:nvSpPr>
+          <p:cNvPr id="4" name="Slide Number Placeholder 3"/>
+          <p:cNvSpPr>
+            <a:spLocks noGrp="1"/>
+          </p:cNvSpPr>
+          <p:nvPr>
+            <p:ph type="sldNum" sz="quarter" idx="10"/>
+          </p:nvPr>
+        </p:nvSpPr>
+        <p:spPr/>
+        <p:txBody>
+          <a:bodyPr/>
+          <a:lstStyle/>
+          <a:p>
+            <a:fld id="{B39AF3DB-B6A1-2444-9DD8-53D016F8E638}" type="slidenum">
+              <a:rPr lang="pt-BR" smtClean="0">
+                <a:solidFill>
+                  <a:prstClr val="black"/>
+                </a:solidFill>
+              </a:rPr>
+              <a:pPr/>
+              <a:t>15</a:t>
+            </a:fld>
+            <a:endParaRPr lang="pt-BR">
+              <a:solidFill>
+                <a:prstClr val="black"/>
+              </a:solidFill>
+            </a:endParaRPr>
+          </a:p>
+        </p:txBody>
+      </p:sp>
+    </p:spTree>
+    <p:extLst>
+      <p:ext uri="{BB962C8B-B14F-4D97-AF65-F5344CB8AC3E}">
+        <p14:creationId xmlns:p14="http://schemas.microsoft.com/office/powerpoint/2010/main" val="732586118"/>
       </p:ext>
     </p:extLst>
   </p:cSld>
@@ -31634,6 +31729,1825 @@
     <p:extLst>
       <p:ext uri="{BB962C8B-B14F-4D97-AF65-F5344CB8AC3E}">
         <p14:creationId xmlns:p14="http://schemas.microsoft.com/office/powerpoint/2010/main" val="1197803352"/>
+      </p:ext>
+    </p:extLst>
+  </p:cSld>
+  <p:clrMapOvr>
+    <a:masterClrMapping/>
+  </p:clrMapOvr>
+</p:sld>
+</file>
+
+<file path=ppt/slides/slide15.xml><?xml version="1.0" encoding="utf-8"?>
+<p:sld xmlns:a="http://schemas.openxmlformats.org/drawingml/2006/main" xmlns:r="http://schemas.openxmlformats.org/officeDocument/2006/relationships" xmlns:p="http://schemas.openxmlformats.org/presentationml/2006/main">
+  <p:cSld>
+    <p:spTree>
+      <p:nvGrpSpPr>
+        <p:cNvPr id="1" name=""/>
+        <p:cNvGrpSpPr/>
+        <p:nvPr/>
+      </p:nvGrpSpPr>
+      <p:grpSpPr>
+        <a:xfrm>
+          <a:off x="0" y="0"/>
+          <a:ext cx="0" cy="0"/>
+          <a:chOff x="0" y="0"/>
+          <a:chExt cx="0" cy="0"/>
+        </a:xfrm>
+      </p:grpSpPr>
+      <p:sp>
+        <p:nvSpPr>
+          <p:cNvPr id="43" name="Rectangle 42"/>
+          <p:cNvSpPr/>
+          <p:nvPr/>
+        </p:nvSpPr>
+        <p:spPr>
+          <a:xfrm>
+            <a:off x="6804884" y="1106495"/>
+            <a:ext cx="6254624" cy="2191469"/>
+          </a:xfrm>
+          <a:prstGeom prst="rect">
+            <a:avLst/>
+          </a:prstGeom>
+          <a:noFill/>
+          <a:ln w="12700">
+            <a:solidFill>
+              <a:schemeClr val="bg1">
+                <a:lumMod val="50000"/>
+              </a:schemeClr>
+            </a:solidFill>
+          </a:ln>
+        </p:spPr>
+        <p:style>
+          <a:lnRef idx="2">
+            <a:schemeClr val="accent4"/>
+          </a:lnRef>
+          <a:fillRef idx="1">
+            <a:schemeClr val="lt1"/>
+          </a:fillRef>
+          <a:effectRef idx="0">
+            <a:schemeClr val="accent4"/>
+          </a:effectRef>
+          <a:fontRef idx="minor">
+            <a:schemeClr val="dk1"/>
+          </a:fontRef>
+        </p:style>
+        <p:txBody>
+          <a:bodyPr tIns="105844" rtlCol="0" anchor="t"/>
+          <a:lstStyle/>
+          <a:p>
+            <a:pPr defTabSz="672130">
+              <a:spcAft>
+                <a:spcPts val="882"/>
+              </a:spcAft>
+            </a:pPr>
+            <a:endParaRPr lang="pt-BR" sz="1470" dirty="0">
+              <a:solidFill>
+                <a:schemeClr val="tx1"/>
+              </a:solidFill>
+              <a:latin typeface="Exo 2 Medium" panose="00000600000000000000" pitchFamily="50" charset="0"/>
+              <a:cs typeface="Simplon BP Regular"/>
+            </a:endParaRPr>
+          </a:p>
+        </p:txBody>
+      </p:sp>
+      <p:sp>
+        <p:nvSpPr>
+          <p:cNvPr id="3" name="Title 2"/>
+          <p:cNvSpPr>
+            <a:spLocks noGrp="1"/>
+          </p:cNvSpPr>
+          <p:nvPr>
+            <p:ph type="title"/>
+          </p:nvPr>
+        </p:nvSpPr>
+        <p:spPr>
+          <a:xfrm>
+            <a:off x="469692" y="185232"/>
+            <a:ext cx="12098020" cy="800352"/>
+          </a:xfrm>
+        </p:spPr>
+        <p:txBody>
+          <a:bodyPr vert="horz" wrap="square" lIns="105844" tIns="0" rIns="105844" bIns="0" numCol="1" anchor="t" anchorCtr="0" compatLnSpc="1">
+            <a:prstTxWarp prst="textNoShape">
+              <a:avLst/>
+            </a:prstTxWarp>
+            <a:noAutofit/>
+          </a:bodyPr>
+          <a:lstStyle/>
+          <a:p>
+            <a:pPr algn="l">
+              <a:spcAft>
+                <a:spcPts val="882"/>
+              </a:spcAft>
+            </a:pPr>
+            <a:r>
+              <a:rPr lang="en-US" sz="2646" dirty="0">
+                <a:solidFill>
+                  <a:prstClr val="black"/>
+                </a:solidFill>
+                <a:latin typeface="Exo 2 Medium" panose="00000600000000000000" pitchFamily="50" charset="0"/>
+                <a:cs typeface="Simplon Oi Headline"/>
+              </a:rPr>
+              <a:t>SEMANA Abril - 05/04/2022</a:t>
+            </a:r>
+          </a:p>
+        </p:txBody>
+      </p:sp>
+      <p:sp>
+        <p:nvSpPr>
+          <p:cNvPr id="78" name="TextBox 118"/>
+          <p:cNvSpPr txBox="1"/>
+          <p:nvPr/>
+        </p:nvSpPr>
+        <p:spPr>
+          <a:xfrm>
+            <a:off x="11822773" y="576471"/>
+            <a:ext cx="899678" cy="179824"/>
+          </a:xfrm>
+          <a:prstGeom prst="rect">
+            <a:avLst/>
+          </a:prstGeom>
+          <a:noFill/>
+          <a:ln w="12700">
+            <a:noFill/>
+          </a:ln>
+        </p:spPr>
+        <p:style>
+          <a:lnRef idx="2">
+            <a:schemeClr val="accent4"/>
+          </a:lnRef>
+          <a:fillRef idx="1">
+            <a:schemeClr val="lt1"/>
+          </a:fillRef>
+          <a:effectRef idx="0">
+            <a:schemeClr val="accent4"/>
+          </a:effectRef>
+          <a:fontRef idx="minor">
+            <a:schemeClr val="dk1"/>
+          </a:fontRef>
+        </p:style>
+        <p:txBody>
+          <a:bodyPr wrap="none" lIns="52922" tIns="52922" rIns="52922" bIns="0" rtlCol="0" anchor="b"/>
+          <a:lstStyle>
+            <a:defPPr>
+              <a:defRPr lang="en-US"/>
+            </a:defPPr>
+            <a:lvl1pPr algn="ctr">
+              <a:defRPr sz="1000" b="1">
+                <a:latin typeface="Simplon BP Regular"/>
+                <a:cs typeface="Simplon BP Regular"/>
+              </a:defRPr>
+            </a:lvl1pPr>
+            <a:lvl2pPr>
+              <a:defRPr>
+                <a:solidFill>
+                  <a:schemeClr val="dk1"/>
+                </a:solidFill>
+              </a:defRPr>
+            </a:lvl2pPr>
+            <a:lvl3pPr>
+              <a:defRPr>
+                <a:solidFill>
+                  <a:schemeClr val="dk1"/>
+                </a:solidFill>
+              </a:defRPr>
+            </a:lvl3pPr>
+            <a:lvl4pPr>
+              <a:defRPr>
+                <a:solidFill>
+                  <a:schemeClr val="dk1"/>
+                </a:solidFill>
+              </a:defRPr>
+            </a:lvl4pPr>
+            <a:lvl5pPr>
+              <a:defRPr>
+                <a:solidFill>
+                  <a:schemeClr val="dk1"/>
+                </a:solidFill>
+              </a:defRPr>
+            </a:lvl5pPr>
+            <a:lvl6pPr>
+              <a:defRPr>
+                <a:solidFill>
+                  <a:schemeClr val="dk1"/>
+                </a:solidFill>
+              </a:defRPr>
+            </a:lvl6pPr>
+            <a:lvl7pPr>
+              <a:defRPr>
+                <a:solidFill>
+                  <a:schemeClr val="dk1"/>
+                </a:solidFill>
+              </a:defRPr>
+            </a:lvl7pPr>
+            <a:lvl8pPr>
+              <a:defRPr>
+                <a:solidFill>
+                  <a:schemeClr val="dk1"/>
+                </a:solidFill>
+              </a:defRPr>
+            </a:lvl8pPr>
+            <a:lvl9pPr>
+              <a:defRPr>
+                <a:solidFill>
+                  <a:schemeClr val="dk1"/>
+                </a:solidFill>
+              </a:defRPr>
+            </a:lvl9pPr>
+          </a:lstStyle>
+          <a:p>
+            <a:pPr defTabSz="672130"/>
+            <a:r>
+              <a:rPr lang="pt-BR" sz="1176" b="0" dirty="0">
+                <a:solidFill>
+                  <a:prstClr val="black"/>
+                </a:solidFill>
+                <a:latin typeface="Exo 2 Medium" panose="00000600000000000000" pitchFamily="50" charset="0"/>
+              </a:rPr>
+              <a:t>Negócios</a:t>
+            </a:r>
+          </a:p>
+        </p:txBody>
+      </p:sp>
+      <p:sp>
+        <p:nvSpPr>
+          <p:cNvPr id="109" name="Oval 120"/>
+          <p:cNvSpPr>
+            <a:spLocks noChangeAspect="1"/>
+          </p:cNvSpPr>
+          <p:nvPr/>
+        </p:nvSpPr>
+        <p:spPr>
+          <a:xfrm>
+            <a:off x="11193898" y="297930"/>
+            <a:ext cx="211404" cy="211689"/>
+          </a:xfrm>
+          <a:prstGeom prst="ellipse">
+            <a:avLst/>
+          </a:prstGeom>
+          <a:solidFill>
+            <a:srgbClr val="1BCF13"/>
+          </a:solidFill>
+          <a:ln w="12700">
+            <a:solidFill>
+              <a:schemeClr val="accent3"/>
+            </a:solidFill>
+          </a:ln>
+        </p:spPr>
+        <p:style>
+          <a:lnRef idx="2">
+            <a:schemeClr val="accent1">
+              <a:shade val="50000"/>
+            </a:schemeClr>
+          </a:lnRef>
+          <a:fillRef idx="1">
+            <a:schemeClr val="accent1"/>
+          </a:fillRef>
+          <a:effectRef idx="0">
+            <a:schemeClr val="accent1"/>
+          </a:effectRef>
+          <a:fontRef idx="minor">
+            <a:schemeClr val="lt1"/>
+          </a:fontRef>
+        </p:style>
+        <p:txBody>
+          <a:bodyPr wrap="none" lIns="52922" tIns="52922" rIns="52922" rtlCol="0" anchor="ctr"/>
+          <a:lstStyle/>
+          <a:p>
+            <a:pPr algn="ctr" defTabSz="672130"/>
+            <a:endParaRPr lang="en-US" sz="1176" dirty="0">
+              <a:solidFill>
+                <a:prstClr val="black"/>
+              </a:solidFill>
+              <a:latin typeface="Exo 2 Medium" panose="00000600000000000000" pitchFamily="50" charset="0"/>
+              <a:cs typeface="Simplon BP Regular"/>
+            </a:endParaRPr>
+          </a:p>
+        </p:txBody>
+      </p:sp>
+      <p:sp>
+        <p:nvSpPr>
+          <p:cNvPr id="80" name="TextBox 123"/>
+          <p:cNvSpPr txBox="1"/>
+          <p:nvPr/>
+        </p:nvSpPr>
+        <p:spPr>
+          <a:xfrm>
+            <a:off x="10852497" y="576471"/>
+            <a:ext cx="899678" cy="179824"/>
+          </a:xfrm>
+          <a:prstGeom prst="rect">
+            <a:avLst/>
+          </a:prstGeom>
+          <a:noFill/>
+          <a:ln w="12700">
+            <a:noFill/>
+          </a:ln>
+        </p:spPr>
+        <p:style>
+          <a:lnRef idx="2">
+            <a:schemeClr val="accent4"/>
+          </a:lnRef>
+          <a:fillRef idx="1">
+            <a:schemeClr val="lt1"/>
+          </a:fillRef>
+          <a:effectRef idx="0">
+            <a:schemeClr val="accent4"/>
+          </a:effectRef>
+          <a:fontRef idx="minor">
+            <a:schemeClr val="dk1"/>
+          </a:fontRef>
+        </p:style>
+        <p:txBody>
+          <a:bodyPr wrap="none" lIns="52922" tIns="52922" rIns="52922" bIns="0" rtlCol="0" anchor="b"/>
+          <a:lstStyle>
+            <a:defPPr>
+              <a:defRPr lang="en-US"/>
+            </a:defPPr>
+            <a:lvl1pPr algn="ctr">
+              <a:defRPr sz="1000" b="1">
+                <a:latin typeface="Simplon BP Regular"/>
+                <a:cs typeface="Simplon BP Regular"/>
+              </a:defRPr>
+            </a:lvl1pPr>
+            <a:lvl2pPr>
+              <a:defRPr>
+                <a:solidFill>
+                  <a:schemeClr val="dk1"/>
+                </a:solidFill>
+              </a:defRPr>
+            </a:lvl2pPr>
+            <a:lvl3pPr>
+              <a:defRPr>
+                <a:solidFill>
+                  <a:schemeClr val="dk1"/>
+                </a:solidFill>
+              </a:defRPr>
+            </a:lvl3pPr>
+            <a:lvl4pPr>
+              <a:defRPr>
+                <a:solidFill>
+                  <a:schemeClr val="dk1"/>
+                </a:solidFill>
+              </a:defRPr>
+            </a:lvl4pPr>
+            <a:lvl5pPr>
+              <a:defRPr>
+                <a:solidFill>
+                  <a:schemeClr val="dk1"/>
+                </a:solidFill>
+              </a:defRPr>
+            </a:lvl5pPr>
+            <a:lvl6pPr>
+              <a:defRPr>
+                <a:solidFill>
+                  <a:schemeClr val="dk1"/>
+                </a:solidFill>
+              </a:defRPr>
+            </a:lvl6pPr>
+            <a:lvl7pPr>
+              <a:defRPr>
+                <a:solidFill>
+                  <a:schemeClr val="dk1"/>
+                </a:solidFill>
+              </a:defRPr>
+            </a:lvl7pPr>
+            <a:lvl8pPr>
+              <a:defRPr>
+                <a:solidFill>
+                  <a:schemeClr val="dk1"/>
+                </a:solidFill>
+              </a:defRPr>
+            </a:lvl8pPr>
+            <a:lvl9pPr>
+              <a:defRPr>
+                <a:solidFill>
+                  <a:schemeClr val="dk1"/>
+                </a:solidFill>
+              </a:defRPr>
+            </a:lvl9pPr>
+          </a:lstStyle>
+          <a:p>
+            <a:pPr defTabSz="672130"/>
+            <a:r>
+              <a:rPr lang="pt-BR" sz="1176" b="0" dirty="0">
+                <a:solidFill>
+                  <a:prstClr val="black"/>
+                </a:solidFill>
+                <a:latin typeface="Exo 2 Medium" panose="00000600000000000000" pitchFamily="50" charset="0"/>
+              </a:rPr>
+              <a:t>Plataforma</a:t>
+            </a:r>
+          </a:p>
+        </p:txBody>
+      </p:sp>
+      <p:sp>
+        <p:nvSpPr>
+          <p:cNvPr id="82" name="TextBox 128"/>
+          <p:cNvSpPr txBox="1"/>
+          <p:nvPr/>
+        </p:nvSpPr>
+        <p:spPr>
+          <a:xfrm>
+            <a:off x="9854245" y="576471"/>
+            <a:ext cx="899678" cy="179824"/>
+          </a:xfrm>
+          <a:prstGeom prst="rect">
+            <a:avLst/>
+          </a:prstGeom>
+          <a:noFill/>
+          <a:ln w="12700">
+            <a:noFill/>
+          </a:ln>
+        </p:spPr>
+        <p:style>
+          <a:lnRef idx="2">
+            <a:schemeClr val="accent4"/>
+          </a:lnRef>
+          <a:fillRef idx="1">
+            <a:schemeClr val="lt1"/>
+          </a:fillRef>
+          <a:effectRef idx="0">
+            <a:schemeClr val="accent4"/>
+          </a:effectRef>
+          <a:fontRef idx="minor">
+            <a:schemeClr val="dk1"/>
+          </a:fontRef>
+        </p:style>
+        <p:txBody>
+          <a:bodyPr wrap="none" lIns="52922" tIns="52922" rIns="52922" bIns="0" rtlCol="0" anchor="b"/>
+          <a:lstStyle>
+            <a:defPPr>
+              <a:defRPr lang="en-US"/>
+            </a:defPPr>
+            <a:lvl1pPr algn="ctr">
+              <a:defRPr sz="1000" b="1">
+                <a:latin typeface="Simplon BP Regular"/>
+                <a:cs typeface="Simplon BP Regular"/>
+              </a:defRPr>
+            </a:lvl1pPr>
+            <a:lvl2pPr>
+              <a:defRPr>
+                <a:solidFill>
+                  <a:schemeClr val="dk1"/>
+                </a:solidFill>
+              </a:defRPr>
+            </a:lvl2pPr>
+            <a:lvl3pPr>
+              <a:defRPr>
+                <a:solidFill>
+                  <a:schemeClr val="dk1"/>
+                </a:solidFill>
+              </a:defRPr>
+            </a:lvl3pPr>
+            <a:lvl4pPr>
+              <a:defRPr>
+                <a:solidFill>
+                  <a:schemeClr val="dk1"/>
+                </a:solidFill>
+              </a:defRPr>
+            </a:lvl4pPr>
+            <a:lvl5pPr>
+              <a:defRPr>
+                <a:solidFill>
+                  <a:schemeClr val="dk1"/>
+                </a:solidFill>
+              </a:defRPr>
+            </a:lvl5pPr>
+            <a:lvl6pPr>
+              <a:defRPr>
+                <a:solidFill>
+                  <a:schemeClr val="dk1"/>
+                </a:solidFill>
+              </a:defRPr>
+            </a:lvl6pPr>
+            <a:lvl7pPr>
+              <a:defRPr>
+                <a:solidFill>
+                  <a:schemeClr val="dk1"/>
+                </a:solidFill>
+              </a:defRPr>
+            </a:lvl7pPr>
+            <a:lvl8pPr>
+              <a:defRPr>
+                <a:solidFill>
+                  <a:schemeClr val="dk1"/>
+                </a:solidFill>
+              </a:defRPr>
+            </a:lvl8pPr>
+            <a:lvl9pPr>
+              <a:defRPr>
+                <a:solidFill>
+                  <a:schemeClr val="dk1"/>
+                </a:solidFill>
+              </a:defRPr>
+            </a:lvl9pPr>
+          </a:lstStyle>
+          <a:p>
+            <a:pPr defTabSz="672130"/>
+            <a:r>
+              <a:rPr lang="pt-BR" sz="1176" b="0" dirty="0">
+                <a:solidFill>
+                  <a:prstClr val="black"/>
+                </a:solidFill>
+                <a:latin typeface="Exo 2 Medium" panose="00000600000000000000" pitchFamily="50" charset="0"/>
+              </a:rPr>
+              <a:t>Back</a:t>
+            </a:r>
+          </a:p>
+        </p:txBody>
+      </p:sp>
+      <p:sp>
+        <p:nvSpPr>
+          <p:cNvPr id="84" name="TextBox 133"/>
+          <p:cNvSpPr txBox="1"/>
+          <p:nvPr/>
+        </p:nvSpPr>
+        <p:spPr>
+          <a:xfrm>
+            <a:off x="8986650" y="576471"/>
+            <a:ext cx="899678" cy="179824"/>
+          </a:xfrm>
+          <a:prstGeom prst="rect">
+            <a:avLst/>
+          </a:prstGeom>
+          <a:noFill/>
+          <a:ln w="12700">
+            <a:noFill/>
+          </a:ln>
+        </p:spPr>
+        <p:style>
+          <a:lnRef idx="2">
+            <a:schemeClr val="accent4"/>
+          </a:lnRef>
+          <a:fillRef idx="1">
+            <a:schemeClr val="lt1"/>
+          </a:fillRef>
+          <a:effectRef idx="0">
+            <a:schemeClr val="accent4"/>
+          </a:effectRef>
+          <a:fontRef idx="minor">
+            <a:schemeClr val="dk1"/>
+          </a:fontRef>
+        </p:style>
+        <p:txBody>
+          <a:bodyPr wrap="none" lIns="52922" tIns="52922" rIns="52922" bIns="0" rtlCol="0" anchor="b"/>
+          <a:lstStyle>
+            <a:defPPr>
+              <a:defRPr lang="en-US"/>
+            </a:defPPr>
+            <a:lvl1pPr algn="ctr">
+              <a:defRPr sz="1000" b="1">
+                <a:latin typeface="Simplon BP Regular"/>
+                <a:cs typeface="Simplon BP Regular"/>
+              </a:defRPr>
+            </a:lvl1pPr>
+            <a:lvl2pPr>
+              <a:defRPr>
+                <a:solidFill>
+                  <a:schemeClr val="dk1"/>
+                </a:solidFill>
+              </a:defRPr>
+            </a:lvl2pPr>
+            <a:lvl3pPr>
+              <a:defRPr>
+                <a:solidFill>
+                  <a:schemeClr val="dk1"/>
+                </a:solidFill>
+              </a:defRPr>
+            </a:lvl3pPr>
+            <a:lvl4pPr>
+              <a:defRPr>
+                <a:solidFill>
+                  <a:schemeClr val="dk1"/>
+                </a:solidFill>
+              </a:defRPr>
+            </a:lvl4pPr>
+            <a:lvl5pPr>
+              <a:defRPr>
+                <a:solidFill>
+                  <a:schemeClr val="dk1"/>
+                </a:solidFill>
+              </a:defRPr>
+            </a:lvl5pPr>
+            <a:lvl6pPr>
+              <a:defRPr>
+                <a:solidFill>
+                  <a:schemeClr val="dk1"/>
+                </a:solidFill>
+              </a:defRPr>
+            </a:lvl6pPr>
+            <a:lvl7pPr>
+              <a:defRPr>
+                <a:solidFill>
+                  <a:schemeClr val="dk1"/>
+                </a:solidFill>
+              </a:defRPr>
+            </a:lvl7pPr>
+            <a:lvl8pPr>
+              <a:defRPr>
+                <a:solidFill>
+                  <a:schemeClr val="dk1"/>
+                </a:solidFill>
+              </a:defRPr>
+            </a:lvl8pPr>
+            <a:lvl9pPr>
+              <a:defRPr>
+                <a:solidFill>
+                  <a:schemeClr val="dk1"/>
+                </a:solidFill>
+              </a:defRPr>
+            </a:lvl9pPr>
+          </a:lstStyle>
+          <a:p>
+            <a:pPr defTabSz="672130"/>
+            <a:r>
+              <a:rPr lang="pt-BR" sz="1176" b="0" dirty="0">
+                <a:solidFill>
+                  <a:prstClr val="black"/>
+                </a:solidFill>
+                <a:latin typeface="Exo 2 Medium" panose="00000600000000000000" pitchFamily="50" charset="0"/>
+              </a:rPr>
+              <a:t>Front</a:t>
+            </a:r>
+          </a:p>
+        </p:txBody>
+      </p:sp>
+      <p:sp>
+        <p:nvSpPr>
+          <p:cNvPr id="88" name="Oval 134"/>
+          <p:cNvSpPr>
+            <a:spLocks noChangeAspect="1"/>
+          </p:cNvSpPr>
+          <p:nvPr/>
+        </p:nvSpPr>
+        <p:spPr>
+          <a:xfrm>
+            <a:off x="8443555" y="297930"/>
+            <a:ext cx="211404" cy="211689"/>
+          </a:xfrm>
+          <a:prstGeom prst="ellipse">
+            <a:avLst/>
+          </a:prstGeom>
+          <a:solidFill>
+            <a:srgbClr val="1BCF13"/>
+          </a:solidFill>
+          <a:ln w="12700">
+            <a:solidFill>
+              <a:schemeClr val="accent3"/>
+            </a:solidFill>
+          </a:ln>
+        </p:spPr>
+        <p:style>
+          <a:lnRef idx="2">
+            <a:schemeClr val="accent1">
+              <a:shade val="50000"/>
+            </a:schemeClr>
+          </a:lnRef>
+          <a:fillRef idx="1">
+            <a:schemeClr val="accent1"/>
+          </a:fillRef>
+          <a:effectRef idx="0">
+            <a:schemeClr val="accent1"/>
+          </a:effectRef>
+          <a:fontRef idx="minor">
+            <a:schemeClr val="lt1"/>
+          </a:fontRef>
+        </p:style>
+        <p:txBody>
+          <a:bodyPr wrap="none" lIns="52922" tIns="52922" rIns="52922" rtlCol="0" anchor="ctr"/>
+          <a:lstStyle/>
+          <a:p>
+            <a:pPr algn="ctr" defTabSz="672130"/>
+            <a:endParaRPr lang="en-US" sz="1176" dirty="0">
+              <a:solidFill>
+                <a:prstClr val="black"/>
+              </a:solidFill>
+              <a:latin typeface="Exo 2 Medium" panose="00000600000000000000" pitchFamily="50" charset="0"/>
+              <a:cs typeface="Simplon BP Regular"/>
+            </a:endParaRPr>
+          </a:p>
+        </p:txBody>
+      </p:sp>
+      <p:sp>
+        <p:nvSpPr>
+          <p:cNvPr id="86" name="TextBox 138"/>
+          <p:cNvSpPr txBox="1"/>
+          <p:nvPr/>
+        </p:nvSpPr>
+        <p:spPr>
+          <a:xfrm>
+            <a:off x="8126053" y="576471"/>
+            <a:ext cx="899678" cy="179824"/>
+          </a:xfrm>
+          <a:prstGeom prst="rect">
+            <a:avLst/>
+          </a:prstGeom>
+          <a:noFill/>
+          <a:ln w="12700">
+            <a:noFill/>
+          </a:ln>
+        </p:spPr>
+        <p:style>
+          <a:lnRef idx="2">
+            <a:schemeClr val="accent4"/>
+          </a:lnRef>
+          <a:fillRef idx="1">
+            <a:schemeClr val="lt1"/>
+          </a:fillRef>
+          <a:effectRef idx="0">
+            <a:schemeClr val="accent4"/>
+          </a:effectRef>
+          <a:fontRef idx="minor">
+            <a:schemeClr val="dk1"/>
+          </a:fontRef>
+        </p:style>
+        <p:txBody>
+          <a:bodyPr wrap="none" lIns="52922" tIns="52922" rIns="52922" bIns="0" rtlCol="0" anchor="b"/>
+          <a:lstStyle>
+            <a:defPPr>
+              <a:defRPr lang="en-US"/>
+            </a:defPPr>
+            <a:lvl1pPr algn="ctr">
+              <a:defRPr sz="1000" b="1">
+                <a:latin typeface="Simplon BP Regular"/>
+                <a:cs typeface="Simplon BP Regular"/>
+              </a:defRPr>
+            </a:lvl1pPr>
+            <a:lvl2pPr>
+              <a:defRPr>
+                <a:solidFill>
+                  <a:schemeClr val="dk1"/>
+                </a:solidFill>
+              </a:defRPr>
+            </a:lvl2pPr>
+            <a:lvl3pPr>
+              <a:defRPr>
+                <a:solidFill>
+                  <a:schemeClr val="dk1"/>
+                </a:solidFill>
+              </a:defRPr>
+            </a:lvl3pPr>
+            <a:lvl4pPr>
+              <a:defRPr>
+                <a:solidFill>
+                  <a:schemeClr val="dk1"/>
+                </a:solidFill>
+              </a:defRPr>
+            </a:lvl4pPr>
+            <a:lvl5pPr>
+              <a:defRPr>
+                <a:solidFill>
+                  <a:schemeClr val="dk1"/>
+                </a:solidFill>
+              </a:defRPr>
+            </a:lvl5pPr>
+            <a:lvl6pPr>
+              <a:defRPr>
+                <a:solidFill>
+                  <a:schemeClr val="dk1"/>
+                </a:solidFill>
+              </a:defRPr>
+            </a:lvl6pPr>
+            <a:lvl7pPr>
+              <a:defRPr>
+                <a:solidFill>
+                  <a:schemeClr val="dk1"/>
+                </a:solidFill>
+              </a:defRPr>
+            </a:lvl7pPr>
+            <a:lvl8pPr>
+              <a:defRPr>
+                <a:solidFill>
+                  <a:schemeClr val="dk1"/>
+                </a:solidFill>
+              </a:defRPr>
+            </a:lvl8pPr>
+            <a:lvl9pPr>
+              <a:defRPr>
+                <a:solidFill>
+                  <a:schemeClr val="dk1"/>
+                </a:solidFill>
+              </a:defRPr>
+            </a:lvl9pPr>
+          </a:lstStyle>
+          <a:p>
+            <a:pPr defTabSz="672130"/>
+            <a:r>
+              <a:rPr lang="en-US" sz="1176" b="0" dirty="0">
+                <a:solidFill>
+                  <a:prstClr val="black"/>
+                </a:solidFill>
+                <a:latin typeface="Exo 2 Medium" panose="00000600000000000000" pitchFamily="50" charset="0"/>
+              </a:rPr>
+              <a:t>Equipe</a:t>
+            </a:r>
+          </a:p>
+        </p:txBody>
+      </p:sp>
+      <p:sp>
+        <p:nvSpPr>
+          <p:cNvPr id="64" name="Retângulo 63"/>
+          <p:cNvSpPr/>
+          <p:nvPr/>
+        </p:nvSpPr>
+        <p:spPr>
+          <a:xfrm>
+            <a:off x="512766" y="868345"/>
+            <a:ext cx="6186608" cy="238150"/>
+          </a:xfrm>
+          <a:prstGeom prst="rect">
+            <a:avLst/>
+          </a:prstGeom>
+          <a:solidFill>
+            <a:schemeClr val="bg1">
+              <a:lumMod val="85000"/>
+            </a:schemeClr>
+          </a:solidFill>
+        </p:spPr>
+        <p:txBody>
+          <a:bodyPr vert="horz" lIns="134422" tIns="67211" rIns="134422" bIns="67211" rtlCol="0" anchor="ctr"/>
+          <a:lstStyle/>
+          <a:p>
+            <a:pPr defTabSz="672130"/>
+            <a:r>
+              <a:rPr lang="en-US" sz="1544" dirty="0">
+                <a:latin typeface="Exo 2 Medium" panose="00000600000000000000" pitchFamily="50" charset="0"/>
+                <a:ea typeface="Simplon Oi Headline" charset="0"/>
+                <a:cs typeface="Simplon Oi Headline" charset="0"/>
+              </a:rPr>
+              <a:t>Progressos c/ responsáveis </a:t>
+            </a:r>
+          </a:p>
+        </p:txBody>
+      </p:sp>
+      <p:sp>
+        <p:nvSpPr>
+          <p:cNvPr id="65" name="Retângulo 64"/>
+          <p:cNvSpPr/>
+          <p:nvPr/>
+        </p:nvSpPr>
+        <p:spPr>
+          <a:xfrm>
+            <a:off x="6814576" y="868344"/>
+            <a:ext cx="6244932" cy="250902"/>
+          </a:xfrm>
+          <a:prstGeom prst="rect">
+            <a:avLst/>
+          </a:prstGeom>
+          <a:solidFill>
+            <a:schemeClr val="bg1">
+              <a:lumMod val="85000"/>
+            </a:schemeClr>
+          </a:solidFill>
+        </p:spPr>
+        <p:txBody>
+          <a:bodyPr vert="horz" lIns="134422" tIns="67211" rIns="134422" bIns="67211" rtlCol="0" anchor="ctr"/>
+          <a:lstStyle/>
+          <a:p>
+            <a:pPr defTabSz="672130"/>
+            <a:r>
+              <a:rPr lang="pt-BR" sz="1544" dirty="0">
+                <a:latin typeface="Exo 2 Medium" panose="00000600000000000000" pitchFamily="50" charset="0"/>
+                <a:ea typeface="Simplon Oi Headline" charset="0"/>
+                <a:cs typeface="Simplon Oi Headline" charset="0"/>
+              </a:rPr>
+              <a:t>Pontos atenção/ Principais Riscos</a:t>
+            </a:r>
+          </a:p>
+        </p:txBody>
+      </p:sp>
+      <p:sp>
+        <p:nvSpPr>
+          <p:cNvPr id="66" name="Retângulo 65"/>
+          <p:cNvSpPr/>
+          <p:nvPr/>
+        </p:nvSpPr>
+        <p:spPr>
+          <a:xfrm>
+            <a:off x="528898" y="3479441"/>
+            <a:ext cx="12551972" cy="238150"/>
+          </a:xfrm>
+          <a:prstGeom prst="rect">
+            <a:avLst/>
+          </a:prstGeom>
+          <a:solidFill>
+            <a:schemeClr val="bg1">
+              <a:lumMod val="85000"/>
+            </a:schemeClr>
+          </a:solidFill>
+        </p:spPr>
+        <p:txBody>
+          <a:bodyPr vert="horz" lIns="134422" tIns="67211" rIns="134422" bIns="67211" rtlCol="0" anchor="ctr"/>
+          <a:lstStyle/>
+          <a:p>
+            <a:pPr defTabSz="672130"/>
+            <a:r>
+              <a:rPr lang="pt-BR" sz="1544" dirty="0">
+                <a:latin typeface="Exo 2 Medium" panose="00000600000000000000" pitchFamily="50" charset="0"/>
+                <a:ea typeface="Simplon Oi Headline" charset="0"/>
+                <a:cs typeface="Simplon Oi Headline" charset="0"/>
+              </a:rPr>
+              <a:t>Próximos Passos c/ responsáveis </a:t>
+            </a:r>
+          </a:p>
+        </p:txBody>
+      </p:sp>
+      <p:sp>
+        <p:nvSpPr>
+          <p:cNvPr id="63" name="Rectangle 37"/>
+          <p:cNvSpPr/>
+          <p:nvPr/>
+        </p:nvSpPr>
+        <p:spPr>
+          <a:xfrm>
+            <a:off x="496765" y="1106495"/>
+            <a:ext cx="6207777" cy="2235805"/>
+          </a:xfrm>
+          <a:prstGeom prst="rect">
+            <a:avLst/>
+          </a:prstGeom>
+          <a:noFill/>
+          <a:ln w="12700">
+            <a:solidFill>
+              <a:schemeClr val="bg1">
+                <a:lumMod val="50000"/>
+              </a:schemeClr>
+            </a:solidFill>
+          </a:ln>
+        </p:spPr>
+        <p:style>
+          <a:lnRef idx="2">
+            <a:schemeClr val="accent4"/>
+          </a:lnRef>
+          <a:fillRef idx="1">
+            <a:schemeClr val="lt1"/>
+          </a:fillRef>
+          <a:effectRef idx="0">
+            <a:schemeClr val="accent4"/>
+          </a:effectRef>
+          <a:fontRef idx="minor">
+            <a:schemeClr val="dk1"/>
+          </a:fontRef>
+        </p:style>
+        <p:txBody>
+          <a:bodyPr tIns="105844" rtlCol="0" anchor="t"/>
+          <a:lstStyle/>
+          <a:p>
+            <a:pPr marL="252049" indent="-252049" fontAlgn="base">
+              <a:spcBef>
+                <a:spcPct val="0"/>
+              </a:spcBef>
+              <a:buFont typeface="Wingdings" panose="05000000000000000000" pitchFamily="2" charset="2"/>
+              <a:buChar char="ü"/>
+              <a:defRPr/>
+            </a:pPr>
+            <a:r>
+              <a:rPr lang="pt-BR" sz="1323" dirty="0" err="1">
+                <a:solidFill>
+                  <a:schemeClr val="tx1"/>
+                </a:solidFill>
+                <a:latin typeface="Exo 2 Medium" panose="00000600000000000000" pitchFamily="50" charset="0"/>
+                <a:cs typeface="Simplon BP Regular"/>
+              </a:rPr>
+              <a:t>Codar</a:t>
+            </a:r>
+            <a:r>
+              <a:rPr lang="pt-BR" sz="1323" dirty="0">
+                <a:solidFill>
+                  <a:schemeClr val="tx1"/>
+                </a:solidFill>
+                <a:latin typeface="Exo 2 Medium" panose="00000600000000000000" pitchFamily="50" charset="0"/>
+                <a:cs typeface="Simplon BP Regular"/>
+              </a:rPr>
+              <a:t> as Telas</a:t>
+            </a:r>
+            <a:r>
+              <a:rPr lang="pt-BR" sz="1323" b="1" dirty="0">
+                <a:solidFill>
+                  <a:schemeClr val="tx1"/>
+                </a:solidFill>
+                <a:latin typeface="Exo 2 Medium" panose="00000600000000000000" pitchFamily="50" charset="0"/>
+                <a:cs typeface="Simplon BP Regular"/>
+              </a:rPr>
+              <a:t> #Grupo</a:t>
+            </a:r>
+          </a:p>
+          <a:p>
+            <a:pPr marL="252049" indent="-252049" fontAlgn="base">
+              <a:spcBef>
+                <a:spcPct val="0"/>
+              </a:spcBef>
+              <a:buFont typeface="Wingdings" panose="05000000000000000000" pitchFamily="2" charset="2"/>
+              <a:buChar char="ü"/>
+              <a:defRPr/>
+            </a:pPr>
+            <a:endParaRPr lang="pt-BR" sz="1323" b="1" dirty="0">
+              <a:solidFill>
+                <a:schemeClr val="tx1"/>
+              </a:solidFill>
+              <a:latin typeface="Exo 2 Medium" panose="00000600000000000000" pitchFamily="50" charset="0"/>
+              <a:cs typeface="Simplon BP Regular"/>
+            </a:endParaRPr>
+          </a:p>
+          <a:p>
+            <a:pPr marL="252049" indent="-252049" fontAlgn="base">
+              <a:spcBef>
+                <a:spcPct val="0"/>
+              </a:spcBef>
+              <a:buFont typeface="Wingdings" panose="05000000000000000000" pitchFamily="2" charset="2"/>
+              <a:buChar char="ü"/>
+              <a:defRPr/>
+            </a:pPr>
+            <a:r>
+              <a:rPr lang="pt-BR" sz="1323" dirty="0">
+                <a:solidFill>
+                  <a:schemeClr val="tx1"/>
+                </a:solidFill>
+                <a:latin typeface="Exo 2 Medium" panose="00000600000000000000" pitchFamily="50" charset="0"/>
+                <a:cs typeface="Simplon BP Regular"/>
+              </a:rPr>
+              <a:t>Reconfigurar o </a:t>
+            </a:r>
+            <a:r>
+              <a:rPr lang="pt-BR" sz="1323" dirty="0" err="1">
+                <a:solidFill>
+                  <a:schemeClr val="tx1"/>
+                </a:solidFill>
+                <a:latin typeface="Exo 2 Medium" panose="00000600000000000000" pitchFamily="50" charset="0"/>
+                <a:cs typeface="Simplon BP Regular"/>
+              </a:rPr>
+              <a:t>backlog</a:t>
+            </a:r>
+            <a:r>
+              <a:rPr lang="pt-BR" sz="1323" b="1" dirty="0">
+                <a:solidFill>
+                  <a:schemeClr val="tx1"/>
+                </a:solidFill>
+                <a:latin typeface="Exo 2 Medium" panose="00000600000000000000" pitchFamily="50" charset="0"/>
+                <a:cs typeface="Simplon BP Regular"/>
+              </a:rPr>
+              <a:t> #Grupo</a:t>
+            </a:r>
+          </a:p>
+          <a:p>
+            <a:pPr marL="252049" indent="-252049" fontAlgn="base">
+              <a:spcBef>
+                <a:spcPct val="0"/>
+              </a:spcBef>
+              <a:buFont typeface="Wingdings" panose="05000000000000000000" pitchFamily="2" charset="2"/>
+              <a:buChar char="ü"/>
+              <a:defRPr/>
+            </a:pPr>
+            <a:endParaRPr lang="pt-BR" sz="1323" b="1" dirty="0">
+              <a:solidFill>
+                <a:schemeClr val="tx1"/>
+              </a:solidFill>
+              <a:latin typeface="Exo 2 Medium" panose="00000600000000000000" pitchFamily="50" charset="0"/>
+              <a:cs typeface="Simplon BP Regular"/>
+            </a:endParaRPr>
+          </a:p>
+          <a:p>
+            <a:pPr marL="252049" indent="-252049" fontAlgn="base">
+              <a:spcBef>
+                <a:spcPct val="0"/>
+              </a:spcBef>
+              <a:buFont typeface="Wingdings" panose="05000000000000000000" pitchFamily="2" charset="2"/>
+              <a:buChar char="ü"/>
+              <a:defRPr/>
+            </a:pPr>
+            <a:endParaRPr lang="pt-BR" sz="1323" b="1" dirty="0">
+              <a:solidFill>
+                <a:schemeClr val="tx1"/>
+              </a:solidFill>
+              <a:latin typeface="Exo 2 Medium" panose="00000600000000000000" pitchFamily="50" charset="0"/>
+              <a:cs typeface="Simplon BP Regular"/>
+            </a:endParaRPr>
+          </a:p>
+        </p:txBody>
+      </p:sp>
+      <p:sp>
+        <p:nvSpPr>
+          <p:cNvPr id="2" name="Rectangle 43">
+            <a:extLst>
+              <a:ext uri="{FF2B5EF4-FFF2-40B4-BE49-F238E27FC236}">
+                <a16:creationId xmlns:a16="http://schemas.microsoft.com/office/drawing/2014/main" id="{B15BA19F-C787-4E6A-ADAB-C0DFF09C66A8}"/>
+              </a:ext>
+            </a:extLst>
+          </p:cNvPr>
+          <p:cNvSpPr>
+            <a:spLocks/>
+          </p:cNvSpPr>
+          <p:nvPr/>
+        </p:nvSpPr>
+        <p:spPr>
+          <a:xfrm>
+            <a:off x="493440" y="3717591"/>
+            <a:ext cx="12587430" cy="3634138"/>
+          </a:xfrm>
+          <a:prstGeom prst="rect">
+            <a:avLst/>
+          </a:prstGeom>
+          <a:noFill/>
+          <a:ln w="12700">
+            <a:solidFill>
+              <a:schemeClr val="bg1">
+                <a:lumMod val="50000"/>
+              </a:schemeClr>
+            </a:solidFill>
+          </a:ln>
+        </p:spPr>
+        <p:style>
+          <a:lnRef idx="2">
+            <a:schemeClr val="accent4"/>
+          </a:lnRef>
+          <a:fillRef idx="1">
+            <a:schemeClr val="lt1"/>
+          </a:fillRef>
+          <a:effectRef idx="0">
+            <a:schemeClr val="accent4"/>
+          </a:effectRef>
+          <a:fontRef idx="minor">
+            <a:schemeClr val="dk1"/>
+          </a:fontRef>
+        </p:style>
+        <p:txBody>
+          <a:bodyPr wrap="square" tIns="105844" numCol="3" rtlCol="0" anchor="t"/>
+          <a:lstStyle/>
+          <a:p>
+            <a:pPr marL="0" lvl="1" defTabSz="672130"/>
+            <a:r>
+              <a:rPr lang="pt-BR" sz="1323" b="1" dirty="0">
+                <a:solidFill>
+                  <a:schemeClr val="tx1"/>
+                </a:solidFill>
+                <a:latin typeface="Exo 2 Medium" panose="00000600000000000000" pitchFamily="50" charset="0"/>
+                <a:cs typeface="Simplon BP Regular"/>
+              </a:rPr>
+              <a:t>Frente Plataforma</a:t>
+            </a:r>
+          </a:p>
+          <a:p>
+            <a:pPr marL="0" lvl="1" defTabSz="672130"/>
+            <a:endParaRPr lang="pt-BR" sz="1323" b="1" dirty="0">
+              <a:solidFill>
+                <a:schemeClr val="tx1"/>
+              </a:solidFill>
+              <a:latin typeface="Exo 2 Medium" panose="00000600000000000000" pitchFamily="50" charset="0"/>
+              <a:cs typeface="Simplon BP Regular"/>
+            </a:endParaRPr>
+          </a:p>
+          <a:p>
+            <a:pPr marL="0" lvl="1" defTabSz="672130"/>
+            <a:r>
+              <a:rPr lang="pt-BR" sz="1323" b="1" dirty="0">
+                <a:solidFill>
+                  <a:schemeClr val="tx1"/>
+                </a:solidFill>
+                <a:latin typeface="Exo 2 Medium" panose="00000600000000000000" pitchFamily="50" charset="0"/>
+                <a:cs typeface="Simplon BP Regular"/>
+              </a:rPr>
+              <a:t>Frente Back-End</a:t>
+            </a:r>
+          </a:p>
+          <a:p>
+            <a:pPr marL="0" lvl="1" indent="-252049">
+              <a:buFont typeface="Wingdings" panose="05000000000000000000" pitchFamily="2" charset="2"/>
+              <a:buChar char="§"/>
+            </a:pPr>
+            <a:r>
+              <a:rPr lang="pt-BR" sz="1323" b="1" dirty="0">
+                <a:solidFill>
+                  <a:schemeClr val="tx1"/>
+                </a:solidFill>
+                <a:latin typeface="Exo 2 Medium" panose="00000600000000000000" pitchFamily="50" charset="0"/>
+                <a:cs typeface="Simplon BP Regular"/>
+              </a:rPr>
+              <a:t>Configurar </a:t>
+            </a:r>
+            <a:r>
+              <a:rPr lang="pt-BR" sz="1323" b="1" dirty="0" err="1">
+                <a:solidFill>
+                  <a:schemeClr val="tx1"/>
+                </a:solidFill>
+                <a:latin typeface="Exo 2 Medium" panose="00000600000000000000" pitchFamily="50" charset="0"/>
+                <a:cs typeface="Simplon BP Regular"/>
+              </a:rPr>
+              <a:t>Cloud</a:t>
+            </a:r>
+            <a:endParaRPr lang="pt-BR" sz="1323" b="1" dirty="0">
+              <a:solidFill>
+                <a:schemeClr val="tx1"/>
+              </a:solidFill>
+              <a:latin typeface="Exo 2 Medium" panose="00000600000000000000" pitchFamily="50" charset="0"/>
+              <a:cs typeface="Simplon BP Regular"/>
+            </a:endParaRPr>
+          </a:p>
+          <a:p>
+            <a:pPr marL="0" lvl="1" indent="-252049">
+              <a:buFont typeface="Wingdings" panose="05000000000000000000" pitchFamily="2" charset="2"/>
+              <a:buChar char="§"/>
+            </a:pPr>
+            <a:r>
+              <a:rPr lang="pt-BR" sz="1323" b="1" dirty="0" err="1">
+                <a:solidFill>
+                  <a:schemeClr val="tx1"/>
+                </a:solidFill>
+                <a:latin typeface="Exo 2 Medium" panose="00000600000000000000" pitchFamily="50" charset="0"/>
+                <a:cs typeface="Simplon BP Regular"/>
+              </a:rPr>
+              <a:t>Codar</a:t>
+            </a:r>
+            <a:r>
+              <a:rPr lang="pt-BR" sz="1323" b="1" dirty="0">
+                <a:solidFill>
+                  <a:schemeClr val="tx1"/>
+                </a:solidFill>
+                <a:latin typeface="Exo 2 Medium" panose="00000600000000000000" pitchFamily="50" charset="0"/>
+                <a:cs typeface="Simplon BP Regular"/>
+              </a:rPr>
+              <a:t> as Telas e configurar a funções #Grupo</a:t>
+            </a:r>
+          </a:p>
+          <a:p>
+            <a:pPr marL="0" lvl="1" defTabSz="672130"/>
+            <a:r>
+              <a:rPr lang="pt-BR" sz="1323" b="1" dirty="0">
+                <a:solidFill>
+                  <a:schemeClr val="tx1"/>
+                </a:solidFill>
+                <a:latin typeface="Exo 2 Medium" panose="00000600000000000000" pitchFamily="50" charset="0"/>
+                <a:cs typeface="Simplon BP Regular"/>
+              </a:rPr>
+              <a:t>Frente Front-End</a:t>
+            </a:r>
+          </a:p>
+          <a:p>
+            <a:pPr marL="285750" lvl="1" indent="-285750" defTabSz="672130">
+              <a:buFont typeface="Wingdings" panose="05000000000000000000" pitchFamily="2" charset="2"/>
+              <a:buChar char="§"/>
+            </a:pPr>
+            <a:br>
+              <a:rPr lang="pt-BR" sz="1200" b="1" dirty="0">
+                <a:solidFill>
+                  <a:schemeClr val="tx1"/>
+                </a:solidFill>
+                <a:latin typeface="Exo 2 Medium" panose="00000600000000000000" pitchFamily="50" charset="0"/>
+                <a:cs typeface="Simplon BP Regular"/>
+              </a:rPr>
+            </a:br>
+            <a:endParaRPr lang="pt-BR" sz="1200" b="1" dirty="0">
+              <a:solidFill>
+                <a:schemeClr val="tx1"/>
+              </a:solidFill>
+              <a:latin typeface="Exo 2 Medium" panose="00000600000000000000" pitchFamily="50" charset="0"/>
+              <a:cs typeface="Simplon BP Regular"/>
+            </a:endParaRPr>
+          </a:p>
+          <a:p>
+            <a:pPr marL="0" lvl="1" defTabSz="672130"/>
+            <a:r>
+              <a:rPr lang="pt-BR" sz="1320" b="1" dirty="0">
+                <a:solidFill>
+                  <a:schemeClr val="tx1"/>
+                </a:solidFill>
+                <a:latin typeface="Exo 2 Medium" panose="00000600000000000000" pitchFamily="50" charset="0"/>
+                <a:cs typeface="Simplon BP Regular"/>
+              </a:rPr>
+              <a:t>Frente Negócios</a:t>
+            </a:r>
+          </a:p>
+          <a:p>
+            <a:pPr marL="285750" lvl="1" indent="-285750" defTabSz="672130">
+              <a:buFont typeface="Wingdings" pitchFamily="2" charset="2"/>
+              <a:buChar char="§"/>
+            </a:pPr>
+            <a:r>
+              <a:rPr lang="pt-BR" sz="1320" b="1" dirty="0">
+                <a:solidFill>
+                  <a:schemeClr val="tx1"/>
+                </a:solidFill>
+                <a:latin typeface="Exo 2 Medium" panose="00000600000000000000" pitchFamily="50" charset="0"/>
+                <a:cs typeface="Simplon BP Regular"/>
+              </a:rPr>
+              <a:t>Concluir PPT de Apresentação para Sprint 2 #Grupo</a:t>
+            </a:r>
+          </a:p>
+          <a:p>
+            <a:pPr marL="285750" lvl="1" indent="-285750" defTabSz="672130">
+              <a:buFont typeface="Wingdings" pitchFamily="2" charset="2"/>
+              <a:buChar char="§"/>
+            </a:pPr>
+            <a:r>
+              <a:rPr lang="pt-BR" sz="1320" b="1" dirty="0" err="1">
+                <a:solidFill>
+                  <a:schemeClr val="tx1"/>
+                </a:solidFill>
+                <a:latin typeface="Exo 2 Medium" panose="00000600000000000000" pitchFamily="50" charset="0"/>
+                <a:cs typeface="Simplon BP Regular"/>
+              </a:rPr>
+              <a:t>Revisao</a:t>
+            </a:r>
+            <a:r>
+              <a:rPr lang="pt-BR" sz="1320" b="1" dirty="0">
+                <a:solidFill>
+                  <a:schemeClr val="tx1"/>
+                </a:solidFill>
+                <a:latin typeface="Exo 2 Medium" panose="00000600000000000000" pitchFamily="50" charset="0"/>
+                <a:cs typeface="Simplon BP Regular"/>
+              </a:rPr>
+              <a:t> de negocio</a:t>
+            </a:r>
+          </a:p>
+          <a:p>
+            <a:pPr marL="0" lvl="1" defTabSz="672130"/>
+            <a:endParaRPr lang="pt-BR" sz="1320" b="1" dirty="0">
+              <a:solidFill>
+                <a:schemeClr val="tx1"/>
+              </a:solidFill>
+              <a:latin typeface="Exo 2 Medium" panose="00000600000000000000" pitchFamily="50" charset="0"/>
+              <a:cs typeface="Simplon BP Regular"/>
+            </a:endParaRPr>
+          </a:p>
+          <a:p>
+            <a:pPr marL="285750" lvl="1" indent="-285750" defTabSz="672130">
+              <a:buFont typeface="Wingdings" pitchFamily="2" charset="2"/>
+              <a:buChar char="§"/>
+            </a:pPr>
+            <a:endParaRPr lang="pt-BR" sz="1320" b="1" dirty="0">
+              <a:solidFill>
+                <a:schemeClr val="tx1"/>
+              </a:solidFill>
+              <a:latin typeface="Exo 2 Medium" panose="00000600000000000000" pitchFamily="50" charset="0"/>
+              <a:cs typeface="Simplon BP Regular"/>
+            </a:endParaRPr>
+          </a:p>
+          <a:p>
+            <a:pPr marL="285750" lvl="1" indent="-285750" defTabSz="672130">
+              <a:buFont typeface="Wingdings" pitchFamily="2" charset="2"/>
+              <a:buChar char="§"/>
+            </a:pPr>
+            <a:endParaRPr lang="pt-BR" sz="1320" b="1" dirty="0">
+              <a:solidFill>
+                <a:schemeClr val="tx1"/>
+              </a:solidFill>
+              <a:latin typeface="Exo 2 Medium" panose="00000600000000000000" pitchFamily="50" charset="0"/>
+              <a:cs typeface="Simplon BP Regular"/>
+            </a:endParaRPr>
+          </a:p>
+          <a:p>
+            <a:pPr marL="0" lvl="1"/>
+            <a:endParaRPr lang="pt-BR" sz="1320" b="1" dirty="0">
+              <a:solidFill>
+                <a:schemeClr val="tx1"/>
+              </a:solidFill>
+              <a:latin typeface="Exo 2 Medium" panose="00000600000000000000" pitchFamily="50" charset="0"/>
+              <a:cs typeface="Simplon BP Regular"/>
+            </a:endParaRPr>
+          </a:p>
+        </p:txBody>
+      </p:sp>
+      <p:sp>
+        <p:nvSpPr>
+          <p:cNvPr id="6" name="Oval 134">
+            <a:extLst>
+              <a:ext uri="{FF2B5EF4-FFF2-40B4-BE49-F238E27FC236}">
+                <a16:creationId xmlns:a16="http://schemas.microsoft.com/office/drawing/2014/main" id="{70825C6F-9257-4CF5-8C62-1CA1EB2F8815}"/>
+              </a:ext>
+            </a:extLst>
+          </p:cNvPr>
+          <p:cNvSpPr>
+            <a:spLocks noChangeAspect="1"/>
+          </p:cNvSpPr>
+          <p:nvPr/>
+        </p:nvSpPr>
+        <p:spPr>
+          <a:xfrm>
+            <a:off x="9323960" y="269355"/>
+            <a:ext cx="211404" cy="211689"/>
+          </a:xfrm>
+          <a:prstGeom prst="ellipse">
+            <a:avLst/>
+          </a:prstGeom>
+          <a:solidFill>
+            <a:srgbClr val="FFFF00"/>
+          </a:solidFill>
+          <a:ln w="12700">
+            <a:solidFill>
+              <a:schemeClr val="accent3"/>
+            </a:solidFill>
+          </a:ln>
+        </p:spPr>
+        <p:style>
+          <a:lnRef idx="2">
+            <a:schemeClr val="accent1">
+              <a:shade val="50000"/>
+            </a:schemeClr>
+          </a:lnRef>
+          <a:fillRef idx="1">
+            <a:schemeClr val="accent1"/>
+          </a:fillRef>
+          <a:effectRef idx="0">
+            <a:schemeClr val="accent1"/>
+          </a:effectRef>
+          <a:fontRef idx="minor">
+            <a:schemeClr val="lt1"/>
+          </a:fontRef>
+        </p:style>
+        <p:txBody>
+          <a:bodyPr wrap="none" lIns="52922" tIns="52922" rIns="52922" rtlCol="0" anchor="ctr"/>
+          <a:lstStyle/>
+          <a:p>
+            <a:pPr algn="ctr" defTabSz="672130"/>
+            <a:endParaRPr lang="en-US" sz="1176" dirty="0">
+              <a:ln>
+                <a:solidFill>
+                  <a:srgbClr val="00B050"/>
+                </a:solidFill>
+              </a:ln>
+              <a:solidFill>
+                <a:srgbClr val="1BCF13"/>
+              </a:solidFill>
+              <a:highlight>
+                <a:srgbClr val="00FF00"/>
+              </a:highlight>
+              <a:latin typeface="Exo 2 Medium" panose="00000600000000000000" pitchFamily="50" charset="0"/>
+              <a:cs typeface="Simplon BP Regular"/>
+            </a:endParaRPr>
+          </a:p>
+        </p:txBody>
+      </p:sp>
+      <p:sp>
+        <p:nvSpPr>
+          <p:cNvPr id="9" name="Oval 134">
+            <a:extLst>
+              <a:ext uri="{FF2B5EF4-FFF2-40B4-BE49-F238E27FC236}">
+                <a16:creationId xmlns:a16="http://schemas.microsoft.com/office/drawing/2014/main" id="{B60B13C9-0C70-4C0F-82B2-D0CD4FDFC1F0}"/>
+              </a:ext>
+            </a:extLst>
+          </p:cNvPr>
+          <p:cNvSpPr>
+            <a:spLocks noChangeAspect="1"/>
+          </p:cNvSpPr>
+          <p:nvPr/>
+        </p:nvSpPr>
+        <p:spPr>
+          <a:xfrm>
+            <a:off x="12155999" y="297930"/>
+            <a:ext cx="211404" cy="211689"/>
+          </a:xfrm>
+          <a:prstGeom prst="ellipse">
+            <a:avLst/>
+          </a:prstGeom>
+          <a:solidFill>
+            <a:srgbClr val="1BCF13"/>
+          </a:solidFill>
+          <a:ln w="12700">
+            <a:solidFill>
+              <a:schemeClr val="accent3"/>
+            </a:solidFill>
+          </a:ln>
+        </p:spPr>
+        <p:style>
+          <a:lnRef idx="2">
+            <a:schemeClr val="accent1">
+              <a:shade val="50000"/>
+            </a:schemeClr>
+          </a:lnRef>
+          <a:fillRef idx="1">
+            <a:schemeClr val="accent1"/>
+          </a:fillRef>
+          <a:effectRef idx="0">
+            <a:schemeClr val="accent1"/>
+          </a:effectRef>
+          <a:fontRef idx="minor">
+            <a:schemeClr val="lt1"/>
+          </a:fontRef>
+        </p:style>
+        <p:txBody>
+          <a:bodyPr wrap="none" lIns="52922" tIns="52922" rIns="52922" rtlCol="0" anchor="ctr"/>
+          <a:lstStyle/>
+          <a:p>
+            <a:pPr algn="ctr" defTabSz="672130"/>
+            <a:endParaRPr lang="en-US" sz="1176" dirty="0">
+              <a:solidFill>
+                <a:prstClr val="black"/>
+              </a:solidFill>
+              <a:latin typeface="Exo 2 Medium" panose="00000600000000000000" pitchFamily="50" charset="0"/>
+              <a:cs typeface="Simplon BP Regular"/>
+            </a:endParaRPr>
+          </a:p>
+        </p:txBody>
+      </p:sp>
+      <p:sp>
+        <p:nvSpPr>
+          <p:cNvPr id="5" name="Retângulo 4">
+            <a:extLst>
+              <a:ext uri="{FF2B5EF4-FFF2-40B4-BE49-F238E27FC236}">
+                <a16:creationId xmlns:a16="http://schemas.microsoft.com/office/drawing/2014/main" id="{A1C14918-6027-46B3-96BF-C5F7FDEC3276}"/>
+              </a:ext>
+            </a:extLst>
+          </p:cNvPr>
+          <p:cNvSpPr/>
+          <p:nvPr/>
+        </p:nvSpPr>
+        <p:spPr>
+          <a:xfrm>
+            <a:off x="8017619" y="209534"/>
+            <a:ext cx="5041889" cy="618769"/>
+          </a:xfrm>
+          <a:prstGeom prst="rect">
+            <a:avLst/>
+          </a:prstGeom>
+          <a:noFill/>
+          <a:ln w="6350">
+            <a:solidFill>
+              <a:schemeClr val="bg1">
+                <a:lumMod val="75000"/>
+              </a:schemeClr>
+            </a:solidFill>
+          </a:ln>
+        </p:spPr>
+        <p:style>
+          <a:lnRef idx="2">
+            <a:schemeClr val="accent1">
+              <a:shade val="50000"/>
+            </a:schemeClr>
+          </a:lnRef>
+          <a:fillRef idx="1">
+            <a:schemeClr val="accent1"/>
+          </a:fillRef>
+          <a:effectRef idx="0">
+            <a:schemeClr val="accent1"/>
+          </a:effectRef>
+          <a:fontRef idx="minor">
+            <a:schemeClr val="lt1"/>
+          </a:fontRef>
+        </p:style>
+        <p:txBody>
+          <a:bodyPr rtlCol="0" anchor="ctr"/>
+          <a:lstStyle/>
+          <a:p>
+            <a:pPr algn="ctr"/>
+            <a:endParaRPr lang="pt-BR">
+              <a:latin typeface="Exo 2 Medium" panose="00000600000000000000" pitchFamily="50" charset="0"/>
+            </a:endParaRPr>
+          </a:p>
+        </p:txBody>
+      </p:sp>
+      <p:sp>
+        <p:nvSpPr>
+          <p:cNvPr id="8" name="TextBox 138">
+            <a:extLst>
+              <a:ext uri="{FF2B5EF4-FFF2-40B4-BE49-F238E27FC236}">
+                <a16:creationId xmlns:a16="http://schemas.microsoft.com/office/drawing/2014/main" id="{5CE7D08C-795B-4BF1-97F6-F9773F4E9F4C}"/>
+              </a:ext>
+            </a:extLst>
+          </p:cNvPr>
+          <p:cNvSpPr txBox="1"/>
+          <p:nvPr/>
+        </p:nvSpPr>
+        <p:spPr>
+          <a:xfrm>
+            <a:off x="9715810" y="51570"/>
+            <a:ext cx="1478088" cy="211688"/>
+          </a:xfrm>
+          <a:prstGeom prst="rect">
+            <a:avLst/>
+          </a:prstGeom>
+          <a:solidFill>
+            <a:schemeClr val="bg1"/>
+          </a:solidFill>
+          <a:ln w="12700">
+            <a:noFill/>
+          </a:ln>
+        </p:spPr>
+        <p:style>
+          <a:lnRef idx="2">
+            <a:schemeClr val="accent4"/>
+          </a:lnRef>
+          <a:fillRef idx="1">
+            <a:schemeClr val="lt1"/>
+          </a:fillRef>
+          <a:effectRef idx="0">
+            <a:schemeClr val="accent4"/>
+          </a:effectRef>
+          <a:fontRef idx="minor">
+            <a:schemeClr val="dk1"/>
+          </a:fontRef>
+        </p:style>
+        <p:txBody>
+          <a:bodyPr wrap="none" lIns="52922" tIns="52922" rIns="52922" bIns="0" rtlCol="0" anchor="b"/>
+          <a:lstStyle>
+            <a:defPPr>
+              <a:defRPr lang="en-US"/>
+            </a:defPPr>
+            <a:lvl1pPr algn="ctr">
+              <a:defRPr sz="1000" b="1">
+                <a:latin typeface="Simplon BP Regular"/>
+                <a:cs typeface="Simplon BP Regular"/>
+              </a:defRPr>
+            </a:lvl1pPr>
+            <a:lvl2pPr>
+              <a:defRPr>
+                <a:solidFill>
+                  <a:schemeClr val="dk1"/>
+                </a:solidFill>
+              </a:defRPr>
+            </a:lvl2pPr>
+            <a:lvl3pPr>
+              <a:defRPr>
+                <a:solidFill>
+                  <a:schemeClr val="dk1"/>
+                </a:solidFill>
+              </a:defRPr>
+            </a:lvl3pPr>
+            <a:lvl4pPr>
+              <a:defRPr>
+                <a:solidFill>
+                  <a:schemeClr val="dk1"/>
+                </a:solidFill>
+              </a:defRPr>
+            </a:lvl4pPr>
+            <a:lvl5pPr>
+              <a:defRPr>
+                <a:solidFill>
+                  <a:schemeClr val="dk1"/>
+                </a:solidFill>
+              </a:defRPr>
+            </a:lvl5pPr>
+            <a:lvl6pPr>
+              <a:defRPr>
+                <a:solidFill>
+                  <a:schemeClr val="dk1"/>
+                </a:solidFill>
+              </a:defRPr>
+            </a:lvl6pPr>
+            <a:lvl7pPr>
+              <a:defRPr>
+                <a:solidFill>
+                  <a:schemeClr val="dk1"/>
+                </a:solidFill>
+              </a:defRPr>
+            </a:lvl7pPr>
+            <a:lvl8pPr>
+              <a:defRPr>
+                <a:solidFill>
+                  <a:schemeClr val="dk1"/>
+                </a:solidFill>
+              </a:defRPr>
+            </a:lvl8pPr>
+            <a:lvl9pPr>
+              <a:defRPr>
+                <a:solidFill>
+                  <a:schemeClr val="dk1"/>
+                </a:solidFill>
+              </a:defRPr>
+            </a:lvl9pPr>
+          </a:lstStyle>
+          <a:p>
+            <a:pPr defTabSz="672130"/>
+            <a:r>
+              <a:rPr lang="en-US" sz="1176" b="0" dirty="0">
+                <a:solidFill>
+                  <a:prstClr val="black"/>
+                </a:solidFill>
+                <a:latin typeface="Exo 2 Medium" panose="00000600000000000000" pitchFamily="50" charset="0"/>
+              </a:rPr>
+              <a:t>    Farol do Projeto   </a:t>
+            </a:r>
+          </a:p>
+        </p:txBody>
+      </p:sp>
+      <p:sp>
+        <p:nvSpPr>
+          <p:cNvPr id="22" name="Oval 120">
+            <a:extLst>
+              <a:ext uri="{FF2B5EF4-FFF2-40B4-BE49-F238E27FC236}">
+                <a16:creationId xmlns:a16="http://schemas.microsoft.com/office/drawing/2014/main" id="{CCFA3F41-39FA-48EC-9FEC-A2A8A34BADB1}"/>
+              </a:ext>
+            </a:extLst>
+          </p:cNvPr>
+          <p:cNvSpPr>
+            <a:spLocks noChangeAspect="1"/>
+          </p:cNvSpPr>
+          <p:nvPr/>
+        </p:nvSpPr>
+        <p:spPr>
+          <a:xfrm>
+            <a:off x="9330787" y="284377"/>
+            <a:ext cx="211404" cy="211689"/>
+          </a:xfrm>
+          <a:prstGeom prst="ellipse">
+            <a:avLst/>
+          </a:prstGeom>
+          <a:solidFill>
+            <a:srgbClr val="1BCF13"/>
+          </a:solidFill>
+          <a:ln w="12700">
+            <a:solidFill>
+              <a:schemeClr val="accent3"/>
+            </a:solidFill>
+          </a:ln>
+        </p:spPr>
+        <p:style>
+          <a:lnRef idx="2">
+            <a:schemeClr val="accent1">
+              <a:shade val="50000"/>
+            </a:schemeClr>
+          </a:lnRef>
+          <a:fillRef idx="1">
+            <a:schemeClr val="accent1"/>
+          </a:fillRef>
+          <a:effectRef idx="0">
+            <a:schemeClr val="accent1"/>
+          </a:effectRef>
+          <a:fontRef idx="minor">
+            <a:schemeClr val="lt1"/>
+          </a:fontRef>
+        </p:style>
+        <p:txBody>
+          <a:bodyPr wrap="none" lIns="52922" tIns="52922" rIns="52922" rtlCol="0" anchor="ctr"/>
+          <a:lstStyle/>
+          <a:p>
+            <a:pPr algn="ctr" defTabSz="672130"/>
+            <a:endParaRPr lang="en-US" sz="1176" dirty="0">
+              <a:solidFill>
+                <a:prstClr val="black"/>
+              </a:solidFill>
+              <a:latin typeface="Exo 2 Medium" panose="00000600000000000000" pitchFamily="50" charset="0"/>
+              <a:cs typeface="Simplon BP Regular"/>
+            </a:endParaRPr>
+          </a:p>
+        </p:txBody>
+      </p:sp>
+      <p:sp>
+        <p:nvSpPr>
+          <p:cNvPr id="24" name="Oval 120">
+            <a:extLst>
+              <a:ext uri="{FF2B5EF4-FFF2-40B4-BE49-F238E27FC236}">
+                <a16:creationId xmlns:a16="http://schemas.microsoft.com/office/drawing/2014/main" id="{812564AE-899E-044A-B29B-2188F7BA8C60}"/>
+              </a:ext>
+            </a:extLst>
+          </p:cNvPr>
+          <p:cNvSpPr>
+            <a:spLocks noChangeAspect="1"/>
+          </p:cNvSpPr>
+          <p:nvPr/>
+        </p:nvSpPr>
+        <p:spPr>
+          <a:xfrm>
+            <a:off x="10180359" y="314020"/>
+            <a:ext cx="211404" cy="211689"/>
+          </a:xfrm>
+          <a:prstGeom prst="ellipse">
+            <a:avLst/>
+          </a:prstGeom>
+          <a:solidFill>
+            <a:srgbClr val="1BCF13"/>
+          </a:solidFill>
+          <a:ln w="12700">
+            <a:solidFill>
+              <a:schemeClr val="accent3"/>
+            </a:solidFill>
+          </a:ln>
+        </p:spPr>
+        <p:style>
+          <a:lnRef idx="2">
+            <a:schemeClr val="accent1">
+              <a:shade val="50000"/>
+            </a:schemeClr>
+          </a:lnRef>
+          <a:fillRef idx="1">
+            <a:schemeClr val="accent1"/>
+          </a:fillRef>
+          <a:effectRef idx="0">
+            <a:schemeClr val="accent1"/>
+          </a:effectRef>
+          <a:fontRef idx="minor">
+            <a:schemeClr val="lt1"/>
+          </a:fontRef>
+        </p:style>
+        <p:txBody>
+          <a:bodyPr wrap="none" lIns="52922" tIns="52922" rIns="52922" rtlCol="0" anchor="ctr"/>
+          <a:lstStyle/>
+          <a:p>
+            <a:pPr algn="ctr" defTabSz="672130"/>
+            <a:endParaRPr lang="en-US" sz="1176" dirty="0">
+              <a:solidFill>
+                <a:prstClr val="black"/>
+              </a:solidFill>
+              <a:latin typeface="Exo 2 Medium" panose="00000600000000000000" pitchFamily="50" charset="0"/>
+              <a:cs typeface="Simplon BP Regular"/>
+            </a:endParaRPr>
+          </a:p>
+        </p:txBody>
+      </p:sp>
+    </p:spTree>
+    <p:extLst>
+      <p:ext uri="{BB962C8B-B14F-4D97-AF65-F5344CB8AC3E}">
+        <p14:creationId xmlns:p14="http://schemas.microsoft.com/office/powerpoint/2010/main" val="3036296891"/>
       </p:ext>
     </p:extLst>
   </p:cSld>
@@ -49838,18 +51752,18 @@
 </file>
 
 <file path=customXml/item1.xml><?xml version="1.0" encoding="utf-8"?>
+<p:properties xmlns:p="http://schemas.microsoft.com/office/2006/metadata/properties" xmlns:xsi="http://www.w3.org/2001/XMLSchema-instance" xmlns:pc="http://schemas.microsoft.com/office/infopath/2007/PartnerControls">
+  <documentManagement/>
+</p:properties>
+</file>
+
+<file path=customXml/item2.xml><?xml version="1.0" encoding="utf-8"?>
 <?mso-contentType ?>
 <FormTemplates xmlns="http://schemas.microsoft.com/sharepoint/v3/contenttype/forms">
   <Display>DocumentLibraryForm</Display>
   <Edit>DocumentLibraryForm</Edit>
   <New>DocumentLibraryForm</New>
 </FormTemplates>
-</file>
-
-<file path=customXml/item2.xml><?xml version="1.0" encoding="utf-8"?>
-<p:properties xmlns:p="http://schemas.microsoft.com/office/2006/metadata/properties" xmlns:xsi="http://www.w3.org/2001/XMLSchema-instance" xmlns:pc="http://schemas.microsoft.com/office/infopath/2007/PartnerControls">
-  <documentManagement/>
-</p:properties>
 </file>
 
 <file path=customXml/item3.xml><?xml version="1.0" encoding="utf-8"?>
@@ -49967,14 +51881,6 @@
 </file>
 
 <file path=customXml/itemProps1.xml><?xml version="1.0" encoding="utf-8"?>
-<ds:datastoreItem xmlns:ds="http://schemas.openxmlformats.org/officeDocument/2006/customXml" ds:itemID="{E2481852-F24E-4532-AF30-C154D705D105}">
-  <ds:schemaRefs>
-    <ds:schemaRef ds:uri="http://schemas.microsoft.com/sharepoint/v3/contenttype/forms"/>
-  </ds:schemaRefs>
-</ds:datastoreItem>
-</file>
-
-<file path=customXml/itemProps2.xml><?xml version="1.0" encoding="utf-8"?>
 <ds:datastoreItem xmlns:ds="http://schemas.openxmlformats.org/officeDocument/2006/customXml" ds:itemID="{4B31267F-D399-4A8A-87F8-B75F56828412}">
   <ds:schemaRefs>
     <ds:schemaRef ds:uri="http://www.w3.org/XML/1998/namespace"/>
@@ -49987,6 +51893,14 @@
     <ds:schemaRef ds:uri="http://schemas.openxmlformats.org/package/2006/metadata/core-properties"/>
     <ds:schemaRef ds:uri="http://schemas.microsoft.com/office/2006/metadata/properties"/>
     <ds:schemaRef ds:uri="http://purl.org/dc/terms/"/>
+  </ds:schemaRefs>
+</ds:datastoreItem>
+</file>
+
+<file path=customXml/itemProps2.xml><?xml version="1.0" encoding="utf-8"?>
+<ds:datastoreItem xmlns:ds="http://schemas.openxmlformats.org/officeDocument/2006/customXml" ds:itemID="{E2481852-F24E-4532-AF30-C154D705D105}">
+  <ds:schemaRefs>
+    <ds:schemaRef ds:uri="http://schemas.microsoft.com/sharepoint/v3/contenttype/forms"/>
   </ds:schemaRefs>
 </ds:datastoreItem>
 </file>

</xml_diff>

<commit_message>
[mobile]Inicio do agendamento com banco
</commit_message>
<xml_diff>
--- a/documentacao/status-report/Status_Report_-_Grupo_09.pptx
+++ b/documentacao/status-report/Status_Report_-_Grupo_09.pptx
@@ -7,10 +7,10 @@
     <p:sldMasterId id="2147483665" r:id="rId6"/>
   </p:sldMasterIdLst>
   <p:notesMasterIdLst>
-    <p:notesMasterId r:id="rId22"/>
+    <p:notesMasterId r:id="rId23"/>
   </p:notesMasterIdLst>
   <p:handoutMasterIdLst>
-    <p:handoutMasterId r:id="rId23"/>
+    <p:handoutMasterId r:id="rId24"/>
   </p:handoutMasterIdLst>
   <p:sldIdLst>
     <p:sldId id="344" r:id="rId7"/>
@@ -28,6 +28,7 @@
     <p:sldId id="482" r:id="rId19"/>
     <p:sldId id="483" r:id="rId20"/>
     <p:sldId id="484" r:id="rId21"/>
+    <p:sldId id="485" r:id="rId22"/>
   </p:sldIdLst>
   <p:sldSz cx="13442950" cy="7561263"/>
   <p:notesSz cx="7104063" cy="10234613"/>
@@ -149,6 +150,7 @@
             <p14:sldId id="482"/>
             <p14:sldId id="483"/>
             <p14:sldId id="484"/>
+            <p14:sldId id="485"/>
           </p14:sldIdLst>
         </p14:section>
       </p14:sectionLst>
@@ -447,7 +449,7 @@
             <a:fld id="{C3CD65D1-5C11-455D-9F9A-0E035F00A0DA}" type="datetimeFigureOut">
               <a:rPr lang="pt-BR" smtClean="0"/>
               <a:pPr/>
-              <a:t>05/04/2022</a:t>
+              <a:t>03/05/2022</a:t>
             </a:fld>
             <a:endParaRPr lang="pt-BR"/>
           </a:p>
@@ -615,7 +617,7 @@
             <a:fld id="{A05DA3EF-18EA-43DE-B1BB-402A3C558822}" type="datetimeFigureOut">
               <a:rPr lang="pt-BR" smtClean="0"/>
               <a:pPr/>
-              <a:t>05/04/2022</a:t>
+              <a:t>03/05/2022</a:t>
             </a:fld>
             <a:endParaRPr lang="pt-BR"/>
           </a:p>
@@ -1520,6 +1522,99 @@
     <p:extLst>
       <p:ext uri="{BB962C8B-B14F-4D97-AF65-F5344CB8AC3E}">
         <p14:creationId xmlns:p14="http://schemas.microsoft.com/office/powerpoint/2010/main" val="732586118"/>
+      </p:ext>
+    </p:extLst>
+  </p:cSld>
+  <p:clrMapOvr>
+    <a:masterClrMapping/>
+  </p:clrMapOvr>
+</p:notes>
+</file>
+
+<file path=ppt/notesSlides/notesSlide16.xml><?xml version="1.0" encoding="utf-8"?>
+<p:notes xmlns:a="http://schemas.openxmlformats.org/drawingml/2006/main" xmlns:r="http://schemas.openxmlformats.org/officeDocument/2006/relationships" xmlns:p="http://schemas.openxmlformats.org/presentationml/2006/main">
+  <p:cSld>
+    <p:spTree>
+      <p:nvGrpSpPr>
+        <p:cNvPr id="1" name=""/>
+        <p:cNvGrpSpPr/>
+        <p:nvPr/>
+      </p:nvGrpSpPr>
+      <p:grpSpPr>
+        <a:xfrm>
+          <a:off x="0" y="0"/>
+          <a:ext cx="0" cy="0"/>
+          <a:chOff x="0" y="0"/>
+          <a:chExt cx="0" cy="0"/>
+        </a:xfrm>
+      </p:grpSpPr>
+      <p:sp>
+        <p:nvSpPr>
+          <p:cNvPr id="2" name="Slide Image Placeholder 1"/>
+          <p:cNvSpPr>
+            <a:spLocks noGrp="1" noRot="1" noChangeAspect="1"/>
+          </p:cNvSpPr>
+          <p:nvPr>
+            <p:ph type="sldImg"/>
+          </p:nvPr>
+        </p:nvSpPr>
+        <p:spPr/>
+      </p:sp>
+      <p:sp>
+        <p:nvSpPr>
+          <p:cNvPr id="3" name="Notes Placeholder 2"/>
+          <p:cNvSpPr>
+            <a:spLocks noGrp="1"/>
+          </p:cNvSpPr>
+          <p:nvPr>
+            <p:ph type="body" idx="1"/>
+          </p:nvPr>
+        </p:nvSpPr>
+        <p:spPr/>
+        <p:txBody>
+          <a:bodyPr/>
+          <a:lstStyle/>
+          <a:p>
+            <a:endParaRPr lang="en-US"/>
+          </a:p>
+        </p:txBody>
+      </p:sp>
+      <p:sp>
+        <p:nvSpPr>
+          <p:cNvPr id="4" name="Slide Number Placeholder 3"/>
+          <p:cNvSpPr>
+            <a:spLocks noGrp="1"/>
+          </p:cNvSpPr>
+          <p:nvPr>
+            <p:ph type="sldNum" sz="quarter" idx="10"/>
+          </p:nvPr>
+        </p:nvSpPr>
+        <p:spPr/>
+        <p:txBody>
+          <a:bodyPr/>
+          <a:lstStyle/>
+          <a:p>
+            <a:fld id="{B39AF3DB-B6A1-2444-9DD8-53D016F8E638}" type="slidenum">
+              <a:rPr lang="pt-BR" smtClean="0">
+                <a:solidFill>
+                  <a:prstClr val="black"/>
+                </a:solidFill>
+              </a:rPr>
+              <a:pPr/>
+              <a:t>16</a:t>
+            </a:fld>
+            <a:endParaRPr lang="pt-BR">
+              <a:solidFill>
+                <a:prstClr val="black"/>
+              </a:solidFill>
+            </a:endParaRPr>
+          </a:p>
+        </p:txBody>
+      </p:sp>
+    </p:spTree>
+    <p:extLst>
+      <p:ext uri="{BB962C8B-B14F-4D97-AF65-F5344CB8AC3E}">
+        <p14:creationId xmlns:p14="http://schemas.microsoft.com/office/powerpoint/2010/main" val="528599944"/>
       </p:ext>
     </p:extLst>
   </p:cSld>
@@ -33548,6 +33643,1851 @@
     <p:extLst>
       <p:ext uri="{BB962C8B-B14F-4D97-AF65-F5344CB8AC3E}">
         <p14:creationId xmlns:p14="http://schemas.microsoft.com/office/powerpoint/2010/main" val="3036296891"/>
+      </p:ext>
+    </p:extLst>
+  </p:cSld>
+  <p:clrMapOvr>
+    <a:masterClrMapping/>
+  </p:clrMapOvr>
+</p:sld>
+</file>
+
+<file path=ppt/slides/slide16.xml><?xml version="1.0" encoding="utf-8"?>
+<p:sld xmlns:a="http://schemas.openxmlformats.org/drawingml/2006/main" xmlns:r="http://schemas.openxmlformats.org/officeDocument/2006/relationships" xmlns:p="http://schemas.openxmlformats.org/presentationml/2006/main">
+  <p:cSld>
+    <p:spTree>
+      <p:nvGrpSpPr>
+        <p:cNvPr id="1" name=""/>
+        <p:cNvGrpSpPr/>
+        <p:nvPr/>
+      </p:nvGrpSpPr>
+      <p:grpSpPr>
+        <a:xfrm>
+          <a:off x="0" y="0"/>
+          <a:ext cx="0" cy="0"/>
+          <a:chOff x="0" y="0"/>
+          <a:chExt cx="0" cy="0"/>
+        </a:xfrm>
+      </p:grpSpPr>
+      <p:sp>
+        <p:nvSpPr>
+          <p:cNvPr id="43" name="Rectangle 42"/>
+          <p:cNvSpPr/>
+          <p:nvPr/>
+        </p:nvSpPr>
+        <p:spPr>
+          <a:xfrm>
+            <a:off x="6804884" y="1106495"/>
+            <a:ext cx="6254624" cy="2191469"/>
+          </a:xfrm>
+          <a:prstGeom prst="rect">
+            <a:avLst/>
+          </a:prstGeom>
+          <a:noFill/>
+          <a:ln w="12700">
+            <a:solidFill>
+              <a:schemeClr val="bg1">
+                <a:lumMod val="50000"/>
+              </a:schemeClr>
+            </a:solidFill>
+          </a:ln>
+        </p:spPr>
+        <p:style>
+          <a:lnRef idx="2">
+            <a:schemeClr val="accent4"/>
+          </a:lnRef>
+          <a:fillRef idx="1">
+            <a:schemeClr val="lt1"/>
+          </a:fillRef>
+          <a:effectRef idx="0">
+            <a:schemeClr val="accent4"/>
+          </a:effectRef>
+          <a:fontRef idx="minor">
+            <a:schemeClr val="dk1"/>
+          </a:fontRef>
+        </p:style>
+        <p:txBody>
+          <a:bodyPr tIns="105844" rtlCol="0" anchor="t"/>
+          <a:lstStyle/>
+          <a:p>
+            <a:pPr defTabSz="672130">
+              <a:spcAft>
+                <a:spcPts val="882"/>
+              </a:spcAft>
+            </a:pPr>
+            <a:endParaRPr lang="pt-BR" sz="1470" dirty="0">
+              <a:solidFill>
+                <a:schemeClr val="tx1"/>
+              </a:solidFill>
+              <a:latin typeface="Exo 2 Medium" panose="00000600000000000000" pitchFamily="50" charset="0"/>
+              <a:cs typeface="Simplon BP Regular"/>
+            </a:endParaRPr>
+          </a:p>
+        </p:txBody>
+      </p:sp>
+      <p:sp>
+        <p:nvSpPr>
+          <p:cNvPr id="3" name="Title 2"/>
+          <p:cNvSpPr>
+            <a:spLocks noGrp="1"/>
+          </p:cNvSpPr>
+          <p:nvPr>
+            <p:ph type="title"/>
+          </p:nvPr>
+        </p:nvSpPr>
+        <p:spPr>
+          <a:xfrm>
+            <a:off x="469692" y="185232"/>
+            <a:ext cx="12098020" cy="800352"/>
+          </a:xfrm>
+        </p:spPr>
+        <p:txBody>
+          <a:bodyPr vert="horz" wrap="square" lIns="105844" tIns="0" rIns="105844" bIns="0" numCol="1" anchor="t" anchorCtr="0" compatLnSpc="1">
+            <a:prstTxWarp prst="textNoShape">
+              <a:avLst/>
+            </a:prstTxWarp>
+            <a:noAutofit/>
+          </a:bodyPr>
+          <a:lstStyle/>
+          <a:p>
+            <a:pPr algn="l">
+              <a:spcAft>
+                <a:spcPts val="882"/>
+              </a:spcAft>
+            </a:pPr>
+            <a:r>
+              <a:rPr lang="en-US" sz="2646" dirty="0">
+                <a:solidFill>
+                  <a:prstClr val="black"/>
+                </a:solidFill>
+                <a:latin typeface="Exo 2 Medium" panose="00000600000000000000" pitchFamily="50" charset="0"/>
+                <a:cs typeface="Simplon Oi Headline"/>
+              </a:rPr>
+              <a:t>SEMANA Abril - 03/05/2022</a:t>
+            </a:r>
+          </a:p>
+        </p:txBody>
+      </p:sp>
+      <p:sp>
+        <p:nvSpPr>
+          <p:cNvPr id="78" name="TextBox 118"/>
+          <p:cNvSpPr txBox="1"/>
+          <p:nvPr/>
+        </p:nvSpPr>
+        <p:spPr>
+          <a:xfrm>
+            <a:off x="11822773" y="576471"/>
+            <a:ext cx="899678" cy="179824"/>
+          </a:xfrm>
+          <a:prstGeom prst="rect">
+            <a:avLst/>
+          </a:prstGeom>
+          <a:noFill/>
+          <a:ln w="12700">
+            <a:noFill/>
+          </a:ln>
+        </p:spPr>
+        <p:style>
+          <a:lnRef idx="2">
+            <a:schemeClr val="accent4"/>
+          </a:lnRef>
+          <a:fillRef idx="1">
+            <a:schemeClr val="lt1"/>
+          </a:fillRef>
+          <a:effectRef idx="0">
+            <a:schemeClr val="accent4"/>
+          </a:effectRef>
+          <a:fontRef idx="minor">
+            <a:schemeClr val="dk1"/>
+          </a:fontRef>
+        </p:style>
+        <p:txBody>
+          <a:bodyPr wrap="none" lIns="52922" tIns="52922" rIns="52922" bIns="0" rtlCol="0" anchor="b"/>
+          <a:lstStyle>
+            <a:defPPr>
+              <a:defRPr lang="en-US"/>
+            </a:defPPr>
+            <a:lvl1pPr algn="ctr">
+              <a:defRPr sz="1000" b="1">
+                <a:latin typeface="Simplon BP Regular"/>
+                <a:cs typeface="Simplon BP Regular"/>
+              </a:defRPr>
+            </a:lvl1pPr>
+            <a:lvl2pPr>
+              <a:defRPr>
+                <a:solidFill>
+                  <a:schemeClr val="dk1"/>
+                </a:solidFill>
+              </a:defRPr>
+            </a:lvl2pPr>
+            <a:lvl3pPr>
+              <a:defRPr>
+                <a:solidFill>
+                  <a:schemeClr val="dk1"/>
+                </a:solidFill>
+              </a:defRPr>
+            </a:lvl3pPr>
+            <a:lvl4pPr>
+              <a:defRPr>
+                <a:solidFill>
+                  <a:schemeClr val="dk1"/>
+                </a:solidFill>
+              </a:defRPr>
+            </a:lvl4pPr>
+            <a:lvl5pPr>
+              <a:defRPr>
+                <a:solidFill>
+                  <a:schemeClr val="dk1"/>
+                </a:solidFill>
+              </a:defRPr>
+            </a:lvl5pPr>
+            <a:lvl6pPr>
+              <a:defRPr>
+                <a:solidFill>
+                  <a:schemeClr val="dk1"/>
+                </a:solidFill>
+              </a:defRPr>
+            </a:lvl6pPr>
+            <a:lvl7pPr>
+              <a:defRPr>
+                <a:solidFill>
+                  <a:schemeClr val="dk1"/>
+                </a:solidFill>
+              </a:defRPr>
+            </a:lvl7pPr>
+            <a:lvl8pPr>
+              <a:defRPr>
+                <a:solidFill>
+                  <a:schemeClr val="dk1"/>
+                </a:solidFill>
+              </a:defRPr>
+            </a:lvl8pPr>
+            <a:lvl9pPr>
+              <a:defRPr>
+                <a:solidFill>
+                  <a:schemeClr val="dk1"/>
+                </a:solidFill>
+              </a:defRPr>
+            </a:lvl9pPr>
+          </a:lstStyle>
+          <a:p>
+            <a:pPr defTabSz="672130"/>
+            <a:r>
+              <a:rPr lang="pt-BR" sz="1176" b="0" dirty="0">
+                <a:solidFill>
+                  <a:prstClr val="black"/>
+                </a:solidFill>
+                <a:latin typeface="Exo 2 Medium" panose="00000600000000000000" pitchFamily="50" charset="0"/>
+              </a:rPr>
+              <a:t>Negócios</a:t>
+            </a:r>
+          </a:p>
+        </p:txBody>
+      </p:sp>
+      <p:sp>
+        <p:nvSpPr>
+          <p:cNvPr id="109" name="Oval 120"/>
+          <p:cNvSpPr>
+            <a:spLocks noChangeAspect="1"/>
+          </p:cNvSpPr>
+          <p:nvPr/>
+        </p:nvSpPr>
+        <p:spPr>
+          <a:xfrm>
+            <a:off x="11193898" y="297930"/>
+            <a:ext cx="211404" cy="211689"/>
+          </a:xfrm>
+          <a:prstGeom prst="ellipse">
+            <a:avLst/>
+          </a:prstGeom>
+          <a:solidFill>
+            <a:srgbClr val="1BCF13"/>
+          </a:solidFill>
+          <a:ln w="12700">
+            <a:solidFill>
+              <a:schemeClr val="accent3"/>
+            </a:solidFill>
+          </a:ln>
+        </p:spPr>
+        <p:style>
+          <a:lnRef idx="2">
+            <a:schemeClr val="accent1">
+              <a:shade val="50000"/>
+            </a:schemeClr>
+          </a:lnRef>
+          <a:fillRef idx="1">
+            <a:schemeClr val="accent1"/>
+          </a:fillRef>
+          <a:effectRef idx="0">
+            <a:schemeClr val="accent1"/>
+          </a:effectRef>
+          <a:fontRef idx="minor">
+            <a:schemeClr val="lt1"/>
+          </a:fontRef>
+        </p:style>
+        <p:txBody>
+          <a:bodyPr wrap="none" lIns="52922" tIns="52922" rIns="52922" rtlCol="0" anchor="ctr"/>
+          <a:lstStyle/>
+          <a:p>
+            <a:pPr algn="ctr" defTabSz="672130"/>
+            <a:endParaRPr lang="en-US" sz="1176" dirty="0">
+              <a:solidFill>
+                <a:prstClr val="black"/>
+              </a:solidFill>
+              <a:latin typeface="Exo 2 Medium" panose="00000600000000000000" pitchFamily="50" charset="0"/>
+              <a:cs typeface="Simplon BP Regular"/>
+            </a:endParaRPr>
+          </a:p>
+        </p:txBody>
+      </p:sp>
+      <p:sp>
+        <p:nvSpPr>
+          <p:cNvPr id="80" name="TextBox 123"/>
+          <p:cNvSpPr txBox="1"/>
+          <p:nvPr/>
+        </p:nvSpPr>
+        <p:spPr>
+          <a:xfrm>
+            <a:off x="10852497" y="576471"/>
+            <a:ext cx="899678" cy="179824"/>
+          </a:xfrm>
+          <a:prstGeom prst="rect">
+            <a:avLst/>
+          </a:prstGeom>
+          <a:noFill/>
+          <a:ln w="12700">
+            <a:noFill/>
+          </a:ln>
+        </p:spPr>
+        <p:style>
+          <a:lnRef idx="2">
+            <a:schemeClr val="accent4"/>
+          </a:lnRef>
+          <a:fillRef idx="1">
+            <a:schemeClr val="lt1"/>
+          </a:fillRef>
+          <a:effectRef idx="0">
+            <a:schemeClr val="accent4"/>
+          </a:effectRef>
+          <a:fontRef idx="minor">
+            <a:schemeClr val="dk1"/>
+          </a:fontRef>
+        </p:style>
+        <p:txBody>
+          <a:bodyPr wrap="none" lIns="52922" tIns="52922" rIns="52922" bIns="0" rtlCol="0" anchor="b"/>
+          <a:lstStyle>
+            <a:defPPr>
+              <a:defRPr lang="en-US"/>
+            </a:defPPr>
+            <a:lvl1pPr algn="ctr">
+              <a:defRPr sz="1000" b="1">
+                <a:latin typeface="Simplon BP Regular"/>
+                <a:cs typeface="Simplon BP Regular"/>
+              </a:defRPr>
+            </a:lvl1pPr>
+            <a:lvl2pPr>
+              <a:defRPr>
+                <a:solidFill>
+                  <a:schemeClr val="dk1"/>
+                </a:solidFill>
+              </a:defRPr>
+            </a:lvl2pPr>
+            <a:lvl3pPr>
+              <a:defRPr>
+                <a:solidFill>
+                  <a:schemeClr val="dk1"/>
+                </a:solidFill>
+              </a:defRPr>
+            </a:lvl3pPr>
+            <a:lvl4pPr>
+              <a:defRPr>
+                <a:solidFill>
+                  <a:schemeClr val="dk1"/>
+                </a:solidFill>
+              </a:defRPr>
+            </a:lvl4pPr>
+            <a:lvl5pPr>
+              <a:defRPr>
+                <a:solidFill>
+                  <a:schemeClr val="dk1"/>
+                </a:solidFill>
+              </a:defRPr>
+            </a:lvl5pPr>
+            <a:lvl6pPr>
+              <a:defRPr>
+                <a:solidFill>
+                  <a:schemeClr val="dk1"/>
+                </a:solidFill>
+              </a:defRPr>
+            </a:lvl6pPr>
+            <a:lvl7pPr>
+              <a:defRPr>
+                <a:solidFill>
+                  <a:schemeClr val="dk1"/>
+                </a:solidFill>
+              </a:defRPr>
+            </a:lvl7pPr>
+            <a:lvl8pPr>
+              <a:defRPr>
+                <a:solidFill>
+                  <a:schemeClr val="dk1"/>
+                </a:solidFill>
+              </a:defRPr>
+            </a:lvl8pPr>
+            <a:lvl9pPr>
+              <a:defRPr>
+                <a:solidFill>
+                  <a:schemeClr val="dk1"/>
+                </a:solidFill>
+              </a:defRPr>
+            </a:lvl9pPr>
+          </a:lstStyle>
+          <a:p>
+            <a:pPr defTabSz="672130"/>
+            <a:r>
+              <a:rPr lang="pt-BR" sz="1176" b="0" dirty="0">
+                <a:solidFill>
+                  <a:prstClr val="black"/>
+                </a:solidFill>
+                <a:latin typeface="Exo 2 Medium" panose="00000600000000000000" pitchFamily="50" charset="0"/>
+              </a:rPr>
+              <a:t>Plataforma</a:t>
+            </a:r>
+          </a:p>
+        </p:txBody>
+      </p:sp>
+      <p:sp>
+        <p:nvSpPr>
+          <p:cNvPr id="82" name="TextBox 128"/>
+          <p:cNvSpPr txBox="1"/>
+          <p:nvPr/>
+        </p:nvSpPr>
+        <p:spPr>
+          <a:xfrm>
+            <a:off x="9854245" y="576471"/>
+            <a:ext cx="899678" cy="179824"/>
+          </a:xfrm>
+          <a:prstGeom prst="rect">
+            <a:avLst/>
+          </a:prstGeom>
+          <a:noFill/>
+          <a:ln w="12700">
+            <a:noFill/>
+          </a:ln>
+        </p:spPr>
+        <p:style>
+          <a:lnRef idx="2">
+            <a:schemeClr val="accent4"/>
+          </a:lnRef>
+          <a:fillRef idx="1">
+            <a:schemeClr val="lt1"/>
+          </a:fillRef>
+          <a:effectRef idx="0">
+            <a:schemeClr val="accent4"/>
+          </a:effectRef>
+          <a:fontRef idx="minor">
+            <a:schemeClr val="dk1"/>
+          </a:fontRef>
+        </p:style>
+        <p:txBody>
+          <a:bodyPr wrap="none" lIns="52922" tIns="52922" rIns="52922" bIns="0" rtlCol="0" anchor="b"/>
+          <a:lstStyle>
+            <a:defPPr>
+              <a:defRPr lang="en-US"/>
+            </a:defPPr>
+            <a:lvl1pPr algn="ctr">
+              <a:defRPr sz="1000" b="1">
+                <a:latin typeface="Simplon BP Regular"/>
+                <a:cs typeface="Simplon BP Regular"/>
+              </a:defRPr>
+            </a:lvl1pPr>
+            <a:lvl2pPr>
+              <a:defRPr>
+                <a:solidFill>
+                  <a:schemeClr val="dk1"/>
+                </a:solidFill>
+              </a:defRPr>
+            </a:lvl2pPr>
+            <a:lvl3pPr>
+              <a:defRPr>
+                <a:solidFill>
+                  <a:schemeClr val="dk1"/>
+                </a:solidFill>
+              </a:defRPr>
+            </a:lvl3pPr>
+            <a:lvl4pPr>
+              <a:defRPr>
+                <a:solidFill>
+                  <a:schemeClr val="dk1"/>
+                </a:solidFill>
+              </a:defRPr>
+            </a:lvl4pPr>
+            <a:lvl5pPr>
+              <a:defRPr>
+                <a:solidFill>
+                  <a:schemeClr val="dk1"/>
+                </a:solidFill>
+              </a:defRPr>
+            </a:lvl5pPr>
+            <a:lvl6pPr>
+              <a:defRPr>
+                <a:solidFill>
+                  <a:schemeClr val="dk1"/>
+                </a:solidFill>
+              </a:defRPr>
+            </a:lvl6pPr>
+            <a:lvl7pPr>
+              <a:defRPr>
+                <a:solidFill>
+                  <a:schemeClr val="dk1"/>
+                </a:solidFill>
+              </a:defRPr>
+            </a:lvl7pPr>
+            <a:lvl8pPr>
+              <a:defRPr>
+                <a:solidFill>
+                  <a:schemeClr val="dk1"/>
+                </a:solidFill>
+              </a:defRPr>
+            </a:lvl8pPr>
+            <a:lvl9pPr>
+              <a:defRPr>
+                <a:solidFill>
+                  <a:schemeClr val="dk1"/>
+                </a:solidFill>
+              </a:defRPr>
+            </a:lvl9pPr>
+          </a:lstStyle>
+          <a:p>
+            <a:pPr defTabSz="672130"/>
+            <a:r>
+              <a:rPr lang="pt-BR" sz="1176" b="0" dirty="0">
+                <a:solidFill>
+                  <a:prstClr val="black"/>
+                </a:solidFill>
+                <a:latin typeface="Exo 2 Medium" panose="00000600000000000000" pitchFamily="50" charset="0"/>
+              </a:rPr>
+              <a:t>Back</a:t>
+            </a:r>
+          </a:p>
+        </p:txBody>
+      </p:sp>
+      <p:sp>
+        <p:nvSpPr>
+          <p:cNvPr id="84" name="TextBox 133"/>
+          <p:cNvSpPr txBox="1"/>
+          <p:nvPr/>
+        </p:nvSpPr>
+        <p:spPr>
+          <a:xfrm>
+            <a:off x="8986650" y="576471"/>
+            <a:ext cx="899678" cy="179824"/>
+          </a:xfrm>
+          <a:prstGeom prst="rect">
+            <a:avLst/>
+          </a:prstGeom>
+          <a:noFill/>
+          <a:ln w="12700">
+            <a:noFill/>
+          </a:ln>
+        </p:spPr>
+        <p:style>
+          <a:lnRef idx="2">
+            <a:schemeClr val="accent4"/>
+          </a:lnRef>
+          <a:fillRef idx="1">
+            <a:schemeClr val="lt1"/>
+          </a:fillRef>
+          <a:effectRef idx="0">
+            <a:schemeClr val="accent4"/>
+          </a:effectRef>
+          <a:fontRef idx="minor">
+            <a:schemeClr val="dk1"/>
+          </a:fontRef>
+        </p:style>
+        <p:txBody>
+          <a:bodyPr wrap="none" lIns="52922" tIns="52922" rIns="52922" bIns="0" rtlCol="0" anchor="b"/>
+          <a:lstStyle>
+            <a:defPPr>
+              <a:defRPr lang="en-US"/>
+            </a:defPPr>
+            <a:lvl1pPr algn="ctr">
+              <a:defRPr sz="1000" b="1">
+                <a:latin typeface="Simplon BP Regular"/>
+                <a:cs typeface="Simplon BP Regular"/>
+              </a:defRPr>
+            </a:lvl1pPr>
+            <a:lvl2pPr>
+              <a:defRPr>
+                <a:solidFill>
+                  <a:schemeClr val="dk1"/>
+                </a:solidFill>
+              </a:defRPr>
+            </a:lvl2pPr>
+            <a:lvl3pPr>
+              <a:defRPr>
+                <a:solidFill>
+                  <a:schemeClr val="dk1"/>
+                </a:solidFill>
+              </a:defRPr>
+            </a:lvl3pPr>
+            <a:lvl4pPr>
+              <a:defRPr>
+                <a:solidFill>
+                  <a:schemeClr val="dk1"/>
+                </a:solidFill>
+              </a:defRPr>
+            </a:lvl4pPr>
+            <a:lvl5pPr>
+              <a:defRPr>
+                <a:solidFill>
+                  <a:schemeClr val="dk1"/>
+                </a:solidFill>
+              </a:defRPr>
+            </a:lvl5pPr>
+            <a:lvl6pPr>
+              <a:defRPr>
+                <a:solidFill>
+                  <a:schemeClr val="dk1"/>
+                </a:solidFill>
+              </a:defRPr>
+            </a:lvl6pPr>
+            <a:lvl7pPr>
+              <a:defRPr>
+                <a:solidFill>
+                  <a:schemeClr val="dk1"/>
+                </a:solidFill>
+              </a:defRPr>
+            </a:lvl7pPr>
+            <a:lvl8pPr>
+              <a:defRPr>
+                <a:solidFill>
+                  <a:schemeClr val="dk1"/>
+                </a:solidFill>
+              </a:defRPr>
+            </a:lvl8pPr>
+            <a:lvl9pPr>
+              <a:defRPr>
+                <a:solidFill>
+                  <a:schemeClr val="dk1"/>
+                </a:solidFill>
+              </a:defRPr>
+            </a:lvl9pPr>
+          </a:lstStyle>
+          <a:p>
+            <a:pPr defTabSz="672130"/>
+            <a:r>
+              <a:rPr lang="pt-BR" sz="1176" b="0" dirty="0">
+                <a:solidFill>
+                  <a:prstClr val="black"/>
+                </a:solidFill>
+                <a:latin typeface="Exo 2 Medium" panose="00000600000000000000" pitchFamily="50" charset="0"/>
+              </a:rPr>
+              <a:t>Front</a:t>
+            </a:r>
+          </a:p>
+        </p:txBody>
+      </p:sp>
+      <p:sp>
+        <p:nvSpPr>
+          <p:cNvPr id="88" name="Oval 134"/>
+          <p:cNvSpPr>
+            <a:spLocks noChangeAspect="1"/>
+          </p:cNvSpPr>
+          <p:nvPr/>
+        </p:nvSpPr>
+        <p:spPr>
+          <a:xfrm>
+            <a:off x="8443555" y="297930"/>
+            <a:ext cx="211404" cy="211689"/>
+          </a:xfrm>
+          <a:prstGeom prst="ellipse">
+            <a:avLst/>
+          </a:prstGeom>
+          <a:solidFill>
+            <a:srgbClr val="1BCF13"/>
+          </a:solidFill>
+          <a:ln w="12700">
+            <a:solidFill>
+              <a:schemeClr val="accent3"/>
+            </a:solidFill>
+          </a:ln>
+        </p:spPr>
+        <p:style>
+          <a:lnRef idx="2">
+            <a:schemeClr val="accent1">
+              <a:shade val="50000"/>
+            </a:schemeClr>
+          </a:lnRef>
+          <a:fillRef idx="1">
+            <a:schemeClr val="accent1"/>
+          </a:fillRef>
+          <a:effectRef idx="0">
+            <a:schemeClr val="accent1"/>
+          </a:effectRef>
+          <a:fontRef idx="minor">
+            <a:schemeClr val="lt1"/>
+          </a:fontRef>
+        </p:style>
+        <p:txBody>
+          <a:bodyPr wrap="none" lIns="52922" tIns="52922" rIns="52922" rtlCol="0" anchor="ctr"/>
+          <a:lstStyle/>
+          <a:p>
+            <a:pPr algn="ctr" defTabSz="672130"/>
+            <a:endParaRPr lang="en-US" sz="1176" dirty="0">
+              <a:solidFill>
+                <a:prstClr val="black"/>
+              </a:solidFill>
+              <a:latin typeface="Exo 2 Medium" panose="00000600000000000000" pitchFamily="50" charset="0"/>
+              <a:cs typeface="Simplon BP Regular"/>
+            </a:endParaRPr>
+          </a:p>
+        </p:txBody>
+      </p:sp>
+      <p:sp>
+        <p:nvSpPr>
+          <p:cNvPr id="86" name="TextBox 138"/>
+          <p:cNvSpPr txBox="1"/>
+          <p:nvPr/>
+        </p:nvSpPr>
+        <p:spPr>
+          <a:xfrm>
+            <a:off x="8126053" y="576471"/>
+            <a:ext cx="899678" cy="179824"/>
+          </a:xfrm>
+          <a:prstGeom prst="rect">
+            <a:avLst/>
+          </a:prstGeom>
+          <a:noFill/>
+          <a:ln w="12700">
+            <a:noFill/>
+          </a:ln>
+        </p:spPr>
+        <p:style>
+          <a:lnRef idx="2">
+            <a:schemeClr val="accent4"/>
+          </a:lnRef>
+          <a:fillRef idx="1">
+            <a:schemeClr val="lt1"/>
+          </a:fillRef>
+          <a:effectRef idx="0">
+            <a:schemeClr val="accent4"/>
+          </a:effectRef>
+          <a:fontRef idx="minor">
+            <a:schemeClr val="dk1"/>
+          </a:fontRef>
+        </p:style>
+        <p:txBody>
+          <a:bodyPr wrap="none" lIns="52922" tIns="52922" rIns="52922" bIns="0" rtlCol="0" anchor="b"/>
+          <a:lstStyle>
+            <a:defPPr>
+              <a:defRPr lang="en-US"/>
+            </a:defPPr>
+            <a:lvl1pPr algn="ctr">
+              <a:defRPr sz="1000" b="1">
+                <a:latin typeface="Simplon BP Regular"/>
+                <a:cs typeface="Simplon BP Regular"/>
+              </a:defRPr>
+            </a:lvl1pPr>
+            <a:lvl2pPr>
+              <a:defRPr>
+                <a:solidFill>
+                  <a:schemeClr val="dk1"/>
+                </a:solidFill>
+              </a:defRPr>
+            </a:lvl2pPr>
+            <a:lvl3pPr>
+              <a:defRPr>
+                <a:solidFill>
+                  <a:schemeClr val="dk1"/>
+                </a:solidFill>
+              </a:defRPr>
+            </a:lvl3pPr>
+            <a:lvl4pPr>
+              <a:defRPr>
+                <a:solidFill>
+                  <a:schemeClr val="dk1"/>
+                </a:solidFill>
+              </a:defRPr>
+            </a:lvl4pPr>
+            <a:lvl5pPr>
+              <a:defRPr>
+                <a:solidFill>
+                  <a:schemeClr val="dk1"/>
+                </a:solidFill>
+              </a:defRPr>
+            </a:lvl5pPr>
+            <a:lvl6pPr>
+              <a:defRPr>
+                <a:solidFill>
+                  <a:schemeClr val="dk1"/>
+                </a:solidFill>
+              </a:defRPr>
+            </a:lvl6pPr>
+            <a:lvl7pPr>
+              <a:defRPr>
+                <a:solidFill>
+                  <a:schemeClr val="dk1"/>
+                </a:solidFill>
+              </a:defRPr>
+            </a:lvl7pPr>
+            <a:lvl8pPr>
+              <a:defRPr>
+                <a:solidFill>
+                  <a:schemeClr val="dk1"/>
+                </a:solidFill>
+              </a:defRPr>
+            </a:lvl8pPr>
+            <a:lvl9pPr>
+              <a:defRPr>
+                <a:solidFill>
+                  <a:schemeClr val="dk1"/>
+                </a:solidFill>
+              </a:defRPr>
+            </a:lvl9pPr>
+          </a:lstStyle>
+          <a:p>
+            <a:pPr defTabSz="672130"/>
+            <a:r>
+              <a:rPr lang="en-US" sz="1176" b="0" dirty="0">
+                <a:solidFill>
+                  <a:prstClr val="black"/>
+                </a:solidFill>
+                <a:latin typeface="Exo 2 Medium" panose="00000600000000000000" pitchFamily="50" charset="0"/>
+              </a:rPr>
+              <a:t>Equipe</a:t>
+            </a:r>
+          </a:p>
+        </p:txBody>
+      </p:sp>
+      <p:sp>
+        <p:nvSpPr>
+          <p:cNvPr id="64" name="Retângulo 63"/>
+          <p:cNvSpPr/>
+          <p:nvPr/>
+        </p:nvSpPr>
+        <p:spPr>
+          <a:xfrm>
+            <a:off x="512766" y="868345"/>
+            <a:ext cx="6186608" cy="238150"/>
+          </a:xfrm>
+          <a:prstGeom prst="rect">
+            <a:avLst/>
+          </a:prstGeom>
+          <a:solidFill>
+            <a:schemeClr val="bg1">
+              <a:lumMod val="85000"/>
+            </a:schemeClr>
+          </a:solidFill>
+        </p:spPr>
+        <p:txBody>
+          <a:bodyPr vert="horz" lIns="134422" tIns="67211" rIns="134422" bIns="67211" rtlCol="0" anchor="ctr"/>
+          <a:lstStyle/>
+          <a:p>
+            <a:pPr defTabSz="672130"/>
+            <a:r>
+              <a:rPr lang="en-US" sz="1544" dirty="0">
+                <a:latin typeface="Exo 2 Medium" panose="00000600000000000000" pitchFamily="50" charset="0"/>
+                <a:ea typeface="Simplon Oi Headline" charset="0"/>
+                <a:cs typeface="Simplon Oi Headline" charset="0"/>
+              </a:rPr>
+              <a:t>Progressos c/ responsáveis </a:t>
+            </a:r>
+          </a:p>
+        </p:txBody>
+      </p:sp>
+      <p:sp>
+        <p:nvSpPr>
+          <p:cNvPr id="65" name="Retângulo 64"/>
+          <p:cNvSpPr/>
+          <p:nvPr/>
+        </p:nvSpPr>
+        <p:spPr>
+          <a:xfrm>
+            <a:off x="6814576" y="868344"/>
+            <a:ext cx="6244932" cy="250902"/>
+          </a:xfrm>
+          <a:prstGeom prst="rect">
+            <a:avLst/>
+          </a:prstGeom>
+          <a:solidFill>
+            <a:schemeClr val="bg1">
+              <a:lumMod val="85000"/>
+            </a:schemeClr>
+          </a:solidFill>
+        </p:spPr>
+        <p:txBody>
+          <a:bodyPr vert="horz" lIns="134422" tIns="67211" rIns="134422" bIns="67211" rtlCol="0" anchor="ctr"/>
+          <a:lstStyle/>
+          <a:p>
+            <a:pPr defTabSz="672130"/>
+            <a:r>
+              <a:rPr lang="pt-BR" sz="1544" dirty="0">
+                <a:latin typeface="Exo 2 Medium" panose="00000600000000000000" pitchFamily="50" charset="0"/>
+                <a:ea typeface="Simplon Oi Headline" charset="0"/>
+                <a:cs typeface="Simplon Oi Headline" charset="0"/>
+              </a:rPr>
+              <a:t>Pontos atenção/ Principais Riscos</a:t>
+            </a:r>
+          </a:p>
+        </p:txBody>
+      </p:sp>
+      <p:sp>
+        <p:nvSpPr>
+          <p:cNvPr id="66" name="Retângulo 65"/>
+          <p:cNvSpPr/>
+          <p:nvPr/>
+        </p:nvSpPr>
+        <p:spPr>
+          <a:xfrm>
+            <a:off x="528898" y="3479441"/>
+            <a:ext cx="12551972" cy="238150"/>
+          </a:xfrm>
+          <a:prstGeom prst="rect">
+            <a:avLst/>
+          </a:prstGeom>
+          <a:solidFill>
+            <a:schemeClr val="bg1">
+              <a:lumMod val="85000"/>
+            </a:schemeClr>
+          </a:solidFill>
+        </p:spPr>
+        <p:txBody>
+          <a:bodyPr vert="horz" lIns="134422" tIns="67211" rIns="134422" bIns="67211" rtlCol="0" anchor="ctr"/>
+          <a:lstStyle/>
+          <a:p>
+            <a:pPr defTabSz="672130"/>
+            <a:r>
+              <a:rPr lang="pt-BR" sz="1544" dirty="0">
+                <a:latin typeface="Exo 2 Medium" panose="00000600000000000000" pitchFamily="50" charset="0"/>
+                <a:ea typeface="Simplon Oi Headline" charset="0"/>
+                <a:cs typeface="Simplon Oi Headline" charset="0"/>
+              </a:rPr>
+              <a:t>Próximos Passos c/ responsáveis </a:t>
+            </a:r>
+          </a:p>
+        </p:txBody>
+      </p:sp>
+      <p:sp>
+        <p:nvSpPr>
+          <p:cNvPr id="63" name="Rectangle 37"/>
+          <p:cNvSpPr/>
+          <p:nvPr/>
+        </p:nvSpPr>
+        <p:spPr>
+          <a:xfrm>
+            <a:off x="496765" y="1106495"/>
+            <a:ext cx="6207777" cy="2235805"/>
+          </a:xfrm>
+          <a:prstGeom prst="rect">
+            <a:avLst/>
+          </a:prstGeom>
+          <a:noFill/>
+          <a:ln w="12700">
+            <a:solidFill>
+              <a:schemeClr val="bg1">
+                <a:lumMod val="50000"/>
+              </a:schemeClr>
+            </a:solidFill>
+          </a:ln>
+        </p:spPr>
+        <p:style>
+          <a:lnRef idx="2">
+            <a:schemeClr val="accent4"/>
+          </a:lnRef>
+          <a:fillRef idx="1">
+            <a:schemeClr val="lt1"/>
+          </a:fillRef>
+          <a:effectRef idx="0">
+            <a:schemeClr val="accent4"/>
+          </a:effectRef>
+          <a:fontRef idx="minor">
+            <a:schemeClr val="dk1"/>
+          </a:fontRef>
+        </p:style>
+        <p:txBody>
+          <a:bodyPr tIns="105844" rtlCol="0" anchor="t"/>
+          <a:lstStyle/>
+          <a:p>
+            <a:pPr marL="252049" indent="-252049" fontAlgn="base">
+              <a:spcBef>
+                <a:spcPct val="0"/>
+              </a:spcBef>
+              <a:buFont typeface="Wingdings" panose="05000000000000000000" pitchFamily="2" charset="2"/>
+              <a:buChar char="ü"/>
+              <a:defRPr/>
+            </a:pPr>
+            <a:r>
+              <a:rPr lang="pt-BR" sz="1323" dirty="0" err="1">
+                <a:solidFill>
+                  <a:schemeClr val="tx1"/>
+                </a:solidFill>
+                <a:latin typeface="Exo 2 Medium" panose="00000600000000000000" pitchFamily="50" charset="0"/>
+                <a:cs typeface="Simplon BP Regular"/>
+              </a:rPr>
+              <a:t>Organizacao</a:t>
+            </a:r>
+            <a:r>
+              <a:rPr lang="pt-BR" sz="1323" dirty="0">
+                <a:solidFill>
+                  <a:schemeClr val="tx1"/>
+                </a:solidFill>
+                <a:latin typeface="Exo 2 Medium" panose="00000600000000000000" pitchFamily="50" charset="0"/>
+                <a:cs typeface="Simplon BP Regular"/>
+              </a:rPr>
+              <a:t> do backlog </a:t>
+            </a:r>
+            <a:r>
+              <a:rPr lang="pt-BR" sz="1323" b="1" dirty="0">
+                <a:solidFill>
+                  <a:schemeClr val="tx1"/>
+                </a:solidFill>
+                <a:latin typeface="Exo 2 Medium" panose="00000600000000000000" pitchFamily="50" charset="0"/>
+                <a:cs typeface="Simplon BP Regular"/>
+              </a:rPr>
+              <a:t>#Wesley</a:t>
+            </a:r>
+          </a:p>
+          <a:p>
+            <a:pPr marL="252049" indent="-252049" fontAlgn="base">
+              <a:spcBef>
+                <a:spcPct val="0"/>
+              </a:spcBef>
+              <a:buFont typeface="Wingdings" panose="05000000000000000000" pitchFamily="2" charset="2"/>
+              <a:buChar char="ü"/>
+              <a:defRPr/>
+            </a:pPr>
+            <a:r>
+              <a:rPr lang="pt-BR" sz="1323" dirty="0" err="1">
+                <a:solidFill>
+                  <a:schemeClr val="tx1"/>
+                </a:solidFill>
+                <a:latin typeface="Exo 2 Medium" panose="00000600000000000000" pitchFamily="50" charset="0"/>
+                <a:cs typeface="Simplon BP Regular"/>
+              </a:rPr>
+              <a:t>Comeco</a:t>
+            </a:r>
+            <a:r>
+              <a:rPr lang="pt-BR" sz="1323" dirty="0">
+                <a:solidFill>
+                  <a:schemeClr val="tx1"/>
+                </a:solidFill>
+                <a:latin typeface="Exo 2 Medium" panose="00000600000000000000" pitchFamily="50" charset="0"/>
+                <a:cs typeface="Simplon BP Regular"/>
+              </a:rPr>
+              <a:t> da configuração do certificado Digital </a:t>
+            </a:r>
+            <a:r>
+              <a:rPr lang="pt-BR" sz="1323" b="1" dirty="0">
+                <a:solidFill>
+                  <a:schemeClr val="tx1"/>
+                </a:solidFill>
+                <a:latin typeface="Exo 2 Medium" panose="00000600000000000000" pitchFamily="50" charset="0"/>
+                <a:cs typeface="Simplon BP Regular"/>
+              </a:rPr>
+              <a:t>#Bruno e </a:t>
+            </a:r>
+            <a:r>
+              <a:rPr lang="pt-BR" sz="1323" b="1" dirty="0" err="1">
+                <a:solidFill>
+                  <a:schemeClr val="tx1"/>
+                </a:solidFill>
+                <a:latin typeface="Exo 2 Medium" panose="00000600000000000000" pitchFamily="50" charset="0"/>
+                <a:cs typeface="Simplon BP Regular"/>
+              </a:rPr>
+              <a:t>Jailson</a:t>
+            </a:r>
+            <a:endParaRPr lang="pt-BR" sz="1323" b="1" dirty="0">
+              <a:solidFill>
+                <a:schemeClr val="tx1"/>
+              </a:solidFill>
+              <a:latin typeface="Exo 2 Medium" panose="00000600000000000000" pitchFamily="50" charset="0"/>
+              <a:cs typeface="Simplon BP Regular"/>
+            </a:endParaRPr>
+          </a:p>
+          <a:p>
+            <a:pPr marL="252049" indent="-252049" fontAlgn="base">
+              <a:spcBef>
+                <a:spcPct val="0"/>
+              </a:spcBef>
+              <a:buFont typeface="Wingdings" panose="05000000000000000000" pitchFamily="2" charset="2"/>
+              <a:buChar char="ü"/>
+              <a:defRPr/>
+            </a:pPr>
+            <a:r>
+              <a:rPr lang="pt-BR" sz="1323" dirty="0" err="1">
+                <a:solidFill>
+                  <a:schemeClr val="tx1"/>
+                </a:solidFill>
+                <a:latin typeface="Exo 2 Medium" panose="00000600000000000000" pitchFamily="50" charset="0"/>
+                <a:cs typeface="Simplon BP Regular"/>
+              </a:rPr>
+              <a:t>Conexao</a:t>
+            </a:r>
+            <a:r>
+              <a:rPr lang="pt-BR" sz="1323" dirty="0">
+                <a:solidFill>
+                  <a:schemeClr val="tx1"/>
+                </a:solidFill>
+                <a:latin typeface="Exo 2 Medium" panose="00000600000000000000" pitchFamily="50" charset="0"/>
+                <a:cs typeface="Simplon BP Regular"/>
+              </a:rPr>
+              <a:t> com cadastro e login </a:t>
+            </a:r>
+            <a:r>
+              <a:rPr lang="pt-BR" sz="1323" b="1" dirty="0">
+                <a:solidFill>
+                  <a:schemeClr val="tx1"/>
+                </a:solidFill>
+                <a:latin typeface="Exo 2 Medium" panose="00000600000000000000" pitchFamily="50" charset="0"/>
+                <a:cs typeface="Simplon BP Regular"/>
+              </a:rPr>
+              <a:t>#Pedro, Mathias, Jean</a:t>
+            </a:r>
+          </a:p>
+          <a:p>
+            <a:pPr marL="252049" indent="-252049" fontAlgn="base">
+              <a:spcBef>
+                <a:spcPct val="0"/>
+              </a:spcBef>
+              <a:buFont typeface="Wingdings" panose="05000000000000000000" pitchFamily="2" charset="2"/>
+              <a:buChar char="ü"/>
+              <a:defRPr/>
+            </a:pPr>
+            <a:endParaRPr lang="pt-BR" sz="1323" b="1" dirty="0">
+              <a:solidFill>
+                <a:schemeClr val="tx1"/>
+              </a:solidFill>
+              <a:latin typeface="Exo 2 Medium" panose="00000600000000000000" pitchFamily="50" charset="0"/>
+              <a:cs typeface="Simplon BP Regular"/>
+            </a:endParaRPr>
+          </a:p>
+        </p:txBody>
+      </p:sp>
+      <p:sp>
+        <p:nvSpPr>
+          <p:cNvPr id="2" name="Rectangle 43">
+            <a:extLst>
+              <a:ext uri="{FF2B5EF4-FFF2-40B4-BE49-F238E27FC236}">
+                <a16:creationId xmlns:a16="http://schemas.microsoft.com/office/drawing/2014/main" id="{B15BA19F-C787-4E6A-ADAB-C0DFF09C66A8}"/>
+              </a:ext>
+            </a:extLst>
+          </p:cNvPr>
+          <p:cNvSpPr>
+            <a:spLocks/>
+          </p:cNvSpPr>
+          <p:nvPr/>
+        </p:nvSpPr>
+        <p:spPr>
+          <a:xfrm>
+            <a:off x="493440" y="3717591"/>
+            <a:ext cx="12587430" cy="3634138"/>
+          </a:xfrm>
+          <a:prstGeom prst="rect">
+            <a:avLst/>
+          </a:prstGeom>
+          <a:noFill/>
+          <a:ln w="12700">
+            <a:solidFill>
+              <a:schemeClr val="bg1">
+                <a:lumMod val="50000"/>
+              </a:schemeClr>
+            </a:solidFill>
+          </a:ln>
+        </p:spPr>
+        <p:style>
+          <a:lnRef idx="2">
+            <a:schemeClr val="accent4"/>
+          </a:lnRef>
+          <a:fillRef idx="1">
+            <a:schemeClr val="lt1"/>
+          </a:fillRef>
+          <a:effectRef idx="0">
+            <a:schemeClr val="accent4"/>
+          </a:effectRef>
+          <a:fontRef idx="minor">
+            <a:schemeClr val="dk1"/>
+          </a:fontRef>
+        </p:style>
+        <p:txBody>
+          <a:bodyPr wrap="square" tIns="105844" numCol="3" rtlCol="0" anchor="t"/>
+          <a:lstStyle/>
+          <a:p>
+            <a:pPr marL="0" lvl="1" defTabSz="672130"/>
+            <a:r>
+              <a:rPr lang="pt-BR" sz="1323" b="1" dirty="0">
+                <a:solidFill>
+                  <a:schemeClr val="tx1"/>
+                </a:solidFill>
+                <a:latin typeface="Exo 2 Medium" panose="00000600000000000000" pitchFamily="50" charset="0"/>
+                <a:cs typeface="Simplon BP Regular"/>
+              </a:rPr>
+              <a:t>Frente Plataforma</a:t>
+            </a:r>
+          </a:p>
+          <a:p>
+            <a:pPr marL="285750" lvl="1" indent="-285750" defTabSz="672130">
+              <a:buFont typeface="Arial" panose="020B0604020202020204" pitchFamily="34" charset="0"/>
+              <a:buChar char="•"/>
+            </a:pPr>
+            <a:r>
+              <a:rPr lang="pt-BR" sz="1323" b="1" dirty="0" err="1">
+                <a:solidFill>
+                  <a:schemeClr val="tx1"/>
+                </a:solidFill>
+                <a:latin typeface="Exo 2 Medium" panose="00000600000000000000" pitchFamily="50" charset="0"/>
+                <a:cs typeface="Simplon BP Regular"/>
+              </a:rPr>
+              <a:t>Refatorar</a:t>
+            </a:r>
+            <a:r>
+              <a:rPr lang="pt-BR" sz="1323" b="1" dirty="0">
+                <a:solidFill>
+                  <a:schemeClr val="tx1"/>
+                </a:solidFill>
+                <a:latin typeface="Exo 2 Medium" panose="00000600000000000000" pitchFamily="50" charset="0"/>
+                <a:cs typeface="Simplon BP Regular"/>
+              </a:rPr>
+              <a:t> telas do app</a:t>
+            </a:r>
+          </a:p>
+          <a:p>
+            <a:pPr marL="0" lvl="1" defTabSz="672130"/>
+            <a:endParaRPr lang="pt-BR" sz="1323" b="1" dirty="0">
+              <a:solidFill>
+                <a:schemeClr val="tx1"/>
+              </a:solidFill>
+              <a:latin typeface="Exo 2 Medium" panose="00000600000000000000" pitchFamily="50" charset="0"/>
+              <a:cs typeface="Simplon BP Regular"/>
+            </a:endParaRPr>
+          </a:p>
+          <a:p>
+            <a:pPr marL="0" lvl="1" defTabSz="672130"/>
+            <a:r>
+              <a:rPr lang="pt-BR" sz="1323" b="1" dirty="0">
+                <a:solidFill>
+                  <a:schemeClr val="tx1"/>
+                </a:solidFill>
+                <a:latin typeface="Exo 2 Medium" panose="00000600000000000000" pitchFamily="50" charset="0"/>
+                <a:cs typeface="Simplon BP Regular"/>
+              </a:rPr>
+              <a:t>Frente Back-</a:t>
+            </a:r>
+            <a:r>
+              <a:rPr lang="pt-BR" sz="1323" b="1" dirty="0" err="1">
+                <a:solidFill>
+                  <a:schemeClr val="tx1"/>
+                </a:solidFill>
+                <a:latin typeface="Exo 2 Medium" panose="00000600000000000000" pitchFamily="50" charset="0"/>
+                <a:cs typeface="Simplon BP Regular"/>
+              </a:rPr>
+              <a:t>End</a:t>
+            </a:r>
+            <a:endParaRPr lang="pt-BR" sz="1323" b="1" dirty="0">
+              <a:solidFill>
+                <a:schemeClr val="tx1"/>
+              </a:solidFill>
+              <a:latin typeface="Exo 2 Medium" panose="00000600000000000000" pitchFamily="50" charset="0"/>
+              <a:cs typeface="Simplon BP Regular"/>
+            </a:endParaRPr>
+          </a:p>
+          <a:p>
+            <a:pPr marL="285750" lvl="1" indent="-285750" defTabSz="672130">
+              <a:buFont typeface="Arial" panose="020B0604020202020204" pitchFamily="34" charset="0"/>
+              <a:buChar char="•"/>
+            </a:pPr>
+            <a:r>
+              <a:rPr lang="pt-BR" sz="1323" b="1" dirty="0">
+                <a:solidFill>
+                  <a:schemeClr val="tx1"/>
+                </a:solidFill>
+                <a:latin typeface="Exo 2 Medium" panose="00000600000000000000" pitchFamily="50" charset="0"/>
+                <a:cs typeface="Simplon BP Regular"/>
+              </a:rPr>
+              <a:t>Conectar as telas com o banco</a:t>
+            </a:r>
+          </a:p>
+          <a:p>
+            <a:pPr marL="285750" lvl="1" indent="-285750" defTabSz="672130">
+              <a:buFont typeface="Arial" panose="020B0604020202020204" pitchFamily="34" charset="0"/>
+              <a:buChar char="•"/>
+            </a:pPr>
+            <a:r>
+              <a:rPr lang="pt-BR" sz="1323" b="1" dirty="0">
+                <a:solidFill>
+                  <a:schemeClr val="tx1"/>
+                </a:solidFill>
+                <a:latin typeface="Exo 2 Medium" panose="00000600000000000000" pitchFamily="50" charset="0"/>
+                <a:cs typeface="Simplon BP Regular"/>
+              </a:rPr>
+              <a:t>Configurar na nuvem cloud para o file server </a:t>
+            </a:r>
+          </a:p>
+          <a:p>
+            <a:pPr marL="0" lvl="1" defTabSz="672130"/>
+            <a:r>
+              <a:rPr lang="pt-BR" sz="1323" b="1" dirty="0">
+                <a:solidFill>
+                  <a:schemeClr val="tx1"/>
+                </a:solidFill>
+                <a:latin typeface="Exo 2 Medium" panose="00000600000000000000" pitchFamily="50" charset="0"/>
+                <a:cs typeface="Simplon BP Regular"/>
+              </a:rPr>
+              <a:t>Frente Front-End</a:t>
+            </a:r>
+          </a:p>
+          <a:p>
+            <a:pPr marL="285750" lvl="1" indent="-285750" defTabSz="672130">
+              <a:buFont typeface="Wingdings" panose="05000000000000000000" pitchFamily="2" charset="2"/>
+              <a:buChar char="§"/>
+            </a:pPr>
+            <a:r>
+              <a:rPr lang="pt-BR" sz="1200" b="1" dirty="0">
+                <a:solidFill>
+                  <a:schemeClr val="tx1"/>
+                </a:solidFill>
+                <a:latin typeface="Exo 2 Medium" panose="00000600000000000000" pitchFamily="50" charset="0"/>
+                <a:cs typeface="Simplon BP Regular"/>
+              </a:rPr>
+              <a:t>Arrumar botão e menu</a:t>
+            </a:r>
+          </a:p>
+          <a:p>
+            <a:pPr marL="285750" lvl="1" indent="-285750" defTabSz="672130">
+              <a:buFont typeface="Wingdings" panose="05000000000000000000" pitchFamily="2" charset="2"/>
+              <a:buChar char="§"/>
+            </a:pPr>
+            <a:r>
+              <a:rPr lang="pt-BR" sz="1200" b="1" dirty="0">
+                <a:solidFill>
+                  <a:schemeClr val="tx1"/>
+                </a:solidFill>
+                <a:latin typeface="Exo 2 Medium" panose="00000600000000000000" pitchFamily="50" charset="0"/>
+                <a:cs typeface="Simplon BP Regular"/>
+              </a:rPr>
+              <a:t>Adicionar fragmentos nas telas</a:t>
+            </a:r>
+            <a:br>
+              <a:rPr lang="pt-BR" sz="1200" b="1" dirty="0">
+                <a:solidFill>
+                  <a:schemeClr val="tx1"/>
+                </a:solidFill>
+                <a:latin typeface="Exo 2 Medium" panose="00000600000000000000" pitchFamily="50" charset="0"/>
+                <a:cs typeface="Simplon BP Regular"/>
+              </a:rPr>
+            </a:br>
+            <a:endParaRPr lang="pt-BR" sz="1200" b="1" dirty="0">
+              <a:solidFill>
+                <a:schemeClr val="tx1"/>
+              </a:solidFill>
+              <a:latin typeface="Exo 2 Medium" panose="00000600000000000000" pitchFamily="50" charset="0"/>
+              <a:cs typeface="Simplon BP Regular"/>
+            </a:endParaRPr>
+          </a:p>
+          <a:p>
+            <a:pPr marL="0" lvl="1" defTabSz="672130"/>
+            <a:r>
+              <a:rPr lang="pt-BR" sz="1320" b="1" dirty="0">
+                <a:solidFill>
+                  <a:schemeClr val="tx1"/>
+                </a:solidFill>
+                <a:latin typeface="Exo 2 Medium" panose="00000600000000000000" pitchFamily="50" charset="0"/>
+                <a:cs typeface="Simplon BP Regular"/>
+              </a:rPr>
+              <a:t>Frente Negócios</a:t>
+            </a:r>
+          </a:p>
+          <a:p>
+            <a:pPr marL="0" lvl="1" defTabSz="672130"/>
+            <a:endParaRPr lang="pt-BR" sz="1320" b="1" dirty="0">
+              <a:solidFill>
+                <a:schemeClr val="tx1"/>
+              </a:solidFill>
+              <a:latin typeface="Exo 2 Medium" panose="00000600000000000000" pitchFamily="50" charset="0"/>
+              <a:cs typeface="Simplon BP Regular"/>
+            </a:endParaRPr>
+          </a:p>
+          <a:p>
+            <a:pPr marL="285750" lvl="1" indent="-285750" defTabSz="672130">
+              <a:buFont typeface="Wingdings" pitchFamily="2" charset="2"/>
+              <a:buChar char="§"/>
+            </a:pPr>
+            <a:r>
+              <a:rPr lang="pt-BR" sz="1320" b="1" dirty="0">
+                <a:solidFill>
+                  <a:schemeClr val="tx1"/>
+                </a:solidFill>
+                <a:latin typeface="Exo 2 Medium" panose="00000600000000000000" pitchFamily="50" charset="0"/>
+                <a:cs typeface="Simplon BP Regular"/>
+              </a:rPr>
+              <a:t>Sem tarefas por enquanto</a:t>
+            </a:r>
+          </a:p>
+          <a:p>
+            <a:pPr marL="285750" lvl="1" indent="-285750" defTabSz="672130">
+              <a:buFont typeface="Wingdings" pitchFamily="2" charset="2"/>
+              <a:buChar char="§"/>
+            </a:pPr>
+            <a:endParaRPr lang="pt-BR" sz="1320" b="1" dirty="0">
+              <a:solidFill>
+                <a:schemeClr val="tx1"/>
+              </a:solidFill>
+              <a:latin typeface="Exo 2 Medium" panose="00000600000000000000" pitchFamily="50" charset="0"/>
+              <a:cs typeface="Simplon BP Regular"/>
+            </a:endParaRPr>
+          </a:p>
+          <a:p>
+            <a:pPr marL="0" lvl="1"/>
+            <a:endParaRPr lang="pt-BR" sz="1320" b="1" dirty="0">
+              <a:solidFill>
+                <a:schemeClr val="tx1"/>
+              </a:solidFill>
+              <a:latin typeface="Exo 2 Medium" panose="00000600000000000000" pitchFamily="50" charset="0"/>
+              <a:cs typeface="Simplon BP Regular"/>
+            </a:endParaRPr>
+          </a:p>
+        </p:txBody>
+      </p:sp>
+      <p:sp>
+        <p:nvSpPr>
+          <p:cNvPr id="6" name="Oval 134">
+            <a:extLst>
+              <a:ext uri="{FF2B5EF4-FFF2-40B4-BE49-F238E27FC236}">
+                <a16:creationId xmlns:a16="http://schemas.microsoft.com/office/drawing/2014/main" id="{70825C6F-9257-4CF5-8C62-1CA1EB2F8815}"/>
+              </a:ext>
+            </a:extLst>
+          </p:cNvPr>
+          <p:cNvSpPr>
+            <a:spLocks noChangeAspect="1"/>
+          </p:cNvSpPr>
+          <p:nvPr/>
+        </p:nvSpPr>
+        <p:spPr>
+          <a:xfrm>
+            <a:off x="9323960" y="269355"/>
+            <a:ext cx="211404" cy="211689"/>
+          </a:xfrm>
+          <a:prstGeom prst="ellipse">
+            <a:avLst/>
+          </a:prstGeom>
+          <a:solidFill>
+            <a:srgbClr val="FFFF00"/>
+          </a:solidFill>
+          <a:ln w="12700">
+            <a:solidFill>
+              <a:schemeClr val="accent3"/>
+            </a:solidFill>
+          </a:ln>
+        </p:spPr>
+        <p:style>
+          <a:lnRef idx="2">
+            <a:schemeClr val="accent1">
+              <a:shade val="50000"/>
+            </a:schemeClr>
+          </a:lnRef>
+          <a:fillRef idx="1">
+            <a:schemeClr val="accent1"/>
+          </a:fillRef>
+          <a:effectRef idx="0">
+            <a:schemeClr val="accent1"/>
+          </a:effectRef>
+          <a:fontRef idx="minor">
+            <a:schemeClr val="lt1"/>
+          </a:fontRef>
+        </p:style>
+        <p:txBody>
+          <a:bodyPr wrap="none" lIns="52922" tIns="52922" rIns="52922" rtlCol="0" anchor="ctr"/>
+          <a:lstStyle/>
+          <a:p>
+            <a:pPr algn="ctr" defTabSz="672130"/>
+            <a:endParaRPr lang="en-US" sz="1176" dirty="0">
+              <a:ln>
+                <a:solidFill>
+                  <a:srgbClr val="00B050"/>
+                </a:solidFill>
+              </a:ln>
+              <a:solidFill>
+                <a:srgbClr val="1BCF13"/>
+              </a:solidFill>
+              <a:highlight>
+                <a:srgbClr val="00FF00"/>
+              </a:highlight>
+              <a:latin typeface="Exo 2 Medium" panose="00000600000000000000" pitchFamily="50" charset="0"/>
+              <a:cs typeface="Simplon BP Regular"/>
+            </a:endParaRPr>
+          </a:p>
+        </p:txBody>
+      </p:sp>
+      <p:sp>
+        <p:nvSpPr>
+          <p:cNvPr id="9" name="Oval 134">
+            <a:extLst>
+              <a:ext uri="{FF2B5EF4-FFF2-40B4-BE49-F238E27FC236}">
+                <a16:creationId xmlns:a16="http://schemas.microsoft.com/office/drawing/2014/main" id="{B60B13C9-0C70-4C0F-82B2-D0CD4FDFC1F0}"/>
+              </a:ext>
+            </a:extLst>
+          </p:cNvPr>
+          <p:cNvSpPr>
+            <a:spLocks noChangeAspect="1"/>
+          </p:cNvSpPr>
+          <p:nvPr/>
+        </p:nvSpPr>
+        <p:spPr>
+          <a:xfrm>
+            <a:off x="12155999" y="297930"/>
+            <a:ext cx="211404" cy="211689"/>
+          </a:xfrm>
+          <a:prstGeom prst="ellipse">
+            <a:avLst/>
+          </a:prstGeom>
+          <a:solidFill>
+            <a:srgbClr val="1BCF13"/>
+          </a:solidFill>
+          <a:ln w="12700">
+            <a:solidFill>
+              <a:schemeClr val="accent3"/>
+            </a:solidFill>
+          </a:ln>
+        </p:spPr>
+        <p:style>
+          <a:lnRef idx="2">
+            <a:schemeClr val="accent1">
+              <a:shade val="50000"/>
+            </a:schemeClr>
+          </a:lnRef>
+          <a:fillRef idx="1">
+            <a:schemeClr val="accent1"/>
+          </a:fillRef>
+          <a:effectRef idx="0">
+            <a:schemeClr val="accent1"/>
+          </a:effectRef>
+          <a:fontRef idx="minor">
+            <a:schemeClr val="lt1"/>
+          </a:fontRef>
+        </p:style>
+        <p:txBody>
+          <a:bodyPr wrap="none" lIns="52922" tIns="52922" rIns="52922" rtlCol="0" anchor="ctr"/>
+          <a:lstStyle/>
+          <a:p>
+            <a:pPr algn="ctr" defTabSz="672130"/>
+            <a:endParaRPr lang="en-US" sz="1176" dirty="0">
+              <a:solidFill>
+                <a:prstClr val="black"/>
+              </a:solidFill>
+              <a:latin typeface="Exo 2 Medium" panose="00000600000000000000" pitchFamily="50" charset="0"/>
+              <a:cs typeface="Simplon BP Regular"/>
+            </a:endParaRPr>
+          </a:p>
+        </p:txBody>
+      </p:sp>
+      <p:sp>
+        <p:nvSpPr>
+          <p:cNvPr id="5" name="Retângulo 4">
+            <a:extLst>
+              <a:ext uri="{FF2B5EF4-FFF2-40B4-BE49-F238E27FC236}">
+                <a16:creationId xmlns:a16="http://schemas.microsoft.com/office/drawing/2014/main" id="{A1C14918-6027-46B3-96BF-C5F7FDEC3276}"/>
+              </a:ext>
+            </a:extLst>
+          </p:cNvPr>
+          <p:cNvSpPr/>
+          <p:nvPr/>
+        </p:nvSpPr>
+        <p:spPr>
+          <a:xfrm>
+            <a:off x="8017619" y="209534"/>
+            <a:ext cx="5041889" cy="618769"/>
+          </a:xfrm>
+          <a:prstGeom prst="rect">
+            <a:avLst/>
+          </a:prstGeom>
+          <a:noFill/>
+          <a:ln w="6350">
+            <a:solidFill>
+              <a:schemeClr val="bg1">
+                <a:lumMod val="75000"/>
+              </a:schemeClr>
+            </a:solidFill>
+          </a:ln>
+        </p:spPr>
+        <p:style>
+          <a:lnRef idx="2">
+            <a:schemeClr val="accent1">
+              <a:shade val="50000"/>
+            </a:schemeClr>
+          </a:lnRef>
+          <a:fillRef idx="1">
+            <a:schemeClr val="accent1"/>
+          </a:fillRef>
+          <a:effectRef idx="0">
+            <a:schemeClr val="accent1"/>
+          </a:effectRef>
+          <a:fontRef idx="minor">
+            <a:schemeClr val="lt1"/>
+          </a:fontRef>
+        </p:style>
+        <p:txBody>
+          <a:bodyPr rtlCol="0" anchor="ctr"/>
+          <a:lstStyle/>
+          <a:p>
+            <a:pPr algn="ctr"/>
+            <a:endParaRPr lang="pt-BR">
+              <a:latin typeface="Exo 2 Medium" panose="00000600000000000000" pitchFamily="50" charset="0"/>
+            </a:endParaRPr>
+          </a:p>
+        </p:txBody>
+      </p:sp>
+      <p:sp>
+        <p:nvSpPr>
+          <p:cNvPr id="8" name="TextBox 138">
+            <a:extLst>
+              <a:ext uri="{FF2B5EF4-FFF2-40B4-BE49-F238E27FC236}">
+                <a16:creationId xmlns:a16="http://schemas.microsoft.com/office/drawing/2014/main" id="{5CE7D08C-795B-4BF1-97F6-F9773F4E9F4C}"/>
+              </a:ext>
+            </a:extLst>
+          </p:cNvPr>
+          <p:cNvSpPr txBox="1"/>
+          <p:nvPr/>
+        </p:nvSpPr>
+        <p:spPr>
+          <a:xfrm>
+            <a:off x="9715810" y="51570"/>
+            <a:ext cx="1478088" cy="211688"/>
+          </a:xfrm>
+          <a:prstGeom prst="rect">
+            <a:avLst/>
+          </a:prstGeom>
+          <a:solidFill>
+            <a:schemeClr val="bg1"/>
+          </a:solidFill>
+          <a:ln w="12700">
+            <a:noFill/>
+          </a:ln>
+        </p:spPr>
+        <p:style>
+          <a:lnRef idx="2">
+            <a:schemeClr val="accent4"/>
+          </a:lnRef>
+          <a:fillRef idx="1">
+            <a:schemeClr val="lt1"/>
+          </a:fillRef>
+          <a:effectRef idx="0">
+            <a:schemeClr val="accent4"/>
+          </a:effectRef>
+          <a:fontRef idx="minor">
+            <a:schemeClr val="dk1"/>
+          </a:fontRef>
+        </p:style>
+        <p:txBody>
+          <a:bodyPr wrap="none" lIns="52922" tIns="52922" rIns="52922" bIns="0" rtlCol="0" anchor="b"/>
+          <a:lstStyle>
+            <a:defPPr>
+              <a:defRPr lang="en-US"/>
+            </a:defPPr>
+            <a:lvl1pPr algn="ctr">
+              <a:defRPr sz="1000" b="1">
+                <a:latin typeface="Simplon BP Regular"/>
+                <a:cs typeface="Simplon BP Regular"/>
+              </a:defRPr>
+            </a:lvl1pPr>
+            <a:lvl2pPr>
+              <a:defRPr>
+                <a:solidFill>
+                  <a:schemeClr val="dk1"/>
+                </a:solidFill>
+              </a:defRPr>
+            </a:lvl2pPr>
+            <a:lvl3pPr>
+              <a:defRPr>
+                <a:solidFill>
+                  <a:schemeClr val="dk1"/>
+                </a:solidFill>
+              </a:defRPr>
+            </a:lvl3pPr>
+            <a:lvl4pPr>
+              <a:defRPr>
+                <a:solidFill>
+                  <a:schemeClr val="dk1"/>
+                </a:solidFill>
+              </a:defRPr>
+            </a:lvl4pPr>
+            <a:lvl5pPr>
+              <a:defRPr>
+                <a:solidFill>
+                  <a:schemeClr val="dk1"/>
+                </a:solidFill>
+              </a:defRPr>
+            </a:lvl5pPr>
+            <a:lvl6pPr>
+              <a:defRPr>
+                <a:solidFill>
+                  <a:schemeClr val="dk1"/>
+                </a:solidFill>
+              </a:defRPr>
+            </a:lvl6pPr>
+            <a:lvl7pPr>
+              <a:defRPr>
+                <a:solidFill>
+                  <a:schemeClr val="dk1"/>
+                </a:solidFill>
+              </a:defRPr>
+            </a:lvl7pPr>
+            <a:lvl8pPr>
+              <a:defRPr>
+                <a:solidFill>
+                  <a:schemeClr val="dk1"/>
+                </a:solidFill>
+              </a:defRPr>
+            </a:lvl8pPr>
+            <a:lvl9pPr>
+              <a:defRPr>
+                <a:solidFill>
+                  <a:schemeClr val="dk1"/>
+                </a:solidFill>
+              </a:defRPr>
+            </a:lvl9pPr>
+          </a:lstStyle>
+          <a:p>
+            <a:pPr defTabSz="672130"/>
+            <a:r>
+              <a:rPr lang="en-US" sz="1176" b="0" dirty="0">
+                <a:solidFill>
+                  <a:prstClr val="black"/>
+                </a:solidFill>
+                <a:latin typeface="Exo 2 Medium" panose="00000600000000000000" pitchFamily="50" charset="0"/>
+              </a:rPr>
+              <a:t>    Farol do Projeto   </a:t>
+            </a:r>
+          </a:p>
+        </p:txBody>
+      </p:sp>
+      <p:sp>
+        <p:nvSpPr>
+          <p:cNvPr id="22" name="Oval 120">
+            <a:extLst>
+              <a:ext uri="{FF2B5EF4-FFF2-40B4-BE49-F238E27FC236}">
+                <a16:creationId xmlns:a16="http://schemas.microsoft.com/office/drawing/2014/main" id="{CCFA3F41-39FA-48EC-9FEC-A2A8A34BADB1}"/>
+              </a:ext>
+            </a:extLst>
+          </p:cNvPr>
+          <p:cNvSpPr>
+            <a:spLocks noChangeAspect="1"/>
+          </p:cNvSpPr>
+          <p:nvPr/>
+        </p:nvSpPr>
+        <p:spPr>
+          <a:xfrm>
+            <a:off x="9330787" y="284377"/>
+            <a:ext cx="211404" cy="211689"/>
+          </a:xfrm>
+          <a:prstGeom prst="ellipse">
+            <a:avLst/>
+          </a:prstGeom>
+          <a:solidFill>
+            <a:srgbClr val="1BCF13"/>
+          </a:solidFill>
+          <a:ln w="12700">
+            <a:solidFill>
+              <a:schemeClr val="accent3"/>
+            </a:solidFill>
+          </a:ln>
+        </p:spPr>
+        <p:style>
+          <a:lnRef idx="2">
+            <a:schemeClr val="accent1">
+              <a:shade val="50000"/>
+            </a:schemeClr>
+          </a:lnRef>
+          <a:fillRef idx="1">
+            <a:schemeClr val="accent1"/>
+          </a:fillRef>
+          <a:effectRef idx="0">
+            <a:schemeClr val="accent1"/>
+          </a:effectRef>
+          <a:fontRef idx="minor">
+            <a:schemeClr val="lt1"/>
+          </a:fontRef>
+        </p:style>
+        <p:txBody>
+          <a:bodyPr wrap="none" lIns="52922" tIns="52922" rIns="52922" rtlCol="0" anchor="ctr"/>
+          <a:lstStyle/>
+          <a:p>
+            <a:pPr algn="ctr" defTabSz="672130"/>
+            <a:endParaRPr lang="en-US" sz="1176" dirty="0">
+              <a:solidFill>
+                <a:prstClr val="black"/>
+              </a:solidFill>
+              <a:latin typeface="Exo 2 Medium" panose="00000600000000000000" pitchFamily="50" charset="0"/>
+              <a:cs typeface="Simplon BP Regular"/>
+            </a:endParaRPr>
+          </a:p>
+        </p:txBody>
+      </p:sp>
+      <p:sp>
+        <p:nvSpPr>
+          <p:cNvPr id="24" name="Oval 120">
+            <a:extLst>
+              <a:ext uri="{FF2B5EF4-FFF2-40B4-BE49-F238E27FC236}">
+                <a16:creationId xmlns:a16="http://schemas.microsoft.com/office/drawing/2014/main" id="{812564AE-899E-044A-B29B-2188F7BA8C60}"/>
+              </a:ext>
+            </a:extLst>
+          </p:cNvPr>
+          <p:cNvSpPr>
+            <a:spLocks noChangeAspect="1"/>
+          </p:cNvSpPr>
+          <p:nvPr/>
+        </p:nvSpPr>
+        <p:spPr>
+          <a:xfrm>
+            <a:off x="10180359" y="314020"/>
+            <a:ext cx="211404" cy="211689"/>
+          </a:xfrm>
+          <a:prstGeom prst="ellipse">
+            <a:avLst/>
+          </a:prstGeom>
+          <a:solidFill>
+            <a:srgbClr val="1BCF13"/>
+          </a:solidFill>
+          <a:ln w="12700">
+            <a:solidFill>
+              <a:schemeClr val="accent3"/>
+            </a:solidFill>
+          </a:ln>
+        </p:spPr>
+        <p:style>
+          <a:lnRef idx="2">
+            <a:schemeClr val="accent1">
+              <a:shade val="50000"/>
+            </a:schemeClr>
+          </a:lnRef>
+          <a:fillRef idx="1">
+            <a:schemeClr val="accent1"/>
+          </a:fillRef>
+          <a:effectRef idx="0">
+            <a:schemeClr val="accent1"/>
+          </a:effectRef>
+          <a:fontRef idx="minor">
+            <a:schemeClr val="lt1"/>
+          </a:fontRef>
+        </p:style>
+        <p:txBody>
+          <a:bodyPr wrap="none" lIns="52922" tIns="52922" rIns="52922" rtlCol="0" anchor="ctr"/>
+          <a:lstStyle/>
+          <a:p>
+            <a:pPr algn="ctr" defTabSz="672130"/>
+            <a:endParaRPr lang="en-US" sz="1176" dirty="0">
+              <a:solidFill>
+                <a:prstClr val="black"/>
+              </a:solidFill>
+              <a:latin typeface="Exo 2 Medium" panose="00000600000000000000" pitchFamily="50" charset="0"/>
+              <a:cs typeface="Simplon BP Regular"/>
+            </a:endParaRPr>
+          </a:p>
+        </p:txBody>
+      </p:sp>
+    </p:spTree>
+    <p:extLst>
+      <p:ext uri="{BB962C8B-B14F-4D97-AF65-F5344CB8AC3E}">
+        <p14:creationId xmlns:p14="http://schemas.microsoft.com/office/powerpoint/2010/main" val="1013480282"/>
       </p:ext>
     </p:extLst>
   </p:cSld>
@@ -51758,15 +53698,6 @@
 </file>
 
 <file path=customXml/item2.xml><?xml version="1.0" encoding="utf-8"?>
-<?mso-contentType ?>
-<FormTemplates xmlns="http://schemas.microsoft.com/sharepoint/v3/contenttype/forms">
-  <Display>DocumentLibraryForm</Display>
-  <Edit>DocumentLibraryForm</Edit>
-  <New>DocumentLibraryForm</New>
-</FormTemplates>
-</file>
-
-<file path=customXml/item3.xml><?xml version="1.0" encoding="utf-8"?>
 <ct:contentTypeSchema xmlns:ct="http://schemas.microsoft.com/office/2006/metadata/contentType" xmlns:ma="http://schemas.microsoft.com/office/2006/metadata/properties/metaAttributes" ct:_="" ma:_="" ma:contentTypeName="Document" ma:contentTypeID="0x0101007F8ECE7139958D46ABEDA89D12B90CBF" ma:contentTypeVersion="0" ma:contentTypeDescription="Create a new document." ma:contentTypeScope="" ma:versionID="e6d660081116f63565d30cc13099d5ec">
   <xsd:schema xmlns:xsd="http://www.w3.org/2001/XMLSchema" xmlns:xs="http://www.w3.org/2001/XMLSchema" xmlns:p="http://schemas.microsoft.com/office/2006/metadata/properties" targetNamespace="http://schemas.microsoft.com/office/2006/metadata/properties" ma:root="true" ma:fieldsID="d413257cd9829394d17656a545d5fa4e">
     <xsd:element name="properties">
@@ -51880,6 +53811,15 @@
 </ct:contentTypeSchema>
 </file>
 
+<file path=customXml/item3.xml><?xml version="1.0" encoding="utf-8"?>
+<?mso-contentType ?>
+<FormTemplates xmlns="http://schemas.microsoft.com/sharepoint/v3/contenttype/forms">
+  <Display>DocumentLibraryForm</Display>
+  <Edit>DocumentLibraryForm</Edit>
+  <New>DocumentLibraryForm</New>
+</FormTemplates>
+</file>
+
 <file path=customXml/itemProps1.xml><?xml version="1.0" encoding="utf-8"?>
 <ds:datastoreItem xmlns:ds="http://schemas.openxmlformats.org/officeDocument/2006/customXml" ds:itemID="{4B31267F-D399-4A8A-87F8-B75F56828412}">
   <ds:schemaRefs>
@@ -51898,14 +53838,6 @@
 </file>
 
 <file path=customXml/itemProps2.xml><?xml version="1.0" encoding="utf-8"?>
-<ds:datastoreItem xmlns:ds="http://schemas.openxmlformats.org/officeDocument/2006/customXml" ds:itemID="{E2481852-F24E-4532-AF30-C154D705D105}">
-  <ds:schemaRefs>
-    <ds:schemaRef ds:uri="http://schemas.microsoft.com/sharepoint/v3/contenttype/forms"/>
-  </ds:schemaRefs>
-</ds:datastoreItem>
-</file>
-
-<file path=customXml/itemProps3.xml><?xml version="1.0" encoding="utf-8"?>
 <ds:datastoreItem xmlns:ds="http://schemas.openxmlformats.org/officeDocument/2006/customXml" ds:itemID="{EFDE92A4-5D2A-451A-A373-EB014CDC0D59}">
   <ds:schemaRefs>
     <ds:schemaRef ds:uri="http://schemas.microsoft.com/office/2006/metadata/contentType"/>
@@ -51919,4 +53851,12 @@
     <ds:schemaRef ds:uri="http://schemas.microsoft.com/office/infopath/2007/PartnerControls"/>
   </ds:schemaRefs>
 </ds:datastoreItem>
+</file>
+
+<file path=customXml/itemProps3.xml><?xml version="1.0" encoding="utf-8"?>
+<ds:datastoreItem xmlns:ds="http://schemas.openxmlformats.org/officeDocument/2006/customXml" ds:itemID="{E2481852-F24E-4532-AF30-C154D705D105}">
+  <ds:schemaRefs>
+    <ds:schemaRef ds:uri="http://schemas.microsoft.com/sharepoint/v3/contenttype/forms"/>
+  </ds:schemaRefs>
+</ds:datastoreItem>
 </file>
</xml_diff>

<commit_message>
atualizacoes status report e mobile
</commit_message>
<xml_diff>
--- a/documentacao/status-report/Status_Report_-_Grupo_09.pptx
+++ b/documentacao/status-report/Status_Report_-_Grupo_09.pptx
@@ -7,10 +7,10 @@
     <p:sldMasterId id="2147483665" r:id="rId6"/>
   </p:sldMasterIdLst>
   <p:notesMasterIdLst>
-    <p:notesMasterId r:id="rId23"/>
+    <p:notesMasterId r:id="rId24"/>
   </p:notesMasterIdLst>
   <p:handoutMasterIdLst>
-    <p:handoutMasterId r:id="rId24"/>
+    <p:handoutMasterId r:id="rId25"/>
   </p:handoutMasterIdLst>
   <p:sldIdLst>
     <p:sldId id="344" r:id="rId7"/>
@@ -29,6 +29,7 @@
     <p:sldId id="483" r:id="rId20"/>
     <p:sldId id="484" r:id="rId21"/>
     <p:sldId id="485" r:id="rId22"/>
+    <p:sldId id="486" r:id="rId23"/>
   </p:sldIdLst>
   <p:sldSz cx="13442950" cy="7561263"/>
   <p:notesSz cx="7104063" cy="10234613"/>
@@ -151,6 +152,7 @@
             <p14:sldId id="483"/>
             <p14:sldId id="484"/>
             <p14:sldId id="485"/>
+            <p14:sldId id="486"/>
           </p14:sldIdLst>
         </p14:section>
       </p14:sectionLst>
@@ -449,7 +451,7 @@
             <a:fld id="{C3CD65D1-5C11-455D-9F9A-0E035F00A0DA}" type="datetimeFigureOut">
               <a:rPr lang="pt-BR" smtClean="0"/>
               <a:pPr/>
-              <a:t>03/05/2022</a:t>
+              <a:t>10/05/2022</a:t>
             </a:fld>
             <a:endParaRPr lang="pt-BR"/>
           </a:p>
@@ -617,7 +619,7 @@
             <a:fld id="{A05DA3EF-18EA-43DE-B1BB-402A3C558822}" type="datetimeFigureOut">
               <a:rPr lang="pt-BR" smtClean="0"/>
               <a:pPr/>
-              <a:t>03/05/2022</a:t>
+              <a:t>10/05/2022</a:t>
             </a:fld>
             <a:endParaRPr lang="pt-BR"/>
           </a:p>
@@ -1615,6 +1617,99 @@
     <p:extLst>
       <p:ext uri="{BB962C8B-B14F-4D97-AF65-F5344CB8AC3E}">
         <p14:creationId xmlns:p14="http://schemas.microsoft.com/office/powerpoint/2010/main" val="528599944"/>
+      </p:ext>
+    </p:extLst>
+  </p:cSld>
+  <p:clrMapOvr>
+    <a:masterClrMapping/>
+  </p:clrMapOvr>
+</p:notes>
+</file>
+
+<file path=ppt/notesSlides/notesSlide17.xml><?xml version="1.0" encoding="utf-8"?>
+<p:notes xmlns:a="http://schemas.openxmlformats.org/drawingml/2006/main" xmlns:r="http://schemas.openxmlformats.org/officeDocument/2006/relationships" xmlns:p="http://schemas.openxmlformats.org/presentationml/2006/main">
+  <p:cSld>
+    <p:spTree>
+      <p:nvGrpSpPr>
+        <p:cNvPr id="1" name=""/>
+        <p:cNvGrpSpPr/>
+        <p:nvPr/>
+      </p:nvGrpSpPr>
+      <p:grpSpPr>
+        <a:xfrm>
+          <a:off x="0" y="0"/>
+          <a:ext cx="0" cy="0"/>
+          <a:chOff x="0" y="0"/>
+          <a:chExt cx="0" cy="0"/>
+        </a:xfrm>
+      </p:grpSpPr>
+      <p:sp>
+        <p:nvSpPr>
+          <p:cNvPr id="2" name="Slide Image Placeholder 1"/>
+          <p:cNvSpPr>
+            <a:spLocks noGrp="1" noRot="1" noChangeAspect="1"/>
+          </p:cNvSpPr>
+          <p:nvPr>
+            <p:ph type="sldImg"/>
+          </p:nvPr>
+        </p:nvSpPr>
+        <p:spPr/>
+      </p:sp>
+      <p:sp>
+        <p:nvSpPr>
+          <p:cNvPr id="3" name="Notes Placeholder 2"/>
+          <p:cNvSpPr>
+            <a:spLocks noGrp="1"/>
+          </p:cNvSpPr>
+          <p:nvPr>
+            <p:ph type="body" idx="1"/>
+          </p:nvPr>
+        </p:nvSpPr>
+        <p:spPr/>
+        <p:txBody>
+          <a:bodyPr/>
+          <a:lstStyle/>
+          <a:p>
+            <a:endParaRPr lang="en-US"/>
+          </a:p>
+        </p:txBody>
+      </p:sp>
+      <p:sp>
+        <p:nvSpPr>
+          <p:cNvPr id="4" name="Slide Number Placeholder 3"/>
+          <p:cNvSpPr>
+            <a:spLocks noGrp="1"/>
+          </p:cNvSpPr>
+          <p:nvPr>
+            <p:ph type="sldNum" sz="quarter" idx="10"/>
+          </p:nvPr>
+        </p:nvSpPr>
+        <p:spPr/>
+        <p:txBody>
+          <a:bodyPr/>
+          <a:lstStyle/>
+          <a:p>
+            <a:fld id="{B39AF3DB-B6A1-2444-9DD8-53D016F8E638}" type="slidenum">
+              <a:rPr lang="pt-BR" smtClean="0">
+                <a:solidFill>
+                  <a:prstClr val="black"/>
+                </a:solidFill>
+              </a:rPr>
+              <a:pPr/>
+              <a:t>17</a:t>
+            </a:fld>
+            <a:endParaRPr lang="pt-BR">
+              <a:solidFill>
+                <a:prstClr val="black"/>
+              </a:solidFill>
+            </a:endParaRPr>
+          </a:p>
+        </p:txBody>
+      </p:sp>
+    </p:spTree>
+    <p:extLst>
+      <p:ext uri="{BB962C8B-B14F-4D97-AF65-F5344CB8AC3E}">
+        <p14:creationId xmlns:p14="http://schemas.microsoft.com/office/powerpoint/2010/main" val="1304265703"/>
       </p:ext>
     </p:extLst>
   </p:cSld>
@@ -35488,6 +35583,2100 @@
     <p:extLst>
       <p:ext uri="{BB962C8B-B14F-4D97-AF65-F5344CB8AC3E}">
         <p14:creationId xmlns:p14="http://schemas.microsoft.com/office/powerpoint/2010/main" val="1013480282"/>
+      </p:ext>
+    </p:extLst>
+  </p:cSld>
+  <p:clrMapOvr>
+    <a:masterClrMapping/>
+  </p:clrMapOvr>
+</p:sld>
+</file>
+
+<file path=ppt/slides/slide17.xml><?xml version="1.0" encoding="utf-8"?>
+<p:sld xmlns:a="http://schemas.openxmlformats.org/drawingml/2006/main" xmlns:r="http://schemas.openxmlformats.org/officeDocument/2006/relationships" xmlns:p="http://schemas.openxmlformats.org/presentationml/2006/main">
+  <p:cSld>
+    <p:spTree>
+      <p:nvGrpSpPr>
+        <p:cNvPr id="1" name=""/>
+        <p:cNvGrpSpPr/>
+        <p:nvPr/>
+      </p:nvGrpSpPr>
+      <p:grpSpPr>
+        <a:xfrm>
+          <a:off x="0" y="0"/>
+          <a:ext cx="0" cy="0"/>
+          <a:chOff x="0" y="0"/>
+          <a:chExt cx="0" cy="0"/>
+        </a:xfrm>
+      </p:grpSpPr>
+      <p:sp>
+        <p:nvSpPr>
+          <p:cNvPr id="43" name="Rectangle 42"/>
+          <p:cNvSpPr/>
+          <p:nvPr/>
+        </p:nvSpPr>
+        <p:spPr>
+          <a:xfrm>
+            <a:off x="6804884" y="1106495"/>
+            <a:ext cx="6254624" cy="2191469"/>
+          </a:xfrm>
+          <a:prstGeom prst="rect">
+            <a:avLst/>
+          </a:prstGeom>
+          <a:noFill/>
+          <a:ln w="12700">
+            <a:solidFill>
+              <a:schemeClr val="bg1">
+                <a:lumMod val="50000"/>
+              </a:schemeClr>
+            </a:solidFill>
+          </a:ln>
+        </p:spPr>
+        <p:style>
+          <a:lnRef idx="2">
+            <a:schemeClr val="accent4"/>
+          </a:lnRef>
+          <a:fillRef idx="1">
+            <a:schemeClr val="lt1"/>
+          </a:fillRef>
+          <a:effectRef idx="0">
+            <a:schemeClr val="accent4"/>
+          </a:effectRef>
+          <a:fontRef idx="minor">
+            <a:schemeClr val="dk1"/>
+          </a:fontRef>
+        </p:style>
+        <p:txBody>
+          <a:bodyPr tIns="105844" rtlCol="0" anchor="t"/>
+          <a:lstStyle/>
+          <a:p>
+            <a:pPr defTabSz="672130">
+              <a:spcAft>
+                <a:spcPts val="882"/>
+              </a:spcAft>
+            </a:pPr>
+            <a:endParaRPr lang="pt-BR" sz="1470" dirty="0">
+              <a:solidFill>
+                <a:schemeClr val="tx1"/>
+              </a:solidFill>
+              <a:latin typeface="Exo 2 Medium" panose="00000600000000000000" pitchFamily="50" charset="0"/>
+              <a:cs typeface="Simplon BP Regular"/>
+            </a:endParaRPr>
+          </a:p>
+        </p:txBody>
+      </p:sp>
+      <p:sp>
+        <p:nvSpPr>
+          <p:cNvPr id="3" name="Title 2"/>
+          <p:cNvSpPr>
+            <a:spLocks noGrp="1"/>
+          </p:cNvSpPr>
+          <p:nvPr>
+            <p:ph type="title"/>
+          </p:nvPr>
+        </p:nvSpPr>
+        <p:spPr>
+          <a:xfrm>
+            <a:off x="469692" y="185232"/>
+            <a:ext cx="12098020" cy="800352"/>
+          </a:xfrm>
+        </p:spPr>
+        <p:txBody>
+          <a:bodyPr vert="horz" wrap="square" lIns="105844" tIns="0" rIns="105844" bIns="0" numCol="1" anchor="t" anchorCtr="0" compatLnSpc="1">
+            <a:prstTxWarp prst="textNoShape">
+              <a:avLst/>
+            </a:prstTxWarp>
+            <a:noAutofit/>
+          </a:bodyPr>
+          <a:lstStyle/>
+          <a:p>
+            <a:pPr algn="l">
+              <a:spcAft>
+                <a:spcPts val="882"/>
+              </a:spcAft>
+            </a:pPr>
+            <a:r>
+              <a:rPr lang="en-US" sz="2646" dirty="0">
+                <a:solidFill>
+                  <a:prstClr val="black"/>
+                </a:solidFill>
+                <a:latin typeface="Exo 2 Medium" panose="00000600000000000000" pitchFamily="50" charset="0"/>
+                <a:cs typeface="Simplon Oi Headline"/>
+              </a:rPr>
+              <a:t>SEMANA Abril - 10/05/2022</a:t>
+            </a:r>
+          </a:p>
+        </p:txBody>
+      </p:sp>
+      <p:sp>
+        <p:nvSpPr>
+          <p:cNvPr id="78" name="TextBox 118"/>
+          <p:cNvSpPr txBox="1"/>
+          <p:nvPr/>
+        </p:nvSpPr>
+        <p:spPr>
+          <a:xfrm>
+            <a:off x="11822773" y="576471"/>
+            <a:ext cx="899678" cy="179824"/>
+          </a:xfrm>
+          <a:prstGeom prst="rect">
+            <a:avLst/>
+          </a:prstGeom>
+          <a:noFill/>
+          <a:ln w="12700">
+            <a:noFill/>
+          </a:ln>
+        </p:spPr>
+        <p:style>
+          <a:lnRef idx="2">
+            <a:schemeClr val="accent4"/>
+          </a:lnRef>
+          <a:fillRef idx="1">
+            <a:schemeClr val="lt1"/>
+          </a:fillRef>
+          <a:effectRef idx="0">
+            <a:schemeClr val="accent4"/>
+          </a:effectRef>
+          <a:fontRef idx="minor">
+            <a:schemeClr val="dk1"/>
+          </a:fontRef>
+        </p:style>
+        <p:txBody>
+          <a:bodyPr wrap="none" lIns="52922" tIns="52922" rIns="52922" bIns="0" rtlCol="0" anchor="b"/>
+          <a:lstStyle>
+            <a:defPPr>
+              <a:defRPr lang="en-US"/>
+            </a:defPPr>
+            <a:lvl1pPr algn="ctr">
+              <a:defRPr sz="1000" b="1">
+                <a:latin typeface="Simplon BP Regular"/>
+                <a:cs typeface="Simplon BP Regular"/>
+              </a:defRPr>
+            </a:lvl1pPr>
+            <a:lvl2pPr>
+              <a:defRPr>
+                <a:solidFill>
+                  <a:schemeClr val="dk1"/>
+                </a:solidFill>
+              </a:defRPr>
+            </a:lvl2pPr>
+            <a:lvl3pPr>
+              <a:defRPr>
+                <a:solidFill>
+                  <a:schemeClr val="dk1"/>
+                </a:solidFill>
+              </a:defRPr>
+            </a:lvl3pPr>
+            <a:lvl4pPr>
+              <a:defRPr>
+                <a:solidFill>
+                  <a:schemeClr val="dk1"/>
+                </a:solidFill>
+              </a:defRPr>
+            </a:lvl4pPr>
+            <a:lvl5pPr>
+              <a:defRPr>
+                <a:solidFill>
+                  <a:schemeClr val="dk1"/>
+                </a:solidFill>
+              </a:defRPr>
+            </a:lvl5pPr>
+            <a:lvl6pPr>
+              <a:defRPr>
+                <a:solidFill>
+                  <a:schemeClr val="dk1"/>
+                </a:solidFill>
+              </a:defRPr>
+            </a:lvl6pPr>
+            <a:lvl7pPr>
+              <a:defRPr>
+                <a:solidFill>
+                  <a:schemeClr val="dk1"/>
+                </a:solidFill>
+              </a:defRPr>
+            </a:lvl7pPr>
+            <a:lvl8pPr>
+              <a:defRPr>
+                <a:solidFill>
+                  <a:schemeClr val="dk1"/>
+                </a:solidFill>
+              </a:defRPr>
+            </a:lvl8pPr>
+            <a:lvl9pPr>
+              <a:defRPr>
+                <a:solidFill>
+                  <a:schemeClr val="dk1"/>
+                </a:solidFill>
+              </a:defRPr>
+            </a:lvl9pPr>
+          </a:lstStyle>
+          <a:p>
+            <a:pPr defTabSz="672130"/>
+            <a:r>
+              <a:rPr lang="pt-BR" sz="1176" b="0" dirty="0">
+                <a:solidFill>
+                  <a:prstClr val="black"/>
+                </a:solidFill>
+                <a:latin typeface="Exo 2 Medium" panose="00000600000000000000" pitchFamily="50" charset="0"/>
+              </a:rPr>
+              <a:t>Negócios</a:t>
+            </a:r>
+          </a:p>
+        </p:txBody>
+      </p:sp>
+      <p:sp>
+        <p:nvSpPr>
+          <p:cNvPr id="109" name="Oval 120"/>
+          <p:cNvSpPr>
+            <a:spLocks noChangeAspect="1"/>
+          </p:cNvSpPr>
+          <p:nvPr/>
+        </p:nvSpPr>
+        <p:spPr>
+          <a:xfrm>
+            <a:off x="11193898" y="297930"/>
+            <a:ext cx="211404" cy="211689"/>
+          </a:xfrm>
+          <a:prstGeom prst="ellipse">
+            <a:avLst/>
+          </a:prstGeom>
+          <a:solidFill>
+            <a:srgbClr val="1BCF13"/>
+          </a:solidFill>
+          <a:ln w="12700">
+            <a:solidFill>
+              <a:schemeClr val="accent3"/>
+            </a:solidFill>
+          </a:ln>
+        </p:spPr>
+        <p:style>
+          <a:lnRef idx="2">
+            <a:schemeClr val="accent1">
+              <a:shade val="50000"/>
+            </a:schemeClr>
+          </a:lnRef>
+          <a:fillRef idx="1">
+            <a:schemeClr val="accent1"/>
+          </a:fillRef>
+          <a:effectRef idx="0">
+            <a:schemeClr val="accent1"/>
+          </a:effectRef>
+          <a:fontRef idx="minor">
+            <a:schemeClr val="lt1"/>
+          </a:fontRef>
+        </p:style>
+        <p:txBody>
+          <a:bodyPr wrap="none" lIns="52922" tIns="52922" rIns="52922" rtlCol="0" anchor="ctr"/>
+          <a:lstStyle/>
+          <a:p>
+            <a:pPr algn="ctr" defTabSz="672130"/>
+            <a:endParaRPr lang="en-US" sz="1176" dirty="0">
+              <a:solidFill>
+                <a:prstClr val="black"/>
+              </a:solidFill>
+              <a:latin typeface="Exo 2 Medium" panose="00000600000000000000" pitchFamily="50" charset="0"/>
+              <a:cs typeface="Simplon BP Regular"/>
+            </a:endParaRPr>
+          </a:p>
+        </p:txBody>
+      </p:sp>
+      <p:sp>
+        <p:nvSpPr>
+          <p:cNvPr id="80" name="TextBox 123"/>
+          <p:cNvSpPr txBox="1"/>
+          <p:nvPr/>
+        </p:nvSpPr>
+        <p:spPr>
+          <a:xfrm>
+            <a:off x="10852497" y="576471"/>
+            <a:ext cx="899678" cy="179824"/>
+          </a:xfrm>
+          <a:prstGeom prst="rect">
+            <a:avLst/>
+          </a:prstGeom>
+          <a:noFill/>
+          <a:ln w="12700">
+            <a:noFill/>
+          </a:ln>
+        </p:spPr>
+        <p:style>
+          <a:lnRef idx="2">
+            <a:schemeClr val="accent4"/>
+          </a:lnRef>
+          <a:fillRef idx="1">
+            <a:schemeClr val="lt1"/>
+          </a:fillRef>
+          <a:effectRef idx="0">
+            <a:schemeClr val="accent4"/>
+          </a:effectRef>
+          <a:fontRef idx="minor">
+            <a:schemeClr val="dk1"/>
+          </a:fontRef>
+        </p:style>
+        <p:txBody>
+          <a:bodyPr wrap="none" lIns="52922" tIns="52922" rIns="52922" bIns="0" rtlCol="0" anchor="b"/>
+          <a:lstStyle>
+            <a:defPPr>
+              <a:defRPr lang="en-US"/>
+            </a:defPPr>
+            <a:lvl1pPr algn="ctr">
+              <a:defRPr sz="1000" b="1">
+                <a:latin typeface="Simplon BP Regular"/>
+                <a:cs typeface="Simplon BP Regular"/>
+              </a:defRPr>
+            </a:lvl1pPr>
+            <a:lvl2pPr>
+              <a:defRPr>
+                <a:solidFill>
+                  <a:schemeClr val="dk1"/>
+                </a:solidFill>
+              </a:defRPr>
+            </a:lvl2pPr>
+            <a:lvl3pPr>
+              <a:defRPr>
+                <a:solidFill>
+                  <a:schemeClr val="dk1"/>
+                </a:solidFill>
+              </a:defRPr>
+            </a:lvl3pPr>
+            <a:lvl4pPr>
+              <a:defRPr>
+                <a:solidFill>
+                  <a:schemeClr val="dk1"/>
+                </a:solidFill>
+              </a:defRPr>
+            </a:lvl4pPr>
+            <a:lvl5pPr>
+              <a:defRPr>
+                <a:solidFill>
+                  <a:schemeClr val="dk1"/>
+                </a:solidFill>
+              </a:defRPr>
+            </a:lvl5pPr>
+            <a:lvl6pPr>
+              <a:defRPr>
+                <a:solidFill>
+                  <a:schemeClr val="dk1"/>
+                </a:solidFill>
+              </a:defRPr>
+            </a:lvl6pPr>
+            <a:lvl7pPr>
+              <a:defRPr>
+                <a:solidFill>
+                  <a:schemeClr val="dk1"/>
+                </a:solidFill>
+              </a:defRPr>
+            </a:lvl7pPr>
+            <a:lvl8pPr>
+              <a:defRPr>
+                <a:solidFill>
+                  <a:schemeClr val="dk1"/>
+                </a:solidFill>
+              </a:defRPr>
+            </a:lvl8pPr>
+            <a:lvl9pPr>
+              <a:defRPr>
+                <a:solidFill>
+                  <a:schemeClr val="dk1"/>
+                </a:solidFill>
+              </a:defRPr>
+            </a:lvl9pPr>
+          </a:lstStyle>
+          <a:p>
+            <a:pPr defTabSz="672130"/>
+            <a:r>
+              <a:rPr lang="pt-BR" sz="1176" b="0" dirty="0">
+                <a:solidFill>
+                  <a:prstClr val="black"/>
+                </a:solidFill>
+                <a:latin typeface="Exo 2 Medium" panose="00000600000000000000" pitchFamily="50" charset="0"/>
+              </a:rPr>
+              <a:t>Plataforma</a:t>
+            </a:r>
+          </a:p>
+        </p:txBody>
+      </p:sp>
+      <p:sp>
+        <p:nvSpPr>
+          <p:cNvPr id="82" name="TextBox 128"/>
+          <p:cNvSpPr txBox="1"/>
+          <p:nvPr/>
+        </p:nvSpPr>
+        <p:spPr>
+          <a:xfrm>
+            <a:off x="9854245" y="576471"/>
+            <a:ext cx="899678" cy="179824"/>
+          </a:xfrm>
+          <a:prstGeom prst="rect">
+            <a:avLst/>
+          </a:prstGeom>
+          <a:noFill/>
+          <a:ln w="12700">
+            <a:noFill/>
+          </a:ln>
+        </p:spPr>
+        <p:style>
+          <a:lnRef idx="2">
+            <a:schemeClr val="accent4"/>
+          </a:lnRef>
+          <a:fillRef idx="1">
+            <a:schemeClr val="lt1"/>
+          </a:fillRef>
+          <a:effectRef idx="0">
+            <a:schemeClr val="accent4"/>
+          </a:effectRef>
+          <a:fontRef idx="minor">
+            <a:schemeClr val="dk1"/>
+          </a:fontRef>
+        </p:style>
+        <p:txBody>
+          <a:bodyPr wrap="none" lIns="52922" tIns="52922" rIns="52922" bIns="0" rtlCol="0" anchor="b"/>
+          <a:lstStyle>
+            <a:defPPr>
+              <a:defRPr lang="en-US"/>
+            </a:defPPr>
+            <a:lvl1pPr algn="ctr">
+              <a:defRPr sz="1000" b="1">
+                <a:latin typeface="Simplon BP Regular"/>
+                <a:cs typeface="Simplon BP Regular"/>
+              </a:defRPr>
+            </a:lvl1pPr>
+            <a:lvl2pPr>
+              <a:defRPr>
+                <a:solidFill>
+                  <a:schemeClr val="dk1"/>
+                </a:solidFill>
+              </a:defRPr>
+            </a:lvl2pPr>
+            <a:lvl3pPr>
+              <a:defRPr>
+                <a:solidFill>
+                  <a:schemeClr val="dk1"/>
+                </a:solidFill>
+              </a:defRPr>
+            </a:lvl3pPr>
+            <a:lvl4pPr>
+              <a:defRPr>
+                <a:solidFill>
+                  <a:schemeClr val="dk1"/>
+                </a:solidFill>
+              </a:defRPr>
+            </a:lvl4pPr>
+            <a:lvl5pPr>
+              <a:defRPr>
+                <a:solidFill>
+                  <a:schemeClr val="dk1"/>
+                </a:solidFill>
+              </a:defRPr>
+            </a:lvl5pPr>
+            <a:lvl6pPr>
+              <a:defRPr>
+                <a:solidFill>
+                  <a:schemeClr val="dk1"/>
+                </a:solidFill>
+              </a:defRPr>
+            </a:lvl6pPr>
+            <a:lvl7pPr>
+              <a:defRPr>
+                <a:solidFill>
+                  <a:schemeClr val="dk1"/>
+                </a:solidFill>
+              </a:defRPr>
+            </a:lvl7pPr>
+            <a:lvl8pPr>
+              <a:defRPr>
+                <a:solidFill>
+                  <a:schemeClr val="dk1"/>
+                </a:solidFill>
+              </a:defRPr>
+            </a:lvl8pPr>
+            <a:lvl9pPr>
+              <a:defRPr>
+                <a:solidFill>
+                  <a:schemeClr val="dk1"/>
+                </a:solidFill>
+              </a:defRPr>
+            </a:lvl9pPr>
+          </a:lstStyle>
+          <a:p>
+            <a:pPr defTabSz="672130"/>
+            <a:r>
+              <a:rPr lang="pt-BR" sz="1176" b="0" dirty="0">
+                <a:solidFill>
+                  <a:prstClr val="black"/>
+                </a:solidFill>
+                <a:latin typeface="Exo 2 Medium" panose="00000600000000000000" pitchFamily="50" charset="0"/>
+              </a:rPr>
+              <a:t>Back</a:t>
+            </a:r>
+          </a:p>
+        </p:txBody>
+      </p:sp>
+      <p:sp>
+        <p:nvSpPr>
+          <p:cNvPr id="84" name="TextBox 133"/>
+          <p:cNvSpPr txBox="1"/>
+          <p:nvPr/>
+        </p:nvSpPr>
+        <p:spPr>
+          <a:xfrm>
+            <a:off x="8986650" y="576471"/>
+            <a:ext cx="899678" cy="179824"/>
+          </a:xfrm>
+          <a:prstGeom prst="rect">
+            <a:avLst/>
+          </a:prstGeom>
+          <a:noFill/>
+          <a:ln w="12700">
+            <a:noFill/>
+          </a:ln>
+        </p:spPr>
+        <p:style>
+          <a:lnRef idx="2">
+            <a:schemeClr val="accent4"/>
+          </a:lnRef>
+          <a:fillRef idx="1">
+            <a:schemeClr val="lt1"/>
+          </a:fillRef>
+          <a:effectRef idx="0">
+            <a:schemeClr val="accent4"/>
+          </a:effectRef>
+          <a:fontRef idx="minor">
+            <a:schemeClr val="dk1"/>
+          </a:fontRef>
+        </p:style>
+        <p:txBody>
+          <a:bodyPr wrap="none" lIns="52922" tIns="52922" rIns="52922" bIns="0" rtlCol="0" anchor="b"/>
+          <a:lstStyle>
+            <a:defPPr>
+              <a:defRPr lang="en-US"/>
+            </a:defPPr>
+            <a:lvl1pPr algn="ctr">
+              <a:defRPr sz="1000" b="1">
+                <a:latin typeface="Simplon BP Regular"/>
+                <a:cs typeface="Simplon BP Regular"/>
+              </a:defRPr>
+            </a:lvl1pPr>
+            <a:lvl2pPr>
+              <a:defRPr>
+                <a:solidFill>
+                  <a:schemeClr val="dk1"/>
+                </a:solidFill>
+              </a:defRPr>
+            </a:lvl2pPr>
+            <a:lvl3pPr>
+              <a:defRPr>
+                <a:solidFill>
+                  <a:schemeClr val="dk1"/>
+                </a:solidFill>
+              </a:defRPr>
+            </a:lvl3pPr>
+            <a:lvl4pPr>
+              <a:defRPr>
+                <a:solidFill>
+                  <a:schemeClr val="dk1"/>
+                </a:solidFill>
+              </a:defRPr>
+            </a:lvl4pPr>
+            <a:lvl5pPr>
+              <a:defRPr>
+                <a:solidFill>
+                  <a:schemeClr val="dk1"/>
+                </a:solidFill>
+              </a:defRPr>
+            </a:lvl5pPr>
+            <a:lvl6pPr>
+              <a:defRPr>
+                <a:solidFill>
+                  <a:schemeClr val="dk1"/>
+                </a:solidFill>
+              </a:defRPr>
+            </a:lvl6pPr>
+            <a:lvl7pPr>
+              <a:defRPr>
+                <a:solidFill>
+                  <a:schemeClr val="dk1"/>
+                </a:solidFill>
+              </a:defRPr>
+            </a:lvl7pPr>
+            <a:lvl8pPr>
+              <a:defRPr>
+                <a:solidFill>
+                  <a:schemeClr val="dk1"/>
+                </a:solidFill>
+              </a:defRPr>
+            </a:lvl8pPr>
+            <a:lvl9pPr>
+              <a:defRPr>
+                <a:solidFill>
+                  <a:schemeClr val="dk1"/>
+                </a:solidFill>
+              </a:defRPr>
+            </a:lvl9pPr>
+          </a:lstStyle>
+          <a:p>
+            <a:pPr defTabSz="672130"/>
+            <a:r>
+              <a:rPr lang="pt-BR" sz="1176" b="0" dirty="0">
+                <a:solidFill>
+                  <a:prstClr val="black"/>
+                </a:solidFill>
+                <a:latin typeface="Exo 2 Medium" panose="00000600000000000000" pitchFamily="50" charset="0"/>
+              </a:rPr>
+              <a:t>Front</a:t>
+            </a:r>
+          </a:p>
+        </p:txBody>
+      </p:sp>
+      <p:sp>
+        <p:nvSpPr>
+          <p:cNvPr id="88" name="Oval 134"/>
+          <p:cNvSpPr>
+            <a:spLocks noChangeAspect="1"/>
+          </p:cNvSpPr>
+          <p:nvPr/>
+        </p:nvSpPr>
+        <p:spPr>
+          <a:xfrm>
+            <a:off x="8443555" y="297930"/>
+            <a:ext cx="211404" cy="211689"/>
+          </a:xfrm>
+          <a:prstGeom prst="ellipse">
+            <a:avLst/>
+          </a:prstGeom>
+          <a:solidFill>
+            <a:srgbClr val="1BCF13"/>
+          </a:solidFill>
+          <a:ln w="12700">
+            <a:solidFill>
+              <a:schemeClr val="accent3"/>
+            </a:solidFill>
+          </a:ln>
+        </p:spPr>
+        <p:style>
+          <a:lnRef idx="2">
+            <a:schemeClr val="accent1">
+              <a:shade val="50000"/>
+            </a:schemeClr>
+          </a:lnRef>
+          <a:fillRef idx="1">
+            <a:schemeClr val="accent1"/>
+          </a:fillRef>
+          <a:effectRef idx="0">
+            <a:schemeClr val="accent1"/>
+          </a:effectRef>
+          <a:fontRef idx="minor">
+            <a:schemeClr val="lt1"/>
+          </a:fontRef>
+        </p:style>
+        <p:txBody>
+          <a:bodyPr wrap="none" lIns="52922" tIns="52922" rIns="52922" rtlCol="0" anchor="ctr"/>
+          <a:lstStyle/>
+          <a:p>
+            <a:pPr algn="ctr" defTabSz="672130"/>
+            <a:endParaRPr lang="en-US" sz="1176" dirty="0">
+              <a:solidFill>
+                <a:prstClr val="black"/>
+              </a:solidFill>
+              <a:latin typeface="Exo 2 Medium" panose="00000600000000000000" pitchFamily="50" charset="0"/>
+              <a:cs typeface="Simplon BP Regular"/>
+            </a:endParaRPr>
+          </a:p>
+        </p:txBody>
+      </p:sp>
+      <p:sp>
+        <p:nvSpPr>
+          <p:cNvPr id="86" name="TextBox 138"/>
+          <p:cNvSpPr txBox="1"/>
+          <p:nvPr/>
+        </p:nvSpPr>
+        <p:spPr>
+          <a:xfrm>
+            <a:off x="8126053" y="576471"/>
+            <a:ext cx="899678" cy="179824"/>
+          </a:xfrm>
+          <a:prstGeom prst="rect">
+            <a:avLst/>
+          </a:prstGeom>
+          <a:noFill/>
+          <a:ln w="12700">
+            <a:noFill/>
+          </a:ln>
+        </p:spPr>
+        <p:style>
+          <a:lnRef idx="2">
+            <a:schemeClr val="accent4"/>
+          </a:lnRef>
+          <a:fillRef idx="1">
+            <a:schemeClr val="lt1"/>
+          </a:fillRef>
+          <a:effectRef idx="0">
+            <a:schemeClr val="accent4"/>
+          </a:effectRef>
+          <a:fontRef idx="minor">
+            <a:schemeClr val="dk1"/>
+          </a:fontRef>
+        </p:style>
+        <p:txBody>
+          <a:bodyPr wrap="none" lIns="52922" tIns="52922" rIns="52922" bIns="0" rtlCol="0" anchor="b"/>
+          <a:lstStyle>
+            <a:defPPr>
+              <a:defRPr lang="en-US"/>
+            </a:defPPr>
+            <a:lvl1pPr algn="ctr">
+              <a:defRPr sz="1000" b="1">
+                <a:latin typeface="Simplon BP Regular"/>
+                <a:cs typeface="Simplon BP Regular"/>
+              </a:defRPr>
+            </a:lvl1pPr>
+            <a:lvl2pPr>
+              <a:defRPr>
+                <a:solidFill>
+                  <a:schemeClr val="dk1"/>
+                </a:solidFill>
+              </a:defRPr>
+            </a:lvl2pPr>
+            <a:lvl3pPr>
+              <a:defRPr>
+                <a:solidFill>
+                  <a:schemeClr val="dk1"/>
+                </a:solidFill>
+              </a:defRPr>
+            </a:lvl3pPr>
+            <a:lvl4pPr>
+              <a:defRPr>
+                <a:solidFill>
+                  <a:schemeClr val="dk1"/>
+                </a:solidFill>
+              </a:defRPr>
+            </a:lvl4pPr>
+            <a:lvl5pPr>
+              <a:defRPr>
+                <a:solidFill>
+                  <a:schemeClr val="dk1"/>
+                </a:solidFill>
+              </a:defRPr>
+            </a:lvl5pPr>
+            <a:lvl6pPr>
+              <a:defRPr>
+                <a:solidFill>
+                  <a:schemeClr val="dk1"/>
+                </a:solidFill>
+              </a:defRPr>
+            </a:lvl6pPr>
+            <a:lvl7pPr>
+              <a:defRPr>
+                <a:solidFill>
+                  <a:schemeClr val="dk1"/>
+                </a:solidFill>
+              </a:defRPr>
+            </a:lvl7pPr>
+            <a:lvl8pPr>
+              <a:defRPr>
+                <a:solidFill>
+                  <a:schemeClr val="dk1"/>
+                </a:solidFill>
+              </a:defRPr>
+            </a:lvl8pPr>
+            <a:lvl9pPr>
+              <a:defRPr>
+                <a:solidFill>
+                  <a:schemeClr val="dk1"/>
+                </a:solidFill>
+              </a:defRPr>
+            </a:lvl9pPr>
+          </a:lstStyle>
+          <a:p>
+            <a:pPr defTabSz="672130"/>
+            <a:r>
+              <a:rPr lang="en-US" sz="1176" b="0" dirty="0">
+                <a:solidFill>
+                  <a:prstClr val="black"/>
+                </a:solidFill>
+                <a:latin typeface="Exo 2 Medium" panose="00000600000000000000" pitchFamily="50" charset="0"/>
+              </a:rPr>
+              <a:t>Equipe</a:t>
+            </a:r>
+          </a:p>
+        </p:txBody>
+      </p:sp>
+      <p:sp>
+        <p:nvSpPr>
+          <p:cNvPr id="64" name="Retângulo 63"/>
+          <p:cNvSpPr/>
+          <p:nvPr/>
+        </p:nvSpPr>
+        <p:spPr>
+          <a:xfrm>
+            <a:off x="512766" y="868345"/>
+            <a:ext cx="6186608" cy="238150"/>
+          </a:xfrm>
+          <a:prstGeom prst="rect">
+            <a:avLst/>
+          </a:prstGeom>
+          <a:solidFill>
+            <a:schemeClr val="bg1">
+              <a:lumMod val="85000"/>
+            </a:schemeClr>
+          </a:solidFill>
+        </p:spPr>
+        <p:txBody>
+          <a:bodyPr vert="horz" lIns="134422" tIns="67211" rIns="134422" bIns="67211" rtlCol="0" anchor="ctr"/>
+          <a:lstStyle/>
+          <a:p>
+            <a:pPr defTabSz="672130"/>
+            <a:r>
+              <a:rPr lang="en-US" sz="1544" dirty="0">
+                <a:latin typeface="Exo 2 Medium" panose="00000600000000000000" pitchFamily="50" charset="0"/>
+                <a:ea typeface="Simplon Oi Headline" charset="0"/>
+                <a:cs typeface="Simplon Oi Headline" charset="0"/>
+              </a:rPr>
+              <a:t>Progressos c/ responsáveis </a:t>
+            </a:r>
+          </a:p>
+        </p:txBody>
+      </p:sp>
+      <p:sp>
+        <p:nvSpPr>
+          <p:cNvPr id="65" name="Retângulo 64"/>
+          <p:cNvSpPr/>
+          <p:nvPr/>
+        </p:nvSpPr>
+        <p:spPr>
+          <a:xfrm>
+            <a:off x="6814576" y="868344"/>
+            <a:ext cx="6244932" cy="250902"/>
+          </a:xfrm>
+          <a:prstGeom prst="rect">
+            <a:avLst/>
+          </a:prstGeom>
+          <a:solidFill>
+            <a:schemeClr val="bg1">
+              <a:lumMod val="85000"/>
+            </a:schemeClr>
+          </a:solidFill>
+        </p:spPr>
+        <p:txBody>
+          <a:bodyPr vert="horz" lIns="134422" tIns="67211" rIns="134422" bIns="67211" rtlCol="0" anchor="ctr"/>
+          <a:lstStyle/>
+          <a:p>
+            <a:pPr defTabSz="672130"/>
+            <a:r>
+              <a:rPr lang="pt-BR" sz="1544" dirty="0">
+                <a:latin typeface="Exo 2 Medium" panose="00000600000000000000" pitchFamily="50" charset="0"/>
+                <a:ea typeface="Simplon Oi Headline" charset="0"/>
+                <a:cs typeface="Simplon Oi Headline" charset="0"/>
+              </a:rPr>
+              <a:t>Pontos atenção/ Principais Riscos</a:t>
+            </a:r>
+          </a:p>
+        </p:txBody>
+      </p:sp>
+      <p:sp>
+        <p:nvSpPr>
+          <p:cNvPr id="66" name="Retângulo 65"/>
+          <p:cNvSpPr/>
+          <p:nvPr/>
+        </p:nvSpPr>
+        <p:spPr>
+          <a:xfrm>
+            <a:off x="528898" y="3479441"/>
+            <a:ext cx="12551972" cy="238150"/>
+          </a:xfrm>
+          <a:prstGeom prst="rect">
+            <a:avLst/>
+          </a:prstGeom>
+          <a:solidFill>
+            <a:schemeClr val="bg1">
+              <a:lumMod val="85000"/>
+            </a:schemeClr>
+          </a:solidFill>
+        </p:spPr>
+        <p:txBody>
+          <a:bodyPr vert="horz" lIns="134422" tIns="67211" rIns="134422" bIns="67211" rtlCol="0" anchor="ctr"/>
+          <a:lstStyle/>
+          <a:p>
+            <a:pPr defTabSz="672130"/>
+            <a:r>
+              <a:rPr lang="pt-BR" sz="1544" dirty="0">
+                <a:latin typeface="Exo 2 Medium" panose="00000600000000000000" pitchFamily="50" charset="0"/>
+                <a:ea typeface="Simplon Oi Headline" charset="0"/>
+                <a:cs typeface="Simplon Oi Headline" charset="0"/>
+              </a:rPr>
+              <a:t>Próximos Passos c/ responsáveis </a:t>
+            </a:r>
+          </a:p>
+        </p:txBody>
+      </p:sp>
+      <p:sp>
+        <p:nvSpPr>
+          <p:cNvPr id="63" name="Rectangle 37"/>
+          <p:cNvSpPr/>
+          <p:nvPr/>
+        </p:nvSpPr>
+        <p:spPr>
+          <a:xfrm>
+            <a:off x="496765" y="1106495"/>
+            <a:ext cx="6207777" cy="2235805"/>
+          </a:xfrm>
+          <a:prstGeom prst="rect">
+            <a:avLst/>
+          </a:prstGeom>
+          <a:noFill/>
+          <a:ln w="12700">
+            <a:solidFill>
+              <a:schemeClr val="bg1">
+                <a:lumMod val="50000"/>
+              </a:schemeClr>
+            </a:solidFill>
+          </a:ln>
+        </p:spPr>
+        <p:style>
+          <a:lnRef idx="2">
+            <a:schemeClr val="accent4"/>
+          </a:lnRef>
+          <a:fillRef idx="1">
+            <a:schemeClr val="lt1"/>
+          </a:fillRef>
+          <a:effectRef idx="0">
+            <a:schemeClr val="accent4"/>
+          </a:effectRef>
+          <a:fontRef idx="minor">
+            <a:schemeClr val="dk1"/>
+          </a:fontRef>
+        </p:style>
+        <p:txBody>
+          <a:bodyPr tIns="105844" rtlCol="0" anchor="t"/>
+          <a:lstStyle/>
+          <a:p>
+            <a:pPr marL="252049" indent="-252049" fontAlgn="base">
+              <a:spcBef>
+                <a:spcPct val="0"/>
+              </a:spcBef>
+              <a:buFont typeface="Wingdings" panose="05000000000000000000" pitchFamily="2" charset="2"/>
+              <a:buChar char="ü"/>
+              <a:defRPr/>
+            </a:pPr>
+            <a:r>
+              <a:rPr lang="pt-BR" sz="1323" dirty="0">
+                <a:solidFill>
+                  <a:schemeClr val="tx1"/>
+                </a:solidFill>
+                <a:latin typeface="Exo 2 Medium" panose="00000600000000000000" pitchFamily="50" charset="0"/>
+                <a:cs typeface="Simplon BP Regular"/>
+              </a:rPr>
+              <a:t>Certificado Completo </a:t>
+            </a:r>
+            <a:r>
+              <a:rPr lang="pt-BR" sz="1323" b="1" dirty="0">
+                <a:solidFill>
+                  <a:schemeClr val="tx1"/>
+                </a:solidFill>
+                <a:latin typeface="Exo 2 Medium" panose="00000600000000000000" pitchFamily="50" charset="0"/>
+                <a:cs typeface="Simplon BP Regular"/>
+              </a:rPr>
+              <a:t>#</a:t>
+            </a:r>
+            <a:r>
+              <a:rPr lang="pt-BR" sz="1323" b="1" dirty="0" err="1">
+                <a:solidFill>
+                  <a:schemeClr val="tx1"/>
+                </a:solidFill>
+                <a:latin typeface="Exo 2 Medium" panose="00000600000000000000" pitchFamily="50" charset="0"/>
+                <a:cs typeface="Simplon BP Regular"/>
+              </a:rPr>
+              <a:t>Jailson</a:t>
+            </a:r>
+            <a:r>
+              <a:rPr lang="pt-BR" sz="1323" b="1" dirty="0">
+                <a:solidFill>
+                  <a:schemeClr val="tx1"/>
+                </a:solidFill>
+                <a:latin typeface="Exo 2 Medium" panose="00000600000000000000" pitchFamily="50" charset="0"/>
+                <a:cs typeface="Simplon BP Regular"/>
+              </a:rPr>
+              <a:t> e Bruno</a:t>
+            </a:r>
+          </a:p>
+          <a:p>
+            <a:pPr marL="252049" indent="-252049" fontAlgn="base">
+              <a:spcBef>
+                <a:spcPct val="0"/>
+              </a:spcBef>
+              <a:buFont typeface="Wingdings" panose="05000000000000000000" pitchFamily="2" charset="2"/>
+              <a:buChar char="ü"/>
+              <a:defRPr/>
+            </a:pPr>
+            <a:r>
+              <a:rPr lang="pt-BR" sz="1323" dirty="0">
+                <a:solidFill>
+                  <a:schemeClr val="tx1"/>
+                </a:solidFill>
+                <a:latin typeface="Exo 2 Medium" panose="00000600000000000000" pitchFamily="50" charset="0"/>
+                <a:cs typeface="Simplon BP Regular"/>
+              </a:rPr>
+              <a:t>Docker </a:t>
+            </a:r>
+            <a:r>
+              <a:rPr lang="pt-BR" sz="1323" b="1" dirty="0">
+                <a:solidFill>
+                  <a:schemeClr val="tx1"/>
+                </a:solidFill>
+                <a:latin typeface="Exo 2 Medium" panose="00000600000000000000" pitchFamily="50" charset="0"/>
+                <a:cs typeface="Simplon BP Regular"/>
+              </a:rPr>
+              <a:t>#</a:t>
+            </a:r>
+            <a:r>
+              <a:rPr lang="pt-BR" sz="1323" b="1" dirty="0" err="1">
+                <a:solidFill>
+                  <a:schemeClr val="tx1"/>
+                </a:solidFill>
+                <a:latin typeface="Exo 2 Medium" panose="00000600000000000000" pitchFamily="50" charset="0"/>
+                <a:cs typeface="Simplon BP Regular"/>
+              </a:rPr>
+              <a:t>Jailson</a:t>
+            </a:r>
+            <a:r>
+              <a:rPr lang="pt-BR" sz="1323" b="1" dirty="0">
+                <a:solidFill>
+                  <a:schemeClr val="tx1"/>
+                </a:solidFill>
+                <a:latin typeface="Exo 2 Medium" panose="00000600000000000000" pitchFamily="50" charset="0"/>
+                <a:cs typeface="Simplon BP Regular"/>
+              </a:rPr>
+              <a:t> e Bruno</a:t>
+            </a:r>
+          </a:p>
+          <a:p>
+            <a:pPr marL="252049" indent="-252049" fontAlgn="base">
+              <a:spcBef>
+                <a:spcPct val="0"/>
+              </a:spcBef>
+              <a:buFont typeface="Wingdings" panose="05000000000000000000" pitchFamily="2" charset="2"/>
+              <a:buChar char="ü"/>
+              <a:defRPr/>
+            </a:pPr>
+            <a:r>
+              <a:rPr lang="pt-BR" sz="1323" dirty="0">
+                <a:solidFill>
+                  <a:schemeClr val="tx1"/>
+                </a:solidFill>
+                <a:latin typeface="Exo 2 Medium" panose="00000600000000000000" pitchFamily="50" charset="0"/>
+                <a:cs typeface="Simplon BP Regular"/>
+              </a:rPr>
+              <a:t>Tela de agendamento em andamento </a:t>
+            </a:r>
+            <a:r>
+              <a:rPr lang="pt-BR" sz="1323" b="1" dirty="0">
+                <a:solidFill>
+                  <a:schemeClr val="tx1"/>
+                </a:solidFill>
+                <a:latin typeface="Exo 2 Medium" panose="00000600000000000000" pitchFamily="50" charset="0"/>
+                <a:cs typeface="Simplon BP Regular"/>
+              </a:rPr>
+              <a:t>#Pedro, Mathias e Jean</a:t>
+            </a:r>
+          </a:p>
+          <a:p>
+            <a:pPr marL="252049" indent="-252049" fontAlgn="base">
+              <a:spcBef>
+                <a:spcPct val="0"/>
+              </a:spcBef>
+              <a:buFont typeface="Wingdings" panose="05000000000000000000" pitchFamily="2" charset="2"/>
+              <a:buChar char="ü"/>
+              <a:defRPr/>
+            </a:pPr>
+            <a:endParaRPr lang="pt-BR" sz="1323" b="1" dirty="0">
+              <a:solidFill>
+                <a:schemeClr val="tx1"/>
+              </a:solidFill>
+              <a:latin typeface="Exo 2 Medium" panose="00000600000000000000" pitchFamily="50" charset="0"/>
+              <a:cs typeface="Simplon BP Regular"/>
+            </a:endParaRPr>
+          </a:p>
+        </p:txBody>
+      </p:sp>
+      <p:sp>
+        <p:nvSpPr>
+          <p:cNvPr id="2" name="Rectangle 43">
+            <a:extLst>
+              <a:ext uri="{FF2B5EF4-FFF2-40B4-BE49-F238E27FC236}">
+                <a16:creationId xmlns:a16="http://schemas.microsoft.com/office/drawing/2014/main" id="{B15BA19F-C787-4E6A-ADAB-C0DFF09C66A8}"/>
+              </a:ext>
+            </a:extLst>
+          </p:cNvPr>
+          <p:cNvSpPr>
+            <a:spLocks/>
+          </p:cNvSpPr>
+          <p:nvPr/>
+        </p:nvSpPr>
+        <p:spPr>
+          <a:xfrm>
+            <a:off x="493440" y="3717591"/>
+            <a:ext cx="12587430" cy="3634138"/>
+          </a:xfrm>
+          <a:prstGeom prst="rect">
+            <a:avLst/>
+          </a:prstGeom>
+          <a:noFill/>
+          <a:ln w="12700">
+            <a:solidFill>
+              <a:schemeClr val="bg1">
+                <a:lumMod val="50000"/>
+              </a:schemeClr>
+            </a:solidFill>
+          </a:ln>
+        </p:spPr>
+        <p:style>
+          <a:lnRef idx="2">
+            <a:schemeClr val="accent4"/>
+          </a:lnRef>
+          <a:fillRef idx="1">
+            <a:schemeClr val="lt1"/>
+          </a:fillRef>
+          <a:effectRef idx="0">
+            <a:schemeClr val="accent4"/>
+          </a:effectRef>
+          <a:fontRef idx="minor">
+            <a:schemeClr val="dk1"/>
+          </a:fontRef>
+        </p:style>
+        <p:txBody>
+          <a:bodyPr wrap="square" tIns="105844" numCol="3" rtlCol="0" anchor="t"/>
+          <a:lstStyle/>
+          <a:p>
+            <a:pPr marL="0" lvl="1" defTabSz="672130"/>
+            <a:r>
+              <a:rPr lang="pt-BR" sz="1323" b="1" dirty="0">
+                <a:solidFill>
+                  <a:schemeClr val="tx1"/>
+                </a:solidFill>
+                <a:latin typeface="Exo 2 Medium" panose="00000600000000000000" pitchFamily="50" charset="0"/>
+                <a:cs typeface="Simplon BP Regular"/>
+              </a:rPr>
+              <a:t>Frente Plataforma</a:t>
+            </a:r>
+          </a:p>
+          <a:p>
+            <a:pPr marL="285750" lvl="1" indent="-285750" defTabSz="672130">
+              <a:buFont typeface="Arial" panose="020B0604020202020204" pitchFamily="34" charset="0"/>
+              <a:buChar char="•"/>
+            </a:pPr>
+            <a:r>
+              <a:rPr lang="pt-BR" sz="1323" dirty="0" err="1">
+                <a:solidFill>
+                  <a:schemeClr val="tx1"/>
+                </a:solidFill>
+                <a:latin typeface="Exo 2 Medium" panose="00000600000000000000" pitchFamily="50" charset="0"/>
+                <a:cs typeface="Simplon BP Regular"/>
+              </a:rPr>
+              <a:t>Refatorar</a:t>
+            </a:r>
+            <a:r>
+              <a:rPr lang="pt-BR" sz="1323" dirty="0">
+                <a:solidFill>
+                  <a:schemeClr val="tx1"/>
+                </a:solidFill>
+                <a:latin typeface="Exo 2 Medium" panose="00000600000000000000" pitchFamily="50" charset="0"/>
+                <a:cs typeface="Simplon BP Regular"/>
+              </a:rPr>
+              <a:t> telas do app </a:t>
+            </a:r>
+            <a:r>
+              <a:rPr lang="pt-BR" sz="1323" b="1" dirty="0">
+                <a:solidFill>
+                  <a:schemeClr val="tx1"/>
+                </a:solidFill>
+                <a:latin typeface="Exo 2 Medium" panose="00000600000000000000" pitchFamily="50" charset="0"/>
+                <a:cs typeface="Simplon BP Regular"/>
+              </a:rPr>
+              <a:t>#Wesley e Ferraz</a:t>
+            </a:r>
+          </a:p>
+          <a:p>
+            <a:pPr marL="0" lvl="1" defTabSz="672130"/>
+            <a:endParaRPr lang="pt-BR" sz="1323" b="1" dirty="0">
+              <a:solidFill>
+                <a:schemeClr val="tx1"/>
+              </a:solidFill>
+              <a:latin typeface="Exo 2 Medium" panose="00000600000000000000" pitchFamily="50" charset="0"/>
+              <a:cs typeface="Simplon BP Regular"/>
+            </a:endParaRPr>
+          </a:p>
+          <a:p>
+            <a:pPr marL="0" lvl="1" defTabSz="672130"/>
+            <a:r>
+              <a:rPr lang="pt-BR" sz="1323" b="1" dirty="0">
+                <a:solidFill>
+                  <a:schemeClr val="tx1"/>
+                </a:solidFill>
+                <a:latin typeface="Exo 2 Medium" panose="00000600000000000000" pitchFamily="50" charset="0"/>
+                <a:cs typeface="Simplon BP Regular"/>
+              </a:rPr>
+              <a:t>Frente Back-</a:t>
+            </a:r>
+            <a:r>
+              <a:rPr lang="pt-BR" sz="1323" b="1" dirty="0" err="1">
+                <a:solidFill>
+                  <a:schemeClr val="tx1"/>
+                </a:solidFill>
+                <a:latin typeface="Exo 2 Medium" panose="00000600000000000000" pitchFamily="50" charset="0"/>
+                <a:cs typeface="Simplon BP Regular"/>
+              </a:rPr>
+              <a:t>End</a:t>
+            </a:r>
+            <a:endParaRPr lang="pt-BR" sz="1323" b="1" dirty="0">
+              <a:solidFill>
+                <a:schemeClr val="tx1"/>
+              </a:solidFill>
+              <a:latin typeface="Exo 2 Medium" panose="00000600000000000000" pitchFamily="50" charset="0"/>
+              <a:cs typeface="Simplon BP Regular"/>
+            </a:endParaRPr>
+          </a:p>
+          <a:p>
+            <a:pPr marL="285750" lvl="1" indent="-285750" defTabSz="672130">
+              <a:buFont typeface="Arial" panose="020B0604020202020204" pitchFamily="34" charset="0"/>
+              <a:buChar char="•"/>
+            </a:pPr>
+            <a:r>
+              <a:rPr lang="pt-BR" sz="1323" dirty="0">
+                <a:solidFill>
+                  <a:schemeClr val="tx1"/>
+                </a:solidFill>
+                <a:latin typeface="Exo 2 Medium" panose="00000600000000000000" pitchFamily="50" charset="0"/>
+                <a:cs typeface="Simplon BP Regular"/>
+              </a:rPr>
+              <a:t>Conectar as telas com o banco </a:t>
+            </a:r>
+            <a:r>
+              <a:rPr lang="pt-BR" sz="1323" b="1" dirty="0">
+                <a:solidFill>
+                  <a:schemeClr val="tx1"/>
+                </a:solidFill>
+                <a:latin typeface="Exo 2 Medium" panose="00000600000000000000" pitchFamily="50" charset="0"/>
+                <a:cs typeface="Simplon BP Regular"/>
+              </a:rPr>
+              <a:t>#Jean, Mathias e Pedro</a:t>
+            </a:r>
+          </a:p>
+          <a:p>
+            <a:pPr marL="285750" lvl="1" indent="-285750" defTabSz="672130">
+              <a:buFont typeface="Arial" panose="020B0604020202020204" pitchFamily="34" charset="0"/>
+              <a:buChar char="•"/>
+            </a:pPr>
+            <a:r>
+              <a:rPr lang="pt-BR" sz="1323" dirty="0">
+                <a:solidFill>
+                  <a:schemeClr val="tx1"/>
+                </a:solidFill>
+                <a:latin typeface="Exo 2 Medium" panose="00000600000000000000" pitchFamily="50" charset="0"/>
+                <a:cs typeface="Simplon BP Regular"/>
+              </a:rPr>
+              <a:t>Configurar na nuvem cloud para o file server</a:t>
+            </a:r>
+            <a:r>
+              <a:rPr lang="pt-BR" sz="1323" b="1" dirty="0">
+                <a:solidFill>
+                  <a:schemeClr val="tx1"/>
+                </a:solidFill>
+                <a:latin typeface="Exo 2 Medium" panose="00000600000000000000" pitchFamily="50" charset="0"/>
+                <a:cs typeface="Simplon BP Regular"/>
+              </a:rPr>
+              <a:t> #</a:t>
+            </a:r>
+            <a:r>
+              <a:rPr lang="pt-BR" sz="1323" b="1" dirty="0" err="1">
+                <a:solidFill>
+                  <a:schemeClr val="tx1"/>
+                </a:solidFill>
+                <a:latin typeface="Exo 2 Medium" panose="00000600000000000000" pitchFamily="50" charset="0"/>
+                <a:cs typeface="Simplon BP Regular"/>
+              </a:rPr>
+              <a:t>Jailson</a:t>
+            </a:r>
+            <a:r>
+              <a:rPr lang="pt-BR" sz="1323" b="1" dirty="0">
+                <a:solidFill>
+                  <a:schemeClr val="tx1"/>
+                </a:solidFill>
+                <a:latin typeface="Exo 2 Medium" panose="00000600000000000000" pitchFamily="50" charset="0"/>
+                <a:cs typeface="Simplon BP Regular"/>
+              </a:rPr>
+              <a:t> e Bruno</a:t>
+            </a:r>
+          </a:p>
+          <a:p>
+            <a:pPr marL="0" lvl="1" defTabSz="672130"/>
+            <a:r>
+              <a:rPr lang="pt-BR" sz="1323" b="1" dirty="0">
+                <a:solidFill>
+                  <a:schemeClr val="tx1"/>
+                </a:solidFill>
+                <a:latin typeface="Exo 2 Medium" panose="00000600000000000000" pitchFamily="50" charset="0"/>
+                <a:cs typeface="Simplon BP Regular"/>
+              </a:rPr>
+              <a:t>Frente Front-End</a:t>
+            </a:r>
+          </a:p>
+          <a:p>
+            <a:pPr marL="285750" lvl="1" indent="-285750" defTabSz="672130">
+              <a:buFont typeface="Wingdings" panose="05000000000000000000" pitchFamily="2" charset="2"/>
+              <a:buChar char="§"/>
+            </a:pPr>
+            <a:r>
+              <a:rPr lang="pt-BR" sz="1200" dirty="0">
+                <a:solidFill>
+                  <a:schemeClr val="tx1"/>
+                </a:solidFill>
+                <a:latin typeface="Exo 2 Medium" panose="00000600000000000000" pitchFamily="50" charset="0"/>
+                <a:cs typeface="Simplon BP Regular"/>
+              </a:rPr>
+              <a:t>Arrumar botão e menu </a:t>
+            </a:r>
+            <a:r>
+              <a:rPr lang="pt-BR" sz="1200" b="1" dirty="0">
+                <a:solidFill>
+                  <a:schemeClr val="tx1"/>
+                </a:solidFill>
+                <a:latin typeface="Exo 2 Medium" panose="00000600000000000000" pitchFamily="50" charset="0"/>
+                <a:cs typeface="Simplon BP Regular"/>
+              </a:rPr>
+              <a:t>#Ferraz e Wesley</a:t>
+            </a:r>
+          </a:p>
+          <a:p>
+            <a:pPr marL="285750" lvl="1" indent="-285750" defTabSz="672130">
+              <a:buFont typeface="Wingdings" panose="05000000000000000000" pitchFamily="2" charset="2"/>
+              <a:buChar char="§"/>
+            </a:pPr>
+            <a:r>
+              <a:rPr lang="pt-BR" sz="1200" dirty="0">
+                <a:solidFill>
+                  <a:schemeClr val="tx1"/>
+                </a:solidFill>
+                <a:latin typeface="Exo 2 Medium" panose="00000600000000000000" pitchFamily="50" charset="0"/>
+                <a:cs typeface="Simplon BP Regular"/>
+              </a:rPr>
+              <a:t>Fragmentos nas telas em andamento</a:t>
+            </a:r>
+            <a:r>
+              <a:rPr lang="pt-BR" sz="1200" b="1" dirty="0">
+                <a:solidFill>
+                  <a:schemeClr val="tx1"/>
+                </a:solidFill>
+                <a:latin typeface="Exo 2 Medium" panose="00000600000000000000" pitchFamily="50" charset="0"/>
+                <a:cs typeface="Simplon BP Regular"/>
+              </a:rPr>
+              <a:t> #Ferraz e Wesley</a:t>
+            </a:r>
+            <a:br>
+              <a:rPr lang="pt-BR" sz="1200" b="1" dirty="0">
+                <a:solidFill>
+                  <a:schemeClr val="tx1"/>
+                </a:solidFill>
+                <a:latin typeface="Exo 2 Medium" panose="00000600000000000000" pitchFamily="50" charset="0"/>
+                <a:cs typeface="Simplon BP Regular"/>
+              </a:rPr>
+            </a:br>
+            <a:endParaRPr lang="pt-BR" sz="1200" b="1" dirty="0">
+              <a:solidFill>
+                <a:schemeClr val="tx1"/>
+              </a:solidFill>
+              <a:latin typeface="Exo 2 Medium" panose="00000600000000000000" pitchFamily="50" charset="0"/>
+              <a:cs typeface="Simplon BP Regular"/>
+            </a:endParaRPr>
+          </a:p>
+          <a:p>
+            <a:pPr marL="0" lvl="1" defTabSz="672130"/>
+            <a:r>
+              <a:rPr lang="pt-BR" sz="1320" b="1" dirty="0">
+                <a:solidFill>
+                  <a:schemeClr val="tx1"/>
+                </a:solidFill>
+                <a:latin typeface="Exo 2 Medium" panose="00000600000000000000" pitchFamily="50" charset="0"/>
+                <a:cs typeface="Simplon BP Regular"/>
+              </a:rPr>
+              <a:t>Frente Negócios</a:t>
+            </a:r>
+          </a:p>
+          <a:p>
+            <a:pPr marL="0" lvl="1" defTabSz="672130"/>
+            <a:endParaRPr lang="pt-BR" sz="1320" b="1" dirty="0">
+              <a:solidFill>
+                <a:schemeClr val="tx1"/>
+              </a:solidFill>
+              <a:latin typeface="Exo 2 Medium" panose="00000600000000000000" pitchFamily="50" charset="0"/>
+              <a:cs typeface="Simplon BP Regular"/>
+            </a:endParaRPr>
+          </a:p>
+          <a:p>
+            <a:pPr marL="285750" lvl="1" indent="-285750" defTabSz="672130">
+              <a:buFont typeface="Wingdings" pitchFamily="2" charset="2"/>
+              <a:buChar char="§"/>
+            </a:pPr>
+            <a:r>
+              <a:rPr lang="pt-BR" sz="1320" dirty="0">
+                <a:solidFill>
+                  <a:schemeClr val="tx1"/>
+                </a:solidFill>
+                <a:latin typeface="Exo 2 Medium" panose="00000600000000000000" pitchFamily="50" charset="0"/>
+                <a:cs typeface="Simplon BP Regular"/>
+              </a:rPr>
+              <a:t>White </a:t>
+            </a:r>
+            <a:r>
+              <a:rPr lang="pt-BR" sz="1320" dirty="0" err="1">
+                <a:solidFill>
+                  <a:schemeClr val="tx1"/>
+                </a:solidFill>
+                <a:latin typeface="Exo 2 Medium" panose="00000600000000000000" pitchFamily="50" charset="0"/>
+                <a:cs typeface="Simplon BP Regular"/>
+              </a:rPr>
+              <a:t>Paper</a:t>
+            </a:r>
+            <a:r>
+              <a:rPr lang="pt-BR" sz="1320" dirty="0">
+                <a:solidFill>
+                  <a:schemeClr val="tx1"/>
+                </a:solidFill>
+                <a:latin typeface="Exo 2 Medium" panose="00000600000000000000" pitchFamily="50" charset="0"/>
+                <a:cs typeface="Simplon BP Regular"/>
+              </a:rPr>
+              <a:t> Revisar </a:t>
+            </a:r>
+            <a:r>
+              <a:rPr lang="pt-BR" sz="1320" b="1" dirty="0">
+                <a:solidFill>
+                  <a:schemeClr val="tx1"/>
+                </a:solidFill>
+                <a:latin typeface="Exo 2 Medium" panose="00000600000000000000" pitchFamily="50" charset="0"/>
+                <a:cs typeface="Simplon BP Regular"/>
+              </a:rPr>
+              <a:t>#Wesley</a:t>
+            </a:r>
+          </a:p>
+          <a:p>
+            <a:pPr marL="285750" lvl="1" indent="-285750" defTabSz="672130">
+              <a:buFont typeface="Wingdings" pitchFamily="2" charset="2"/>
+              <a:buChar char="§"/>
+            </a:pPr>
+            <a:endParaRPr lang="pt-BR" sz="1320" b="1" dirty="0">
+              <a:solidFill>
+                <a:schemeClr val="tx1"/>
+              </a:solidFill>
+              <a:latin typeface="Exo 2 Medium" panose="00000600000000000000" pitchFamily="50" charset="0"/>
+              <a:cs typeface="Simplon BP Regular"/>
+            </a:endParaRPr>
+          </a:p>
+          <a:p>
+            <a:pPr marL="0" lvl="1"/>
+            <a:endParaRPr lang="pt-BR" sz="1320" b="1" dirty="0">
+              <a:solidFill>
+                <a:schemeClr val="tx1"/>
+              </a:solidFill>
+              <a:latin typeface="Exo 2 Medium" panose="00000600000000000000" pitchFamily="50" charset="0"/>
+              <a:cs typeface="Simplon BP Regular"/>
+            </a:endParaRPr>
+          </a:p>
+        </p:txBody>
+      </p:sp>
+      <p:sp>
+        <p:nvSpPr>
+          <p:cNvPr id="6" name="Oval 134">
+            <a:extLst>
+              <a:ext uri="{FF2B5EF4-FFF2-40B4-BE49-F238E27FC236}">
+                <a16:creationId xmlns:a16="http://schemas.microsoft.com/office/drawing/2014/main" id="{70825C6F-9257-4CF5-8C62-1CA1EB2F8815}"/>
+              </a:ext>
+            </a:extLst>
+          </p:cNvPr>
+          <p:cNvSpPr>
+            <a:spLocks noChangeAspect="1"/>
+          </p:cNvSpPr>
+          <p:nvPr/>
+        </p:nvSpPr>
+        <p:spPr>
+          <a:xfrm>
+            <a:off x="9323960" y="269355"/>
+            <a:ext cx="211404" cy="211689"/>
+          </a:xfrm>
+          <a:prstGeom prst="ellipse">
+            <a:avLst/>
+          </a:prstGeom>
+          <a:solidFill>
+            <a:srgbClr val="FFFF00"/>
+          </a:solidFill>
+          <a:ln w="12700">
+            <a:solidFill>
+              <a:schemeClr val="accent3"/>
+            </a:solidFill>
+          </a:ln>
+        </p:spPr>
+        <p:style>
+          <a:lnRef idx="2">
+            <a:schemeClr val="accent1">
+              <a:shade val="50000"/>
+            </a:schemeClr>
+          </a:lnRef>
+          <a:fillRef idx="1">
+            <a:schemeClr val="accent1"/>
+          </a:fillRef>
+          <a:effectRef idx="0">
+            <a:schemeClr val="accent1"/>
+          </a:effectRef>
+          <a:fontRef idx="minor">
+            <a:schemeClr val="lt1"/>
+          </a:fontRef>
+        </p:style>
+        <p:txBody>
+          <a:bodyPr wrap="none" lIns="52922" tIns="52922" rIns="52922" rtlCol="0" anchor="ctr"/>
+          <a:lstStyle/>
+          <a:p>
+            <a:pPr algn="ctr" defTabSz="672130"/>
+            <a:endParaRPr lang="en-US" sz="1176" dirty="0">
+              <a:ln>
+                <a:solidFill>
+                  <a:srgbClr val="00B050"/>
+                </a:solidFill>
+              </a:ln>
+              <a:solidFill>
+                <a:srgbClr val="1BCF13"/>
+              </a:solidFill>
+              <a:highlight>
+                <a:srgbClr val="00FF00"/>
+              </a:highlight>
+              <a:latin typeface="Exo 2 Medium" panose="00000600000000000000" pitchFamily="50" charset="0"/>
+              <a:cs typeface="Simplon BP Regular"/>
+            </a:endParaRPr>
+          </a:p>
+        </p:txBody>
+      </p:sp>
+      <p:sp>
+        <p:nvSpPr>
+          <p:cNvPr id="9" name="Oval 134">
+            <a:extLst>
+              <a:ext uri="{FF2B5EF4-FFF2-40B4-BE49-F238E27FC236}">
+                <a16:creationId xmlns:a16="http://schemas.microsoft.com/office/drawing/2014/main" id="{B60B13C9-0C70-4C0F-82B2-D0CD4FDFC1F0}"/>
+              </a:ext>
+            </a:extLst>
+          </p:cNvPr>
+          <p:cNvSpPr>
+            <a:spLocks noChangeAspect="1"/>
+          </p:cNvSpPr>
+          <p:nvPr/>
+        </p:nvSpPr>
+        <p:spPr>
+          <a:xfrm>
+            <a:off x="12155999" y="297930"/>
+            <a:ext cx="211404" cy="211689"/>
+          </a:xfrm>
+          <a:prstGeom prst="ellipse">
+            <a:avLst/>
+          </a:prstGeom>
+          <a:solidFill>
+            <a:srgbClr val="1BCF13"/>
+          </a:solidFill>
+          <a:ln w="12700">
+            <a:solidFill>
+              <a:schemeClr val="accent3"/>
+            </a:solidFill>
+          </a:ln>
+        </p:spPr>
+        <p:style>
+          <a:lnRef idx="2">
+            <a:schemeClr val="accent1">
+              <a:shade val="50000"/>
+            </a:schemeClr>
+          </a:lnRef>
+          <a:fillRef idx="1">
+            <a:schemeClr val="accent1"/>
+          </a:fillRef>
+          <a:effectRef idx="0">
+            <a:schemeClr val="accent1"/>
+          </a:effectRef>
+          <a:fontRef idx="minor">
+            <a:schemeClr val="lt1"/>
+          </a:fontRef>
+        </p:style>
+        <p:txBody>
+          <a:bodyPr wrap="none" lIns="52922" tIns="52922" rIns="52922" rtlCol="0" anchor="ctr"/>
+          <a:lstStyle/>
+          <a:p>
+            <a:pPr algn="ctr" defTabSz="672130"/>
+            <a:endParaRPr lang="en-US" sz="1176" dirty="0">
+              <a:solidFill>
+                <a:prstClr val="black"/>
+              </a:solidFill>
+              <a:latin typeface="Exo 2 Medium" panose="00000600000000000000" pitchFamily="50" charset="0"/>
+              <a:cs typeface="Simplon BP Regular"/>
+            </a:endParaRPr>
+          </a:p>
+        </p:txBody>
+      </p:sp>
+      <p:sp>
+        <p:nvSpPr>
+          <p:cNvPr id="5" name="Retângulo 4">
+            <a:extLst>
+              <a:ext uri="{FF2B5EF4-FFF2-40B4-BE49-F238E27FC236}">
+                <a16:creationId xmlns:a16="http://schemas.microsoft.com/office/drawing/2014/main" id="{A1C14918-6027-46B3-96BF-C5F7FDEC3276}"/>
+              </a:ext>
+            </a:extLst>
+          </p:cNvPr>
+          <p:cNvSpPr/>
+          <p:nvPr/>
+        </p:nvSpPr>
+        <p:spPr>
+          <a:xfrm>
+            <a:off x="8017619" y="209534"/>
+            <a:ext cx="5041889" cy="618769"/>
+          </a:xfrm>
+          <a:prstGeom prst="rect">
+            <a:avLst/>
+          </a:prstGeom>
+          <a:noFill/>
+          <a:ln w="6350">
+            <a:solidFill>
+              <a:schemeClr val="bg1">
+                <a:lumMod val="75000"/>
+              </a:schemeClr>
+            </a:solidFill>
+          </a:ln>
+        </p:spPr>
+        <p:style>
+          <a:lnRef idx="2">
+            <a:schemeClr val="accent1">
+              <a:shade val="50000"/>
+            </a:schemeClr>
+          </a:lnRef>
+          <a:fillRef idx="1">
+            <a:schemeClr val="accent1"/>
+          </a:fillRef>
+          <a:effectRef idx="0">
+            <a:schemeClr val="accent1"/>
+          </a:effectRef>
+          <a:fontRef idx="minor">
+            <a:schemeClr val="lt1"/>
+          </a:fontRef>
+        </p:style>
+        <p:txBody>
+          <a:bodyPr rtlCol="0" anchor="ctr"/>
+          <a:lstStyle/>
+          <a:p>
+            <a:pPr algn="ctr"/>
+            <a:endParaRPr lang="pt-BR">
+              <a:latin typeface="Exo 2 Medium" panose="00000600000000000000" pitchFamily="50" charset="0"/>
+            </a:endParaRPr>
+          </a:p>
+        </p:txBody>
+      </p:sp>
+      <p:sp>
+        <p:nvSpPr>
+          <p:cNvPr id="8" name="TextBox 138">
+            <a:extLst>
+              <a:ext uri="{FF2B5EF4-FFF2-40B4-BE49-F238E27FC236}">
+                <a16:creationId xmlns:a16="http://schemas.microsoft.com/office/drawing/2014/main" id="{5CE7D08C-795B-4BF1-97F6-F9773F4E9F4C}"/>
+              </a:ext>
+            </a:extLst>
+          </p:cNvPr>
+          <p:cNvSpPr txBox="1"/>
+          <p:nvPr/>
+        </p:nvSpPr>
+        <p:spPr>
+          <a:xfrm>
+            <a:off x="9715810" y="51570"/>
+            <a:ext cx="1478088" cy="211688"/>
+          </a:xfrm>
+          <a:prstGeom prst="rect">
+            <a:avLst/>
+          </a:prstGeom>
+          <a:solidFill>
+            <a:schemeClr val="bg1"/>
+          </a:solidFill>
+          <a:ln w="12700">
+            <a:noFill/>
+          </a:ln>
+        </p:spPr>
+        <p:style>
+          <a:lnRef idx="2">
+            <a:schemeClr val="accent4"/>
+          </a:lnRef>
+          <a:fillRef idx="1">
+            <a:schemeClr val="lt1"/>
+          </a:fillRef>
+          <a:effectRef idx="0">
+            <a:schemeClr val="accent4"/>
+          </a:effectRef>
+          <a:fontRef idx="minor">
+            <a:schemeClr val="dk1"/>
+          </a:fontRef>
+        </p:style>
+        <p:txBody>
+          <a:bodyPr wrap="none" lIns="52922" tIns="52922" rIns="52922" bIns="0" rtlCol="0" anchor="b"/>
+          <a:lstStyle>
+            <a:defPPr>
+              <a:defRPr lang="en-US"/>
+            </a:defPPr>
+            <a:lvl1pPr algn="ctr">
+              <a:defRPr sz="1000" b="1">
+                <a:latin typeface="Simplon BP Regular"/>
+                <a:cs typeface="Simplon BP Regular"/>
+              </a:defRPr>
+            </a:lvl1pPr>
+            <a:lvl2pPr>
+              <a:defRPr>
+                <a:solidFill>
+                  <a:schemeClr val="dk1"/>
+                </a:solidFill>
+              </a:defRPr>
+            </a:lvl2pPr>
+            <a:lvl3pPr>
+              <a:defRPr>
+                <a:solidFill>
+                  <a:schemeClr val="dk1"/>
+                </a:solidFill>
+              </a:defRPr>
+            </a:lvl3pPr>
+            <a:lvl4pPr>
+              <a:defRPr>
+                <a:solidFill>
+                  <a:schemeClr val="dk1"/>
+                </a:solidFill>
+              </a:defRPr>
+            </a:lvl4pPr>
+            <a:lvl5pPr>
+              <a:defRPr>
+                <a:solidFill>
+                  <a:schemeClr val="dk1"/>
+                </a:solidFill>
+              </a:defRPr>
+            </a:lvl5pPr>
+            <a:lvl6pPr>
+              <a:defRPr>
+                <a:solidFill>
+                  <a:schemeClr val="dk1"/>
+                </a:solidFill>
+              </a:defRPr>
+            </a:lvl6pPr>
+            <a:lvl7pPr>
+              <a:defRPr>
+                <a:solidFill>
+                  <a:schemeClr val="dk1"/>
+                </a:solidFill>
+              </a:defRPr>
+            </a:lvl7pPr>
+            <a:lvl8pPr>
+              <a:defRPr>
+                <a:solidFill>
+                  <a:schemeClr val="dk1"/>
+                </a:solidFill>
+              </a:defRPr>
+            </a:lvl8pPr>
+            <a:lvl9pPr>
+              <a:defRPr>
+                <a:solidFill>
+                  <a:schemeClr val="dk1"/>
+                </a:solidFill>
+              </a:defRPr>
+            </a:lvl9pPr>
+          </a:lstStyle>
+          <a:p>
+            <a:pPr defTabSz="672130"/>
+            <a:r>
+              <a:rPr lang="en-US" sz="1176" b="0" dirty="0">
+                <a:solidFill>
+                  <a:prstClr val="black"/>
+                </a:solidFill>
+                <a:latin typeface="Exo 2 Medium" panose="00000600000000000000" pitchFamily="50" charset="0"/>
+              </a:rPr>
+              <a:t>    Farol do Projeto   </a:t>
+            </a:r>
+          </a:p>
+        </p:txBody>
+      </p:sp>
+      <p:sp>
+        <p:nvSpPr>
+          <p:cNvPr id="22" name="Oval 120">
+            <a:extLst>
+              <a:ext uri="{FF2B5EF4-FFF2-40B4-BE49-F238E27FC236}">
+                <a16:creationId xmlns:a16="http://schemas.microsoft.com/office/drawing/2014/main" id="{CCFA3F41-39FA-48EC-9FEC-A2A8A34BADB1}"/>
+              </a:ext>
+            </a:extLst>
+          </p:cNvPr>
+          <p:cNvSpPr>
+            <a:spLocks noChangeAspect="1"/>
+          </p:cNvSpPr>
+          <p:nvPr/>
+        </p:nvSpPr>
+        <p:spPr>
+          <a:xfrm>
+            <a:off x="9330787" y="284377"/>
+            <a:ext cx="211404" cy="211689"/>
+          </a:xfrm>
+          <a:prstGeom prst="ellipse">
+            <a:avLst/>
+          </a:prstGeom>
+          <a:solidFill>
+            <a:srgbClr val="1BCF13"/>
+          </a:solidFill>
+          <a:ln w="12700">
+            <a:solidFill>
+              <a:schemeClr val="accent3"/>
+            </a:solidFill>
+          </a:ln>
+        </p:spPr>
+        <p:style>
+          <a:lnRef idx="2">
+            <a:schemeClr val="accent1">
+              <a:shade val="50000"/>
+            </a:schemeClr>
+          </a:lnRef>
+          <a:fillRef idx="1">
+            <a:schemeClr val="accent1"/>
+          </a:fillRef>
+          <a:effectRef idx="0">
+            <a:schemeClr val="accent1"/>
+          </a:effectRef>
+          <a:fontRef idx="minor">
+            <a:schemeClr val="lt1"/>
+          </a:fontRef>
+        </p:style>
+        <p:txBody>
+          <a:bodyPr wrap="none" lIns="52922" tIns="52922" rIns="52922" rtlCol="0" anchor="ctr"/>
+          <a:lstStyle/>
+          <a:p>
+            <a:pPr algn="ctr" defTabSz="672130"/>
+            <a:endParaRPr lang="en-US" sz="1176" dirty="0">
+              <a:solidFill>
+                <a:prstClr val="black"/>
+              </a:solidFill>
+              <a:latin typeface="Exo 2 Medium" panose="00000600000000000000" pitchFamily="50" charset="0"/>
+              <a:cs typeface="Simplon BP Regular"/>
+            </a:endParaRPr>
+          </a:p>
+        </p:txBody>
+      </p:sp>
+      <p:sp>
+        <p:nvSpPr>
+          <p:cNvPr id="24" name="Oval 120">
+            <a:extLst>
+              <a:ext uri="{FF2B5EF4-FFF2-40B4-BE49-F238E27FC236}">
+                <a16:creationId xmlns:a16="http://schemas.microsoft.com/office/drawing/2014/main" id="{812564AE-899E-044A-B29B-2188F7BA8C60}"/>
+              </a:ext>
+            </a:extLst>
+          </p:cNvPr>
+          <p:cNvSpPr>
+            <a:spLocks noChangeAspect="1"/>
+          </p:cNvSpPr>
+          <p:nvPr/>
+        </p:nvSpPr>
+        <p:spPr>
+          <a:xfrm>
+            <a:off x="10180359" y="314020"/>
+            <a:ext cx="211404" cy="211689"/>
+          </a:xfrm>
+          <a:prstGeom prst="ellipse">
+            <a:avLst/>
+          </a:prstGeom>
+          <a:solidFill>
+            <a:srgbClr val="1BCF13"/>
+          </a:solidFill>
+          <a:ln w="12700">
+            <a:solidFill>
+              <a:schemeClr val="accent3"/>
+            </a:solidFill>
+          </a:ln>
+        </p:spPr>
+        <p:style>
+          <a:lnRef idx="2">
+            <a:schemeClr val="accent1">
+              <a:shade val="50000"/>
+            </a:schemeClr>
+          </a:lnRef>
+          <a:fillRef idx="1">
+            <a:schemeClr val="accent1"/>
+          </a:fillRef>
+          <a:effectRef idx="0">
+            <a:schemeClr val="accent1"/>
+          </a:effectRef>
+          <a:fontRef idx="minor">
+            <a:schemeClr val="lt1"/>
+          </a:fontRef>
+        </p:style>
+        <p:txBody>
+          <a:bodyPr wrap="none" lIns="52922" tIns="52922" rIns="52922" rtlCol="0" anchor="ctr"/>
+          <a:lstStyle/>
+          <a:p>
+            <a:pPr algn="ctr" defTabSz="672130"/>
+            <a:endParaRPr lang="en-US" sz="1176" dirty="0">
+              <a:solidFill>
+                <a:prstClr val="black"/>
+              </a:solidFill>
+              <a:latin typeface="Exo 2 Medium" panose="00000600000000000000" pitchFamily="50" charset="0"/>
+              <a:cs typeface="Simplon BP Regular"/>
+            </a:endParaRPr>
+          </a:p>
+        </p:txBody>
+      </p:sp>
+      <p:sp>
+        <p:nvSpPr>
+          <p:cNvPr id="7" name="CaixaDeTexto 6">
+            <a:extLst>
+              <a:ext uri="{FF2B5EF4-FFF2-40B4-BE49-F238E27FC236}">
+                <a16:creationId xmlns:a16="http://schemas.microsoft.com/office/drawing/2014/main" id="{BE4CE6BF-86B7-80AF-6F33-0C508C6BD420}"/>
+              </a:ext>
+            </a:extLst>
+          </p:cNvPr>
+          <p:cNvSpPr txBox="1"/>
+          <p:nvPr/>
+        </p:nvSpPr>
+        <p:spPr>
+          <a:xfrm>
+            <a:off x="11809708" y="1503336"/>
+            <a:ext cx="184731" cy="415498"/>
+          </a:xfrm>
+          <a:prstGeom prst="rect">
+            <a:avLst/>
+          </a:prstGeom>
+          <a:noFill/>
+        </p:spPr>
+        <p:txBody>
+          <a:bodyPr wrap="none" rtlCol="0">
+            <a:spAutoFit/>
+          </a:bodyPr>
+          <a:lstStyle/>
+          <a:p>
+            <a:endParaRPr lang="pt-BR" dirty="0"/>
+          </a:p>
+        </p:txBody>
+      </p:sp>
+      <p:sp>
+        <p:nvSpPr>
+          <p:cNvPr id="10" name="CaixaDeTexto 9">
+            <a:extLst>
+              <a:ext uri="{FF2B5EF4-FFF2-40B4-BE49-F238E27FC236}">
+                <a16:creationId xmlns:a16="http://schemas.microsoft.com/office/drawing/2014/main" id="{4C9F41AA-E726-2DA3-D4FC-032EF406FF04}"/>
+              </a:ext>
+            </a:extLst>
+          </p:cNvPr>
+          <p:cNvSpPr txBox="1"/>
+          <p:nvPr/>
+        </p:nvSpPr>
+        <p:spPr>
+          <a:xfrm>
+            <a:off x="11329261" y="1456841"/>
+            <a:ext cx="184731" cy="415498"/>
+          </a:xfrm>
+          <a:prstGeom prst="rect">
+            <a:avLst/>
+          </a:prstGeom>
+          <a:noFill/>
+        </p:spPr>
+        <p:txBody>
+          <a:bodyPr wrap="none" rtlCol="0">
+            <a:spAutoFit/>
+          </a:bodyPr>
+          <a:lstStyle/>
+          <a:p>
+            <a:endParaRPr lang="pt-BR" dirty="0"/>
+          </a:p>
+        </p:txBody>
+      </p:sp>
+      <p:sp>
+        <p:nvSpPr>
+          <p:cNvPr id="25" name="Rectangle 37">
+            <a:extLst>
+              <a:ext uri="{FF2B5EF4-FFF2-40B4-BE49-F238E27FC236}">
+                <a16:creationId xmlns:a16="http://schemas.microsoft.com/office/drawing/2014/main" id="{CF8E0F39-1427-AB67-E8F9-BAEDA87F6DF9}"/>
+              </a:ext>
+            </a:extLst>
+          </p:cNvPr>
+          <p:cNvSpPr/>
+          <p:nvPr/>
+        </p:nvSpPr>
+        <p:spPr>
+          <a:xfrm>
+            <a:off x="6814576" y="1177726"/>
+            <a:ext cx="6207777" cy="2235805"/>
+          </a:xfrm>
+          <a:prstGeom prst="rect">
+            <a:avLst/>
+          </a:prstGeom>
+          <a:noFill/>
+          <a:ln w="12700">
+            <a:solidFill>
+              <a:schemeClr val="bg1">
+                <a:lumMod val="50000"/>
+              </a:schemeClr>
+            </a:solidFill>
+          </a:ln>
+        </p:spPr>
+        <p:style>
+          <a:lnRef idx="2">
+            <a:schemeClr val="accent4"/>
+          </a:lnRef>
+          <a:fillRef idx="1">
+            <a:schemeClr val="lt1"/>
+          </a:fillRef>
+          <a:effectRef idx="0">
+            <a:schemeClr val="accent4"/>
+          </a:effectRef>
+          <a:fontRef idx="minor">
+            <a:schemeClr val="dk1"/>
+          </a:fontRef>
+        </p:style>
+        <p:txBody>
+          <a:bodyPr tIns="105844" rtlCol="0" anchor="t"/>
+          <a:lstStyle/>
+          <a:p>
+            <a:pPr marL="252049" indent="-252049" fontAlgn="base">
+              <a:spcBef>
+                <a:spcPct val="0"/>
+              </a:spcBef>
+              <a:buFont typeface="Wingdings" panose="05000000000000000000" pitchFamily="2" charset="2"/>
+              <a:buChar char="ü"/>
+              <a:defRPr/>
+            </a:pPr>
+            <a:r>
+              <a:rPr lang="pt-BR" sz="1323" dirty="0">
+                <a:solidFill>
+                  <a:schemeClr val="tx1"/>
+                </a:solidFill>
+                <a:latin typeface="Exo 2 Medium" panose="00000600000000000000" pitchFamily="50" charset="0"/>
+                <a:cs typeface="Simplon BP Regular"/>
+              </a:rPr>
+              <a:t>Problema de chegar no horário certo</a:t>
+            </a:r>
+            <a:endParaRPr lang="pt-BR" sz="1323" b="1" dirty="0">
+              <a:solidFill>
+                <a:schemeClr val="tx1"/>
+              </a:solidFill>
+              <a:latin typeface="Exo 2 Medium" panose="00000600000000000000" pitchFamily="50" charset="0"/>
+              <a:cs typeface="Simplon BP Regular"/>
+            </a:endParaRPr>
+          </a:p>
+          <a:p>
+            <a:pPr marL="252049" indent="-252049" fontAlgn="base">
+              <a:spcBef>
+                <a:spcPct val="0"/>
+              </a:spcBef>
+              <a:buFont typeface="Wingdings" panose="05000000000000000000" pitchFamily="2" charset="2"/>
+              <a:buChar char="ü"/>
+              <a:defRPr/>
+            </a:pPr>
+            <a:endParaRPr lang="pt-BR" sz="1323" b="1" dirty="0">
+              <a:solidFill>
+                <a:schemeClr val="tx1"/>
+              </a:solidFill>
+              <a:latin typeface="Exo 2 Medium" panose="00000600000000000000" pitchFamily="50" charset="0"/>
+              <a:cs typeface="Simplon BP Regular"/>
+            </a:endParaRPr>
+          </a:p>
+        </p:txBody>
+      </p:sp>
+    </p:spTree>
+    <p:extLst>
+      <p:ext uri="{BB962C8B-B14F-4D97-AF65-F5344CB8AC3E}">
+        <p14:creationId xmlns:p14="http://schemas.microsoft.com/office/powerpoint/2010/main" val="3238550511"/>
       </p:ext>
     </p:extLst>
   </p:cSld>
@@ -53692,12 +55881,6 @@
 </file>
 
 <file path=customXml/item1.xml><?xml version="1.0" encoding="utf-8"?>
-<p:properties xmlns:p="http://schemas.microsoft.com/office/2006/metadata/properties" xmlns:xsi="http://www.w3.org/2001/XMLSchema-instance" xmlns:pc="http://schemas.microsoft.com/office/infopath/2007/PartnerControls">
-  <documentManagement/>
-</p:properties>
-</file>
-
-<file path=customXml/item2.xml><?xml version="1.0" encoding="utf-8"?>
 <ct:contentTypeSchema xmlns:ct="http://schemas.microsoft.com/office/2006/metadata/contentType" xmlns:ma="http://schemas.microsoft.com/office/2006/metadata/properties/metaAttributes" ct:_="" ma:_="" ma:contentTypeName="Document" ma:contentTypeID="0x0101007F8ECE7139958D46ABEDA89D12B90CBF" ma:contentTypeVersion="0" ma:contentTypeDescription="Create a new document." ma:contentTypeScope="" ma:versionID="e6d660081116f63565d30cc13099d5ec">
   <xsd:schema xmlns:xsd="http://www.w3.org/2001/XMLSchema" xmlns:xs="http://www.w3.org/2001/XMLSchema" xmlns:p="http://schemas.microsoft.com/office/2006/metadata/properties" targetNamespace="http://schemas.microsoft.com/office/2006/metadata/properties" ma:root="true" ma:fieldsID="d413257cd9829394d17656a545d5fa4e">
     <xsd:element name="properties">
@@ -53811,6 +55994,12 @@
 </ct:contentTypeSchema>
 </file>
 
+<file path=customXml/item2.xml><?xml version="1.0" encoding="utf-8"?>
+<p:properties xmlns:p="http://schemas.microsoft.com/office/2006/metadata/properties" xmlns:xsi="http://www.w3.org/2001/XMLSchema-instance" xmlns:pc="http://schemas.microsoft.com/office/infopath/2007/PartnerControls">
+  <documentManagement/>
+</p:properties>
+</file>
+
 <file path=customXml/item3.xml><?xml version="1.0" encoding="utf-8"?>
 <?mso-contentType ?>
 <FormTemplates xmlns="http://schemas.microsoft.com/sharepoint/v3/contenttype/forms">
@@ -53821,6 +56010,22 @@
 </file>
 
 <file path=customXml/itemProps1.xml><?xml version="1.0" encoding="utf-8"?>
+<ds:datastoreItem xmlns:ds="http://schemas.openxmlformats.org/officeDocument/2006/customXml" ds:itemID="{EFDE92A4-5D2A-451A-A373-EB014CDC0D59}">
+  <ds:schemaRefs>
+    <ds:schemaRef ds:uri="http://schemas.microsoft.com/office/2006/metadata/contentType"/>
+    <ds:schemaRef ds:uri="http://schemas.microsoft.com/office/2006/metadata/properties/metaAttributes"/>
+    <ds:schemaRef ds:uri="http://www.w3.org/2001/XMLSchema"/>
+    <ds:schemaRef ds:uri="http://schemas.microsoft.com/office/2006/metadata/properties"/>
+    <ds:schemaRef ds:uri="http://schemas.openxmlformats.org/package/2006/metadata/core-properties"/>
+    <ds:schemaRef ds:uri="http://purl.org/dc/elements/1.1/"/>
+    <ds:schemaRef ds:uri="http://purl.org/dc/terms/"/>
+    <ds:schemaRef ds:uri="http://schemas.microsoft.com/internal/obd"/>
+    <ds:schemaRef ds:uri="http://schemas.microsoft.com/office/infopath/2007/PartnerControls"/>
+  </ds:schemaRefs>
+</ds:datastoreItem>
+</file>
+
+<file path=customXml/itemProps2.xml><?xml version="1.0" encoding="utf-8"?>
 <ds:datastoreItem xmlns:ds="http://schemas.openxmlformats.org/officeDocument/2006/customXml" ds:itemID="{4B31267F-D399-4A8A-87F8-B75F56828412}">
   <ds:schemaRefs>
     <ds:schemaRef ds:uri="http://www.w3.org/XML/1998/namespace"/>
@@ -53837,22 +56042,6 @@
 </ds:datastoreItem>
 </file>
 
-<file path=customXml/itemProps2.xml><?xml version="1.0" encoding="utf-8"?>
-<ds:datastoreItem xmlns:ds="http://schemas.openxmlformats.org/officeDocument/2006/customXml" ds:itemID="{EFDE92A4-5D2A-451A-A373-EB014CDC0D59}">
-  <ds:schemaRefs>
-    <ds:schemaRef ds:uri="http://schemas.microsoft.com/office/2006/metadata/contentType"/>
-    <ds:schemaRef ds:uri="http://schemas.microsoft.com/office/2006/metadata/properties/metaAttributes"/>
-    <ds:schemaRef ds:uri="http://www.w3.org/2001/XMLSchema"/>
-    <ds:schemaRef ds:uri="http://schemas.microsoft.com/office/2006/metadata/properties"/>
-    <ds:schemaRef ds:uri="http://schemas.openxmlformats.org/package/2006/metadata/core-properties"/>
-    <ds:schemaRef ds:uri="http://purl.org/dc/elements/1.1/"/>
-    <ds:schemaRef ds:uri="http://purl.org/dc/terms/"/>
-    <ds:schemaRef ds:uri="http://schemas.microsoft.com/internal/obd"/>
-    <ds:schemaRef ds:uri="http://schemas.microsoft.com/office/infopath/2007/PartnerControls"/>
-  </ds:schemaRefs>
-</ds:datastoreItem>
-</file>
-
 <file path=customXml/itemProps3.xml><?xml version="1.0" encoding="utf-8"?>
 <ds:datastoreItem xmlns:ds="http://schemas.openxmlformats.org/officeDocument/2006/customXml" ds:itemID="{E2481852-F24E-4532-AF30-C154D705D105}">
   <ds:schemaRefs>

</xml_diff>